<commit_message>
modified slide.pptx add bonus file
</commit_message>
<xml_diff>
--- a/slide/slide.pptx
+++ b/slide/slide.pptx
@@ -5,7 +5,7 @@
     <p:sldMasterId id="2147484061" r:id="rId1"/>
   </p:sldMasterIdLst>
   <p:handoutMasterIdLst>
-    <p:handoutMasterId r:id="rId29"/>
+    <p:handoutMasterId r:id="rId30"/>
   </p:handoutMasterIdLst>
   <p:sldIdLst>
     <p:sldId id="256" r:id="rId2"/>
@@ -34,7 +34,8 @@
     <p:sldId id="276" r:id="rId25"/>
     <p:sldId id="277" r:id="rId26"/>
     <p:sldId id="278" r:id="rId27"/>
-    <p:sldId id="279" r:id="rId28"/>
+    <p:sldId id="284" r:id="rId28"/>
+    <p:sldId id="279" r:id="rId29"/>
   </p:sldIdLst>
   <p:sldSz cx="12192000" cy="6858000"/>
   <p:notesSz cx="6858000" cy="9144000"/>
@@ -8856,26 +8857,26 @@
     </dgm:pt>
   </dgm:ptLst>
   <dgm:cxnLst>
+    <dgm:cxn modelId="{889D3ADF-09C9-2144-B5D9-B33D081606A2}" type="presOf" srcId="{44285950-97B1-954D-8448-243641BC6FD7}" destId="{27C1471F-514F-744F-9A8A-C77838F25AFA}" srcOrd="1" destOrd="0" presId="urn:microsoft.com/office/officeart/2005/8/layout/orgChart1"/>
+    <dgm:cxn modelId="{5450766F-C1E3-E943-83C6-40DB6E929DA7}" type="presOf" srcId="{ED24DCD5-46B7-F143-9547-B253FFB3D4D8}" destId="{A689083C-E991-8349-BBC0-BDEAECBAA80D}" srcOrd="1" destOrd="0" presId="urn:microsoft.com/office/officeart/2005/8/layout/orgChart1"/>
     <dgm:cxn modelId="{12BCE417-EE24-9942-AB6A-F50BEF8C52DC}" type="presOf" srcId="{43B2BE2C-A78A-4E4C-9E65-38A67FFDF117}" destId="{A885C91C-716E-0D4C-8D28-37B85352E8FF}" srcOrd="0" destOrd="0" presId="urn:microsoft.com/office/officeart/2005/8/layout/orgChart1"/>
-    <dgm:cxn modelId="{889D3ADF-09C9-2144-B5D9-B33D081606A2}" type="presOf" srcId="{44285950-97B1-954D-8448-243641BC6FD7}" destId="{27C1471F-514F-744F-9A8A-C77838F25AFA}" srcOrd="1" destOrd="0" presId="urn:microsoft.com/office/officeart/2005/8/layout/orgChart1"/>
+    <dgm:cxn modelId="{4A517139-B842-2A47-8A12-FDB63769C7FD}" type="presOf" srcId="{5955E86F-934E-C944-B183-E396B499A11D}" destId="{67B05306-2550-544E-BDF8-2E33EB611779}" srcOrd="0" destOrd="0" presId="urn:microsoft.com/office/officeart/2005/8/layout/orgChart1"/>
+    <dgm:cxn modelId="{8AFE7B53-1348-5549-83AF-F785CE8572F8}" srcId="{1271E3A9-F07D-7148-94A8-F96DE13B6CA3}" destId="{ED24DCD5-46B7-F143-9547-B253FFB3D4D8}" srcOrd="3" destOrd="0" parTransId="{2932C3D4-E480-E94E-B134-C2C5204A55DB}" sibTransId="{43533F31-6A75-C741-8CCE-47C2BDB92FED}"/>
+    <dgm:cxn modelId="{A80AE60C-C797-924D-BFB7-9A751B55A6EF}" srcId="{8C10AF25-A19D-1E48-BFA9-2709B555A444}" destId="{1271E3A9-F07D-7148-94A8-F96DE13B6CA3}" srcOrd="0" destOrd="0" parTransId="{AE410722-308F-8B48-93B8-84A8AAD7E9A5}" sibTransId="{8850374B-EF5E-F841-9493-EFA1B035BA0D}"/>
+    <dgm:cxn modelId="{847996F4-C7B1-434B-8498-41ED5E31E63C}" type="presOf" srcId="{0BD8BD6F-4059-5842-B41E-7201FF7E7385}" destId="{67B1947C-96B6-1842-81DF-F65F45E04F1D}" srcOrd="0" destOrd="0" presId="urn:microsoft.com/office/officeart/2005/8/layout/orgChart1"/>
+    <dgm:cxn modelId="{3F59919D-0219-F44D-966A-8B77C56A4F76}" type="presOf" srcId="{ED24DCD5-46B7-F143-9547-B253FFB3D4D8}" destId="{02D30F74-B502-154B-8A51-BC7611EE7C02}" srcOrd="0" destOrd="0" presId="urn:microsoft.com/office/officeart/2005/8/layout/orgChart1"/>
+    <dgm:cxn modelId="{26782347-1FFF-E143-8540-C1BF7A9A1BBE}" srcId="{1271E3A9-F07D-7148-94A8-F96DE13B6CA3}" destId="{4FD574EF-A3A1-F848-B909-A43B94BC4D89}" srcOrd="0" destOrd="0" parTransId="{5955E86F-934E-C944-B183-E396B499A11D}" sibTransId="{3F9493D3-C7F5-D746-80F0-876DBC1E2084}"/>
+    <dgm:cxn modelId="{067EF7F8-B2DE-1441-B3D6-5F6CC164AEBA}" type="presOf" srcId="{44285950-97B1-954D-8448-243641BC6FD7}" destId="{94F4AAAC-4F38-BB42-8475-7FEC2A97FD39}" srcOrd="0" destOrd="0" presId="urn:microsoft.com/office/officeart/2005/8/layout/orgChart1"/>
+    <dgm:cxn modelId="{80C4D379-F9E5-C844-8424-F9434C426004}" type="presOf" srcId="{4FD574EF-A3A1-F848-B909-A43B94BC4D89}" destId="{90D16A83-FE34-4D41-8FE6-162A4887B839}" srcOrd="0" destOrd="0" presId="urn:microsoft.com/office/officeart/2005/8/layout/orgChart1"/>
     <dgm:cxn modelId="{CF60B21B-8361-8046-92F7-7EE5286E2889}" srcId="{1271E3A9-F07D-7148-94A8-F96DE13B6CA3}" destId="{44285950-97B1-954D-8448-243641BC6FD7}" srcOrd="2" destOrd="0" parTransId="{43B2BE2C-A78A-4E4C-9E65-38A67FFDF117}" sibTransId="{5BC00911-0CB0-364A-B03A-D15A0421CD18}"/>
-    <dgm:cxn modelId="{80C4D379-F9E5-C844-8424-F9434C426004}" type="presOf" srcId="{4FD574EF-A3A1-F848-B909-A43B94BC4D89}" destId="{90D16A83-FE34-4D41-8FE6-162A4887B839}" srcOrd="0" destOrd="0" presId="urn:microsoft.com/office/officeart/2005/8/layout/orgChart1"/>
+    <dgm:cxn modelId="{A1F6F36A-CD1A-7F43-9E0E-96A4D171A5A0}" type="presOf" srcId="{1271E3A9-F07D-7148-94A8-F96DE13B6CA3}" destId="{05C0B997-D0F6-DE41-A6BC-E2EC2213C154}" srcOrd="1" destOrd="0" presId="urn:microsoft.com/office/officeart/2005/8/layout/orgChart1"/>
+    <dgm:cxn modelId="{141570B4-B71C-0242-BA9C-0AA40367CD3F}" type="presOf" srcId="{0425588E-6D16-FF4A-8216-D519204F89AB}" destId="{6D7C6313-1BBE-F342-A7C8-CFCC2C28288A}" srcOrd="0" destOrd="0" presId="urn:microsoft.com/office/officeart/2005/8/layout/orgChart1"/>
+    <dgm:cxn modelId="{C605DFBA-47EC-A141-97B1-08F10B07A0C5}" type="presOf" srcId="{1271E3A9-F07D-7148-94A8-F96DE13B6CA3}" destId="{D035A074-A5DA-AB41-B4FF-4A98E17DC0C4}" srcOrd="0" destOrd="0" presId="urn:microsoft.com/office/officeart/2005/8/layout/orgChart1"/>
     <dgm:cxn modelId="{BE7D097B-97A0-D942-84A6-602CD388A563}" type="presOf" srcId="{4FD574EF-A3A1-F848-B909-A43B94BC4D89}" destId="{9B830744-9148-C442-9527-E440AA419B43}" srcOrd="1" destOrd="0" presId="urn:microsoft.com/office/officeart/2005/8/layout/orgChart1"/>
-    <dgm:cxn modelId="{067EF7F8-B2DE-1441-B3D6-5F6CC164AEBA}" type="presOf" srcId="{44285950-97B1-954D-8448-243641BC6FD7}" destId="{94F4AAAC-4F38-BB42-8475-7FEC2A97FD39}" srcOrd="0" destOrd="0" presId="urn:microsoft.com/office/officeart/2005/8/layout/orgChart1"/>
     <dgm:cxn modelId="{E97BFB0D-D308-304F-B522-5239B207B1D5}" type="presOf" srcId="{2932C3D4-E480-E94E-B134-C2C5204A55DB}" destId="{2E939C9E-B407-3842-9A6C-C01FA0C64C7C}" srcOrd="0" destOrd="0" presId="urn:microsoft.com/office/officeart/2005/8/layout/orgChart1"/>
     <dgm:cxn modelId="{43CF36B9-EF7C-EC4C-8F91-133C057FDAFE}" type="presOf" srcId="{0425588E-6D16-FF4A-8216-D519204F89AB}" destId="{12971D78-19B7-4745-AC00-A68EF5EA2DAA}" srcOrd="1" destOrd="0" presId="urn:microsoft.com/office/officeart/2005/8/layout/orgChart1"/>
-    <dgm:cxn modelId="{A1F6F36A-CD1A-7F43-9E0E-96A4D171A5A0}" type="presOf" srcId="{1271E3A9-F07D-7148-94A8-F96DE13B6CA3}" destId="{05C0B997-D0F6-DE41-A6BC-E2EC2213C154}" srcOrd="1" destOrd="0" presId="urn:microsoft.com/office/officeart/2005/8/layout/orgChart1"/>
     <dgm:cxn modelId="{74F00F81-F54C-DB4A-BF1D-09BC4EFA0B09}" type="presOf" srcId="{8C10AF25-A19D-1E48-BFA9-2709B555A444}" destId="{3C735618-11EC-9B4B-B894-6DDF7C148F83}" srcOrd="0" destOrd="0" presId="urn:microsoft.com/office/officeart/2005/8/layout/orgChart1"/>
-    <dgm:cxn modelId="{3F59919D-0219-F44D-966A-8B77C56A4F76}" type="presOf" srcId="{ED24DCD5-46B7-F143-9547-B253FFB3D4D8}" destId="{02D30F74-B502-154B-8A51-BC7611EE7C02}" srcOrd="0" destOrd="0" presId="urn:microsoft.com/office/officeart/2005/8/layout/orgChart1"/>
-    <dgm:cxn modelId="{A80AE60C-C797-924D-BFB7-9A751B55A6EF}" srcId="{8C10AF25-A19D-1E48-BFA9-2709B555A444}" destId="{1271E3A9-F07D-7148-94A8-F96DE13B6CA3}" srcOrd="0" destOrd="0" parTransId="{AE410722-308F-8B48-93B8-84A8AAD7E9A5}" sibTransId="{8850374B-EF5E-F841-9493-EFA1B035BA0D}"/>
-    <dgm:cxn modelId="{5450766F-C1E3-E943-83C6-40DB6E929DA7}" type="presOf" srcId="{ED24DCD5-46B7-F143-9547-B253FFB3D4D8}" destId="{A689083C-E991-8349-BBC0-BDEAECBAA80D}" srcOrd="1" destOrd="0" presId="urn:microsoft.com/office/officeart/2005/8/layout/orgChart1"/>
-    <dgm:cxn modelId="{141570B4-B71C-0242-BA9C-0AA40367CD3F}" type="presOf" srcId="{0425588E-6D16-FF4A-8216-D519204F89AB}" destId="{6D7C6313-1BBE-F342-A7C8-CFCC2C28288A}" srcOrd="0" destOrd="0" presId="urn:microsoft.com/office/officeart/2005/8/layout/orgChart1"/>
-    <dgm:cxn modelId="{847996F4-C7B1-434B-8498-41ED5E31E63C}" type="presOf" srcId="{0BD8BD6F-4059-5842-B41E-7201FF7E7385}" destId="{67B1947C-96B6-1842-81DF-F65F45E04F1D}" srcOrd="0" destOrd="0" presId="urn:microsoft.com/office/officeart/2005/8/layout/orgChart1"/>
     <dgm:cxn modelId="{2572ECCB-0814-DD47-ADB6-9F830C3A32D8}" srcId="{1271E3A9-F07D-7148-94A8-F96DE13B6CA3}" destId="{0425588E-6D16-FF4A-8216-D519204F89AB}" srcOrd="1" destOrd="0" parTransId="{0BD8BD6F-4059-5842-B41E-7201FF7E7385}" sibTransId="{840F40D2-89AB-4542-BB7E-584322F98471}"/>
-    <dgm:cxn modelId="{C605DFBA-47EC-A141-97B1-08F10B07A0C5}" type="presOf" srcId="{1271E3A9-F07D-7148-94A8-F96DE13B6CA3}" destId="{D035A074-A5DA-AB41-B4FF-4A98E17DC0C4}" srcOrd="0" destOrd="0" presId="urn:microsoft.com/office/officeart/2005/8/layout/orgChart1"/>
-    <dgm:cxn modelId="{8AFE7B53-1348-5549-83AF-F785CE8572F8}" srcId="{1271E3A9-F07D-7148-94A8-F96DE13B6CA3}" destId="{ED24DCD5-46B7-F143-9547-B253FFB3D4D8}" srcOrd="3" destOrd="0" parTransId="{2932C3D4-E480-E94E-B134-C2C5204A55DB}" sibTransId="{43533F31-6A75-C741-8CCE-47C2BDB92FED}"/>
-    <dgm:cxn modelId="{4A517139-B842-2A47-8A12-FDB63769C7FD}" type="presOf" srcId="{5955E86F-934E-C944-B183-E396B499A11D}" destId="{67B05306-2550-544E-BDF8-2E33EB611779}" srcOrd="0" destOrd="0" presId="urn:microsoft.com/office/officeart/2005/8/layout/orgChart1"/>
-    <dgm:cxn modelId="{26782347-1FFF-E143-8540-C1BF7A9A1BBE}" srcId="{1271E3A9-F07D-7148-94A8-F96DE13B6CA3}" destId="{4FD574EF-A3A1-F848-B909-A43B94BC4D89}" srcOrd="0" destOrd="0" parTransId="{5955E86F-934E-C944-B183-E396B499A11D}" sibTransId="{3F9493D3-C7F5-D746-80F0-876DBC1E2084}"/>
     <dgm:cxn modelId="{46EAAD64-FB1C-4846-8AEB-21B18C477AFC}" type="presParOf" srcId="{3C735618-11EC-9B4B-B894-6DDF7C148F83}" destId="{CFFF82D3-F649-0748-B234-4554EAC7DAD4}" srcOrd="0" destOrd="0" presId="urn:microsoft.com/office/officeart/2005/8/layout/orgChart1"/>
     <dgm:cxn modelId="{14C53332-B573-1F43-B098-E19FAFC7E1FA}" type="presParOf" srcId="{CFFF82D3-F649-0748-B234-4554EAC7DAD4}" destId="{FD092DBD-75E9-5641-8A51-394C5206F6E4}" srcOrd="0" destOrd="0" presId="urn:microsoft.com/office/officeart/2005/8/layout/orgChart1"/>
     <dgm:cxn modelId="{78ABF3F7-9195-4A4B-987A-A8E515E739EE}" type="presParOf" srcId="{FD092DBD-75E9-5641-8A51-394C5206F6E4}" destId="{D035A074-A5DA-AB41-B4FF-4A98E17DC0C4}" srcOrd="0" destOrd="0" presId="urn:microsoft.com/office/officeart/2005/8/layout/orgChart1"/>
@@ -9068,6 +9069,13 @@
         </dgm:presLayoutVars>
       </dgm:prSet>
       <dgm:spPr/>
+      <dgm:t>
+        <a:bodyPr/>
+        <a:lstStyle/>
+        <a:p>
+          <a:endParaRPr lang="zh-CN" altLang="en-US"/>
+        </a:p>
+      </dgm:t>
     </dgm:pt>
     <dgm:pt modelId="{193AE683-08EF-8C49-A426-40B8F786F13C}" type="pres">
       <dgm:prSet presAssocID="{17B9B7FE-9A8F-2E4A-B5ED-90BA7CAAADA0}" presName="root" presStyleCnt="0"/>
@@ -9080,10 +9088,24 @@
     <dgm:pt modelId="{ED950FE3-7B26-E14B-888C-E43CDF733C2E}" type="pres">
       <dgm:prSet presAssocID="{17B9B7FE-9A8F-2E4A-B5ED-90BA7CAAADA0}" presName="rootText" presStyleLbl="node1" presStyleIdx="0" presStyleCnt="1" custScaleX="302654" custScaleY="44410"/>
       <dgm:spPr/>
+      <dgm:t>
+        <a:bodyPr/>
+        <a:lstStyle/>
+        <a:p>
+          <a:endParaRPr lang="zh-CN" altLang="en-US"/>
+        </a:p>
+      </dgm:t>
     </dgm:pt>
     <dgm:pt modelId="{CDA16BFD-D8B0-004C-A84A-0727E5793A13}" type="pres">
       <dgm:prSet presAssocID="{17B9B7FE-9A8F-2E4A-B5ED-90BA7CAAADA0}" presName="rootConnector" presStyleLbl="node1" presStyleIdx="0" presStyleCnt="1"/>
       <dgm:spPr/>
+      <dgm:t>
+        <a:bodyPr/>
+        <a:lstStyle/>
+        <a:p>
+          <a:endParaRPr lang="zh-CN" altLang="en-US"/>
+        </a:p>
+      </dgm:t>
     </dgm:pt>
     <dgm:pt modelId="{1B6F5376-3435-BF49-B758-39D145C10320}" type="pres">
       <dgm:prSet presAssocID="{17B9B7FE-9A8F-2E4A-B5ED-90BA7CAAADA0}" presName="childShape" presStyleCnt="0"/>
@@ -9092,6 +9114,13 @@
     <dgm:pt modelId="{BA009531-8E45-AE42-8A1F-57226ECED7ED}" type="pres">
       <dgm:prSet presAssocID="{EDDC5440-C056-784D-A1A6-65953B41FD30}" presName="Name13" presStyleLbl="parChTrans1D2" presStyleIdx="0" presStyleCnt="2"/>
       <dgm:spPr/>
+      <dgm:t>
+        <a:bodyPr/>
+        <a:lstStyle/>
+        <a:p>
+          <a:endParaRPr lang="zh-CN" altLang="en-US"/>
+        </a:p>
+      </dgm:t>
     </dgm:pt>
     <dgm:pt modelId="{C1F7ACAF-6C70-9F45-B795-16CD23F7961A}" type="pres">
       <dgm:prSet presAssocID="{41CC77BB-AA0B-D44F-B571-10C43F2DEDE3}" presName="childText" presStyleLbl="bgAcc1" presStyleIdx="0" presStyleCnt="2" custScaleX="212288">
@@ -9100,10 +9129,24 @@
         </dgm:presLayoutVars>
       </dgm:prSet>
       <dgm:spPr/>
+      <dgm:t>
+        <a:bodyPr/>
+        <a:lstStyle/>
+        <a:p>
+          <a:endParaRPr lang="zh-CN" altLang="en-US"/>
+        </a:p>
+      </dgm:t>
     </dgm:pt>
     <dgm:pt modelId="{230D6829-C0B5-DF42-9813-AD24C3105BDC}" type="pres">
       <dgm:prSet presAssocID="{A8BF23CB-E7FE-4044-A30E-28D1E9328986}" presName="Name13" presStyleLbl="parChTrans1D2" presStyleIdx="1" presStyleCnt="2"/>
       <dgm:spPr/>
+      <dgm:t>
+        <a:bodyPr/>
+        <a:lstStyle/>
+        <a:p>
+          <a:endParaRPr lang="zh-CN" altLang="en-US"/>
+        </a:p>
+      </dgm:t>
     </dgm:pt>
     <dgm:pt modelId="{96ED63A9-FF7C-1D49-A82A-0BFB6FC7670F}" type="pres">
       <dgm:prSet presAssocID="{C85A2100-9CA6-A54F-AFEC-58AD702205B1}" presName="childText" presStyleLbl="bgAcc1" presStyleIdx="1" presStyleCnt="2" custScaleX="216354">
@@ -9112,11 +9155,18 @@
         </dgm:presLayoutVars>
       </dgm:prSet>
       <dgm:spPr/>
+      <dgm:t>
+        <a:bodyPr/>
+        <a:lstStyle/>
+        <a:p>
+          <a:endParaRPr lang="zh-CN" altLang="en-US"/>
+        </a:p>
+      </dgm:t>
     </dgm:pt>
   </dgm:ptLst>
   <dgm:cxnLst>
+    <dgm:cxn modelId="{89067C34-43EB-104D-93F1-6C6DECAF7378}" srcId="{17B9B7FE-9A8F-2E4A-B5ED-90BA7CAAADA0}" destId="{41CC77BB-AA0B-D44F-B571-10C43F2DEDE3}" srcOrd="0" destOrd="0" parTransId="{EDDC5440-C056-784D-A1A6-65953B41FD30}" sibTransId="{0D604A74-00DF-D548-8E11-E301DF3C3556}"/>
     <dgm:cxn modelId="{665FCED5-550A-5D45-BECF-176E1687BCF7}" type="presOf" srcId="{A8BF23CB-E7FE-4044-A30E-28D1E9328986}" destId="{230D6829-C0B5-DF42-9813-AD24C3105BDC}" srcOrd="0" destOrd="0" presId="urn:microsoft.com/office/officeart/2005/8/layout/hierarchy3"/>
-    <dgm:cxn modelId="{89067C34-43EB-104D-93F1-6C6DECAF7378}" srcId="{17B9B7FE-9A8F-2E4A-B5ED-90BA7CAAADA0}" destId="{41CC77BB-AA0B-D44F-B571-10C43F2DEDE3}" srcOrd="0" destOrd="0" parTransId="{EDDC5440-C056-784D-A1A6-65953B41FD30}" sibTransId="{0D604A74-00DF-D548-8E11-E301DF3C3556}"/>
     <dgm:cxn modelId="{AD39BF14-E25A-4041-B380-7A96690E0881}" type="presOf" srcId="{C85A2100-9CA6-A54F-AFEC-58AD702205B1}" destId="{96ED63A9-FF7C-1D49-A82A-0BFB6FC7670F}" srcOrd="0" destOrd="0" presId="urn:microsoft.com/office/officeart/2005/8/layout/hierarchy3"/>
     <dgm:cxn modelId="{F3D7F47F-3401-AC4E-87B2-383EEEA9EB83}" srcId="{B280AD3E-FF09-964E-9235-35F984C10542}" destId="{17B9B7FE-9A8F-2E4A-B5ED-90BA7CAAADA0}" srcOrd="0" destOrd="0" parTransId="{19CA0D0F-92E0-E648-A38F-6E85FC96F45D}" sibTransId="{0F89FDCD-3B99-384E-976E-FE7297545BAF}"/>
     <dgm:cxn modelId="{EA28AC75-5A51-D54C-A22C-D4220FAE8DF5}" type="presOf" srcId="{17B9B7FE-9A8F-2E4A-B5ED-90BA7CAAADA0}" destId="{ED950FE3-7B26-E14B-888C-E43CDF733C2E}" srcOrd="0" destOrd="0" presId="urn:microsoft.com/office/officeart/2005/8/layout/hierarchy3"/>
@@ -9368,38 +9418,6 @@
         </dgm:presLayoutVars>
       </dgm:prSet>
       <dgm:spPr/>
-    </dgm:pt>
-    <dgm:pt modelId="{193AE683-08EF-8C49-A426-40B8F786F13C}" type="pres">
-      <dgm:prSet presAssocID="{17B9B7FE-9A8F-2E4A-B5ED-90BA7CAAADA0}" presName="root" presStyleCnt="0"/>
-      <dgm:spPr/>
-    </dgm:pt>
-    <dgm:pt modelId="{03DE2F3B-D99A-7742-BE5F-84CD154C82A6}" type="pres">
-      <dgm:prSet presAssocID="{17B9B7FE-9A8F-2E4A-B5ED-90BA7CAAADA0}" presName="rootComposite" presStyleCnt="0"/>
-      <dgm:spPr/>
-    </dgm:pt>
-    <dgm:pt modelId="{ED950FE3-7B26-E14B-888C-E43CDF733C2E}" type="pres">
-      <dgm:prSet presAssocID="{17B9B7FE-9A8F-2E4A-B5ED-90BA7CAAADA0}" presName="rootText" presStyleLbl="node1" presStyleIdx="0" presStyleCnt="1" custScaleX="593455" custScaleY="60757"/>
-      <dgm:spPr/>
-    </dgm:pt>
-    <dgm:pt modelId="{CDA16BFD-D8B0-004C-A84A-0727E5793A13}" type="pres">
-      <dgm:prSet presAssocID="{17B9B7FE-9A8F-2E4A-B5ED-90BA7CAAADA0}" presName="rootConnector" presStyleLbl="node1" presStyleIdx="0" presStyleCnt="1"/>
-      <dgm:spPr/>
-    </dgm:pt>
-    <dgm:pt modelId="{1B6F5376-3435-BF49-B758-39D145C10320}" type="pres">
-      <dgm:prSet presAssocID="{17B9B7FE-9A8F-2E4A-B5ED-90BA7CAAADA0}" presName="childShape" presStyleCnt="0"/>
-      <dgm:spPr/>
-    </dgm:pt>
-    <dgm:pt modelId="{BA009531-8E45-AE42-8A1F-57226ECED7ED}" type="pres">
-      <dgm:prSet presAssocID="{EDDC5440-C056-784D-A1A6-65953B41FD30}" presName="Name13" presStyleLbl="parChTrans1D2" presStyleIdx="0" presStyleCnt="4"/>
-      <dgm:spPr/>
-    </dgm:pt>
-    <dgm:pt modelId="{C1F7ACAF-6C70-9F45-B795-16CD23F7961A}" type="pres">
-      <dgm:prSet presAssocID="{41CC77BB-AA0B-D44F-B571-10C43F2DEDE3}" presName="childText" presStyleLbl="bgAcc1" presStyleIdx="0" presStyleCnt="4" custScaleX="406069">
-        <dgm:presLayoutVars>
-          <dgm:bulletEnabled val="1"/>
-        </dgm:presLayoutVars>
-      </dgm:prSet>
-      <dgm:spPr/>
       <dgm:t>
         <a:bodyPr/>
         <a:lstStyle/>
@@ -9408,16 +9426,16 @@
         </a:p>
       </dgm:t>
     </dgm:pt>
-    <dgm:pt modelId="{230D6829-C0B5-DF42-9813-AD24C3105BDC}" type="pres">
-      <dgm:prSet presAssocID="{A8BF23CB-E7FE-4044-A30E-28D1E9328986}" presName="Name13" presStyleLbl="parChTrans1D2" presStyleIdx="1" presStyleCnt="4"/>
-      <dgm:spPr/>
-    </dgm:pt>
-    <dgm:pt modelId="{96ED63A9-FF7C-1D49-A82A-0BFB6FC7670F}" type="pres">
-      <dgm:prSet presAssocID="{C85A2100-9CA6-A54F-AFEC-58AD702205B1}" presName="childText" presStyleLbl="bgAcc1" presStyleIdx="1" presStyleCnt="4" custScaleX="404531">
-        <dgm:presLayoutVars>
-          <dgm:bulletEnabled val="1"/>
-        </dgm:presLayoutVars>
-      </dgm:prSet>
+    <dgm:pt modelId="{193AE683-08EF-8C49-A426-40B8F786F13C}" type="pres">
+      <dgm:prSet presAssocID="{17B9B7FE-9A8F-2E4A-B5ED-90BA7CAAADA0}" presName="root" presStyleCnt="0"/>
+      <dgm:spPr/>
+    </dgm:pt>
+    <dgm:pt modelId="{03DE2F3B-D99A-7742-BE5F-84CD154C82A6}" type="pres">
+      <dgm:prSet presAssocID="{17B9B7FE-9A8F-2E4A-B5ED-90BA7CAAADA0}" presName="rootComposite" presStyleCnt="0"/>
+      <dgm:spPr/>
+    </dgm:pt>
+    <dgm:pt modelId="{ED950FE3-7B26-E14B-888C-E43CDF733C2E}" type="pres">
+      <dgm:prSet presAssocID="{17B9B7FE-9A8F-2E4A-B5ED-90BA7CAAADA0}" presName="rootText" presStyleLbl="node1" presStyleIdx="0" presStyleCnt="1" custScaleX="593455" custScaleY="60757"/>
       <dgm:spPr/>
       <dgm:t>
         <a:bodyPr/>
@@ -9427,16 +9445,8 @@
         </a:p>
       </dgm:t>
     </dgm:pt>
-    <dgm:pt modelId="{F5906803-D1E7-4541-A760-4FE2B9C37C92}" type="pres">
-      <dgm:prSet presAssocID="{ADD49C36-D877-0641-A616-ACAEA0CB0071}" presName="Name13" presStyleLbl="parChTrans1D2" presStyleIdx="2" presStyleCnt="4"/>
-      <dgm:spPr/>
-    </dgm:pt>
-    <dgm:pt modelId="{01868C30-E0CF-2641-A61F-803BD13A8897}" type="pres">
-      <dgm:prSet presAssocID="{E6FA4723-57A1-1240-970F-13BDBB6DCE45}" presName="childText" presStyleLbl="bgAcc1" presStyleIdx="2" presStyleCnt="4" custScaleX="404531">
-        <dgm:presLayoutVars>
-          <dgm:bulletEnabled val="1"/>
-        </dgm:presLayoutVars>
-      </dgm:prSet>
+    <dgm:pt modelId="{CDA16BFD-D8B0-004C-A84A-0727E5793A13}" type="pres">
+      <dgm:prSet presAssocID="{17B9B7FE-9A8F-2E4A-B5ED-90BA7CAAADA0}" presName="rootConnector" presStyleLbl="node1" presStyleIdx="0" presStyleCnt="1"/>
       <dgm:spPr/>
       <dgm:t>
         <a:bodyPr/>
@@ -9446,9 +9456,98 @@
         </a:p>
       </dgm:t>
     </dgm:pt>
+    <dgm:pt modelId="{1B6F5376-3435-BF49-B758-39D145C10320}" type="pres">
+      <dgm:prSet presAssocID="{17B9B7FE-9A8F-2E4A-B5ED-90BA7CAAADA0}" presName="childShape" presStyleCnt="0"/>
+      <dgm:spPr/>
+    </dgm:pt>
+    <dgm:pt modelId="{BA009531-8E45-AE42-8A1F-57226ECED7ED}" type="pres">
+      <dgm:prSet presAssocID="{EDDC5440-C056-784D-A1A6-65953B41FD30}" presName="Name13" presStyleLbl="parChTrans1D2" presStyleIdx="0" presStyleCnt="4"/>
+      <dgm:spPr/>
+      <dgm:t>
+        <a:bodyPr/>
+        <a:lstStyle/>
+        <a:p>
+          <a:endParaRPr lang="zh-CN" altLang="en-US"/>
+        </a:p>
+      </dgm:t>
+    </dgm:pt>
+    <dgm:pt modelId="{C1F7ACAF-6C70-9F45-B795-16CD23F7961A}" type="pres">
+      <dgm:prSet presAssocID="{41CC77BB-AA0B-D44F-B571-10C43F2DEDE3}" presName="childText" presStyleLbl="bgAcc1" presStyleIdx="0" presStyleCnt="4" custScaleX="406069">
+        <dgm:presLayoutVars>
+          <dgm:bulletEnabled val="1"/>
+        </dgm:presLayoutVars>
+      </dgm:prSet>
+      <dgm:spPr/>
+      <dgm:t>
+        <a:bodyPr/>
+        <a:lstStyle/>
+        <a:p>
+          <a:endParaRPr lang="zh-CN" altLang="en-US"/>
+        </a:p>
+      </dgm:t>
+    </dgm:pt>
+    <dgm:pt modelId="{230D6829-C0B5-DF42-9813-AD24C3105BDC}" type="pres">
+      <dgm:prSet presAssocID="{A8BF23CB-E7FE-4044-A30E-28D1E9328986}" presName="Name13" presStyleLbl="parChTrans1D2" presStyleIdx="1" presStyleCnt="4"/>
+      <dgm:spPr/>
+      <dgm:t>
+        <a:bodyPr/>
+        <a:lstStyle/>
+        <a:p>
+          <a:endParaRPr lang="zh-CN" altLang="en-US"/>
+        </a:p>
+      </dgm:t>
+    </dgm:pt>
+    <dgm:pt modelId="{96ED63A9-FF7C-1D49-A82A-0BFB6FC7670F}" type="pres">
+      <dgm:prSet presAssocID="{C85A2100-9CA6-A54F-AFEC-58AD702205B1}" presName="childText" presStyleLbl="bgAcc1" presStyleIdx="1" presStyleCnt="4" custScaleX="404531">
+        <dgm:presLayoutVars>
+          <dgm:bulletEnabled val="1"/>
+        </dgm:presLayoutVars>
+      </dgm:prSet>
+      <dgm:spPr/>
+      <dgm:t>
+        <a:bodyPr/>
+        <a:lstStyle/>
+        <a:p>
+          <a:endParaRPr lang="zh-CN" altLang="en-US"/>
+        </a:p>
+      </dgm:t>
+    </dgm:pt>
+    <dgm:pt modelId="{F5906803-D1E7-4541-A760-4FE2B9C37C92}" type="pres">
+      <dgm:prSet presAssocID="{ADD49C36-D877-0641-A616-ACAEA0CB0071}" presName="Name13" presStyleLbl="parChTrans1D2" presStyleIdx="2" presStyleCnt="4"/>
+      <dgm:spPr/>
+      <dgm:t>
+        <a:bodyPr/>
+        <a:lstStyle/>
+        <a:p>
+          <a:endParaRPr lang="zh-CN" altLang="en-US"/>
+        </a:p>
+      </dgm:t>
+    </dgm:pt>
+    <dgm:pt modelId="{01868C30-E0CF-2641-A61F-803BD13A8897}" type="pres">
+      <dgm:prSet presAssocID="{E6FA4723-57A1-1240-970F-13BDBB6DCE45}" presName="childText" presStyleLbl="bgAcc1" presStyleIdx="2" presStyleCnt="4" custScaleX="404531">
+        <dgm:presLayoutVars>
+          <dgm:bulletEnabled val="1"/>
+        </dgm:presLayoutVars>
+      </dgm:prSet>
+      <dgm:spPr/>
+      <dgm:t>
+        <a:bodyPr/>
+        <a:lstStyle/>
+        <a:p>
+          <a:endParaRPr lang="zh-CN" altLang="en-US"/>
+        </a:p>
+      </dgm:t>
+    </dgm:pt>
     <dgm:pt modelId="{A41CABD6-FD21-694E-878F-F7B3EE67B258}" type="pres">
       <dgm:prSet presAssocID="{99A15A79-27CB-F349-B664-2F14387B698F}" presName="Name13" presStyleLbl="parChTrans1D2" presStyleIdx="3" presStyleCnt="4"/>
       <dgm:spPr/>
+      <dgm:t>
+        <a:bodyPr/>
+        <a:lstStyle/>
+        <a:p>
+          <a:endParaRPr lang="zh-CN" altLang="en-US"/>
+        </a:p>
+      </dgm:t>
     </dgm:pt>
     <dgm:pt modelId="{E142A5B6-160E-BB45-B772-2D17C8A83389}" type="pres">
       <dgm:prSet presAssocID="{1CA47B65-E934-6641-B0FB-7DA1E55BBC22}" presName="childText" presStyleLbl="bgAcc1" presStyleIdx="3" presStyleCnt="4" custScaleX="404046">
@@ -9457,6 +9556,13 @@
         </dgm:presLayoutVars>
       </dgm:prSet>
       <dgm:spPr/>
+      <dgm:t>
+        <a:bodyPr/>
+        <a:lstStyle/>
+        <a:p>
+          <a:endParaRPr lang="zh-CN" altLang="en-US"/>
+        </a:p>
+      </dgm:t>
     </dgm:pt>
   </dgm:ptLst>
   <dgm:cxnLst>
@@ -9467,9 +9573,9 @@
     <dgm:cxn modelId="{9613CFAF-8E92-4B4A-AB81-71D6A3B54732}" srcId="{17B9B7FE-9A8F-2E4A-B5ED-90BA7CAAADA0}" destId="{E6FA4723-57A1-1240-970F-13BDBB6DCE45}" srcOrd="2" destOrd="0" parTransId="{ADD49C36-D877-0641-A616-ACAEA0CB0071}" sibTransId="{CE9ACC76-D272-0B49-9756-0CF5547244D8}"/>
     <dgm:cxn modelId="{F3D7F47F-3401-AC4E-87B2-383EEEA9EB83}" srcId="{B280AD3E-FF09-964E-9235-35F984C10542}" destId="{17B9B7FE-9A8F-2E4A-B5ED-90BA7CAAADA0}" srcOrd="0" destOrd="0" parTransId="{19CA0D0F-92E0-E648-A38F-6E85FC96F45D}" sibTransId="{0F89FDCD-3B99-384E-976E-FE7297545BAF}"/>
     <dgm:cxn modelId="{89067C34-43EB-104D-93F1-6C6DECAF7378}" srcId="{17B9B7FE-9A8F-2E4A-B5ED-90BA7CAAADA0}" destId="{41CC77BB-AA0B-D44F-B571-10C43F2DEDE3}" srcOrd="0" destOrd="0" parTransId="{EDDC5440-C056-784D-A1A6-65953B41FD30}" sibTransId="{0D604A74-00DF-D548-8E11-E301DF3C3556}"/>
+    <dgm:cxn modelId="{EC30901C-E481-134A-B621-AC964B5C9679}" srcId="{17B9B7FE-9A8F-2E4A-B5ED-90BA7CAAADA0}" destId="{C85A2100-9CA6-A54F-AFEC-58AD702205B1}" srcOrd="1" destOrd="0" parTransId="{A8BF23CB-E7FE-4044-A30E-28D1E9328986}" sibTransId="{338118E2-963B-6447-87BA-167934BF3B8D}"/>
     <dgm:cxn modelId="{8527EB43-6518-C240-B4BF-FBD78510F1AB}" type="presOf" srcId="{E6FA4723-57A1-1240-970F-13BDBB6DCE45}" destId="{01868C30-E0CF-2641-A61F-803BD13A8897}" srcOrd="0" destOrd="0" presId="urn:microsoft.com/office/officeart/2005/8/layout/hierarchy3"/>
     <dgm:cxn modelId="{59D320D4-5675-7349-BF14-C6DA4A78D732}" type="presOf" srcId="{B280AD3E-FF09-964E-9235-35F984C10542}" destId="{78C9D6F6-5BAB-E84A-891B-ECD60EDD166C}" srcOrd="0" destOrd="0" presId="urn:microsoft.com/office/officeart/2005/8/layout/hierarchy3"/>
-    <dgm:cxn modelId="{EC30901C-E481-134A-B621-AC964B5C9679}" srcId="{17B9B7FE-9A8F-2E4A-B5ED-90BA7CAAADA0}" destId="{C85A2100-9CA6-A54F-AFEC-58AD702205B1}" srcOrd="1" destOrd="0" parTransId="{A8BF23CB-E7FE-4044-A30E-28D1E9328986}" sibTransId="{338118E2-963B-6447-87BA-167934BF3B8D}"/>
     <dgm:cxn modelId="{330E4451-A8CD-B044-B4CD-23571C1C579E}" type="presOf" srcId="{EDDC5440-C056-784D-A1A6-65953B41FD30}" destId="{BA009531-8E45-AE42-8A1F-57226ECED7ED}" srcOrd="0" destOrd="0" presId="urn:microsoft.com/office/officeart/2005/8/layout/hierarchy3"/>
     <dgm:cxn modelId="{EEAA3CFE-CE96-FE48-9675-BD12FCE966F7}" srcId="{17B9B7FE-9A8F-2E4A-B5ED-90BA7CAAADA0}" destId="{1CA47B65-E934-6641-B0FB-7DA1E55BBC22}" srcOrd="3" destOrd="0" parTransId="{99A15A79-27CB-F349-B664-2F14387B698F}" sibTransId="{585BEC2C-8875-454E-9DFC-78A6BAED9A01}"/>
     <dgm:cxn modelId="{3071F872-3228-904C-B2A4-C4100567F59E}" type="presOf" srcId="{ADD49C36-D877-0641-A616-ACAEA0CB0071}" destId="{F5906803-D1E7-4541-A760-4FE2B9C37C92}" srcOrd="0" destOrd="0" presId="urn:microsoft.com/office/officeart/2005/8/layout/hierarchy3"/>
@@ -9675,58 +9781,6 @@
         </dgm:presLayoutVars>
       </dgm:prSet>
       <dgm:spPr/>
-    </dgm:pt>
-    <dgm:pt modelId="{ABF02D39-2815-A445-9022-56BC660BC554}" type="pres">
-      <dgm:prSet presAssocID="{5706E8B1-F9C1-194E-A541-006DC1BA5126}" presName="hierRoot1" presStyleCnt="0">
-        <dgm:presLayoutVars>
-          <dgm:hierBranch val="init"/>
-        </dgm:presLayoutVars>
-      </dgm:prSet>
-      <dgm:spPr/>
-    </dgm:pt>
-    <dgm:pt modelId="{6A63BB9B-2261-6542-AE1F-52878CDFDBD7}" type="pres">
-      <dgm:prSet presAssocID="{5706E8B1-F9C1-194E-A541-006DC1BA5126}" presName="rootComposite1" presStyleCnt="0"/>
-      <dgm:spPr/>
-    </dgm:pt>
-    <dgm:pt modelId="{499344CB-0EDD-D343-8D41-D70BD2952DC6}" type="pres">
-      <dgm:prSet presAssocID="{5706E8B1-F9C1-194E-A541-006DC1BA5126}" presName="rootText1" presStyleLbl="node0" presStyleIdx="0" presStyleCnt="1">
-        <dgm:presLayoutVars>
-          <dgm:chPref val="3"/>
-        </dgm:presLayoutVars>
-      </dgm:prSet>
-      <dgm:spPr/>
-    </dgm:pt>
-    <dgm:pt modelId="{23421D8A-766B-8347-A0F4-55C42D5E3385}" type="pres">
-      <dgm:prSet presAssocID="{5706E8B1-F9C1-194E-A541-006DC1BA5126}" presName="rootConnector1" presStyleLbl="node1" presStyleIdx="0" presStyleCnt="0"/>
-      <dgm:spPr/>
-    </dgm:pt>
-    <dgm:pt modelId="{BF130CA2-1CEF-E649-BF09-10FBE85AF126}" type="pres">
-      <dgm:prSet presAssocID="{5706E8B1-F9C1-194E-A541-006DC1BA5126}" presName="hierChild2" presStyleCnt="0"/>
-      <dgm:spPr/>
-    </dgm:pt>
-    <dgm:pt modelId="{A6EB2CF0-8F38-1742-89C3-8C22154D9559}" type="pres">
-      <dgm:prSet presAssocID="{51578587-C425-454C-96A8-561A653C7FA8}" presName="Name37" presStyleLbl="parChTrans1D2" presStyleIdx="0" presStyleCnt="3"/>
-      <dgm:spPr/>
-    </dgm:pt>
-    <dgm:pt modelId="{479AAAD4-9C9C-734C-BD7E-6F20871DDE22}" type="pres">
-      <dgm:prSet presAssocID="{72AFA8BF-7C56-DB4B-809B-A4C35DC678D5}" presName="hierRoot2" presStyleCnt="0">
-        <dgm:presLayoutVars>
-          <dgm:hierBranch val="init"/>
-        </dgm:presLayoutVars>
-      </dgm:prSet>
-      <dgm:spPr/>
-    </dgm:pt>
-    <dgm:pt modelId="{092BFB25-D837-2745-A754-3045DB0E132E}" type="pres">
-      <dgm:prSet presAssocID="{72AFA8BF-7C56-DB4B-809B-A4C35DC678D5}" presName="rootComposite" presStyleCnt="0"/>
-      <dgm:spPr/>
-    </dgm:pt>
-    <dgm:pt modelId="{EF45399D-9D13-FE4B-B4EA-D234037B9A65}" type="pres">
-      <dgm:prSet presAssocID="{72AFA8BF-7C56-DB4B-809B-A4C35DC678D5}" presName="rootText" presStyleLbl="node2" presStyleIdx="0" presStyleCnt="3">
-        <dgm:presLayoutVars>
-          <dgm:chPref val="3"/>
-        </dgm:presLayoutVars>
-      </dgm:prSet>
-      <dgm:spPr/>
       <dgm:t>
         <a:bodyPr/>
         <a:lstStyle/>
@@ -9735,36 +9789,20 @@
         </a:p>
       </dgm:t>
     </dgm:pt>
-    <dgm:pt modelId="{8D51F796-E36A-9F4C-9524-6962F2DA25B9}" type="pres">
-      <dgm:prSet presAssocID="{72AFA8BF-7C56-DB4B-809B-A4C35DC678D5}" presName="rootConnector" presStyleLbl="node2" presStyleIdx="0" presStyleCnt="3"/>
-      <dgm:spPr/>
-    </dgm:pt>
-    <dgm:pt modelId="{43E87CC2-BF36-4342-BDEC-7E4EE76EE9EA}" type="pres">
-      <dgm:prSet presAssocID="{72AFA8BF-7C56-DB4B-809B-A4C35DC678D5}" presName="hierChild4" presStyleCnt="0"/>
-      <dgm:spPr/>
-    </dgm:pt>
-    <dgm:pt modelId="{09B32E39-6607-A144-9AC7-213B8B78F6AA}" type="pres">
-      <dgm:prSet presAssocID="{72AFA8BF-7C56-DB4B-809B-A4C35DC678D5}" presName="hierChild5" presStyleCnt="0"/>
-      <dgm:spPr/>
-    </dgm:pt>
-    <dgm:pt modelId="{1F82024F-662A-894F-8301-57BAEE9197BD}" type="pres">
-      <dgm:prSet presAssocID="{C2C8A47C-48BB-3A4C-B744-40016D26EEC0}" presName="Name37" presStyleLbl="parChTrans1D2" presStyleIdx="1" presStyleCnt="3"/>
-      <dgm:spPr/>
-    </dgm:pt>
-    <dgm:pt modelId="{75FE1C5A-C428-8249-99C3-212C408EF93A}" type="pres">
-      <dgm:prSet presAssocID="{5C84CE07-287A-824F-B69A-1B4489E18B81}" presName="hierRoot2" presStyleCnt="0">
+    <dgm:pt modelId="{ABF02D39-2815-A445-9022-56BC660BC554}" type="pres">
+      <dgm:prSet presAssocID="{5706E8B1-F9C1-194E-A541-006DC1BA5126}" presName="hierRoot1" presStyleCnt="0">
         <dgm:presLayoutVars>
           <dgm:hierBranch val="init"/>
         </dgm:presLayoutVars>
       </dgm:prSet>
       <dgm:spPr/>
     </dgm:pt>
-    <dgm:pt modelId="{17491CD1-65AC-A24C-ABD5-97C4B7689637}" type="pres">
-      <dgm:prSet presAssocID="{5C84CE07-287A-824F-B69A-1B4489E18B81}" presName="rootComposite" presStyleCnt="0"/>
-      <dgm:spPr/>
-    </dgm:pt>
-    <dgm:pt modelId="{527B3AB8-DDC0-DB48-AD92-0DEA16486F0A}" type="pres">
-      <dgm:prSet presAssocID="{5C84CE07-287A-824F-B69A-1B4489E18B81}" presName="rootText" presStyleLbl="node2" presStyleIdx="1" presStyleCnt="3">
+    <dgm:pt modelId="{6A63BB9B-2261-6542-AE1F-52878CDFDBD7}" type="pres">
+      <dgm:prSet presAssocID="{5706E8B1-F9C1-194E-A541-006DC1BA5126}" presName="rootComposite1" presStyleCnt="0"/>
+      <dgm:spPr/>
+    </dgm:pt>
+    <dgm:pt modelId="{499344CB-0EDD-D343-8D41-D70BD2952DC6}" type="pres">
+      <dgm:prSet presAssocID="{5706E8B1-F9C1-194E-A541-006DC1BA5126}" presName="rootText1" presStyleLbl="node0" presStyleIdx="0" presStyleCnt="1">
         <dgm:presLayoutVars>
           <dgm:chPref val="3"/>
         </dgm:presLayoutVars>
@@ -9778,40 +9816,8 @@
         </a:p>
       </dgm:t>
     </dgm:pt>
-    <dgm:pt modelId="{29148C5B-8A6E-D34F-8013-18228A622B2D}" type="pres">
-      <dgm:prSet presAssocID="{5C84CE07-287A-824F-B69A-1B4489E18B81}" presName="rootConnector" presStyleLbl="node2" presStyleIdx="1" presStyleCnt="3"/>
-      <dgm:spPr/>
-    </dgm:pt>
-    <dgm:pt modelId="{7C459EC7-27D4-4C45-B7B1-E10049D2C64C}" type="pres">
-      <dgm:prSet presAssocID="{5C84CE07-287A-824F-B69A-1B4489E18B81}" presName="hierChild4" presStyleCnt="0"/>
-      <dgm:spPr/>
-    </dgm:pt>
-    <dgm:pt modelId="{381850CD-8ABB-384A-93E0-34FE323C36F2}" type="pres">
-      <dgm:prSet presAssocID="{5C84CE07-287A-824F-B69A-1B4489E18B81}" presName="hierChild5" presStyleCnt="0"/>
-      <dgm:spPr/>
-    </dgm:pt>
-    <dgm:pt modelId="{8994C0E6-D6EF-654F-AC8D-68EB888AD6FF}" type="pres">
-      <dgm:prSet presAssocID="{8CA0BBFA-B440-B54B-A88E-200F87992CE1}" presName="Name37" presStyleLbl="parChTrans1D2" presStyleIdx="2" presStyleCnt="3"/>
-      <dgm:spPr/>
-    </dgm:pt>
-    <dgm:pt modelId="{1CB7D87F-BB83-304D-A981-32B75BDBAC39}" type="pres">
-      <dgm:prSet presAssocID="{32EBC116-CC8E-8749-9094-EB78CF14F34A}" presName="hierRoot2" presStyleCnt="0">
-        <dgm:presLayoutVars>
-          <dgm:hierBranch val="init"/>
-        </dgm:presLayoutVars>
-      </dgm:prSet>
-      <dgm:spPr/>
-    </dgm:pt>
-    <dgm:pt modelId="{E734E707-CD70-1D41-B4EE-946393BAF94D}" type="pres">
-      <dgm:prSet presAssocID="{32EBC116-CC8E-8749-9094-EB78CF14F34A}" presName="rootComposite" presStyleCnt="0"/>
-      <dgm:spPr/>
-    </dgm:pt>
-    <dgm:pt modelId="{59A54642-C2FD-FB4F-97FB-5B8737DE86A2}" type="pres">
-      <dgm:prSet presAssocID="{32EBC116-CC8E-8749-9094-EB78CF14F34A}" presName="rootText" presStyleLbl="node2" presStyleIdx="2" presStyleCnt="3">
-        <dgm:presLayoutVars>
-          <dgm:chPref val="3"/>
-        </dgm:presLayoutVars>
-      </dgm:prSet>
+    <dgm:pt modelId="{23421D8A-766B-8347-A0F4-55C42D5E3385}" type="pres">
+      <dgm:prSet presAssocID="{5706E8B1-F9C1-194E-A541-006DC1BA5126}" presName="rootConnector1" presStyleLbl="node1" presStyleIdx="0" presStyleCnt="0"/>
       <dgm:spPr/>
       <dgm:t>
         <a:bodyPr/>
@@ -9821,9 +9827,172 @@
         </a:p>
       </dgm:t>
     </dgm:pt>
+    <dgm:pt modelId="{BF130CA2-1CEF-E649-BF09-10FBE85AF126}" type="pres">
+      <dgm:prSet presAssocID="{5706E8B1-F9C1-194E-A541-006DC1BA5126}" presName="hierChild2" presStyleCnt="0"/>
+      <dgm:spPr/>
+    </dgm:pt>
+    <dgm:pt modelId="{A6EB2CF0-8F38-1742-89C3-8C22154D9559}" type="pres">
+      <dgm:prSet presAssocID="{51578587-C425-454C-96A8-561A653C7FA8}" presName="Name37" presStyleLbl="parChTrans1D2" presStyleIdx="0" presStyleCnt="3"/>
+      <dgm:spPr/>
+      <dgm:t>
+        <a:bodyPr/>
+        <a:lstStyle/>
+        <a:p>
+          <a:endParaRPr lang="zh-CN" altLang="en-US"/>
+        </a:p>
+      </dgm:t>
+    </dgm:pt>
+    <dgm:pt modelId="{479AAAD4-9C9C-734C-BD7E-6F20871DDE22}" type="pres">
+      <dgm:prSet presAssocID="{72AFA8BF-7C56-DB4B-809B-A4C35DC678D5}" presName="hierRoot2" presStyleCnt="0">
+        <dgm:presLayoutVars>
+          <dgm:hierBranch val="init"/>
+        </dgm:presLayoutVars>
+      </dgm:prSet>
+      <dgm:spPr/>
+    </dgm:pt>
+    <dgm:pt modelId="{092BFB25-D837-2745-A754-3045DB0E132E}" type="pres">
+      <dgm:prSet presAssocID="{72AFA8BF-7C56-DB4B-809B-A4C35DC678D5}" presName="rootComposite" presStyleCnt="0"/>
+      <dgm:spPr/>
+    </dgm:pt>
+    <dgm:pt modelId="{EF45399D-9D13-FE4B-B4EA-D234037B9A65}" type="pres">
+      <dgm:prSet presAssocID="{72AFA8BF-7C56-DB4B-809B-A4C35DC678D5}" presName="rootText" presStyleLbl="node2" presStyleIdx="0" presStyleCnt="3">
+        <dgm:presLayoutVars>
+          <dgm:chPref val="3"/>
+        </dgm:presLayoutVars>
+      </dgm:prSet>
+      <dgm:spPr/>
+      <dgm:t>
+        <a:bodyPr/>
+        <a:lstStyle/>
+        <a:p>
+          <a:endParaRPr lang="zh-CN" altLang="en-US"/>
+        </a:p>
+      </dgm:t>
+    </dgm:pt>
+    <dgm:pt modelId="{8D51F796-E36A-9F4C-9524-6962F2DA25B9}" type="pres">
+      <dgm:prSet presAssocID="{72AFA8BF-7C56-DB4B-809B-A4C35DC678D5}" presName="rootConnector" presStyleLbl="node2" presStyleIdx="0" presStyleCnt="3"/>
+      <dgm:spPr/>
+      <dgm:t>
+        <a:bodyPr/>
+        <a:lstStyle/>
+        <a:p>
+          <a:endParaRPr lang="zh-CN" altLang="en-US"/>
+        </a:p>
+      </dgm:t>
+    </dgm:pt>
+    <dgm:pt modelId="{43E87CC2-BF36-4342-BDEC-7E4EE76EE9EA}" type="pres">
+      <dgm:prSet presAssocID="{72AFA8BF-7C56-DB4B-809B-A4C35DC678D5}" presName="hierChild4" presStyleCnt="0"/>
+      <dgm:spPr/>
+    </dgm:pt>
+    <dgm:pt modelId="{09B32E39-6607-A144-9AC7-213B8B78F6AA}" type="pres">
+      <dgm:prSet presAssocID="{72AFA8BF-7C56-DB4B-809B-A4C35DC678D5}" presName="hierChild5" presStyleCnt="0"/>
+      <dgm:spPr/>
+    </dgm:pt>
+    <dgm:pt modelId="{1F82024F-662A-894F-8301-57BAEE9197BD}" type="pres">
+      <dgm:prSet presAssocID="{C2C8A47C-48BB-3A4C-B744-40016D26EEC0}" presName="Name37" presStyleLbl="parChTrans1D2" presStyleIdx="1" presStyleCnt="3"/>
+      <dgm:spPr/>
+      <dgm:t>
+        <a:bodyPr/>
+        <a:lstStyle/>
+        <a:p>
+          <a:endParaRPr lang="zh-CN" altLang="en-US"/>
+        </a:p>
+      </dgm:t>
+    </dgm:pt>
+    <dgm:pt modelId="{75FE1C5A-C428-8249-99C3-212C408EF93A}" type="pres">
+      <dgm:prSet presAssocID="{5C84CE07-287A-824F-B69A-1B4489E18B81}" presName="hierRoot2" presStyleCnt="0">
+        <dgm:presLayoutVars>
+          <dgm:hierBranch val="init"/>
+        </dgm:presLayoutVars>
+      </dgm:prSet>
+      <dgm:spPr/>
+    </dgm:pt>
+    <dgm:pt modelId="{17491CD1-65AC-A24C-ABD5-97C4B7689637}" type="pres">
+      <dgm:prSet presAssocID="{5C84CE07-287A-824F-B69A-1B4489E18B81}" presName="rootComposite" presStyleCnt="0"/>
+      <dgm:spPr/>
+    </dgm:pt>
+    <dgm:pt modelId="{527B3AB8-DDC0-DB48-AD92-0DEA16486F0A}" type="pres">
+      <dgm:prSet presAssocID="{5C84CE07-287A-824F-B69A-1B4489E18B81}" presName="rootText" presStyleLbl="node2" presStyleIdx="1" presStyleCnt="3">
+        <dgm:presLayoutVars>
+          <dgm:chPref val="3"/>
+        </dgm:presLayoutVars>
+      </dgm:prSet>
+      <dgm:spPr/>
+      <dgm:t>
+        <a:bodyPr/>
+        <a:lstStyle/>
+        <a:p>
+          <a:endParaRPr lang="zh-CN" altLang="en-US"/>
+        </a:p>
+      </dgm:t>
+    </dgm:pt>
+    <dgm:pt modelId="{29148C5B-8A6E-D34F-8013-18228A622B2D}" type="pres">
+      <dgm:prSet presAssocID="{5C84CE07-287A-824F-B69A-1B4489E18B81}" presName="rootConnector" presStyleLbl="node2" presStyleIdx="1" presStyleCnt="3"/>
+      <dgm:spPr/>
+      <dgm:t>
+        <a:bodyPr/>
+        <a:lstStyle/>
+        <a:p>
+          <a:endParaRPr lang="zh-CN" altLang="en-US"/>
+        </a:p>
+      </dgm:t>
+    </dgm:pt>
+    <dgm:pt modelId="{7C459EC7-27D4-4C45-B7B1-E10049D2C64C}" type="pres">
+      <dgm:prSet presAssocID="{5C84CE07-287A-824F-B69A-1B4489E18B81}" presName="hierChild4" presStyleCnt="0"/>
+      <dgm:spPr/>
+    </dgm:pt>
+    <dgm:pt modelId="{381850CD-8ABB-384A-93E0-34FE323C36F2}" type="pres">
+      <dgm:prSet presAssocID="{5C84CE07-287A-824F-B69A-1B4489E18B81}" presName="hierChild5" presStyleCnt="0"/>
+      <dgm:spPr/>
+    </dgm:pt>
+    <dgm:pt modelId="{8994C0E6-D6EF-654F-AC8D-68EB888AD6FF}" type="pres">
+      <dgm:prSet presAssocID="{8CA0BBFA-B440-B54B-A88E-200F87992CE1}" presName="Name37" presStyleLbl="parChTrans1D2" presStyleIdx="2" presStyleCnt="3"/>
+      <dgm:spPr/>
+      <dgm:t>
+        <a:bodyPr/>
+        <a:lstStyle/>
+        <a:p>
+          <a:endParaRPr lang="zh-CN" altLang="en-US"/>
+        </a:p>
+      </dgm:t>
+    </dgm:pt>
+    <dgm:pt modelId="{1CB7D87F-BB83-304D-A981-32B75BDBAC39}" type="pres">
+      <dgm:prSet presAssocID="{32EBC116-CC8E-8749-9094-EB78CF14F34A}" presName="hierRoot2" presStyleCnt="0">
+        <dgm:presLayoutVars>
+          <dgm:hierBranch val="init"/>
+        </dgm:presLayoutVars>
+      </dgm:prSet>
+      <dgm:spPr/>
+    </dgm:pt>
+    <dgm:pt modelId="{E734E707-CD70-1D41-B4EE-946393BAF94D}" type="pres">
+      <dgm:prSet presAssocID="{32EBC116-CC8E-8749-9094-EB78CF14F34A}" presName="rootComposite" presStyleCnt="0"/>
+      <dgm:spPr/>
+    </dgm:pt>
+    <dgm:pt modelId="{59A54642-C2FD-FB4F-97FB-5B8737DE86A2}" type="pres">
+      <dgm:prSet presAssocID="{32EBC116-CC8E-8749-9094-EB78CF14F34A}" presName="rootText" presStyleLbl="node2" presStyleIdx="2" presStyleCnt="3">
+        <dgm:presLayoutVars>
+          <dgm:chPref val="3"/>
+        </dgm:presLayoutVars>
+      </dgm:prSet>
+      <dgm:spPr/>
+      <dgm:t>
+        <a:bodyPr/>
+        <a:lstStyle/>
+        <a:p>
+          <a:endParaRPr lang="zh-CN" altLang="en-US"/>
+        </a:p>
+      </dgm:t>
+    </dgm:pt>
     <dgm:pt modelId="{E174E292-ACFA-744A-BA0E-2D796CF26E19}" type="pres">
       <dgm:prSet presAssocID="{32EBC116-CC8E-8749-9094-EB78CF14F34A}" presName="rootConnector" presStyleLbl="node2" presStyleIdx="2" presStyleCnt="3"/>
       <dgm:spPr/>
+      <dgm:t>
+        <a:bodyPr/>
+        <a:lstStyle/>
+        <a:p>
+          <a:endParaRPr lang="zh-CN" altLang="en-US"/>
+        </a:p>
+      </dgm:t>
     </dgm:pt>
     <dgm:pt modelId="{25E64BA3-0A87-2840-8537-E1DA7296C40C}" type="pres">
       <dgm:prSet presAssocID="{32EBC116-CC8E-8749-9094-EB78CF14F34A}" presName="hierChild4" presStyleCnt="0"/>
@@ -9839,22 +10008,22 @@
     </dgm:pt>
   </dgm:ptLst>
   <dgm:cxnLst>
-    <dgm:cxn modelId="{2AB66468-6B1C-4F4D-AD5A-9DBAC9F6E814}" type="presOf" srcId="{C2C8A47C-48BB-3A4C-B744-40016D26EEC0}" destId="{1F82024F-662A-894F-8301-57BAEE9197BD}" srcOrd="0" destOrd="0" presId="urn:microsoft.com/office/officeart/2005/8/layout/orgChart1"/>
-    <dgm:cxn modelId="{C90009F1-DC6D-9349-91B9-85ED40399DCB}" srcId="{5706E8B1-F9C1-194E-A541-006DC1BA5126}" destId="{32EBC116-CC8E-8749-9094-EB78CF14F34A}" srcOrd="2" destOrd="0" parTransId="{8CA0BBFA-B440-B54B-A88E-200F87992CE1}" sibTransId="{A1DC9412-25C0-E543-8704-283CEDD7CDD3}"/>
+    <dgm:cxn modelId="{8BF64EFB-5498-2F4C-B70F-5E6BE5A00189}" type="presOf" srcId="{E479B035-39E7-8D4D-BD5C-70FA268C5FC8}" destId="{D65C6085-8174-9349-B4DD-54C492B9A101}" srcOrd="0" destOrd="0" presId="urn:microsoft.com/office/officeart/2005/8/layout/orgChart1"/>
+    <dgm:cxn modelId="{A77F7554-3C9B-EF42-8DC7-6A9C973DBAA8}" type="presOf" srcId="{5706E8B1-F9C1-194E-A541-006DC1BA5126}" destId="{23421D8A-766B-8347-A0F4-55C42D5E3385}" srcOrd="1" destOrd="0" presId="urn:microsoft.com/office/officeart/2005/8/layout/orgChart1"/>
     <dgm:cxn modelId="{451AF3AC-B2AA-5B41-A91D-7BA5D98CD13F}" type="presOf" srcId="{32EBC116-CC8E-8749-9094-EB78CF14F34A}" destId="{E174E292-ACFA-744A-BA0E-2D796CF26E19}" srcOrd="1" destOrd="0" presId="urn:microsoft.com/office/officeart/2005/8/layout/orgChart1"/>
-    <dgm:cxn modelId="{872B75E0-B41E-3940-8A92-D926B7354AF2}" srcId="{E479B035-39E7-8D4D-BD5C-70FA268C5FC8}" destId="{5706E8B1-F9C1-194E-A541-006DC1BA5126}" srcOrd="0" destOrd="0" parTransId="{27275B26-BD97-F144-84FC-2D3C4ADF99C4}" sibTransId="{43AD0056-F6DD-4E40-BC03-EAD7CE851A1C}"/>
-    <dgm:cxn modelId="{FFBF189D-BF1C-6D4E-84C1-5D78DAC3E2DB}" type="presOf" srcId="{32EBC116-CC8E-8749-9094-EB78CF14F34A}" destId="{59A54642-C2FD-FB4F-97FB-5B8737DE86A2}" srcOrd="0" destOrd="0" presId="urn:microsoft.com/office/officeart/2005/8/layout/orgChart1"/>
-    <dgm:cxn modelId="{F46628F6-4637-1242-9F4F-63002423D74A}" type="presOf" srcId="{5C84CE07-287A-824F-B69A-1B4489E18B81}" destId="{527B3AB8-DDC0-DB48-AD92-0DEA16486F0A}" srcOrd="0" destOrd="0" presId="urn:microsoft.com/office/officeart/2005/8/layout/orgChart1"/>
-    <dgm:cxn modelId="{A5DF5460-2128-394B-BA36-7DFA3729BC5D}" type="presOf" srcId="{8CA0BBFA-B440-B54B-A88E-200F87992CE1}" destId="{8994C0E6-D6EF-654F-AC8D-68EB888AD6FF}" srcOrd="0" destOrd="0" presId="urn:microsoft.com/office/officeart/2005/8/layout/orgChart1"/>
-    <dgm:cxn modelId="{BA9FBEC3-0747-5E48-8A9C-C445B3538670}" srcId="{5706E8B1-F9C1-194E-A541-006DC1BA5126}" destId="{72AFA8BF-7C56-DB4B-809B-A4C35DC678D5}" srcOrd="0" destOrd="0" parTransId="{51578587-C425-454C-96A8-561A653C7FA8}" sibTransId="{03C46B93-DF60-544E-ACA0-977768A4A0DC}"/>
+    <dgm:cxn modelId="{A99C922B-6DF1-8342-936F-8FAA9C2859CC}" type="presOf" srcId="{51578587-C425-454C-96A8-561A653C7FA8}" destId="{A6EB2CF0-8F38-1742-89C3-8C22154D9559}" srcOrd="0" destOrd="0" presId="urn:microsoft.com/office/officeart/2005/8/layout/orgChart1"/>
     <dgm:cxn modelId="{EB608A43-78A1-CC43-A843-6358AE1B54F3}" type="presOf" srcId="{72AFA8BF-7C56-DB4B-809B-A4C35DC678D5}" destId="{8D51F796-E36A-9F4C-9524-6962F2DA25B9}" srcOrd="1" destOrd="0" presId="urn:microsoft.com/office/officeart/2005/8/layout/orgChart1"/>
     <dgm:cxn modelId="{FC8B02BE-04BA-3C44-9BBE-B5A5930B5E0E}" type="presOf" srcId="{5706E8B1-F9C1-194E-A541-006DC1BA5126}" destId="{499344CB-0EDD-D343-8D41-D70BD2952DC6}" srcOrd="0" destOrd="0" presId="urn:microsoft.com/office/officeart/2005/8/layout/orgChart1"/>
+    <dgm:cxn modelId="{A5DF5460-2128-394B-BA36-7DFA3729BC5D}" type="presOf" srcId="{8CA0BBFA-B440-B54B-A88E-200F87992CE1}" destId="{8994C0E6-D6EF-654F-AC8D-68EB888AD6FF}" srcOrd="0" destOrd="0" presId="urn:microsoft.com/office/officeart/2005/8/layout/orgChart1"/>
+    <dgm:cxn modelId="{DE9D5E43-9402-0842-A9C3-20FF9FEEA306}" type="presOf" srcId="{72AFA8BF-7C56-DB4B-809B-A4C35DC678D5}" destId="{EF45399D-9D13-FE4B-B4EA-D234037B9A65}" srcOrd="0" destOrd="0" presId="urn:microsoft.com/office/officeart/2005/8/layout/orgChart1"/>
+    <dgm:cxn modelId="{872B75E0-B41E-3940-8A92-D926B7354AF2}" srcId="{E479B035-39E7-8D4D-BD5C-70FA268C5FC8}" destId="{5706E8B1-F9C1-194E-A541-006DC1BA5126}" srcOrd="0" destOrd="0" parTransId="{27275B26-BD97-F144-84FC-2D3C4ADF99C4}" sibTransId="{43AD0056-F6DD-4E40-BC03-EAD7CE851A1C}"/>
+    <dgm:cxn modelId="{C90009F1-DC6D-9349-91B9-85ED40399DCB}" srcId="{5706E8B1-F9C1-194E-A541-006DC1BA5126}" destId="{32EBC116-CC8E-8749-9094-EB78CF14F34A}" srcOrd="2" destOrd="0" parTransId="{8CA0BBFA-B440-B54B-A88E-200F87992CE1}" sibTransId="{A1DC9412-25C0-E543-8704-283CEDD7CDD3}"/>
+    <dgm:cxn modelId="{A530BCA2-A4E1-E240-AED7-9BA1AB25CAB1}" type="presOf" srcId="{5C84CE07-287A-824F-B69A-1B4489E18B81}" destId="{29148C5B-8A6E-D34F-8013-18228A622B2D}" srcOrd="1" destOrd="0" presId="urn:microsoft.com/office/officeart/2005/8/layout/orgChart1"/>
+    <dgm:cxn modelId="{FFBF189D-BF1C-6D4E-84C1-5D78DAC3E2DB}" type="presOf" srcId="{32EBC116-CC8E-8749-9094-EB78CF14F34A}" destId="{59A54642-C2FD-FB4F-97FB-5B8737DE86A2}" srcOrd="0" destOrd="0" presId="urn:microsoft.com/office/officeart/2005/8/layout/orgChart1"/>
+    <dgm:cxn modelId="{2AB66468-6B1C-4F4D-AD5A-9DBAC9F6E814}" type="presOf" srcId="{C2C8A47C-48BB-3A4C-B744-40016D26EEC0}" destId="{1F82024F-662A-894F-8301-57BAEE9197BD}" srcOrd="0" destOrd="0" presId="urn:microsoft.com/office/officeart/2005/8/layout/orgChart1"/>
+    <dgm:cxn modelId="{BA9FBEC3-0747-5E48-8A9C-C445B3538670}" srcId="{5706E8B1-F9C1-194E-A541-006DC1BA5126}" destId="{72AFA8BF-7C56-DB4B-809B-A4C35DC678D5}" srcOrd="0" destOrd="0" parTransId="{51578587-C425-454C-96A8-561A653C7FA8}" sibTransId="{03C46B93-DF60-544E-ACA0-977768A4A0DC}"/>
     <dgm:cxn modelId="{D98CF6F6-DA03-A943-9248-1CA3B66DBAD6}" srcId="{5706E8B1-F9C1-194E-A541-006DC1BA5126}" destId="{5C84CE07-287A-824F-B69A-1B4489E18B81}" srcOrd="1" destOrd="0" parTransId="{C2C8A47C-48BB-3A4C-B744-40016D26EEC0}" sibTransId="{3703FEC2-EFD9-C648-B21D-6BF3351852EA}"/>
-    <dgm:cxn modelId="{A99C922B-6DF1-8342-936F-8FAA9C2859CC}" type="presOf" srcId="{51578587-C425-454C-96A8-561A653C7FA8}" destId="{A6EB2CF0-8F38-1742-89C3-8C22154D9559}" srcOrd="0" destOrd="0" presId="urn:microsoft.com/office/officeart/2005/8/layout/orgChart1"/>
-    <dgm:cxn modelId="{8BF64EFB-5498-2F4C-B70F-5E6BE5A00189}" type="presOf" srcId="{E479B035-39E7-8D4D-BD5C-70FA268C5FC8}" destId="{D65C6085-8174-9349-B4DD-54C492B9A101}" srcOrd="0" destOrd="0" presId="urn:microsoft.com/office/officeart/2005/8/layout/orgChart1"/>
-    <dgm:cxn modelId="{A77F7554-3C9B-EF42-8DC7-6A9C973DBAA8}" type="presOf" srcId="{5706E8B1-F9C1-194E-A541-006DC1BA5126}" destId="{23421D8A-766B-8347-A0F4-55C42D5E3385}" srcOrd="1" destOrd="0" presId="urn:microsoft.com/office/officeart/2005/8/layout/orgChart1"/>
-    <dgm:cxn modelId="{DE9D5E43-9402-0842-A9C3-20FF9FEEA306}" type="presOf" srcId="{72AFA8BF-7C56-DB4B-809B-A4C35DC678D5}" destId="{EF45399D-9D13-FE4B-B4EA-D234037B9A65}" srcOrd="0" destOrd="0" presId="urn:microsoft.com/office/officeart/2005/8/layout/orgChart1"/>
-    <dgm:cxn modelId="{A530BCA2-A4E1-E240-AED7-9BA1AB25CAB1}" type="presOf" srcId="{5C84CE07-287A-824F-B69A-1B4489E18B81}" destId="{29148C5B-8A6E-D34F-8013-18228A622B2D}" srcOrd="1" destOrd="0" presId="urn:microsoft.com/office/officeart/2005/8/layout/orgChart1"/>
+    <dgm:cxn modelId="{F46628F6-4637-1242-9F4F-63002423D74A}" type="presOf" srcId="{5C84CE07-287A-824F-B69A-1B4489E18B81}" destId="{527B3AB8-DDC0-DB48-AD92-0DEA16486F0A}" srcOrd="0" destOrd="0" presId="urn:microsoft.com/office/officeart/2005/8/layout/orgChart1"/>
     <dgm:cxn modelId="{EF3E5896-F97B-9945-9E5E-65D6240618BC}" type="presParOf" srcId="{D65C6085-8174-9349-B4DD-54C492B9A101}" destId="{ABF02D39-2815-A445-9022-56BC660BC554}" srcOrd="0" destOrd="0" presId="urn:microsoft.com/office/officeart/2005/8/layout/orgChart1"/>
     <dgm:cxn modelId="{680C0798-1375-334D-8DE1-96D2730271A3}" type="presParOf" srcId="{ABF02D39-2815-A445-9022-56BC660BC554}" destId="{6A63BB9B-2261-6542-AE1F-52878CDFDBD7}" srcOrd="0" destOrd="0" presId="urn:microsoft.com/office/officeart/2005/8/layout/orgChart1"/>
     <dgm:cxn modelId="{6CFFB7B9-A081-8543-95CF-F90AEE432406}" type="presParOf" srcId="{6A63BB9B-2261-6542-AE1F-52878CDFDBD7}" destId="{499344CB-0EDD-D343-8D41-D70BD2952DC6}" srcOrd="0" destOrd="0" presId="urn:microsoft.com/office/officeart/2005/8/layout/orgChart1"/>
@@ -10079,6 +10248,13 @@
         </dgm:presLayoutVars>
       </dgm:prSet>
       <dgm:spPr/>
+      <dgm:t>
+        <a:bodyPr/>
+        <a:lstStyle/>
+        <a:p>
+          <a:endParaRPr lang="zh-CN" altLang="en-US"/>
+        </a:p>
+      </dgm:t>
     </dgm:pt>
     <dgm:pt modelId="{9932925B-DC55-D34D-9742-6DF7C991ECCF}" type="pres">
       <dgm:prSet presAssocID="{D08CF25E-3488-F644-BBDE-BE0070469984}" presName="hierRoot1" presStyleCnt="0">
@@ -10099,10 +10275,24 @@
         </dgm:presLayoutVars>
       </dgm:prSet>
       <dgm:spPr/>
+      <dgm:t>
+        <a:bodyPr/>
+        <a:lstStyle/>
+        <a:p>
+          <a:endParaRPr lang="zh-CN" altLang="en-US"/>
+        </a:p>
+      </dgm:t>
     </dgm:pt>
     <dgm:pt modelId="{AB2F8899-779F-5A49-BE05-FE1E63F3BBE4}" type="pres">
       <dgm:prSet presAssocID="{D08CF25E-3488-F644-BBDE-BE0070469984}" presName="rootConnector1" presStyleLbl="node1" presStyleIdx="0" presStyleCnt="0"/>
       <dgm:spPr/>
+      <dgm:t>
+        <a:bodyPr/>
+        <a:lstStyle/>
+        <a:p>
+          <a:endParaRPr lang="zh-CN" altLang="en-US"/>
+        </a:p>
+      </dgm:t>
     </dgm:pt>
     <dgm:pt modelId="{0A2DDEE4-1098-534B-A5F0-D313AA73C2C3}" type="pres">
       <dgm:prSet presAssocID="{D08CF25E-3488-F644-BBDE-BE0070469984}" presName="hierChild2" presStyleCnt="0"/>
@@ -10111,6 +10301,13 @@
     <dgm:pt modelId="{86B7E5D4-CB2C-9049-8995-9D581B202E35}" type="pres">
       <dgm:prSet presAssocID="{1DC5712B-DB38-7E4D-B152-612B25FC0174}" presName="Name64" presStyleLbl="parChTrans1D2" presStyleIdx="0" presStyleCnt="3"/>
       <dgm:spPr/>
+      <dgm:t>
+        <a:bodyPr/>
+        <a:lstStyle/>
+        <a:p>
+          <a:endParaRPr lang="zh-CN" altLang="en-US"/>
+        </a:p>
+      </dgm:t>
     </dgm:pt>
     <dgm:pt modelId="{4A9ADC0C-BAC9-A74B-87DD-1690952D60E3}" type="pres">
       <dgm:prSet presAssocID="{095E1878-C6D3-AE4B-BE33-F77DEB60EB80}" presName="hierRoot2" presStyleCnt="0">
@@ -10131,10 +10328,24 @@
         </dgm:presLayoutVars>
       </dgm:prSet>
       <dgm:spPr/>
+      <dgm:t>
+        <a:bodyPr/>
+        <a:lstStyle/>
+        <a:p>
+          <a:endParaRPr lang="zh-CN" altLang="en-US"/>
+        </a:p>
+      </dgm:t>
     </dgm:pt>
     <dgm:pt modelId="{A9227FA5-A14B-034F-AACA-879D86CB60E5}" type="pres">
       <dgm:prSet presAssocID="{095E1878-C6D3-AE4B-BE33-F77DEB60EB80}" presName="rootConnector" presStyleLbl="node2" presStyleIdx="0" presStyleCnt="3"/>
       <dgm:spPr/>
+      <dgm:t>
+        <a:bodyPr/>
+        <a:lstStyle/>
+        <a:p>
+          <a:endParaRPr lang="zh-CN" altLang="en-US"/>
+        </a:p>
+      </dgm:t>
     </dgm:pt>
     <dgm:pt modelId="{BC8924D5-F112-B740-A683-0AB231D8D526}" type="pres">
       <dgm:prSet presAssocID="{095E1878-C6D3-AE4B-BE33-F77DEB60EB80}" presName="hierChild4" presStyleCnt="0"/>
@@ -10147,6 +10358,13 @@
     <dgm:pt modelId="{C3FC222F-370D-034B-BF2B-F95370AF1E8D}" type="pres">
       <dgm:prSet presAssocID="{03342A7C-5392-2143-BB2A-098DD2EB0D78}" presName="Name64" presStyleLbl="parChTrans1D2" presStyleIdx="1" presStyleCnt="3"/>
       <dgm:spPr/>
+      <dgm:t>
+        <a:bodyPr/>
+        <a:lstStyle/>
+        <a:p>
+          <a:endParaRPr lang="zh-CN" altLang="en-US"/>
+        </a:p>
+      </dgm:t>
     </dgm:pt>
     <dgm:pt modelId="{27467D94-BAAC-9645-B079-1BAB7301E1E7}" type="pres">
       <dgm:prSet presAssocID="{A48D3E1B-F902-4C48-9093-99970EA7A05F}" presName="hierRoot2" presStyleCnt="0">
@@ -10167,10 +10385,24 @@
         </dgm:presLayoutVars>
       </dgm:prSet>
       <dgm:spPr/>
+      <dgm:t>
+        <a:bodyPr/>
+        <a:lstStyle/>
+        <a:p>
+          <a:endParaRPr lang="zh-CN" altLang="en-US"/>
+        </a:p>
+      </dgm:t>
     </dgm:pt>
     <dgm:pt modelId="{B82C99C7-7FF4-3A46-AD51-429B0F83B92E}" type="pres">
       <dgm:prSet presAssocID="{A48D3E1B-F902-4C48-9093-99970EA7A05F}" presName="rootConnector" presStyleLbl="node2" presStyleIdx="1" presStyleCnt="3"/>
       <dgm:spPr/>
+      <dgm:t>
+        <a:bodyPr/>
+        <a:lstStyle/>
+        <a:p>
+          <a:endParaRPr lang="zh-CN" altLang="en-US"/>
+        </a:p>
+      </dgm:t>
     </dgm:pt>
     <dgm:pt modelId="{154E6285-6B78-C443-BD1D-B01FD41BFE0C}" type="pres">
       <dgm:prSet presAssocID="{A48D3E1B-F902-4C48-9093-99970EA7A05F}" presName="hierChild4" presStyleCnt="0"/>
@@ -10183,6 +10415,13 @@
     <dgm:pt modelId="{B380D361-4992-EC4C-BC87-2D3F685A159A}" type="pres">
       <dgm:prSet presAssocID="{277F236F-87A9-8B49-BC1A-B8146FCCAF98}" presName="Name64" presStyleLbl="parChTrans1D2" presStyleIdx="2" presStyleCnt="3"/>
       <dgm:spPr/>
+      <dgm:t>
+        <a:bodyPr/>
+        <a:lstStyle/>
+        <a:p>
+          <a:endParaRPr lang="zh-CN" altLang="en-US"/>
+        </a:p>
+      </dgm:t>
     </dgm:pt>
     <dgm:pt modelId="{85B17C4E-8C97-A140-B510-29C0DDBC1D7C}" type="pres">
       <dgm:prSet presAssocID="{4E301789-8C1F-FA46-99A6-AFC9F24C916B}" presName="hierRoot2" presStyleCnt="0">
@@ -10203,10 +10442,24 @@
         </dgm:presLayoutVars>
       </dgm:prSet>
       <dgm:spPr/>
+      <dgm:t>
+        <a:bodyPr/>
+        <a:lstStyle/>
+        <a:p>
+          <a:endParaRPr lang="zh-CN" altLang="en-US"/>
+        </a:p>
+      </dgm:t>
     </dgm:pt>
     <dgm:pt modelId="{7017A542-97C4-7845-9CAA-98EB530639A4}" type="pres">
       <dgm:prSet presAssocID="{4E301789-8C1F-FA46-99A6-AFC9F24C916B}" presName="rootConnector" presStyleLbl="node2" presStyleIdx="2" presStyleCnt="3"/>
       <dgm:spPr/>
+      <dgm:t>
+        <a:bodyPr/>
+        <a:lstStyle/>
+        <a:p>
+          <a:endParaRPr lang="zh-CN" altLang="en-US"/>
+        </a:p>
+      </dgm:t>
     </dgm:pt>
     <dgm:pt modelId="{3DEF80B3-E13C-4F4D-AADC-3D42F743EDE9}" type="pres">
       <dgm:prSet presAssocID="{4E301789-8C1F-FA46-99A6-AFC9F24C916B}" presName="hierChild4" presStyleCnt="0"/>
@@ -10222,22 +10475,22 @@
     </dgm:pt>
   </dgm:ptLst>
   <dgm:cxnLst>
-    <dgm:cxn modelId="{4C9533DD-E243-AC44-94CD-19437E9B31D8}" type="presOf" srcId="{095E1878-C6D3-AE4B-BE33-F77DEB60EB80}" destId="{A9227FA5-A14B-034F-AACA-879D86CB60E5}" srcOrd="1" destOrd="0" presId="urn:microsoft.com/office/officeart/2009/3/layout/HorizontalOrganizationChart"/>
-    <dgm:cxn modelId="{3B094F6A-92ED-F64A-B254-AADC0CF8242D}" srcId="{D08CF25E-3488-F644-BBDE-BE0070469984}" destId="{4E301789-8C1F-FA46-99A6-AFC9F24C916B}" srcOrd="2" destOrd="0" parTransId="{277F236F-87A9-8B49-BC1A-B8146FCCAF98}" sibTransId="{8E48C083-E8C4-9C4A-93AC-313E81DAA3A2}"/>
-    <dgm:cxn modelId="{B495F349-45EE-824D-932D-38A3539074A4}" type="presOf" srcId="{4E301789-8C1F-FA46-99A6-AFC9F24C916B}" destId="{7017A542-97C4-7845-9CAA-98EB530639A4}" srcOrd="1" destOrd="0" presId="urn:microsoft.com/office/officeart/2009/3/layout/HorizontalOrganizationChart"/>
-    <dgm:cxn modelId="{8AB3BB7F-0A2F-184F-850B-F8BAAE14C5E0}" type="presOf" srcId="{FDC398BD-C907-9145-BE76-2534F26DF377}" destId="{45B40E47-3742-CD48-A5CB-F978E327781B}" srcOrd="0" destOrd="0" presId="urn:microsoft.com/office/officeart/2009/3/layout/HorizontalOrganizationChart"/>
-    <dgm:cxn modelId="{BE3C3565-58B7-6E49-9DB9-BCE90DE8B9AC}" srcId="{D08CF25E-3488-F644-BBDE-BE0070469984}" destId="{A48D3E1B-F902-4C48-9093-99970EA7A05F}" srcOrd="1" destOrd="0" parTransId="{03342A7C-5392-2143-BB2A-098DD2EB0D78}" sibTransId="{7905A2BC-5977-CD4E-94C6-9CDD3FA2B130}"/>
+    <dgm:cxn modelId="{07B209EE-7BB6-EA48-A52A-8C3C7F16DF83}" srcId="{D08CF25E-3488-F644-BBDE-BE0070469984}" destId="{095E1878-C6D3-AE4B-BE33-F77DEB60EB80}" srcOrd="0" destOrd="0" parTransId="{1DC5712B-DB38-7E4D-B152-612B25FC0174}" sibTransId="{E89AEA3E-779D-DC4D-A646-6DDFD1C36189}"/>
     <dgm:cxn modelId="{F1D1BCB4-9DC9-9F4F-969B-C0B19ECF7A68}" type="presOf" srcId="{D08CF25E-3488-F644-BBDE-BE0070469984}" destId="{49DD9878-4461-C640-8712-28B750146275}" srcOrd="0" destOrd="0" presId="urn:microsoft.com/office/officeart/2009/3/layout/HorizontalOrganizationChart"/>
-    <dgm:cxn modelId="{C6B2592C-E1AF-AE46-88F3-B452848292F8}" srcId="{FDC398BD-C907-9145-BE76-2534F26DF377}" destId="{D08CF25E-3488-F644-BBDE-BE0070469984}" srcOrd="0" destOrd="0" parTransId="{A2F50923-901F-BC46-8FDB-5CAD1BBC3CB8}" sibTransId="{82DA1255-A6A0-4E4A-8EE2-106279E693B4}"/>
     <dgm:cxn modelId="{E2E00929-841F-2448-B00E-61B8FCFA7934}" type="presOf" srcId="{D08CF25E-3488-F644-BBDE-BE0070469984}" destId="{AB2F8899-779F-5A49-BE05-FE1E63F3BBE4}" srcOrd="1" destOrd="0" presId="urn:microsoft.com/office/officeart/2009/3/layout/HorizontalOrganizationChart"/>
     <dgm:cxn modelId="{5BAEA2A7-1306-BA4F-8AAA-261432AD6E8A}" type="presOf" srcId="{03342A7C-5392-2143-BB2A-098DD2EB0D78}" destId="{C3FC222F-370D-034B-BF2B-F95370AF1E8D}" srcOrd="0" destOrd="0" presId="urn:microsoft.com/office/officeart/2009/3/layout/HorizontalOrganizationChart"/>
+    <dgm:cxn modelId="{E21BCE76-4960-2C4B-9453-7A75DF2729DF}" type="presOf" srcId="{4E301789-8C1F-FA46-99A6-AFC9F24C916B}" destId="{674B5CEB-CCE9-8C4F-9E07-D90F99C629FA}" srcOrd="0" destOrd="0" presId="urn:microsoft.com/office/officeart/2009/3/layout/HorizontalOrganizationChart"/>
+    <dgm:cxn modelId="{BE3C3565-58B7-6E49-9DB9-BCE90DE8B9AC}" srcId="{D08CF25E-3488-F644-BBDE-BE0070469984}" destId="{A48D3E1B-F902-4C48-9093-99970EA7A05F}" srcOrd="1" destOrd="0" parTransId="{03342A7C-5392-2143-BB2A-098DD2EB0D78}" sibTransId="{7905A2BC-5977-CD4E-94C6-9CDD3FA2B130}"/>
+    <dgm:cxn modelId="{37009EC0-3BE0-8D4A-B361-1CAFFC999639}" type="presOf" srcId="{1DC5712B-DB38-7E4D-B152-612B25FC0174}" destId="{86B7E5D4-CB2C-9049-8995-9D581B202E35}" srcOrd="0" destOrd="0" presId="urn:microsoft.com/office/officeart/2009/3/layout/HorizontalOrganizationChart"/>
+    <dgm:cxn modelId="{8B5CDE20-45A5-1643-9CED-832C095725FD}" type="presOf" srcId="{A48D3E1B-F902-4C48-9093-99970EA7A05F}" destId="{926E4DEA-0FB0-6846-8C5B-2E61D2A977C7}" srcOrd="0" destOrd="0" presId="urn:microsoft.com/office/officeart/2009/3/layout/HorizontalOrganizationChart"/>
+    <dgm:cxn modelId="{8AB3BB7F-0A2F-184F-850B-F8BAAE14C5E0}" type="presOf" srcId="{FDC398BD-C907-9145-BE76-2534F26DF377}" destId="{45B40E47-3742-CD48-A5CB-F978E327781B}" srcOrd="0" destOrd="0" presId="urn:microsoft.com/office/officeart/2009/3/layout/HorizontalOrganizationChart"/>
+    <dgm:cxn modelId="{4C9533DD-E243-AC44-94CD-19437E9B31D8}" type="presOf" srcId="{095E1878-C6D3-AE4B-BE33-F77DEB60EB80}" destId="{A9227FA5-A14B-034F-AACA-879D86CB60E5}" srcOrd="1" destOrd="0" presId="urn:microsoft.com/office/officeart/2009/3/layout/HorizontalOrganizationChart"/>
+    <dgm:cxn modelId="{5725217E-D34C-6441-BE36-CA0F68209BD4}" type="presOf" srcId="{095E1878-C6D3-AE4B-BE33-F77DEB60EB80}" destId="{A294C564-43E3-5347-86E3-50DF51C57578}" srcOrd="0" destOrd="0" presId="urn:microsoft.com/office/officeart/2009/3/layout/HorizontalOrganizationChart"/>
     <dgm:cxn modelId="{A56BE375-01B4-1B44-A9AC-CF3D54D87305}" type="presOf" srcId="{A48D3E1B-F902-4C48-9093-99970EA7A05F}" destId="{B82C99C7-7FF4-3A46-AD51-429B0F83B92E}" srcOrd="1" destOrd="0" presId="urn:microsoft.com/office/officeart/2009/3/layout/HorizontalOrganizationChart"/>
-    <dgm:cxn modelId="{07B209EE-7BB6-EA48-A52A-8C3C7F16DF83}" srcId="{D08CF25E-3488-F644-BBDE-BE0070469984}" destId="{095E1878-C6D3-AE4B-BE33-F77DEB60EB80}" srcOrd="0" destOrd="0" parTransId="{1DC5712B-DB38-7E4D-B152-612B25FC0174}" sibTransId="{E89AEA3E-779D-DC4D-A646-6DDFD1C36189}"/>
-    <dgm:cxn modelId="{5725217E-D34C-6441-BE36-CA0F68209BD4}" type="presOf" srcId="{095E1878-C6D3-AE4B-BE33-F77DEB60EB80}" destId="{A294C564-43E3-5347-86E3-50DF51C57578}" srcOrd="0" destOrd="0" presId="urn:microsoft.com/office/officeart/2009/3/layout/HorizontalOrganizationChart"/>
-    <dgm:cxn modelId="{E21BCE76-4960-2C4B-9453-7A75DF2729DF}" type="presOf" srcId="{4E301789-8C1F-FA46-99A6-AFC9F24C916B}" destId="{674B5CEB-CCE9-8C4F-9E07-D90F99C629FA}" srcOrd="0" destOrd="0" presId="urn:microsoft.com/office/officeart/2009/3/layout/HorizontalOrganizationChart"/>
+    <dgm:cxn modelId="{B495F349-45EE-824D-932D-38A3539074A4}" type="presOf" srcId="{4E301789-8C1F-FA46-99A6-AFC9F24C916B}" destId="{7017A542-97C4-7845-9CAA-98EB530639A4}" srcOrd="1" destOrd="0" presId="urn:microsoft.com/office/officeart/2009/3/layout/HorizontalOrganizationChart"/>
+    <dgm:cxn modelId="{C6B2592C-E1AF-AE46-88F3-B452848292F8}" srcId="{FDC398BD-C907-9145-BE76-2534F26DF377}" destId="{D08CF25E-3488-F644-BBDE-BE0070469984}" srcOrd="0" destOrd="0" parTransId="{A2F50923-901F-BC46-8FDB-5CAD1BBC3CB8}" sibTransId="{82DA1255-A6A0-4E4A-8EE2-106279E693B4}"/>
     <dgm:cxn modelId="{4386FC80-B161-9245-8802-210D6A39E506}" type="presOf" srcId="{277F236F-87A9-8B49-BC1A-B8146FCCAF98}" destId="{B380D361-4992-EC4C-BC87-2D3F685A159A}" srcOrd="0" destOrd="0" presId="urn:microsoft.com/office/officeart/2009/3/layout/HorizontalOrganizationChart"/>
-    <dgm:cxn modelId="{8B5CDE20-45A5-1643-9CED-832C095725FD}" type="presOf" srcId="{A48D3E1B-F902-4C48-9093-99970EA7A05F}" destId="{926E4DEA-0FB0-6846-8C5B-2E61D2A977C7}" srcOrd="0" destOrd="0" presId="urn:microsoft.com/office/officeart/2009/3/layout/HorizontalOrganizationChart"/>
-    <dgm:cxn modelId="{37009EC0-3BE0-8D4A-B361-1CAFFC999639}" type="presOf" srcId="{1DC5712B-DB38-7E4D-B152-612B25FC0174}" destId="{86B7E5D4-CB2C-9049-8995-9D581B202E35}" srcOrd="0" destOrd="0" presId="urn:microsoft.com/office/officeart/2009/3/layout/HorizontalOrganizationChart"/>
+    <dgm:cxn modelId="{3B094F6A-92ED-F64A-B254-AADC0CF8242D}" srcId="{D08CF25E-3488-F644-BBDE-BE0070469984}" destId="{4E301789-8C1F-FA46-99A6-AFC9F24C916B}" srcOrd="2" destOrd="0" parTransId="{277F236F-87A9-8B49-BC1A-B8146FCCAF98}" sibTransId="{8E48C083-E8C4-9C4A-93AC-313E81DAA3A2}"/>
     <dgm:cxn modelId="{DE289180-02DE-D74B-B069-38AD325ED67C}" type="presParOf" srcId="{45B40E47-3742-CD48-A5CB-F978E327781B}" destId="{9932925B-DC55-D34D-9742-6DF7C991ECCF}" srcOrd="0" destOrd="0" presId="urn:microsoft.com/office/officeart/2009/3/layout/HorizontalOrganizationChart"/>
     <dgm:cxn modelId="{687C91E7-E425-504D-86F9-84428BAD67E2}" type="presParOf" srcId="{9932925B-DC55-D34D-9742-6DF7C991ECCF}" destId="{A1AB62A8-A493-7849-BDE0-578E47DDB3E6}" srcOrd="0" destOrd="0" presId="urn:microsoft.com/office/officeart/2009/3/layout/HorizontalOrganizationChart"/>
     <dgm:cxn modelId="{326BC49A-327C-804B-A551-449A4A2BD997}" type="presParOf" srcId="{A1AB62A8-A493-7849-BDE0-578E47DDB3E6}" destId="{49DD9878-4461-C640-8712-28B750146275}" srcOrd="0" destOrd="0" presId="urn:microsoft.com/office/officeart/2009/3/layout/HorizontalOrganizationChart"/>
@@ -10453,6 +10706,13 @@
         </dgm:presLayoutVars>
       </dgm:prSet>
       <dgm:spPr/>
+      <dgm:t>
+        <a:bodyPr/>
+        <a:lstStyle/>
+        <a:p>
+          <a:endParaRPr lang="zh-CN" altLang="en-US"/>
+        </a:p>
+      </dgm:t>
     </dgm:pt>
     <dgm:pt modelId="{61D01C7B-41B9-3E4B-BE52-7551DFC4A7D1}" type="pres">
       <dgm:prSet presAssocID="{71775075-7418-2E4A-944C-9563C9578B15}" presName="root1" presStyleCnt="0"/>
@@ -10465,6 +10725,13 @@
         </dgm:presLayoutVars>
       </dgm:prSet>
       <dgm:spPr/>
+      <dgm:t>
+        <a:bodyPr/>
+        <a:lstStyle/>
+        <a:p>
+          <a:endParaRPr lang="zh-CN" altLang="en-US"/>
+        </a:p>
+      </dgm:t>
     </dgm:pt>
     <dgm:pt modelId="{3521BBEB-BF2E-FA40-84BF-800540394443}" type="pres">
       <dgm:prSet presAssocID="{71775075-7418-2E4A-944C-9563C9578B15}" presName="level2hierChild" presStyleCnt="0"/>
@@ -10473,10 +10740,24 @@
     <dgm:pt modelId="{7557F600-1225-AC4F-B501-9D806D4A540E}" type="pres">
       <dgm:prSet presAssocID="{F5055C99-4090-A446-8B01-FBF14B0BAE6B}" presName="conn2-1" presStyleLbl="parChTrans1D2" presStyleIdx="0" presStyleCnt="3"/>
       <dgm:spPr/>
+      <dgm:t>
+        <a:bodyPr/>
+        <a:lstStyle/>
+        <a:p>
+          <a:endParaRPr lang="zh-CN" altLang="en-US"/>
+        </a:p>
+      </dgm:t>
     </dgm:pt>
     <dgm:pt modelId="{7289D994-AFDB-EE4C-AC0B-BA8BA64580E2}" type="pres">
       <dgm:prSet presAssocID="{F5055C99-4090-A446-8B01-FBF14B0BAE6B}" presName="connTx" presStyleLbl="parChTrans1D2" presStyleIdx="0" presStyleCnt="3"/>
       <dgm:spPr/>
+      <dgm:t>
+        <a:bodyPr/>
+        <a:lstStyle/>
+        <a:p>
+          <a:endParaRPr lang="zh-CN" altLang="en-US"/>
+        </a:p>
+      </dgm:t>
     </dgm:pt>
     <dgm:pt modelId="{A06FA018-AAF7-3E4E-950D-4C3ADBBEF2AE}" type="pres">
       <dgm:prSet presAssocID="{C7FB1FDA-FFD2-7442-9B03-E3C48F541088}" presName="root2" presStyleCnt="0"/>
@@ -10489,6 +10770,13 @@
         </dgm:presLayoutVars>
       </dgm:prSet>
       <dgm:spPr/>
+      <dgm:t>
+        <a:bodyPr/>
+        <a:lstStyle/>
+        <a:p>
+          <a:endParaRPr lang="zh-CN" altLang="en-US"/>
+        </a:p>
+      </dgm:t>
     </dgm:pt>
     <dgm:pt modelId="{58AC17D6-FF5C-704C-B26E-1C80FB8F88E6}" type="pres">
       <dgm:prSet presAssocID="{C7FB1FDA-FFD2-7442-9B03-E3C48F541088}" presName="level3hierChild" presStyleCnt="0"/>
@@ -10497,10 +10785,24 @@
     <dgm:pt modelId="{DB1123F5-0633-5341-8285-1DCA5C08A4C5}" type="pres">
       <dgm:prSet presAssocID="{5B8CCC55-4582-FA4E-B858-16CB397E8E07}" presName="conn2-1" presStyleLbl="parChTrans1D2" presStyleIdx="1" presStyleCnt="3"/>
       <dgm:spPr/>
+      <dgm:t>
+        <a:bodyPr/>
+        <a:lstStyle/>
+        <a:p>
+          <a:endParaRPr lang="zh-CN" altLang="en-US"/>
+        </a:p>
+      </dgm:t>
     </dgm:pt>
     <dgm:pt modelId="{AB1AF23E-CC7A-3D44-A37A-CB3F22D4AB0D}" type="pres">
       <dgm:prSet presAssocID="{5B8CCC55-4582-FA4E-B858-16CB397E8E07}" presName="connTx" presStyleLbl="parChTrans1D2" presStyleIdx="1" presStyleCnt="3"/>
       <dgm:spPr/>
+      <dgm:t>
+        <a:bodyPr/>
+        <a:lstStyle/>
+        <a:p>
+          <a:endParaRPr lang="zh-CN" altLang="en-US"/>
+        </a:p>
+      </dgm:t>
     </dgm:pt>
     <dgm:pt modelId="{F42910E4-C917-B545-B774-E13F477BC28A}" type="pres">
       <dgm:prSet presAssocID="{C4FACB6A-DD2F-2B42-9397-4DAEAC83E3D0}" presName="root2" presStyleCnt="0"/>
@@ -10513,6 +10815,13 @@
         </dgm:presLayoutVars>
       </dgm:prSet>
       <dgm:spPr/>
+      <dgm:t>
+        <a:bodyPr/>
+        <a:lstStyle/>
+        <a:p>
+          <a:endParaRPr lang="zh-CN" altLang="en-US"/>
+        </a:p>
+      </dgm:t>
     </dgm:pt>
     <dgm:pt modelId="{F91AE5CF-26B4-F647-AD49-CF18B5100A4E}" type="pres">
       <dgm:prSet presAssocID="{C4FACB6A-DD2F-2B42-9397-4DAEAC83E3D0}" presName="level3hierChild" presStyleCnt="0"/>
@@ -10521,10 +10830,24 @@
     <dgm:pt modelId="{37B8E5F0-5E96-C547-88BA-A01171926770}" type="pres">
       <dgm:prSet presAssocID="{46934164-B4DD-CB46-A898-EFB4EAC94E0E}" presName="conn2-1" presStyleLbl="parChTrans1D2" presStyleIdx="2" presStyleCnt="3"/>
       <dgm:spPr/>
+      <dgm:t>
+        <a:bodyPr/>
+        <a:lstStyle/>
+        <a:p>
+          <a:endParaRPr lang="zh-CN" altLang="en-US"/>
+        </a:p>
+      </dgm:t>
     </dgm:pt>
     <dgm:pt modelId="{18A44121-1A16-6D42-B33F-0445F6DE930E}" type="pres">
       <dgm:prSet presAssocID="{46934164-B4DD-CB46-A898-EFB4EAC94E0E}" presName="connTx" presStyleLbl="parChTrans1D2" presStyleIdx="2" presStyleCnt="3"/>
       <dgm:spPr/>
+      <dgm:t>
+        <a:bodyPr/>
+        <a:lstStyle/>
+        <a:p>
+          <a:endParaRPr lang="zh-CN" altLang="en-US"/>
+        </a:p>
+      </dgm:t>
     </dgm:pt>
     <dgm:pt modelId="{3C7A5367-BEAA-2B45-BABB-E103E42A54C9}" type="pres">
       <dgm:prSet presAssocID="{2D0DB0BF-5C85-5E43-B815-40AC67821A63}" presName="root2" presStyleCnt="0"/>
@@ -10537,6 +10860,13 @@
         </dgm:presLayoutVars>
       </dgm:prSet>
       <dgm:spPr/>
+      <dgm:t>
+        <a:bodyPr/>
+        <a:lstStyle/>
+        <a:p>
+          <a:endParaRPr lang="zh-CN" altLang="en-US"/>
+        </a:p>
+      </dgm:t>
     </dgm:pt>
     <dgm:pt modelId="{FDEC1025-4BEF-0240-9FD6-395C77F75FE7}" type="pres">
       <dgm:prSet presAssocID="{2D0DB0BF-5C85-5E43-B815-40AC67821A63}" presName="level3hierChild" presStyleCnt="0"/>
@@ -10544,21 +10874,21 @@
     </dgm:pt>
   </dgm:ptLst>
   <dgm:cxnLst>
+    <dgm:cxn modelId="{3FE2E667-BC60-CF40-8210-0C72B49126D1}" type="presOf" srcId="{F5055C99-4090-A446-8B01-FBF14B0BAE6B}" destId="{7557F600-1225-AC4F-B501-9D806D4A540E}" srcOrd="0" destOrd="0" presId="urn:microsoft.com/office/officeart/2005/8/layout/hierarchy2"/>
+    <dgm:cxn modelId="{81DAB201-39EC-8A4E-9F24-9522E52F053B}" type="presOf" srcId="{46934164-B4DD-CB46-A898-EFB4EAC94E0E}" destId="{37B8E5F0-5E96-C547-88BA-A01171926770}" srcOrd="0" destOrd="0" presId="urn:microsoft.com/office/officeart/2005/8/layout/hierarchy2"/>
+    <dgm:cxn modelId="{9640297D-1FE0-FA40-9E76-AE15A8FF2D7D}" srcId="{71775075-7418-2E4A-944C-9563C9578B15}" destId="{C7FB1FDA-FFD2-7442-9B03-E3C48F541088}" srcOrd="0" destOrd="0" parTransId="{F5055C99-4090-A446-8B01-FBF14B0BAE6B}" sibTransId="{1CA3037A-81E0-4841-8B2B-754BB499919E}"/>
     <dgm:cxn modelId="{2D008FB0-30FE-C948-8F35-F46F6059CC83}" type="presOf" srcId="{A2B19482-F0B5-6F4B-A349-23189F9A4A74}" destId="{D26C4686-39D5-4D48-A1DA-37C5FDAC39B7}" srcOrd="0" destOrd="0" presId="urn:microsoft.com/office/officeart/2005/8/layout/hierarchy2"/>
+    <dgm:cxn modelId="{4FD67006-1797-BD46-9BBC-7123DDF528E9}" type="presOf" srcId="{5B8CCC55-4582-FA4E-B858-16CB397E8E07}" destId="{DB1123F5-0633-5341-8285-1DCA5C08A4C5}" srcOrd="0" destOrd="0" presId="urn:microsoft.com/office/officeart/2005/8/layout/hierarchy2"/>
+    <dgm:cxn modelId="{B0CC6420-BD6D-E648-BF2D-1959C0170ABA}" type="presOf" srcId="{71775075-7418-2E4A-944C-9563C9578B15}" destId="{51AC3011-EC30-CC4A-A487-C5612F186AED}" srcOrd="0" destOrd="0" presId="urn:microsoft.com/office/officeart/2005/8/layout/hierarchy2"/>
+    <dgm:cxn modelId="{29BACC8A-5C71-6941-B43A-BD9BE79DE3F5}" srcId="{A2B19482-F0B5-6F4B-A349-23189F9A4A74}" destId="{71775075-7418-2E4A-944C-9563C9578B15}" srcOrd="0" destOrd="0" parTransId="{B0E55517-C9DB-2646-825E-5A9466E74816}" sibTransId="{A6FCC589-73CB-3E4E-80F1-604E300F92FC}"/>
+    <dgm:cxn modelId="{E66752E9-4192-504D-91CE-18FDBCDCAC7D}" type="presOf" srcId="{C4FACB6A-DD2F-2B42-9397-4DAEAC83E3D0}" destId="{F2A7AD12-29FA-F848-B484-E1649BFF6A3B}" srcOrd="0" destOrd="0" presId="urn:microsoft.com/office/officeart/2005/8/layout/hierarchy2"/>
+    <dgm:cxn modelId="{91CF20CC-99CD-2948-9E00-A3CC30C7C2B6}" type="presOf" srcId="{2D0DB0BF-5C85-5E43-B815-40AC67821A63}" destId="{B51CBA03-ACC1-ED46-803B-5FA367A04CED}" srcOrd="0" destOrd="0" presId="urn:microsoft.com/office/officeart/2005/8/layout/hierarchy2"/>
+    <dgm:cxn modelId="{8B339319-896C-9147-9406-D802886E8DD5}" type="presOf" srcId="{C7FB1FDA-FFD2-7442-9B03-E3C48F541088}" destId="{4BBA190D-2886-E645-B638-56D9A5EEAE63}" srcOrd="0" destOrd="0" presId="urn:microsoft.com/office/officeart/2005/8/layout/hierarchy2"/>
+    <dgm:cxn modelId="{7B142391-4D51-9046-9977-073436847E51}" type="presOf" srcId="{46934164-B4DD-CB46-A898-EFB4EAC94E0E}" destId="{18A44121-1A16-6D42-B33F-0445F6DE930E}" srcOrd="1" destOrd="0" presId="urn:microsoft.com/office/officeart/2005/8/layout/hierarchy2"/>
+    <dgm:cxn modelId="{85C1395D-F1EC-9449-A9A6-F2E666D1AB32}" srcId="{71775075-7418-2E4A-944C-9563C9578B15}" destId="{2D0DB0BF-5C85-5E43-B815-40AC67821A63}" srcOrd="2" destOrd="0" parTransId="{46934164-B4DD-CB46-A898-EFB4EAC94E0E}" sibTransId="{C359FAD4-0803-C14B-9CDB-5FDC0E0438D4}"/>
     <dgm:cxn modelId="{C86596EE-EA74-CD49-843C-EB9DFF0E6905}" type="presOf" srcId="{F5055C99-4090-A446-8B01-FBF14B0BAE6B}" destId="{7289D994-AFDB-EE4C-AC0B-BA8BA64580E2}" srcOrd="1" destOrd="0" presId="urn:microsoft.com/office/officeart/2005/8/layout/hierarchy2"/>
-    <dgm:cxn modelId="{85C1395D-F1EC-9449-A9A6-F2E666D1AB32}" srcId="{71775075-7418-2E4A-944C-9563C9578B15}" destId="{2D0DB0BF-5C85-5E43-B815-40AC67821A63}" srcOrd="2" destOrd="0" parTransId="{46934164-B4DD-CB46-A898-EFB4EAC94E0E}" sibTransId="{C359FAD4-0803-C14B-9CDB-5FDC0E0438D4}"/>
-    <dgm:cxn modelId="{3FE2E667-BC60-CF40-8210-0C72B49126D1}" type="presOf" srcId="{F5055C99-4090-A446-8B01-FBF14B0BAE6B}" destId="{7557F600-1225-AC4F-B501-9D806D4A540E}" srcOrd="0" destOrd="0" presId="urn:microsoft.com/office/officeart/2005/8/layout/hierarchy2"/>
     <dgm:cxn modelId="{5211BC66-4495-F94A-97BA-240193C3BD4A}" type="presOf" srcId="{5B8CCC55-4582-FA4E-B858-16CB397E8E07}" destId="{AB1AF23E-CC7A-3D44-A37A-CB3F22D4AB0D}" srcOrd="1" destOrd="0" presId="urn:microsoft.com/office/officeart/2005/8/layout/hierarchy2"/>
-    <dgm:cxn modelId="{8B339319-896C-9147-9406-D802886E8DD5}" type="presOf" srcId="{C7FB1FDA-FFD2-7442-9B03-E3C48F541088}" destId="{4BBA190D-2886-E645-B638-56D9A5EEAE63}" srcOrd="0" destOrd="0" presId="urn:microsoft.com/office/officeart/2005/8/layout/hierarchy2"/>
-    <dgm:cxn modelId="{E66752E9-4192-504D-91CE-18FDBCDCAC7D}" type="presOf" srcId="{C4FACB6A-DD2F-2B42-9397-4DAEAC83E3D0}" destId="{F2A7AD12-29FA-F848-B484-E1649BFF6A3B}" srcOrd="0" destOrd="0" presId="urn:microsoft.com/office/officeart/2005/8/layout/hierarchy2"/>
     <dgm:cxn modelId="{A2226EDA-6E72-C945-A293-84402D29593C}" srcId="{71775075-7418-2E4A-944C-9563C9578B15}" destId="{C4FACB6A-DD2F-2B42-9397-4DAEAC83E3D0}" srcOrd="1" destOrd="0" parTransId="{5B8CCC55-4582-FA4E-B858-16CB397E8E07}" sibTransId="{7BAEE4D1-3541-9841-9B97-26F94FB98C47}"/>
-    <dgm:cxn modelId="{91CF20CC-99CD-2948-9E00-A3CC30C7C2B6}" type="presOf" srcId="{2D0DB0BF-5C85-5E43-B815-40AC67821A63}" destId="{B51CBA03-ACC1-ED46-803B-5FA367A04CED}" srcOrd="0" destOrd="0" presId="urn:microsoft.com/office/officeart/2005/8/layout/hierarchy2"/>
-    <dgm:cxn modelId="{4FD67006-1797-BD46-9BBC-7123DDF528E9}" type="presOf" srcId="{5B8CCC55-4582-FA4E-B858-16CB397E8E07}" destId="{DB1123F5-0633-5341-8285-1DCA5C08A4C5}" srcOrd="0" destOrd="0" presId="urn:microsoft.com/office/officeart/2005/8/layout/hierarchy2"/>
-    <dgm:cxn modelId="{29BACC8A-5C71-6941-B43A-BD9BE79DE3F5}" srcId="{A2B19482-F0B5-6F4B-A349-23189F9A4A74}" destId="{71775075-7418-2E4A-944C-9563C9578B15}" srcOrd="0" destOrd="0" parTransId="{B0E55517-C9DB-2646-825E-5A9466E74816}" sibTransId="{A6FCC589-73CB-3E4E-80F1-604E300F92FC}"/>
-    <dgm:cxn modelId="{81DAB201-39EC-8A4E-9F24-9522E52F053B}" type="presOf" srcId="{46934164-B4DD-CB46-A898-EFB4EAC94E0E}" destId="{37B8E5F0-5E96-C547-88BA-A01171926770}" srcOrd="0" destOrd="0" presId="urn:microsoft.com/office/officeart/2005/8/layout/hierarchy2"/>
-    <dgm:cxn modelId="{7B142391-4D51-9046-9977-073436847E51}" type="presOf" srcId="{46934164-B4DD-CB46-A898-EFB4EAC94E0E}" destId="{18A44121-1A16-6D42-B33F-0445F6DE930E}" srcOrd="1" destOrd="0" presId="urn:microsoft.com/office/officeart/2005/8/layout/hierarchy2"/>
-    <dgm:cxn modelId="{9640297D-1FE0-FA40-9E76-AE15A8FF2D7D}" srcId="{71775075-7418-2E4A-944C-9563C9578B15}" destId="{C7FB1FDA-FFD2-7442-9B03-E3C48F541088}" srcOrd="0" destOrd="0" parTransId="{F5055C99-4090-A446-8B01-FBF14B0BAE6B}" sibTransId="{1CA3037A-81E0-4841-8B2B-754BB499919E}"/>
-    <dgm:cxn modelId="{B0CC6420-BD6D-E648-BF2D-1959C0170ABA}" type="presOf" srcId="{71775075-7418-2E4A-944C-9563C9578B15}" destId="{51AC3011-EC30-CC4A-A487-C5612F186AED}" srcOrd="0" destOrd="0" presId="urn:microsoft.com/office/officeart/2005/8/layout/hierarchy2"/>
     <dgm:cxn modelId="{8A6B9B20-1FE2-FA4E-A167-78C1C8160A71}" type="presParOf" srcId="{D26C4686-39D5-4D48-A1DA-37C5FDAC39B7}" destId="{61D01C7B-41B9-3E4B-BE52-7551DFC4A7D1}" srcOrd="0" destOrd="0" presId="urn:microsoft.com/office/officeart/2005/8/layout/hierarchy2"/>
     <dgm:cxn modelId="{F2CD7394-1676-0E47-ACBA-DA38B898E12F}" type="presParOf" srcId="{61D01C7B-41B9-3E4B-BE52-7551DFC4A7D1}" destId="{51AC3011-EC30-CC4A-A487-C5612F186AED}" srcOrd="0" destOrd="0" presId="urn:microsoft.com/office/officeart/2005/8/layout/hierarchy2"/>
     <dgm:cxn modelId="{BF06531B-3F5B-0640-9538-4A2C3C23C88E}" type="presParOf" srcId="{61D01C7B-41B9-3E4B-BE52-7551DFC4A7D1}" destId="{3521BBEB-BF2E-FA40-84BF-800540394443}" srcOrd="1" destOrd="0" presId="urn:microsoft.com/office/officeart/2005/8/layout/hierarchy2"/>
@@ -10920,66 +11250,6 @@
         </dgm:presLayoutVars>
       </dgm:prSet>
       <dgm:spPr/>
-    </dgm:pt>
-    <dgm:pt modelId="{61D01C7B-41B9-3E4B-BE52-7551DFC4A7D1}" type="pres">
-      <dgm:prSet presAssocID="{71775075-7418-2E4A-944C-9563C9578B15}" presName="root1" presStyleCnt="0"/>
-      <dgm:spPr/>
-    </dgm:pt>
-    <dgm:pt modelId="{51AC3011-EC30-CC4A-A487-C5612F186AED}" type="pres">
-      <dgm:prSet presAssocID="{71775075-7418-2E4A-944C-9563C9578B15}" presName="LevelOneTextNode" presStyleLbl="node0" presStyleIdx="0" presStyleCnt="1">
-        <dgm:presLayoutVars>
-          <dgm:chPref val="3"/>
-        </dgm:presLayoutVars>
-      </dgm:prSet>
-      <dgm:spPr/>
-    </dgm:pt>
-    <dgm:pt modelId="{3521BBEB-BF2E-FA40-84BF-800540394443}" type="pres">
-      <dgm:prSet presAssocID="{71775075-7418-2E4A-944C-9563C9578B15}" presName="level2hierChild" presStyleCnt="0"/>
-      <dgm:spPr/>
-    </dgm:pt>
-    <dgm:pt modelId="{7557F600-1225-AC4F-B501-9D806D4A540E}" type="pres">
-      <dgm:prSet presAssocID="{F5055C99-4090-A446-8B01-FBF14B0BAE6B}" presName="conn2-1" presStyleLbl="parChTrans1D2" presStyleIdx="0" presStyleCnt="1"/>
-      <dgm:spPr/>
-    </dgm:pt>
-    <dgm:pt modelId="{7289D994-AFDB-EE4C-AC0B-BA8BA64580E2}" type="pres">
-      <dgm:prSet presAssocID="{F5055C99-4090-A446-8B01-FBF14B0BAE6B}" presName="connTx" presStyleLbl="parChTrans1D2" presStyleIdx="0" presStyleCnt="1"/>
-      <dgm:spPr/>
-    </dgm:pt>
-    <dgm:pt modelId="{A06FA018-AAF7-3E4E-950D-4C3ADBBEF2AE}" type="pres">
-      <dgm:prSet presAssocID="{C7FB1FDA-FFD2-7442-9B03-E3C48F541088}" presName="root2" presStyleCnt="0"/>
-      <dgm:spPr/>
-    </dgm:pt>
-    <dgm:pt modelId="{4BBA190D-2886-E645-B638-56D9A5EEAE63}" type="pres">
-      <dgm:prSet presAssocID="{C7FB1FDA-FFD2-7442-9B03-E3C48F541088}" presName="LevelTwoTextNode" presStyleLbl="node2" presStyleIdx="0" presStyleCnt="1">
-        <dgm:presLayoutVars>
-          <dgm:chPref val="3"/>
-        </dgm:presLayoutVars>
-      </dgm:prSet>
-      <dgm:spPr/>
-    </dgm:pt>
-    <dgm:pt modelId="{58AC17D6-FF5C-704C-B26E-1C80FB8F88E6}" type="pres">
-      <dgm:prSet presAssocID="{C7FB1FDA-FFD2-7442-9B03-E3C48F541088}" presName="level3hierChild" presStyleCnt="0"/>
-      <dgm:spPr/>
-    </dgm:pt>
-    <dgm:pt modelId="{C1916421-B12F-8542-A511-A01C3DD13ECC}" type="pres">
-      <dgm:prSet presAssocID="{E117BD7B-CFE2-1F4E-BE18-32C1B8FE346D}" presName="conn2-1" presStyleLbl="parChTrans1D3" presStyleIdx="0" presStyleCnt="2"/>
-      <dgm:spPr/>
-    </dgm:pt>
-    <dgm:pt modelId="{CA00C11B-37C3-F24C-BE04-79BD1E1C017D}" type="pres">
-      <dgm:prSet presAssocID="{E117BD7B-CFE2-1F4E-BE18-32C1B8FE346D}" presName="connTx" presStyleLbl="parChTrans1D3" presStyleIdx="0" presStyleCnt="2"/>
-      <dgm:spPr/>
-    </dgm:pt>
-    <dgm:pt modelId="{4A53F51B-E5EF-3E47-BABF-AC70D59EACD1}" type="pres">
-      <dgm:prSet presAssocID="{2D333868-B319-FA44-BCF4-A22D5F4D583C}" presName="root2" presStyleCnt="0"/>
-      <dgm:spPr/>
-    </dgm:pt>
-    <dgm:pt modelId="{C594038F-6E4D-C447-87C5-7D0FAEA2704B}" type="pres">
-      <dgm:prSet presAssocID="{2D333868-B319-FA44-BCF4-A22D5F4D583C}" presName="LevelTwoTextNode" presStyleLbl="node3" presStyleIdx="0" presStyleCnt="2">
-        <dgm:presLayoutVars>
-          <dgm:chPref val="3"/>
-        </dgm:presLayoutVars>
-      </dgm:prSet>
-      <dgm:spPr/>
       <dgm:t>
         <a:bodyPr/>
         <a:lstStyle/>
@@ -10988,24 +11258,12 @@
         </a:p>
       </dgm:t>
     </dgm:pt>
-    <dgm:pt modelId="{2AC30962-AC42-E641-909D-69140880996B}" type="pres">
-      <dgm:prSet presAssocID="{2D333868-B319-FA44-BCF4-A22D5F4D583C}" presName="level3hierChild" presStyleCnt="0"/>
-      <dgm:spPr/>
-    </dgm:pt>
-    <dgm:pt modelId="{201979C6-BA79-4743-B8F0-F7D72E3EC9E8}" type="pres">
-      <dgm:prSet presAssocID="{F1817476-2D3E-9547-8F4B-CAAFA848A452}" presName="conn2-1" presStyleLbl="parChTrans1D4" presStyleIdx="0" presStyleCnt="5"/>
-      <dgm:spPr/>
-    </dgm:pt>
-    <dgm:pt modelId="{23EF812F-7F67-E44E-98B4-5B8C050D8293}" type="pres">
-      <dgm:prSet presAssocID="{F1817476-2D3E-9547-8F4B-CAAFA848A452}" presName="connTx" presStyleLbl="parChTrans1D4" presStyleIdx="0" presStyleCnt="5"/>
-      <dgm:spPr/>
-    </dgm:pt>
-    <dgm:pt modelId="{76104F01-00A1-654C-8B57-AA550BFD9D86}" type="pres">
-      <dgm:prSet presAssocID="{D34ABA54-8E9D-B543-B5FD-657C7B8613E2}" presName="root2" presStyleCnt="0"/>
-      <dgm:spPr/>
-    </dgm:pt>
-    <dgm:pt modelId="{33431CAC-6E85-9747-BF13-88FE589C1972}" type="pres">
-      <dgm:prSet presAssocID="{D34ABA54-8E9D-B543-B5FD-657C7B8613E2}" presName="LevelTwoTextNode" presStyleLbl="node4" presStyleIdx="0" presStyleCnt="5">
+    <dgm:pt modelId="{61D01C7B-41B9-3E4B-BE52-7551DFC4A7D1}" type="pres">
+      <dgm:prSet presAssocID="{71775075-7418-2E4A-944C-9563C9578B15}" presName="root1" presStyleCnt="0"/>
+      <dgm:spPr/>
+    </dgm:pt>
+    <dgm:pt modelId="{51AC3011-EC30-CC4A-A487-C5612F186AED}" type="pres">
+      <dgm:prSet presAssocID="{71775075-7418-2E4A-944C-9563C9578B15}" presName="LevelOneTextNode" presStyleLbl="node0" presStyleIdx="0" presStyleCnt="1">
         <dgm:presLayoutVars>
           <dgm:chPref val="3"/>
         </dgm:presLayoutVars>
@@ -11019,52 +11277,12 @@
         </a:p>
       </dgm:t>
     </dgm:pt>
-    <dgm:pt modelId="{0E6B8793-7108-8F45-B64E-F2D7BDEFE45B}" type="pres">
-      <dgm:prSet presAssocID="{D34ABA54-8E9D-B543-B5FD-657C7B8613E2}" presName="level3hierChild" presStyleCnt="0"/>
-      <dgm:spPr/>
-    </dgm:pt>
-    <dgm:pt modelId="{BDDBB520-461F-F149-8A1C-618D079A9554}" type="pres">
-      <dgm:prSet presAssocID="{EDAE4274-B905-BF49-A664-438DA414C17E}" presName="conn2-1" presStyleLbl="parChTrans1D4" presStyleIdx="1" presStyleCnt="5"/>
-      <dgm:spPr/>
-    </dgm:pt>
-    <dgm:pt modelId="{2F28EB2B-CB25-8A47-82BF-9E3028E5130B}" type="pres">
-      <dgm:prSet presAssocID="{EDAE4274-B905-BF49-A664-438DA414C17E}" presName="connTx" presStyleLbl="parChTrans1D4" presStyleIdx="1" presStyleCnt="5"/>
-      <dgm:spPr/>
-    </dgm:pt>
-    <dgm:pt modelId="{734F16F8-032F-A646-9869-740EFB2A135C}" type="pres">
-      <dgm:prSet presAssocID="{293F40DD-D408-384B-B541-ECC077055930}" presName="root2" presStyleCnt="0"/>
-      <dgm:spPr/>
-    </dgm:pt>
-    <dgm:pt modelId="{C46D46E9-E5C6-4247-9D2C-A18B439B48A1}" type="pres">
-      <dgm:prSet presAssocID="{293F40DD-D408-384B-B541-ECC077055930}" presName="LevelTwoTextNode" presStyleLbl="node4" presStyleIdx="1" presStyleCnt="5">
-        <dgm:presLayoutVars>
-          <dgm:chPref val="3"/>
-        </dgm:presLayoutVars>
-      </dgm:prSet>
-      <dgm:spPr/>
-    </dgm:pt>
-    <dgm:pt modelId="{D9DD1763-4A55-0C48-8908-8E72C65A9E3A}" type="pres">
-      <dgm:prSet presAssocID="{293F40DD-D408-384B-B541-ECC077055930}" presName="level3hierChild" presStyleCnt="0"/>
-      <dgm:spPr/>
-    </dgm:pt>
-    <dgm:pt modelId="{159AB614-218A-2D49-91A6-1EF4FA1A1566}" type="pres">
-      <dgm:prSet presAssocID="{606AD9AA-BF9A-5446-B7CD-AD40DF3BC8C1}" presName="conn2-1" presStyleLbl="parChTrans1D4" presStyleIdx="2" presStyleCnt="5"/>
-      <dgm:spPr/>
-    </dgm:pt>
-    <dgm:pt modelId="{DB6B916A-6E6E-1246-BDBE-85871447EBF5}" type="pres">
-      <dgm:prSet presAssocID="{606AD9AA-BF9A-5446-B7CD-AD40DF3BC8C1}" presName="connTx" presStyleLbl="parChTrans1D4" presStyleIdx="2" presStyleCnt="5"/>
-      <dgm:spPr/>
-    </dgm:pt>
-    <dgm:pt modelId="{AD735E6B-0FB4-974D-A548-DCA1FBE7B026}" type="pres">
-      <dgm:prSet presAssocID="{4E92B94B-0B51-1741-94DA-712EE7DDD084}" presName="root2" presStyleCnt="0"/>
-      <dgm:spPr/>
-    </dgm:pt>
-    <dgm:pt modelId="{20BAB645-C550-F944-89DD-315E85967EAE}" type="pres">
-      <dgm:prSet presAssocID="{4E92B94B-0B51-1741-94DA-712EE7DDD084}" presName="LevelTwoTextNode" presStyleLbl="node4" presStyleIdx="2" presStyleCnt="5">
-        <dgm:presLayoutVars>
-          <dgm:chPref val="3"/>
-        </dgm:presLayoutVars>
-      </dgm:prSet>
+    <dgm:pt modelId="{3521BBEB-BF2E-FA40-84BF-800540394443}" type="pres">
+      <dgm:prSet presAssocID="{71775075-7418-2E4A-944C-9563C9578B15}" presName="level2hierChild" presStyleCnt="0"/>
+      <dgm:spPr/>
+    </dgm:pt>
+    <dgm:pt modelId="{7557F600-1225-AC4F-B501-9D806D4A540E}" type="pres">
+      <dgm:prSet presAssocID="{F5055C99-4090-A446-8B01-FBF14B0BAE6B}" presName="conn2-1" presStyleLbl="parChTrans1D2" presStyleIdx="0" presStyleCnt="1"/>
       <dgm:spPr/>
       <dgm:t>
         <a:bodyPr/>
@@ -11074,28 +11292,8 @@
         </a:p>
       </dgm:t>
     </dgm:pt>
-    <dgm:pt modelId="{9228BE81-17F5-A145-9F6F-75D04DC9389A}" type="pres">
-      <dgm:prSet presAssocID="{4E92B94B-0B51-1741-94DA-712EE7DDD084}" presName="level3hierChild" presStyleCnt="0"/>
-      <dgm:spPr/>
-    </dgm:pt>
-    <dgm:pt modelId="{DB0E2691-0EF0-1640-B06F-2386DCF1E6A3}" type="pres">
-      <dgm:prSet presAssocID="{EF6F51FC-F721-5745-A8D1-023813ED18AF}" presName="conn2-1" presStyleLbl="parChTrans1D3" presStyleIdx="1" presStyleCnt="2"/>
-      <dgm:spPr/>
-    </dgm:pt>
-    <dgm:pt modelId="{C332EEED-214D-824E-8252-C3718C7A5077}" type="pres">
-      <dgm:prSet presAssocID="{EF6F51FC-F721-5745-A8D1-023813ED18AF}" presName="connTx" presStyleLbl="parChTrans1D3" presStyleIdx="1" presStyleCnt="2"/>
-      <dgm:spPr/>
-    </dgm:pt>
-    <dgm:pt modelId="{A10B5033-3A42-BA4C-823C-62D05D0E90FB}" type="pres">
-      <dgm:prSet presAssocID="{F678C734-9529-074D-9739-2181A6F09A05}" presName="root2" presStyleCnt="0"/>
-      <dgm:spPr/>
-    </dgm:pt>
-    <dgm:pt modelId="{7ED7ABB9-68F6-A142-88A3-33292FA999E6}" type="pres">
-      <dgm:prSet presAssocID="{F678C734-9529-074D-9739-2181A6F09A05}" presName="LevelTwoTextNode" presStyleLbl="node3" presStyleIdx="1" presStyleCnt="2">
-        <dgm:presLayoutVars>
-          <dgm:chPref val="3"/>
-        </dgm:presLayoutVars>
-      </dgm:prSet>
+    <dgm:pt modelId="{7289D994-AFDB-EE4C-AC0B-BA8BA64580E2}" type="pres">
+      <dgm:prSet presAssocID="{F5055C99-4090-A446-8B01-FBF14B0BAE6B}" presName="connTx" presStyleLbl="parChTrans1D2" presStyleIdx="0" presStyleCnt="1"/>
       <dgm:spPr/>
       <dgm:t>
         <a:bodyPr/>
@@ -11105,24 +11303,12 @@
         </a:p>
       </dgm:t>
     </dgm:pt>
-    <dgm:pt modelId="{B5A09D3E-D917-1E4D-9B4A-171490B788E0}" type="pres">
-      <dgm:prSet presAssocID="{F678C734-9529-074D-9739-2181A6F09A05}" presName="level3hierChild" presStyleCnt="0"/>
-      <dgm:spPr/>
-    </dgm:pt>
-    <dgm:pt modelId="{6FDD1D71-F0A7-4A4A-BD10-BAFACDACC645}" type="pres">
-      <dgm:prSet presAssocID="{616FA258-A678-CE4B-A5C8-A8B49F8FE7AD}" presName="conn2-1" presStyleLbl="parChTrans1D4" presStyleIdx="3" presStyleCnt="5"/>
-      <dgm:spPr/>
-    </dgm:pt>
-    <dgm:pt modelId="{FB39C324-68AB-1D43-9036-CFA033856AB4}" type="pres">
-      <dgm:prSet presAssocID="{616FA258-A678-CE4B-A5C8-A8B49F8FE7AD}" presName="connTx" presStyleLbl="parChTrans1D4" presStyleIdx="3" presStyleCnt="5"/>
-      <dgm:spPr/>
-    </dgm:pt>
-    <dgm:pt modelId="{2E565FC3-E70E-E44A-A730-BF7DD1025E49}" type="pres">
-      <dgm:prSet presAssocID="{2C14816F-93DB-394C-AA4D-95C3A19D282C}" presName="root2" presStyleCnt="0"/>
-      <dgm:spPr/>
-    </dgm:pt>
-    <dgm:pt modelId="{8A661C3E-E668-824D-AFB3-F40492F5DAA8}" type="pres">
-      <dgm:prSet presAssocID="{2C14816F-93DB-394C-AA4D-95C3A19D282C}" presName="LevelTwoTextNode" presStyleLbl="node4" presStyleIdx="3" presStyleCnt="5">
+    <dgm:pt modelId="{A06FA018-AAF7-3E4E-950D-4C3ADBBEF2AE}" type="pres">
+      <dgm:prSet presAssocID="{C7FB1FDA-FFD2-7442-9B03-E3C48F541088}" presName="root2" presStyleCnt="0"/>
+      <dgm:spPr/>
+    </dgm:pt>
+    <dgm:pt modelId="{4BBA190D-2886-E645-B638-56D9A5EEAE63}" type="pres">
+      <dgm:prSet presAssocID="{C7FB1FDA-FFD2-7442-9B03-E3C48F541088}" presName="LevelTwoTextNode" presStyleLbl="node2" presStyleIdx="0" presStyleCnt="1">
         <dgm:presLayoutVars>
           <dgm:chPref val="3"/>
         </dgm:presLayoutVars>
@@ -11136,28 +11322,12 @@
         </a:p>
       </dgm:t>
     </dgm:pt>
-    <dgm:pt modelId="{0BC519E5-1032-0749-9385-C17C48BC52D5}" type="pres">
-      <dgm:prSet presAssocID="{2C14816F-93DB-394C-AA4D-95C3A19D282C}" presName="level3hierChild" presStyleCnt="0"/>
-      <dgm:spPr/>
-    </dgm:pt>
-    <dgm:pt modelId="{9100CD0C-002B-0341-85CC-4EBD1F3796CF}" type="pres">
-      <dgm:prSet presAssocID="{D5709020-A1D8-544E-932C-20E173860DD6}" presName="conn2-1" presStyleLbl="parChTrans1D4" presStyleIdx="4" presStyleCnt="5"/>
-      <dgm:spPr/>
-    </dgm:pt>
-    <dgm:pt modelId="{8C581872-405F-6F47-BD8E-3BE38281F1BF}" type="pres">
-      <dgm:prSet presAssocID="{D5709020-A1D8-544E-932C-20E173860DD6}" presName="connTx" presStyleLbl="parChTrans1D4" presStyleIdx="4" presStyleCnt="5"/>
-      <dgm:spPr/>
-    </dgm:pt>
-    <dgm:pt modelId="{3339E294-7C3F-434B-A031-E5602E7EA286}" type="pres">
-      <dgm:prSet presAssocID="{E5DDE7F3-491F-2948-B622-F058BEB7E459}" presName="root2" presStyleCnt="0"/>
-      <dgm:spPr/>
-    </dgm:pt>
-    <dgm:pt modelId="{9FBBC3FA-E189-DE4B-B1EF-E3BD4BD04670}" type="pres">
-      <dgm:prSet presAssocID="{E5DDE7F3-491F-2948-B622-F058BEB7E459}" presName="LevelTwoTextNode" presStyleLbl="node4" presStyleIdx="4" presStyleCnt="5">
-        <dgm:presLayoutVars>
-          <dgm:chPref val="3"/>
-        </dgm:presLayoutVars>
-      </dgm:prSet>
+    <dgm:pt modelId="{58AC17D6-FF5C-704C-B26E-1C80FB8F88E6}" type="pres">
+      <dgm:prSet presAssocID="{C7FB1FDA-FFD2-7442-9B03-E3C48F541088}" presName="level3hierChild" presStyleCnt="0"/>
+      <dgm:spPr/>
+    </dgm:pt>
+    <dgm:pt modelId="{C1916421-B12F-8542-A511-A01C3DD13ECC}" type="pres">
+      <dgm:prSet presAssocID="{E117BD7B-CFE2-1F4E-BE18-32C1B8FE346D}" presName="conn2-1" presStyleLbl="parChTrans1D3" presStyleIdx="0" presStyleCnt="2"/>
       <dgm:spPr/>
       <dgm:t>
         <a:bodyPr/>
@@ -11167,47 +11337,347 @@
         </a:p>
       </dgm:t>
     </dgm:pt>
+    <dgm:pt modelId="{CA00C11B-37C3-F24C-BE04-79BD1E1C017D}" type="pres">
+      <dgm:prSet presAssocID="{E117BD7B-CFE2-1F4E-BE18-32C1B8FE346D}" presName="connTx" presStyleLbl="parChTrans1D3" presStyleIdx="0" presStyleCnt="2"/>
+      <dgm:spPr/>
+      <dgm:t>
+        <a:bodyPr/>
+        <a:lstStyle/>
+        <a:p>
+          <a:endParaRPr lang="zh-CN" altLang="en-US"/>
+        </a:p>
+      </dgm:t>
+    </dgm:pt>
+    <dgm:pt modelId="{4A53F51B-E5EF-3E47-BABF-AC70D59EACD1}" type="pres">
+      <dgm:prSet presAssocID="{2D333868-B319-FA44-BCF4-A22D5F4D583C}" presName="root2" presStyleCnt="0"/>
+      <dgm:spPr/>
+    </dgm:pt>
+    <dgm:pt modelId="{C594038F-6E4D-C447-87C5-7D0FAEA2704B}" type="pres">
+      <dgm:prSet presAssocID="{2D333868-B319-FA44-BCF4-A22D5F4D583C}" presName="LevelTwoTextNode" presStyleLbl="node3" presStyleIdx="0" presStyleCnt="2">
+        <dgm:presLayoutVars>
+          <dgm:chPref val="3"/>
+        </dgm:presLayoutVars>
+      </dgm:prSet>
+      <dgm:spPr/>
+      <dgm:t>
+        <a:bodyPr/>
+        <a:lstStyle/>
+        <a:p>
+          <a:endParaRPr lang="zh-CN" altLang="en-US"/>
+        </a:p>
+      </dgm:t>
+    </dgm:pt>
+    <dgm:pt modelId="{2AC30962-AC42-E641-909D-69140880996B}" type="pres">
+      <dgm:prSet presAssocID="{2D333868-B319-FA44-BCF4-A22D5F4D583C}" presName="level3hierChild" presStyleCnt="0"/>
+      <dgm:spPr/>
+    </dgm:pt>
+    <dgm:pt modelId="{201979C6-BA79-4743-B8F0-F7D72E3EC9E8}" type="pres">
+      <dgm:prSet presAssocID="{F1817476-2D3E-9547-8F4B-CAAFA848A452}" presName="conn2-1" presStyleLbl="parChTrans1D4" presStyleIdx="0" presStyleCnt="5"/>
+      <dgm:spPr/>
+      <dgm:t>
+        <a:bodyPr/>
+        <a:lstStyle/>
+        <a:p>
+          <a:endParaRPr lang="zh-CN" altLang="en-US"/>
+        </a:p>
+      </dgm:t>
+    </dgm:pt>
+    <dgm:pt modelId="{23EF812F-7F67-E44E-98B4-5B8C050D8293}" type="pres">
+      <dgm:prSet presAssocID="{F1817476-2D3E-9547-8F4B-CAAFA848A452}" presName="connTx" presStyleLbl="parChTrans1D4" presStyleIdx="0" presStyleCnt="5"/>
+      <dgm:spPr/>
+      <dgm:t>
+        <a:bodyPr/>
+        <a:lstStyle/>
+        <a:p>
+          <a:endParaRPr lang="zh-CN" altLang="en-US"/>
+        </a:p>
+      </dgm:t>
+    </dgm:pt>
+    <dgm:pt modelId="{76104F01-00A1-654C-8B57-AA550BFD9D86}" type="pres">
+      <dgm:prSet presAssocID="{D34ABA54-8E9D-B543-B5FD-657C7B8613E2}" presName="root2" presStyleCnt="0"/>
+      <dgm:spPr/>
+    </dgm:pt>
+    <dgm:pt modelId="{33431CAC-6E85-9747-BF13-88FE589C1972}" type="pres">
+      <dgm:prSet presAssocID="{D34ABA54-8E9D-B543-B5FD-657C7B8613E2}" presName="LevelTwoTextNode" presStyleLbl="node4" presStyleIdx="0" presStyleCnt="5">
+        <dgm:presLayoutVars>
+          <dgm:chPref val="3"/>
+        </dgm:presLayoutVars>
+      </dgm:prSet>
+      <dgm:spPr/>
+      <dgm:t>
+        <a:bodyPr/>
+        <a:lstStyle/>
+        <a:p>
+          <a:endParaRPr lang="zh-CN" altLang="en-US"/>
+        </a:p>
+      </dgm:t>
+    </dgm:pt>
+    <dgm:pt modelId="{0E6B8793-7108-8F45-B64E-F2D7BDEFE45B}" type="pres">
+      <dgm:prSet presAssocID="{D34ABA54-8E9D-B543-B5FD-657C7B8613E2}" presName="level3hierChild" presStyleCnt="0"/>
+      <dgm:spPr/>
+    </dgm:pt>
+    <dgm:pt modelId="{BDDBB520-461F-F149-8A1C-618D079A9554}" type="pres">
+      <dgm:prSet presAssocID="{EDAE4274-B905-BF49-A664-438DA414C17E}" presName="conn2-1" presStyleLbl="parChTrans1D4" presStyleIdx="1" presStyleCnt="5"/>
+      <dgm:spPr/>
+      <dgm:t>
+        <a:bodyPr/>
+        <a:lstStyle/>
+        <a:p>
+          <a:endParaRPr lang="zh-CN" altLang="en-US"/>
+        </a:p>
+      </dgm:t>
+    </dgm:pt>
+    <dgm:pt modelId="{2F28EB2B-CB25-8A47-82BF-9E3028E5130B}" type="pres">
+      <dgm:prSet presAssocID="{EDAE4274-B905-BF49-A664-438DA414C17E}" presName="connTx" presStyleLbl="parChTrans1D4" presStyleIdx="1" presStyleCnt="5"/>
+      <dgm:spPr/>
+      <dgm:t>
+        <a:bodyPr/>
+        <a:lstStyle/>
+        <a:p>
+          <a:endParaRPr lang="zh-CN" altLang="en-US"/>
+        </a:p>
+      </dgm:t>
+    </dgm:pt>
+    <dgm:pt modelId="{734F16F8-032F-A646-9869-740EFB2A135C}" type="pres">
+      <dgm:prSet presAssocID="{293F40DD-D408-384B-B541-ECC077055930}" presName="root2" presStyleCnt="0"/>
+      <dgm:spPr/>
+    </dgm:pt>
+    <dgm:pt modelId="{C46D46E9-E5C6-4247-9D2C-A18B439B48A1}" type="pres">
+      <dgm:prSet presAssocID="{293F40DD-D408-384B-B541-ECC077055930}" presName="LevelTwoTextNode" presStyleLbl="node4" presStyleIdx="1" presStyleCnt="5">
+        <dgm:presLayoutVars>
+          <dgm:chPref val="3"/>
+        </dgm:presLayoutVars>
+      </dgm:prSet>
+      <dgm:spPr/>
+      <dgm:t>
+        <a:bodyPr/>
+        <a:lstStyle/>
+        <a:p>
+          <a:endParaRPr lang="zh-CN" altLang="en-US"/>
+        </a:p>
+      </dgm:t>
+    </dgm:pt>
+    <dgm:pt modelId="{D9DD1763-4A55-0C48-8908-8E72C65A9E3A}" type="pres">
+      <dgm:prSet presAssocID="{293F40DD-D408-384B-B541-ECC077055930}" presName="level3hierChild" presStyleCnt="0"/>
+      <dgm:spPr/>
+    </dgm:pt>
+    <dgm:pt modelId="{159AB614-218A-2D49-91A6-1EF4FA1A1566}" type="pres">
+      <dgm:prSet presAssocID="{606AD9AA-BF9A-5446-B7CD-AD40DF3BC8C1}" presName="conn2-1" presStyleLbl="parChTrans1D4" presStyleIdx="2" presStyleCnt="5"/>
+      <dgm:spPr/>
+      <dgm:t>
+        <a:bodyPr/>
+        <a:lstStyle/>
+        <a:p>
+          <a:endParaRPr lang="zh-CN" altLang="en-US"/>
+        </a:p>
+      </dgm:t>
+    </dgm:pt>
+    <dgm:pt modelId="{DB6B916A-6E6E-1246-BDBE-85871447EBF5}" type="pres">
+      <dgm:prSet presAssocID="{606AD9AA-BF9A-5446-B7CD-AD40DF3BC8C1}" presName="connTx" presStyleLbl="parChTrans1D4" presStyleIdx="2" presStyleCnt="5"/>
+      <dgm:spPr/>
+      <dgm:t>
+        <a:bodyPr/>
+        <a:lstStyle/>
+        <a:p>
+          <a:endParaRPr lang="zh-CN" altLang="en-US"/>
+        </a:p>
+      </dgm:t>
+    </dgm:pt>
+    <dgm:pt modelId="{AD735E6B-0FB4-974D-A548-DCA1FBE7B026}" type="pres">
+      <dgm:prSet presAssocID="{4E92B94B-0B51-1741-94DA-712EE7DDD084}" presName="root2" presStyleCnt="0"/>
+      <dgm:spPr/>
+    </dgm:pt>
+    <dgm:pt modelId="{20BAB645-C550-F944-89DD-315E85967EAE}" type="pres">
+      <dgm:prSet presAssocID="{4E92B94B-0B51-1741-94DA-712EE7DDD084}" presName="LevelTwoTextNode" presStyleLbl="node4" presStyleIdx="2" presStyleCnt="5">
+        <dgm:presLayoutVars>
+          <dgm:chPref val="3"/>
+        </dgm:presLayoutVars>
+      </dgm:prSet>
+      <dgm:spPr/>
+      <dgm:t>
+        <a:bodyPr/>
+        <a:lstStyle/>
+        <a:p>
+          <a:endParaRPr lang="zh-CN" altLang="en-US"/>
+        </a:p>
+      </dgm:t>
+    </dgm:pt>
+    <dgm:pt modelId="{9228BE81-17F5-A145-9F6F-75D04DC9389A}" type="pres">
+      <dgm:prSet presAssocID="{4E92B94B-0B51-1741-94DA-712EE7DDD084}" presName="level3hierChild" presStyleCnt="0"/>
+      <dgm:spPr/>
+    </dgm:pt>
+    <dgm:pt modelId="{DB0E2691-0EF0-1640-B06F-2386DCF1E6A3}" type="pres">
+      <dgm:prSet presAssocID="{EF6F51FC-F721-5745-A8D1-023813ED18AF}" presName="conn2-1" presStyleLbl="parChTrans1D3" presStyleIdx="1" presStyleCnt="2"/>
+      <dgm:spPr/>
+      <dgm:t>
+        <a:bodyPr/>
+        <a:lstStyle/>
+        <a:p>
+          <a:endParaRPr lang="zh-CN" altLang="en-US"/>
+        </a:p>
+      </dgm:t>
+    </dgm:pt>
+    <dgm:pt modelId="{C332EEED-214D-824E-8252-C3718C7A5077}" type="pres">
+      <dgm:prSet presAssocID="{EF6F51FC-F721-5745-A8D1-023813ED18AF}" presName="connTx" presStyleLbl="parChTrans1D3" presStyleIdx="1" presStyleCnt="2"/>
+      <dgm:spPr/>
+      <dgm:t>
+        <a:bodyPr/>
+        <a:lstStyle/>
+        <a:p>
+          <a:endParaRPr lang="zh-CN" altLang="en-US"/>
+        </a:p>
+      </dgm:t>
+    </dgm:pt>
+    <dgm:pt modelId="{A10B5033-3A42-BA4C-823C-62D05D0E90FB}" type="pres">
+      <dgm:prSet presAssocID="{F678C734-9529-074D-9739-2181A6F09A05}" presName="root2" presStyleCnt="0"/>
+      <dgm:spPr/>
+    </dgm:pt>
+    <dgm:pt modelId="{7ED7ABB9-68F6-A142-88A3-33292FA999E6}" type="pres">
+      <dgm:prSet presAssocID="{F678C734-9529-074D-9739-2181A6F09A05}" presName="LevelTwoTextNode" presStyleLbl="node3" presStyleIdx="1" presStyleCnt="2">
+        <dgm:presLayoutVars>
+          <dgm:chPref val="3"/>
+        </dgm:presLayoutVars>
+      </dgm:prSet>
+      <dgm:spPr/>
+      <dgm:t>
+        <a:bodyPr/>
+        <a:lstStyle/>
+        <a:p>
+          <a:endParaRPr lang="zh-CN" altLang="en-US"/>
+        </a:p>
+      </dgm:t>
+    </dgm:pt>
+    <dgm:pt modelId="{B5A09D3E-D917-1E4D-9B4A-171490B788E0}" type="pres">
+      <dgm:prSet presAssocID="{F678C734-9529-074D-9739-2181A6F09A05}" presName="level3hierChild" presStyleCnt="0"/>
+      <dgm:spPr/>
+    </dgm:pt>
+    <dgm:pt modelId="{6FDD1D71-F0A7-4A4A-BD10-BAFACDACC645}" type="pres">
+      <dgm:prSet presAssocID="{616FA258-A678-CE4B-A5C8-A8B49F8FE7AD}" presName="conn2-1" presStyleLbl="parChTrans1D4" presStyleIdx="3" presStyleCnt="5"/>
+      <dgm:spPr/>
+      <dgm:t>
+        <a:bodyPr/>
+        <a:lstStyle/>
+        <a:p>
+          <a:endParaRPr lang="zh-CN" altLang="en-US"/>
+        </a:p>
+      </dgm:t>
+    </dgm:pt>
+    <dgm:pt modelId="{FB39C324-68AB-1D43-9036-CFA033856AB4}" type="pres">
+      <dgm:prSet presAssocID="{616FA258-A678-CE4B-A5C8-A8B49F8FE7AD}" presName="connTx" presStyleLbl="parChTrans1D4" presStyleIdx="3" presStyleCnt="5"/>
+      <dgm:spPr/>
+      <dgm:t>
+        <a:bodyPr/>
+        <a:lstStyle/>
+        <a:p>
+          <a:endParaRPr lang="zh-CN" altLang="en-US"/>
+        </a:p>
+      </dgm:t>
+    </dgm:pt>
+    <dgm:pt modelId="{2E565FC3-E70E-E44A-A730-BF7DD1025E49}" type="pres">
+      <dgm:prSet presAssocID="{2C14816F-93DB-394C-AA4D-95C3A19D282C}" presName="root2" presStyleCnt="0"/>
+      <dgm:spPr/>
+    </dgm:pt>
+    <dgm:pt modelId="{8A661C3E-E668-824D-AFB3-F40492F5DAA8}" type="pres">
+      <dgm:prSet presAssocID="{2C14816F-93DB-394C-AA4D-95C3A19D282C}" presName="LevelTwoTextNode" presStyleLbl="node4" presStyleIdx="3" presStyleCnt="5">
+        <dgm:presLayoutVars>
+          <dgm:chPref val="3"/>
+        </dgm:presLayoutVars>
+      </dgm:prSet>
+      <dgm:spPr/>
+      <dgm:t>
+        <a:bodyPr/>
+        <a:lstStyle/>
+        <a:p>
+          <a:endParaRPr lang="zh-CN" altLang="en-US"/>
+        </a:p>
+      </dgm:t>
+    </dgm:pt>
+    <dgm:pt modelId="{0BC519E5-1032-0749-9385-C17C48BC52D5}" type="pres">
+      <dgm:prSet presAssocID="{2C14816F-93DB-394C-AA4D-95C3A19D282C}" presName="level3hierChild" presStyleCnt="0"/>
+      <dgm:spPr/>
+    </dgm:pt>
+    <dgm:pt modelId="{9100CD0C-002B-0341-85CC-4EBD1F3796CF}" type="pres">
+      <dgm:prSet presAssocID="{D5709020-A1D8-544E-932C-20E173860DD6}" presName="conn2-1" presStyleLbl="parChTrans1D4" presStyleIdx="4" presStyleCnt="5"/>
+      <dgm:spPr/>
+      <dgm:t>
+        <a:bodyPr/>
+        <a:lstStyle/>
+        <a:p>
+          <a:endParaRPr lang="zh-CN" altLang="en-US"/>
+        </a:p>
+      </dgm:t>
+    </dgm:pt>
+    <dgm:pt modelId="{8C581872-405F-6F47-BD8E-3BE38281F1BF}" type="pres">
+      <dgm:prSet presAssocID="{D5709020-A1D8-544E-932C-20E173860DD6}" presName="connTx" presStyleLbl="parChTrans1D4" presStyleIdx="4" presStyleCnt="5"/>
+      <dgm:spPr/>
+      <dgm:t>
+        <a:bodyPr/>
+        <a:lstStyle/>
+        <a:p>
+          <a:endParaRPr lang="zh-CN" altLang="en-US"/>
+        </a:p>
+      </dgm:t>
+    </dgm:pt>
+    <dgm:pt modelId="{3339E294-7C3F-434B-A031-E5602E7EA286}" type="pres">
+      <dgm:prSet presAssocID="{E5DDE7F3-491F-2948-B622-F058BEB7E459}" presName="root2" presStyleCnt="0"/>
+      <dgm:spPr/>
+    </dgm:pt>
+    <dgm:pt modelId="{9FBBC3FA-E189-DE4B-B1EF-E3BD4BD04670}" type="pres">
+      <dgm:prSet presAssocID="{E5DDE7F3-491F-2948-B622-F058BEB7E459}" presName="LevelTwoTextNode" presStyleLbl="node4" presStyleIdx="4" presStyleCnt="5">
+        <dgm:presLayoutVars>
+          <dgm:chPref val="3"/>
+        </dgm:presLayoutVars>
+      </dgm:prSet>
+      <dgm:spPr/>
+      <dgm:t>
+        <a:bodyPr/>
+        <a:lstStyle/>
+        <a:p>
+          <a:endParaRPr lang="zh-CN" altLang="en-US"/>
+        </a:p>
+      </dgm:t>
+    </dgm:pt>
     <dgm:pt modelId="{9AC87297-D08D-8148-B779-B7C76E5A5860}" type="pres">
       <dgm:prSet presAssocID="{E5DDE7F3-491F-2948-B622-F058BEB7E459}" presName="level3hierChild" presStyleCnt="0"/>
       <dgm:spPr/>
     </dgm:pt>
   </dgm:ptLst>
   <dgm:cxnLst>
-    <dgm:cxn modelId="{CE1D3A1A-43EF-4A45-A282-F565FB5C433D}" type="presOf" srcId="{E5DDE7F3-491F-2948-B622-F058BEB7E459}" destId="{9FBBC3FA-E189-DE4B-B1EF-E3BD4BD04670}" srcOrd="0" destOrd="0" presId="urn:microsoft.com/office/officeart/2005/8/layout/hierarchy2"/>
+    <dgm:cxn modelId="{AA3CEA3C-CD09-2E44-9076-14D293A3F3B6}" type="presOf" srcId="{293F40DD-D408-384B-B541-ECC077055930}" destId="{C46D46E9-E5C6-4247-9D2C-A18B439B48A1}" srcOrd="0" destOrd="0" presId="urn:microsoft.com/office/officeart/2005/8/layout/hierarchy2"/>
+    <dgm:cxn modelId="{94539A8B-54ED-F146-8FE4-8F279F8A258D}" srcId="{2D333868-B319-FA44-BCF4-A22D5F4D583C}" destId="{293F40DD-D408-384B-B541-ECC077055930}" srcOrd="1" destOrd="0" parTransId="{EDAE4274-B905-BF49-A664-438DA414C17E}" sibTransId="{20506090-289D-FB48-B50E-754E111C685B}"/>
+    <dgm:cxn modelId="{B28B733B-7FB0-E640-A853-96EFACC10418}" type="presOf" srcId="{EF6F51FC-F721-5745-A8D1-023813ED18AF}" destId="{DB0E2691-0EF0-1640-B06F-2386DCF1E6A3}" srcOrd="0" destOrd="0" presId="urn:microsoft.com/office/officeart/2005/8/layout/hierarchy2"/>
+    <dgm:cxn modelId="{A2B22314-A2E2-5D4E-A241-5E906DFDF600}" type="presOf" srcId="{71775075-7418-2E4A-944C-9563C9578B15}" destId="{51AC3011-EC30-CC4A-A487-C5612F186AED}" srcOrd="0" destOrd="0" presId="urn:microsoft.com/office/officeart/2005/8/layout/hierarchy2"/>
+    <dgm:cxn modelId="{0A6992C1-84BF-384D-8993-0D5A4234E962}" type="presOf" srcId="{D34ABA54-8E9D-B543-B5FD-657C7B8613E2}" destId="{33431CAC-6E85-9747-BF13-88FE589C1972}" srcOrd="0" destOrd="0" presId="urn:microsoft.com/office/officeart/2005/8/layout/hierarchy2"/>
+    <dgm:cxn modelId="{ED770868-7632-CC42-A3F0-4D05DC386964}" type="presOf" srcId="{F1817476-2D3E-9547-8F4B-CAAFA848A452}" destId="{23EF812F-7F67-E44E-98B4-5B8C050D8293}" srcOrd="1" destOrd="0" presId="urn:microsoft.com/office/officeart/2005/8/layout/hierarchy2"/>
     <dgm:cxn modelId="{F3D34287-1965-814A-9AA0-0B6BFC0ADFEC}" type="presOf" srcId="{D5709020-A1D8-544E-932C-20E173860DD6}" destId="{9100CD0C-002B-0341-85CC-4EBD1F3796CF}" srcOrd="0" destOrd="0" presId="urn:microsoft.com/office/officeart/2005/8/layout/hierarchy2"/>
-    <dgm:cxn modelId="{6BCBBB7F-DF26-564A-BFFE-7D651414456F}" type="presOf" srcId="{EF6F51FC-F721-5745-A8D1-023813ED18AF}" destId="{C332EEED-214D-824E-8252-C3718C7A5077}" srcOrd="1" destOrd="0" presId="urn:microsoft.com/office/officeart/2005/8/layout/hierarchy2"/>
+    <dgm:cxn modelId="{5856589A-0F2D-DF4B-81CC-EA8D2158C983}" srcId="{F678C734-9529-074D-9739-2181A6F09A05}" destId="{E5DDE7F3-491F-2948-B622-F058BEB7E459}" srcOrd="1" destOrd="0" parTransId="{D5709020-A1D8-544E-932C-20E173860DD6}" sibTransId="{0A8455A7-1ED0-5541-ACB0-55DC0F8FB3D3}"/>
+    <dgm:cxn modelId="{A5152369-D0FE-4F48-A652-5411E2BF778F}" type="presOf" srcId="{C7FB1FDA-FFD2-7442-9B03-E3C48F541088}" destId="{4BBA190D-2886-E645-B638-56D9A5EEAE63}" srcOrd="0" destOrd="0" presId="urn:microsoft.com/office/officeart/2005/8/layout/hierarchy2"/>
+    <dgm:cxn modelId="{29BACC8A-5C71-6941-B43A-BD9BE79DE3F5}" srcId="{A2B19482-F0B5-6F4B-A349-23189F9A4A74}" destId="{71775075-7418-2E4A-944C-9563C9578B15}" srcOrd="0" destOrd="0" parTransId="{B0E55517-C9DB-2646-825E-5A9466E74816}" sibTransId="{A6FCC589-73CB-3E4E-80F1-604E300F92FC}"/>
     <dgm:cxn modelId="{D4B0C608-F0BC-874F-ADC6-B5A0C4458FA0}" type="presOf" srcId="{2C14816F-93DB-394C-AA4D-95C3A19D282C}" destId="{8A661C3E-E668-824D-AFB3-F40492F5DAA8}" srcOrd="0" destOrd="0" presId="urn:microsoft.com/office/officeart/2005/8/layout/hierarchy2"/>
-    <dgm:cxn modelId="{9640297D-1FE0-FA40-9E76-AE15A8FF2D7D}" srcId="{71775075-7418-2E4A-944C-9563C9578B15}" destId="{C7FB1FDA-FFD2-7442-9B03-E3C48F541088}" srcOrd="0" destOrd="0" parTransId="{F5055C99-4090-A446-8B01-FBF14B0BAE6B}" sibTransId="{1CA3037A-81E0-4841-8B2B-754BB499919E}"/>
-    <dgm:cxn modelId="{A2152951-0036-C94C-A01B-311D70A80968}" type="presOf" srcId="{F1817476-2D3E-9547-8F4B-CAAFA848A452}" destId="{201979C6-BA79-4743-B8F0-F7D72E3EC9E8}" srcOrd="0" destOrd="0" presId="urn:microsoft.com/office/officeart/2005/8/layout/hierarchy2"/>
-    <dgm:cxn modelId="{B24BE00C-DBAA-8E45-9114-5C6BFF94E9DE}" srcId="{C7FB1FDA-FFD2-7442-9B03-E3C48F541088}" destId="{F678C734-9529-074D-9739-2181A6F09A05}" srcOrd="1" destOrd="0" parTransId="{EF6F51FC-F721-5745-A8D1-023813ED18AF}" sibTransId="{DAEA124C-FCE2-6A4B-953F-3494B023F151}"/>
-    <dgm:cxn modelId="{02B3EED9-597B-B94F-A130-4E6C83485495}" type="presOf" srcId="{616FA258-A678-CE4B-A5C8-A8B49F8FE7AD}" destId="{FB39C324-68AB-1D43-9036-CFA033856AB4}" srcOrd="1" destOrd="0" presId="urn:microsoft.com/office/officeart/2005/8/layout/hierarchy2"/>
+    <dgm:cxn modelId="{3009B1B4-5EF8-7F46-AEA7-7AC80366F7DA}" type="presOf" srcId="{EDAE4274-B905-BF49-A664-438DA414C17E}" destId="{2F28EB2B-CB25-8A47-82BF-9E3028E5130B}" srcOrd="1" destOrd="0" presId="urn:microsoft.com/office/officeart/2005/8/layout/hierarchy2"/>
+    <dgm:cxn modelId="{ADC157C7-FC26-2F47-A2BC-951D44FB3ED5}" type="presOf" srcId="{616FA258-A678-CE4B-A5C8-A8B49F8FE7AD}" destId="{6FDD1D71-F0A7-4A4A-BD10-BAFACDACC645}" srcOrd="0" destOrd="0" presId="urn:microsoft.com/office/officeart/2005/8/layout/hierarchy2"/>
+    <dgm:cxn modelId="{C2EEA092-D322-0743-A84B-B7378E8F3DE8}" type="presOf" srcId="{F678C734-9529-074D-9739-2181A6F09A05}" destId="{7ED7ABB9-68F6-A142-88A3-33292FA999E6}" srcOrd="0" destOrd="0" presId="urn:microsoft.com/office/officeart/2005/8/layout/hierarchy2"/>
     <dgm:cxn modelId="{C3B3216F-CF71-C045-A846-165AAA6058B8}" type="presOf" srcId="{F5055C99-4090-A446-8B01-FBF14B0BAE6B}" destId="{7289D994-AFDB-EE4C-AC0B-BA8BA64580E2}" srcOrd="1" destOrd="0" presId="urn:microsoft.com/office/officeart/2005/8/layout/hierarchy2"/>
     <dgm:cxn modelId="{9420EAAB-C9CF-6747-8F16-98CF60B18247}" srcId="{C7FB1FDA-FFD2-7442-9B03-E3C48F541088}" destId="{2D333868-B319-FA44-BCF4-A22D5F4D583C}" srcOrd="0" destOrd="0" parTransId="{E117BD7B-CFE2-1F4E-BE18-32C1B8FE346D}" sibTransId="{AF63C685-1C09-8C4E-9797-1B42A80F707B}"/>
+    <dgm:cxn modelId="{F061D97C-43D2-2F41-910B-009C45455BD8}" type="presOf" srcId="{606AD9AA-BF9A-5446-B7CD-AD40DF3BC8C1}" destId="{DB6B916A-6E6E-1246-BDBE-85871447EBF5}" srcOrd="1" destOrd="0" presId="urn:microsoft.com/office/officeart/2005/8/layout/hierarchy2"/>
+    <dgm:cxn modelId="{9640297D-1FE0-FA40-9E76-AE15A8FF2D7D}" srcId="{71775075-7418-2E4A-944C-9563C9578B15}" destId="{C7FB1FDA-FFD2-7442-9B03-E3C48F541088}" srcOrd="0" destOrd="0" parTransId="{F5055C99-4090-A446-8B01-FBF14B0BAE6B}" sibTransId="{1CA3037A-81E0-4841-8B2B-754BB499919E}"/>
+    <dgm:cxn modelId="{3533DC7F-79A6-9D44-9F6F-4F5487C579BD}" type="presOf" srcId="{F5055C99-4090-A446-8B01-FBF14B0BAE6B}" destId="{7557F600-1225-AC4F-B501-9D806D4A540E}" srcOrd="0" destOrd="0" presId="urn:microsoft.com/office/officeart/2005/8/layout/hierarchy2"/>
+    <dgm:cxn modelId="{D79405BD-B6E6-7C45-8423-24FAFC4A055B}" srcId="{F678C734-9529-074D-9739-2181A6F09A05}" destId="{2C14816F-93DB-394C-AA4D-95C3A19D282C}" srcOrd="0" destOrd="0" parTransId="{616FA258-A678-CE4B-A5C8-A8B49F8FE7AD}" sibTransId="{70655345-71E8-F34E-BBFA-77AF34D570D4}"/>
+    <dgm:cxn modelId="{34F261A9-907B-744A-9308-7692BE919A27}" srcId="{2D333868-B319-FA44-BCF4-A22D5F4D583C}" destId="{4E92B94B-0B51-1741-94DA-712EE7DDD084}" srcOrd="2" destOrd="0" parTransId="{606AD9AA-BF9A-5446-B7CD-AD40DF3BC8C1}" sibTransId="{73925D01-B829-F149-B34B-96CDD6CBC290}"/>
+    <dgm:cxn modelId="{4F7BE029-A434-8045-9EBC-89B5F30ABBDC}" type="presOf" srcId="{E117BD7B-CFE2-1F4E-BE18-32C1B8FE346D}" destId="{CA00C11B-37C3-F24C-BE04-79BD1E1C017D}" srcOrd="1" destOrd="0" presId="urn:microsoft.com/office/officeart/2005/8/layout/hierarchy2"/>
+    <dgm:cxn modelId="{02B3EED9-597B-B94F-A130-4E6C83485495}" type="presOf" srcId="{616FA258-A678-CE4B-A5C8-A8B49F8FE7AD}" destId="{FB39C324-68AB-1D43-9036-CFA033856AB4}" srcOrd="1" destOrd="0" presId="urn:microsoft.com/office/officeart/2005/8/layout/hierarchy2"/>
+    <dgm:cxn modelId="{CDC0B18E-3755-6649-B903-96A494235D68}" type="presOf" srcId="{D5709020-A1D8-544E-932C-20E173860DD6}" destId="{8C581872-405F-6F47-BD8E-3BE38281F1BF}" srcOrd="1" destOrd="0" presId="urn:microsoft.com/office/officeart/2005/8/layout/hierarchy2"/>
+    <dgm:cxn modelId="{E73CD712-3C9C-FE49-92BE-7E3976AB6DD3}" type="presOf" srcId="{E117BD7B-CFE2-1F4E-BE18-32C1B8FE346D}" destId="{C1916421-B12F-8542-A511-A01C3DD13ECC}" srcOrd="0" destOrd="0" presId="urn:microsoft.com/office/officeart/2005/8/layout/hierarchy2"/>
+    <dgm:cxn modelId="{A2152951-0036-C94C-A01B-311D70A80968}" type="presOf" srcId="{F1817476-2D3E-9547-8F4B-CAAFA848A452}" destId="{201979C6-BA79-4743-B8F0-F7D72E3EC9E8}" srcOrd="0" destOrd="0" presId="urn:microsoft.com/office/officeart/2005/8/layout/hierarchy2"/>
+    <dgm:cxn modelId="{C9EC1507-FCA9-8648-9E18-F695A5586442}" type="presOf" srcId="{EDAE4274-B905-BF49-A664-438DA414C17E}" destId="{BDDBB520-461F-F149-8A1C-618D079A9554}" srcOrd="0" destOrd="0" presId="urn:microsoft.com/office/officeart/2005/8/layout/hierarchy2"/>
+    <dgm:cxn modelId="{CE1D3A1A-43EF-4A45-A282-F565FB5C433D}" type="presOf" srcId="{E5DDE7F3-491F-2948-B622-F058BEB7E459}" destId="{9FBBC3FA-E189-DE4B-B1EF-E3BD4BD04670}" srcOrd="0" destOrd="0" presId="urn:microsoft.com/office/officeart/2005/8/layout/hierarchy2"/>
+    <dgm:cxn modelId="{19B87DC6-D28F-0749-8515-FC37932E14D2}" type="presOf" srcId="{2D333868-B319-FA44-BCF4-A22D5F4D583C}" destId="{C594038F-6E4D-C447-87C5-7D0FAEA2704B}" srcOrd="0" destOrd="0" presId="urn:microsoft.com/office/officeart/2005/8/layout/hierarchy2"/>
+    <dgm:cxn modelId="{B24BE00C-DBAA-8E45-9114-5C6BFF94E9DE}" srcId="{C7FB1FDA-FFD2-7442-9B03-E3C48F541088}" destId="{F678C734-9529-074D-9739-2181A6F09A05}" srcOrd="1" destOrd="0" parTransId="{EF6F51FC-F721-5745-A8D1-023813ED18AF}" sibTransId="{DAEA124C-FCE2-6A4B-953F-3494B023F151}"/>
+    <dgm:cxn modelId="{BD196945-C196-9247-A0F9-1E83EA394E98}" type="presOf" srcId="{A2B19482-F0B5-6F4B-A349-23189F9A4A74}" destId="{D26C4686-39D5-4D48-A1DA-37C5FDAC39B7}" srcOrd="0" destOrd="0" presId="urn:microsoft.com/office/officeart/2005/8/layout/hierarchy2"/>
     <dgm:cxn modelId="{AC929351-899B-9D42-970C-699386D39192}" type="presOf" srcId="{606AD9AA-BF9A-5446-B7CD-AD40DF3BC8C1}" destId="{159AB614-218A-2D49-91A6-1EF4FA1A1566}" srcOrd="0" destOrd="0" presId="urn:microsoft.com/office/officeart/2005/8/layout/hierarchy2"/>
-    <dgm:cxn modelId="{C2EEA092-D322-0743-A84B-B7378E8F3DE8}" type="presOf" srcId="{F678C734-9529-074D-9739-2181A6F09A05}" destId="{7ED7ABB9-68F6-A142-88A3-33292FA999E6}" srcOrd="0" destOrd="0" presId="urn:microsoft.com/office/officeart/2005/8/layout/hierarchy2"/>
-    <dgm:cxn modelId="{3533DC7F-79A6-9D44-9F6F-4F5487C579BD}" type="presOf" srcId="{F5055C99-4090-A446-8B01-FBF14B0BAE6B}" destId="{7557F600-1225-AC4F-B501-9D806D4A540E}" srcOrd="0" destOrd="0" presId="urn:microsoft.com/office/officeart/2005/8/layout/hierarchy2"/>
-    <dgm:cxn modelId="{A5152369-D0FE-4F48-A652-5411E2BF778F}" type="presOf" srcId="{C7FB1FDA-FFD2-7442-9B03-E3C48F541088}" destId="{4BBA190D-2886-E645-B638-56D9A5EEAE63}" srcOrd="0" destOrd="0" presId="urn:microsoft.com/office/officeart/2005/8/layout/hierarchy2"/>
-    <dgm:cxn modelId="{94539A8B-54ED-F146-8FE4-8F279F8A258D}" srcId="{2D333868-B319-FA44-BCF4-A22D5F4D583C}" destId="{293F40DD-D408-384B-B541-ECC077055930}" srcOrd="1" destOrd="0" parTransId="{EDAE4274-B905-BF49-A664-438DA414C17E}" sibTransId="{20506090-289D-FB48-B50E-754E111C685B}"/>
-    <dgm:cxn modelId="{C9EC1507-FCA9-8648-9E18-F695A5586442}" type="presOf" srcId="{EDAE4274-B905-BF49-A664-438DA414C17E}" destId="{BDDBB520-461F-F149-8A1C-618D079A9554}" srcOrd="0" destOrd="0" presId="urn:microsoft.com/office/officeart/2005/8/layout/hierarchy2"/>
     <dgm:cxn modelId="{56615ACB-735E-FA49-A69C-CB1D0D4CDF3C}" srcId="{2D333868-B319-FA44-BCF4-A22D5F4D583C}" destId="{D34ABA54-8E9D-B543-B5FD-657C7B8613E2}" srcOrd="0" destOrd="0" parTransId="{F1817476-2D3E-9547-8F4B-CAAFA848A452}" sibTransId="{02E6E2BC-A5C1-704B-9C45-32B0AB73A64B}"/>
-    <dgm:cxn modelId="{3009B1B4-5EF8-7F46-AEA7-7AC80366F7DA}" type="presOf" srcId="{EDAE4274-B905-BF49-A664-438DA414C17E}" destId="{2F28EB2B-CB25-8A47-82BF-9E3028E5130B}" srcOrd="1" destOrd="0" presId="urn:microsoft.com/office/officeart/2005/8/layout/hierarchy2"/>
-    <dgm:cxn modelId="{A2B22314-A2E2-5D4E-A241-5E906DFDF600}" type="presOf" srcId="{71775075-7418-2E4A-944C-9563C9578B15}" destId="{51AC3011-EC30-CC4A-A487-C5612F186AED}" srcOrd="0" destOrd="0" presId="urn:microsoft.com/office/officeart/2005/8/layout/hierarchy2"/>
-    <dgm:cxn modelId="{F061D97C-43D2-2F41-910B-009C45455BD8}" type="presOf" srcId="{606AD9AA-BF9A-5446-B7CD-AD40DF3BC8C1}" destId="{DB6B916A-6E6E-1246-BDBE-85871447EBF5}" srcOrd="1" destOrd="0" presId="urn:microsoft.com/office/officeart/2005/8/layout/hierarchy2"/>
-    <dgm:cxn modelId="{ED770868-7632-CC42-A3F0-4D05DC386964}" type="presOf" srcId="{F1817476-2D3E-9547-8F4B-CAAFA848A452}" destId="{23EF812F-7F67-E44E-98B4-5B8C050D8293}" srcOrd="1" destOrd="0" presId="urn:microsoft.com/office/officeart/2005/8/layout/hierarchy2"/>
-    <dgm:cxn modelId="{4F7BE029-A434-8045-9EBC-89B5F30ABBDC}" type="presOf" srcId="{E117BD7B-CFE2-1F4E-BE18-32C1B8FE346D}" destId="{CA00C11B-37C3-F24C-BE04-79BD1E1C017D}" srcOrd="1" destOrd="0" presId="urn:microsoft.com/office/officeart/2005/8/layout/hierarchy2"/>
+    <dgm:cxn modelId="{6BCBBB7F-DF26-564A-BFFE-7D651414456F}" type="presOf" srcId="{EF6F51FC-F721-5745-A8D1-023813ED18AF}" destId="{C332EEED-214D-824E-8252-C3718C7A5077}" srcOrd="1" destOrd="0" presId="urn:microsoft.com/office/officeart/2005/8/layout/hierarchy2"/>
     <dgm:cxn modelId="{35F38CC1-3894-0544-9B2D-A524FCE58999}" type="presOf" srcId="{4E92B94B-0B51-1741-94DA-712EE7DDD084}" destId="{20BAB645-C550-F944-89DD-315E85967EAE}" srcOrd="0" destOrd="0" presId="urn:microsoft.com/office/officeart/2005/8/layout/hierarchy2"/>
-    <dgm:cxn modelId="{29BACC8A-5C71-6941-B43A-BD9BE79DE3F5}" srcId="{A2B19482-F0B5-6F4B-A349-23189F9A4A74}" destId="{71775075-7418-2E4A-944C-9563C9578B15}" srcOrd="0" destOrd="0" parTransId="{B0E55517-C9DB-2646-825E-5A9466E74816}" sibTransId="{A6FCC589-73CB-3E4E-80F1-604E300F92FC}"/>
-    <dgm:cxn modelId="{34F261A9-907B-744A-9308-7692BE919A27}" srcId="{2D333868-B319-FA44-BCF4-A22D5F4D583C}" destId="{4E92B94B-0B51-1741-94DA-712EE7DDD084}" srcOrd="2" destOrd="0" parTransId="{606AD9AA-BF9A-5446-B7CD-AD40DF3BC8C1}" sibTransId="{73925D01-B829-F149-B34B-96CDD6CBC290}"/>
-    <dgm:cxn modelId="{AA3CEA3C-CD09-2E44-9076-14D293A3F3B6}" type="presOf" srcId="{293F40DD-D408-384B-B541-ECC077055930}" destId="{C46D46E9-E5C6-4247-9D2C-A18B439B48A1}" srcOrd="0" destOrd="0" presId="urn:microsoft.com/office/officeart/2005/8/layout/hierarchy2"/>
-    <dgm:cxn modelId="{0A6992C1-84BF-384D-8993-0D5A4234E962}" type="presOf" srcId="{D34ABA54-8E9D-B543-B5FD-657C7B8613E2}" destId="{33431CAC-6E85-9747-BF13-88FE589C1972}" srcOrd="0" destOrd="0" presId="urn:microsoft.com/office/officeart/2005/8/layout/hierarchy2"/>
-    <dgm:cxn modelId="{D79405BD-B6E6-7C45-8423-24FAFC4A055B}" srcId="{F678C734-9529-074D-9739-2181A6F09A05}" destId="{2C14816F-93DB-394C-AA4D-95C3A19D282C}" srcOrd="0" destOrd="0" parTransId="{616FA258-A678-CE4B-A5C8-A8B49F8FE7AD}" sibTransId="{70655345-71E8-F34E-BBFA-77AF34D570D4}"/>
-    <dgm:cxn modelId="{5856589A-0F2D-DF4B-81CC-EA8D2158C983}" srcId="{F678C734-9529-074D-9739-2181A6F09A05}" destId="{E5DDE7F3-491F-2948-B622-F058BEB7E459}" srcOrd="1" destOrd="0" parTransId="{D5709020-A1D8-544E-932C-20E173860DD6}" sibTransId="{0A8455A7-1ED0-5541-ACB0-55DC0F8FB3D3}"/>
-    <dgm:cxn modelId="{B28B733B-7FB0-E640-A853-96EFACC10418}" type="presOf" srcId="{EF6F51FC-F721-5745-A8D1-023813ED18AF}" destId="{DB0E2691-0EF0-1640-B06F-2386DCF1E6A3}" srcOrd="0" destOrd="0" presId="urn:microsoft.com/office/officeart/2005/8/layout/hierarchy2"/>
-    <dgm:cxn modelId="{CDC0B18E-3755-6649-B903-96A494235D68}" type="presOf" srcId="{D5709020-A1D8-544E-932C-20E173860DD6}" destId="{8C581872-405F-6F47-BD8E-3BE38281F1BF}" srcOrd="1" destOrd="0" presId="urn:microsoft.com/office/officeart/2005/8/layout/hierarchy2"/>
-    <dgm:cxn modelId="{BD196945-C196-9247-A0F9-1E83EA394E98}" type="presOf" srcId="{A2B19482-F0B5-6F4B-A349-23189F9A4A74}" destId="{D26C4686-39D5-4D48-A1DA-37C5FDAC39B7}" srcOrd="0" destOrd="0" presId="urn:microsoft.com/office/officeart/2005/8/layout/hierarchy2"/>
-    <dgm:cxn modelId="{19B87DC6-D28F-0749-8515-FC37932E14D2}" type="presOf" srcId="{2D333868-B319-FA44-BCF4-A22D5F4D583C}" destId="{C594038F-6E4D-C447-87C5-7D0FAEA2704B}" srcOrd="0" destOrd="0" presId="urn:microsoft.com/office/officeart/2005/8/layout/hierarchy2"/>
-    <dgm:cxn modelId="{ADC157C7-FC26-2F47-A2BC-951D44FB3ED5}" type="presOf" srcId="{616FA258-A678-CE4B-A5C8-A8B49F8FE7AD}" destId="{6FDD1D71-F0A7-4A4A-BD10-BAFACDACC645}" srcOrd="0" destOrd="0" presId="urn:microsoft.com/office/officeart/2005/8/layout/hierarchy2"/>
-    <dgm:cxn modelId="{E73CD712-3C9C-FE49-92BE-7E3976AB6DD3}" type="presOf" srcId="{E117BD7B-CFE2-1F4E-BE18-32C1B8FE346D}" destId="{C1916421-B12F-8542-A511-A01C3DD13ECC}" srcOrd="0" destOrd="0" presId="urn:microsoft.com/office/officeart/2005/8/layout/hierarchy2"/>
     <dgm:cxn modelId="{D117EFBE-C7DA-204C-98B2-84F151CDA2DD}" type="presParOf" srcId="{D26C4686-39D5-4D48-A1DA-37C5FDAC39B7}" destId="{61D01C7B-41B9-3E4B-BE52-7551DFC4A7D1}" srcOrd="0" destOrd="0" presId="urn:microsoft.com/office/officeart/2005/8/layout/hierarchy2"/>
     <dgm:cxn modelId="{745F4C62-D6F1-624D-81BE-8436C053EDC8}" type="presParOf" srcId="{61D01C7B-41B9-3E4B-BE52-7551DFC4A7D1}" destId="{51AC3011-EC30-CC4A-A487-C5612F186AED}" srcOrd="0" destOrd="0" presId="urn:microsoft.com/office/officeart/2005/8/layout/hierarchy2"/>
     <dgm:cxn modelId="{32963B6F-4C2A-1140-B3C8-9DC6F9EB7167}" type="presParOf" srcId="{61D01C7B-41B9-3E4B-BE52-7551DFC4A7D1}" destId="{3521BBEB-BF2E-FA40-84BF-800540394443}" srcOrd="1" destOrd="0" presId="urn:microsoft.com/office/officeart/2005/8/layout/hierarchy2"/>
@@ -11633,114 +12103,6 @@
         </dgm:presLayoutVars>
       </dgm:prSet>
       <dgm:spPr/>
-    </dgm:pt>
-    <dgm:pt modelId="{61D01C7B-41B9-3E4B-BE52-7551DFC4A7D1}" type="pres">
-      <dgm:prSet presAssocID="{71775075-7418-2E4A-944C-9563C9578B15}" presName="root1" presStyleCnt="0"/>
-      <dgm:spPr/>
-    </dgm:pt>
-    <dgm:pt modelId="{51AC3011-EC30-CC4A-A487-C5612F186AED}" type="pres">
-      <dgm:prSet presAssocID="{71775075-7418-2E4A-944C-9563C9578B15}" presName="LevelOneTextNode" presStyleLbl="node0" presStyleIdx="0" presStyleCnt="1">
-        <dgm:presLayoutVars>
-          <dgm:chPref val="3"/>
-        </dgm:presLayoutVars>
-      </dgm:prSet>
-      <dgm:spPr/>
-    </dgm:pt>
-    <dgm:pt modelId="{3521BBEB-BF2E-FA40-84BF-800540394443}" type="pres">
-      <dgm:prSet presAssocID="{71775075-7418-2E4A-944C-9563C9578B15}" presName="level2hierChild" presStyleCnt="0"/>
-      <dgm:spPr/>
-    </dgm:pt>
-    <dgm:pt modelId="{DB1123F5-0633-5341-8285-1DCA5C08A4C5}" type="pres">
-      <dgm:prSet presAssocID="{5B8CCC55-4582-FA4E-B858-16CB397E8E07}" presName="conn2-1" presStyleLbl="parChTrans1D2" presStyleIdx="0" presStyleCnt="1"/>
-      <dgm:spPr/>
-    </dgm:pt>
-    <dgm:pt modelId="{AB1AF23E-CC7A-3D44-A37A-CB3F22D4AB0D}" type="pres">
-      <dgm:prSet presAssocID="{5B8CCC55-4582-FA4E-B858-16CB397E8E07}" presName="connTx" presStyleLbl="parChTrans1D2" presStyleIdx="0" presStyleCnt="1"/>
-      <dgm:spPr/>
-    </dgm:pt>
-    <dgm:pt modelId="{F42910E4-C917-B545-B774-E13F477BC28A}" type="pres">
-      <dgm:prSet presAssocID="{C4FACB6A-DD2F-2B42-9397-4DAEAC83E3D0}" presName="root2" presStyleCnt="0"/>
-      <dgm:spPr/>
-    </dgm:pt>
-    <dgm:pt modelId="{F2A7AD12-29FA-F848-B484-E1649BFF6A3B}" type="pres">
-      <dgm:prSet presAssocID="{C4FACB6A-DD2F-2B42-9397-4DAEAC83E3D0}" presName="LevelTwoTextNode" presStyleLbl="node2" presStyleIdx="0" presStyleCnt="1">
-        <dgm:presLayoutVars>
-          <dgm:chPref val="3"/>
-        </dgm:presLayoutVars>
-      </dgm:prSet>
-      <dgm:spPr/>
-    </dgm:pt>
-    <dgm:pt modelId="{F91AE5CF-26B4-F647-AD49-CF18B5100A4E}" type="pres">
-      <dgm:prSet presAssocID="{C4FACB6A-DD2F-2B42-9397-4DAEAC83E3D0}" presName="level3hierChild" presStyleCnt="0"/>
-      <dgm:spPr/>
-    </dgm:pt>
-    <dgm:pt modelId="{A27AC082-2290-924F-8AD5-5560CB78C5CB}" type="pres">
-      <dgm:prSet presAssocID="{C99A4B5B-65AC-684C-9797-B2F6FABDFAA4}" presName="conn2-1" presStyleLbl="parChTrans1D3" presStyleIdx="0" presStyleCnt="4"/>
-      <dgm:spPr/>
-    </dgm:pt>
-    <dgm:pt modelId="{C2B0B986-D3F0-BB49-AAF8-66AD4B17C348}" type="pres">
-      <dgm:prSet presAssocID="{C99A4B5B-65AC-684C-9797-B2F6FABDFAA4}" presName="connTx" presStyleLbl="parChTrans1D3" presStyleIdx="0" presStyleCnt="4"/>
-      <dgm:spPr/>
-    </dgm:pt>
-    <dgm:pt modelId="{5196BC22-05E9-9346-8080-0041024415EB}" type="pres">
-      <dgm:prSet presAssocID="{F0EDC55B-8135-6E41-A0AF-866F4CDC7343}" presName="root2" presStyleCnt="0"/>
-      <dgm:spPr/>
-    </dgm:pt>
-    <dgm:pt modelId="{EA7D64D3-CF64-DF44-ADE5-BB488B29C18F}" type="pres">
-      <dgm:prSet presAssocID="{F0EDC55B-8135-6E41-A0AF-866F4CDC7343}" presName="LevelTwoTextNode" presStyleLbl="node3" presStyleIdx="0" presStyleCnt="4">
-        <dgm:presLayoutVars>
-          <dgm:chPref val="3"/>
-        </dgm:presLayoutVars>
-      </dgm:prSet>
-      <dgm:spPr/>
-    </dgm:pt>
-    <dgm:pt modelId="{8D808D56-9828-7C4D-89F0-EA255E0F11D5}" type="pres">
-      <dgm:prSet presAssocID="{F0EDC55B-8135-6E41-A0AF-866F4CDC7343}" presName="level3hierChild" presStyleCnt="0"/>
-      <dgm:spPr/>
-    </dgm:pt>
-    <dgm:pt modelId="{1D556638-DF8A-8446-9A78-A9A5F9F41EB7}" type="pres">
-      <dgm:prSet presAssocID="{129A4872-49F9-3D45-B8DC-3A9485DE5F68}" presName="conn2-1" presStyleLbl="parChTrans1D3" presStyleIdx="1" presStyleCnt="4"/>
-      <dgm:spPr/>
-    </dgm:pt>
-    <dgm:pt modelId="{9E613B85-72D7-764E-B520-077D4556C2DE}" type="pres">
-      <dgm:prSet presAssocID="{129A4872-49F9-3D45-B8DC-3A9485DE5F68}" presName="connTx" presStyleLbl="parChTrans1D3" presStyleIdx="1" presStyleCnt="4"/>
-      <dgm:spPr/>
-    </dgm:pt>
-    <dgm:pt modelId="{F4064470-CE43-6B49-9BA3-2AB354CE8553}" type="pres">
-      <dgm:prSet presAssocID="{C906AAE0-B246-E44D-BCDC-D32FEC259052}" presName="root2" presStyleCnt="0"/>
-      <dgm:spPr/>
-    </dgm:pt>
-    <dgm:pt modelId="{F3F3EFFE-C968-B34A-AA75-9E428D35E116}" type="pres">
-      <dgm:prSet presAssocID="{C906AAE0-B246-E44D-BCDC-D32FEC259052}" presName="LevelTwoTextNode" presStyleLbl="node3" presStyleIdx="1" presStyleCnt="4">
-        <dgm:presLayoutVars>
-          <dgm:chPref val="3"/>
-        </dgm:presLayoutVars>
-      </dgm:prSet>
-      <dgm:spPr/>
-    </dgm:pt>
-    <dgm:pt modelId="{8C1257F3-1DF4-8A49-8447-75D1B8F3A03C}" type="pres">
-      <dgm:prSet presAssocID="{C906AAE0-B246-E44D-BCDC-D32FEC259052}" presName="level3hierChild" presStyleCnt="0"/>
-      <dgm:spPr/>
-    </dgm:pt>
-    <dgm:pt modelId="{A1619664-98D2-0146-8964-FF1B6E70FC60}" type="pres">
-      <dgm:prSet presAssocID="{CEBA6B2A-B125-5544-8596-FAC5F6E4A94B}" presName="conn2-1" presStyleLbl="parChTrans1D4" presStyleIdx="0" presStyleCnt="3"/>
-      <dgm:spPr/>
-    </dgm:pt>
-    <dgm:pt modelId="{21FA1E0B-C530-DE47-B318-AA01426BFAE1}" type="pres">
-      <dgm:prSet presAssocID="{CEBA6B2A-B125-5544-8596-FAC5F6E4A94B}" presName="connTx" presStyleLbl="parChTrans1D4" presStyleIdx="0" presStyleCnt="3"/>
-      <dgm:spPr/>
-    </dgm:pt>
-    <dgm:pt modelId="{1C270A1A-7A4A-E74F-996C-163DFC402E99}" type="pres">
-      <dgm:prSet presAssocID="{488D7A7A-AD6E-EA43-B237-CF8F3FC7E554}" presName="root2" presStyleCnt="0"/>
-      <dgm:spPr/>
-    </dgm:pt>
-    <dgm:pt modelId="{03DE0F1B-7208-6244-A1BB-293B383797A8}" type="pres">
-      <dgm:prSet presAssocID="{488D7A7A-AD6E-EA43-B237-CF8F3FC7E554}" presName="LevelTwoTextNode" presStyleLbl="node4" presStyleIdx="0" presStyleCnt="3">
-        <dgm:presLayoutVars>
-          <dgm:chPref val="3"/>
-        </dgm:presLayoutVars>
-      </dgm:prSet>
-      <dgm:spPr/>
       <dgm:t>
         <a:bodyPr/>
         <a:lstStyle/>
@@ -11749,24 +12111,12 @@
         </a:p>
       </dgm:t>
     </dgm:pt>
-    <dgm:pt modelId="{C9F5FF86-0E4B-E345-BD73-6B237302FD74}" type="pres">
-      <dgm:prSet presAssocID="{488D7A7A-AD6E-EA43-B237-CF8F3FC7E554}" presName="level3hierChild" presStyleCnt="0"/>
-      <dgm:spPr/>
-    </dgm:pt>
-    <dgm:pt modelId="{C5DB0FC2-EC7A-5943-8AC4-3E4A0F685FB8}" type="pres">
-      <dgm:prSet presAssocID="{641D74A8-1E5A-A847-BE79-BB232C056B43}" presName="conn2-1" presStyleLbl="parChTrans1D4" presStyleIdx="1" presStyleCnt="3"/>
-      <dgm:spPr/>
-    </dgm:pt>
-    <dgm:pt modelId="{6B3E5AF6-7561-284B-9AD2-485222746820}" type="pres">
-      <dgm:prSet presAssocID="{641D74A8-1E5A-A847-BE79-BB232C056B43}" presName="connTx" presStyleLbl="parChTrans1D4" presStyleIdx="1" presStyleCnt="3"/>
-      <dgm:spPr/>
-    </dgm:pt>
-    <dgm:pt modelId="{EABB0823-F0AD-BE42-B073-45E5ED79FC24}" type="pres">
-      <dgm:prSet presAssocID="{06A1D4F8-ADCA-4147-9026-358412654B86}" presName="root2" presStyleCnt="0"/>
-      <dgm:spPr/>
-    </dgm:pt>
-    <dgm:pt modelId="{35A5F22A-8A90-0648-8998-9532535866A8}" type="pres">
-      <dgm:prSet presAssocID="{06A1D4F8-ADCA-4147-9026-358412654B86}" presName="LevelTwoTextNode" presStyleLbl="node4" presStyleIdx="1" presStyleCnt="3">
+    <dgm:pt modelId="{61D01C7B-41B9-3E4B-BE52-7551DFC4A7D1}" type="pres">
+      <dgm:prSet presAssocID="{71775075-7418-2E4A-944C-9563C9578B15}" presName="root1" presStyleCnt="0"/>
+      <dgm:spPr/>
+    </dgm:pt>
+    <dgm:pt modelId="{51AC3011-EC30-CC4A-A487-C5612F186AED}" type="pres">
+      <dgm:prSet presAssocID="{71775075-7418-2E4A-944C-9563C9578B15}" presName="LevelOneTextNode" presStyleLbl="node0" presStyleIdx="0" presStyleCnt="1">
         <dgm:presLayoutVars>
           <dgm:chPref val="3"/>
         </dgm:presLayoutVars>
@@ -11780,28 +12130,12 @@
         </a:p>
       </dgm:t>
     </dgm:pt>
-    <dgm:pt modelId="{A2FA997C-70FB-2C46-8A0C-82E3D61EA600}" type="pres">
-      <dgm:prSet presAssocID="{06A1D4F8-ADCA-4147-9026-358412654B86}" presName="level3hierChild" presStyleCnt="0"/>
-      <dgm:spPr/>
-    </dgm:pt>
-    <dgm:pt modelId="{CAD09599-4394-EA47-91E0-9E3F0CBD38E7}" type="pres">
-      <dgm:prSet presAssocID="{1DF49C4A-895B-9440-B546-4DEB07A6CB98}" presName="conn2-1" presStyleLbl="parChTrans1D4" presStyleIdx="2" presStyleCnt="3"/>
-      <dgm:spPr/>
-    </dgm:pt>
-    <dgm:pt modelId="{8EC2110B-CDB9-1D4C-B6F2-7F036C3499B7}" type="pres">
-      <dgm:prSet presAssocID="{1DF49C4A-895B-9440-B546-4DEB07A6CB98}" presName="connTx" presStyleLbl="parChTrans1D4" presStyleIdx="2" presStyleCnt="3"/>
-      <dgm:spPr/>
-    </dgm:pt>
-    <dgm:pt modelId="{302FD59D-36CD-9A4B-B8B8-6A480A1DBD44}" type="pres">
-      <dgm:prSet presAssocID="{8E47DB61-F6AD-A146-8E59-1EC8663AEF2D}" presName="root2" presStyleCnt="0"/>
-      <dgm:spPr/>
-    </dgm:pt>
-    <dgm:pt modelId="{AF148FD6-3B15-4645-BD6D-D0AF2CC249D9}" type="pres">
-      <dgm:prSet presAssocID="{8E47DB61-F6AD-A146-8E59-1EC8663AEF2D}" presName="LevelTwoTextNode" presStyleLbl="node4" presStyleIdx="2" presStyleCnt="3">
-        <dgm:presLayoutVars>
-          <dgm:chPref val="3"/>
-        </dgm:presLayoutVars>
-      </dgm:prSet>
+    <dgm:pt modelId="{3521BBEB-BF2E-FA40-84BF-800540394443}" type="pres">
+      <dgm:prSet presAssocID="{71775075-7418-2E4A-944C-9563C9578B15}" presName="level2hierChild" presStyleCnt="0"/>
+      <dgm:spPr/>
+    </dgm:pt>
+    <dgm:pt modelId="{DB1123F5-0633-5341-8285-1DCA5C08A4C5}" type="pres">
+      <dgm:prSet presAssocID="{5B8CCC55-4582-FA4E-B858-16CB397E8E07}" presName="conn2-1" presStyleLbl="parChTrans1D2" presStyleIdx="0" presStyleCnt="1"/>
       <dgm:spPr/>
       <dgm:t>
         <a:bodyPr/>
@@ -11811,28 +12145,8 @@
         </a:p>
       </dgm:t>
     </dgm:pt>
-    <dgm:pt modelId="{D340BAF2-09B9-C34C-ACC6-766EA78E108B}" type="pres">
-      <dgm:prSet presAssocID="{8E47DB61-F6AD-A146-8E59-1EC8663AEF2D}" presName="level3hierChild" presStyleCnt="0"/>
-      <dgm:spPr/>
-    </dgm:pt>
-    <dgm:pt modelId="{C61318A7-26AE-D745-B05C-1CFE6BD609AF}" type="pres">
-      <dgm:prSet presAssocID="{5944D133-2D5F-0541-9A58-C763564E449E}" presName="conn2-1" presStyleLbl="parChTrans1D3" presStyleIdx="2" presStyleCnt="4"/>
-      <dgm:spPr/>
-    </dgm:pt>
-    <dgm:pt modelId="{515B84FF-7B9B-3644-AB88-AA10C3A95D18}" type="pres">
-      <dgm:prSet presAssocID="{5944D133-2D5F-0541-9A58-C763564E449E}" presName="connTx" presStyleLbl="parChTrans1D3" presStyleIdx="2" presStyleCnt="4"/>
-      <dgm:spPr/>
-    </dgm:pt>
-    <dgm:pt modelId="{D409523A-B60D-3E45-87C1-0F3AEE2BC8F0}" type="pres">
-      <dgm:prSet presAssocID="{60C2B48D-7B20-CE45-B4EE-D18E5D01624D}" presName="root2" presStyleCnt="0"/>
-      <dgm:spPr/>
-    </dgm:pt>
-    <dgm:pt modelId="{E5BB419C-F137-554B-BC55-6923233BF6E4}" type="pres">
-      <dgm:prSet presAssocID="{60C2B48D-7B20-CE45-B4EE-D18E5D01624D}" presName="LevelTwoTextNode" presStyleLbl="node3" presStyleIdx="2" presStyleCnt="4">
-        <dgm:presLayoutVars>
-          <dgm:chPref val="3"/>
-        </dgm:presLayoutVars>
-      </dgm:prSet>
+    <dgm:pt modelId="{AB1AF23E-CC7A-3D44-A37A-CB3F22D4AB0D}" type="pres">
+      <dgm:prSet presAssocID="{5B8CCC55-4582-FA4E-B858-16CB397E8E07}" presName="connTx" presStyleLbl="parChTrans1D2" presStyleIdx="0" presStyleCnt="1"/>
       <dgm:spPr/>
       <dgm:t>
         <a:bodyPr/>
@@ -11842,24 +12156,12 @@
         </a:p>
       </dgm:t>
     </dgm:pt>
-    <dgm:pt modelId="{3F817595-AD80-4947-86AC-C46FE117F8D8}" type="pres">
-      <dgm:prSet presAssocID="{60C2B48D-7B20-CE45-B4EE-D18E5D01624D}" presName="level3hierChild" presStyleCnt="0"/>
-      <dgm:spPr/>
-    </dgm:pt>
-    <dgm:pt modelId="{2DBD4531-593D-D54F-962C-296B0F4F8BB8}" type="pres">
-      <dgm:prSet presAssocID="{826D4DB2-75B9-1046-9988-E7D2EE396017}" presName="conn2-1" presStyleLbl="parChTrans1D3" presStyleIdx="3" presStyleCnt="4"/>
-      <dgm:spPr/>
-    </dgm:pt>
-    <dgm:pt modelId="{163771FC-6A8C-AE4F-A3A3-1D4AA59E6246}" type="pres">
-      <dgm:prSet presAssocID="{826D4DB2-75B9-1046-9988-E7D2EE396017}" presName="connTx" presStyleLbl="parChTrans1D3" presStyleIdx="3" presStyleCnt="4"/>
-      <dgm:spPr/>
-    </dgm:pt>
-    <dgm:pt modelId="{A6BF4C42-5716-694D-8A0D-C29E75FA29C0}" type="pres">
-      <dgm:prSet presAssocID="{5DF8C541-2AFD-7445-811F-4ACE8B44C3F8}" presName="root2" presStyleCnt="0"/>
-      <dgm:spPr/>
-    </dgm:pt>
-    <dgm:pt modelId="{9F4A18E8-440A-B943-AC72-A116447E2246}" type="pres">
-      <dgm:prSet presAssocID="{5DF8C541-2AFD-7445-811F-4ACE8B44C3F8}" presName="LevelTwoTextNode" presStyleLbl="node3" presStyleIdx="3" presStyleCnt="4">
+    <dgm:pt modelId="{F42910E4-C917-B545-B774-E13F477BC28A}" type="pres">
+      <dgm:prSet presAssocID="{C4FACB6A-DD2F-2B42-9397-4DAEAC83E3D0}" presName="root2" presStyleCnt="0"/>
+      <dgm:spPr/>
+    </dgm:pt>
+    <dgm:pt modelId="{F2A7AD12-29FA-F848-B484-E1649BFF6A3B}" type="pres">
+      <dgm:prSet presAssocID="{C4FACB6A-DD2F-2B42-9397-4DAEAC83E3D0}" presName="LevelTwoTextNode" presStyleLbl="node2" presStyleIdx="0" presStyleCnt="1">
         <dgm:presLayoutVars>
           <dgm:chPref val="3"/>
         </dgm:presLayoutVars>
@@ -11873,47 +12175,362 @@
         </a:p>
       </dgm:t>
     </dgm:pt>
+    <dgm:pt modelId="{F91AE5CF-26B4-F647-AD49-CF18B5100A4E}" type="pres">
+      <dgm:prSet presAssocID="{C4FACB6A-DD2F-2B42-9397-4DAEAC83E3D0}" presName="level3hierChild" presStyleCnt="0"/>
+      <dgm:spPr/>
+    </dgm:pt>
+    <dgm:pt modelId="{A27AC082-2290-924F-8AD5-5560CB78C5CB}" type="pres">
+      <dgm:prSet presAssocID="{C99A4B5B-65AC-684C-9797-B2F6FABDFAA4}" presName="conn2-1" presStyleLbl="parChTrans1D3" presStyleIdx="0" presStyleCnt="4"/>
+      <dgm:spPr/>
+      <dgm:t>
+        <a:bodyPr/>
+        <a:lstStyle/>
+        <a:p>
+          <a:endParaRPr lang="zh-CN" altLang="en-US"/>
+        </a:p>
+      </dgm:t>
+    </dgm:pt>
+    <dgm:pt modelId="{C2B0B986-D3F0-BB49-AAF8-66AD4B17C348}" type="pres">
+      <dgm:prSet presAssocID="{C99A4B5B-65AC-684C-9797-B2F6FABDFAA4}" presName="connTx" presStyleLbl="parChTrans1D3" presStyleIdx="0" presStyleCnt="4"/>
+      <dgm:spPr/>
+      <dgm:t>
+        <a:bodyPr/>
+        <a:lstStyle/>
+        <a:p>
+          <a:endParaRPr lang="zh-CN" altLang="en-US"/>
+        </a:p>
+      </dgm:t>
+    </dgm:pt>
+    <dgm:pt modelId="{5196BC22-05E9-9346-8080-0041024415EB}" type="pres">
+      <dgm:prSet presAssocID="{F0EDC55B-8135-6E41-A0AF-866F4CDC7343}" presName="root2" presStyleCnt="0"/>
+      <dgm:spPr/>
+    </dgm:pt>
+    <dgm:pt modelId="{EA7D64D3-CF64-DF44-ADE5-BB488B29C18F}" type="pres">
+      <dgm:prSet presAssocID="{F0EDC55B-8135-6E41-A0AF-866F4CDC7343}" presName="LevelTwoTextNode" presStyleLbl="node3" presStyleIdx="0" presStyleCnt="4">
+        <dgm:presLayoutVars>
+          <dgm:chPref val="3"/>
+        </dgm:presLayoutVars>
+      </dgm:prSet>
+      <dgm:spPr/>
+      <dgm:t>
+        <a:bodyPr/>
+        <a:lstStyle/>
+        <a:p>
+          <a:endParaRPr lang="zh-CN" altLang="en-US"/>
+        </a:p>
+      </dgm:t>
+    </dgm:pt>
+    <dgm:pt modelId="{8D808D56-9828-7C4D-89F0-EA255E0F11D5}" type="pres">
+      <dgm:prSet presAssocID="{F0EDC55B-8135-6E41-A0AF-866F4CDC7343}" presName="level3hierChild" presStyleCnt="0"/>
+      <dgm:spPr/>
+    </dgm:pt>
+    <dgm:pt modelId="{1D556638-DF8A-8446-9A78-A9A5F9F41EB7}" type="pres">
+      <dgm:prSet presAssocID="{129A4872-49F9-3D45-B8DC-3A9485DE5F68}" presName="conn2-1" presStyleLbl="parChTrans1D3" presStyleIdx="1" presStyleCnt="4"/>
+      <dgm:spPr/>
+      <dgm:t>
+        <a:bodyPr/>
+        <a:lstStyle/>
+        <a:p>
+          <a:endParaRPr lang="zh-CN" altLang="en-US"/>
+        </a:p>
+      </dgm:t>
+    </dgm:pt>
+    <dgm:pt modelId="{9E613B85-72D7-764E-B520-077D4556C2DE}" type="pres">
+      <dgm:prSet presAssocID="{129A4872-49F9-3D45-B8DC-3A9485DE5F68}" presName="connTx" presStyleLbl="parChTrans1D3" presStyleIdx="1" presStyleCnt="4"/>
+      <dgm:spPr/>
+      <dgm:t>
+        <a:bodyPr/>
+        <a:lstStyle/>
+        <a:p>
+          <a:endParaRPr lang="zh-CN" altLang="en-US"/>
+        </a:p>
+      </dgm:t>
+    </dgm:pt>
+    <dgm:pt modelId="{F4064470-CE43-6B49-9BA3-2AB354CE8553}" type="pres">
+      <dgm:prSet presAssocID="{C906AAE0-B246-E44D-BCDC-D32FEC259052}" presName="root2" presStyleCnt="0"/>
+      <dgm:spPr/>
+    </dgm:pt>
+    <dgm:pt modelId="{F3F3EFFE-C968-B34A-AA75-9E428D35E116}" type="pres">
+      <dgm:prSet presAssocID="{C906AAE0-B246-E44D-BCDC-D32FEC259052}" presName="LevelTwoTextNode" presStyleLbl="node3" presStyleIdx="1" presStyleCnt="4">
+        <dgm:presLayoutVars>
+          <dgm:chPref val="3"/>
+        </dgm:presLayoutVars>
+      </dgm:prSet>
+      <dgm:spPr/>
+      <dgm:t>
+        <a:bodyPr/>
+        <a:lstStyle/>
+        <a:p>
+          <a:endParaRPr lang="zh-CN" altLang="en-US"/>
+        </a:p>
+      </dgm:t>
+    </dgm:pt>
+    <dgm:pt modelId="{8C1257F3-1DF4-8A49-8447-75D1B8F3A03C}" type="pres">
+      <dgm:prSet presAssocID="{C906AAE0-B246-E44D-BCDC-D32FEC259052}" presName="level3hierChild" presStyleCnt="0"/>
+      <dgm:spPr/>
+    </dgm:pt>
+    <dgm:pt modelId="{A1619664-98D2-0146-8964-FF1B6E70FC60}" type="pres">
+      <dgm:prSet presAssocID="{CEBA6B2A-B125-5544-8596-FAC5F6E4A94B}" presName="conn2-1" presStyleLbl="parChTrans1D4" presStyleIdx="0" presStyleCnt="3"/>
+      <dgm:spPr/>
+      <dgm:t>
+        <a:bodyPr/>
+        <a:lstStyle/>
+        <a:p>
+          <a:endParaRPr lang="zh-CN" altLang="en-US"/>
+        </a:p>
+      </dgm:t>
+    </dgm:pt>
+    <dgm:pt modelId="{21FA1E0B-C530-DE47-B318-AA01426BFAE1}" type="pres">
+      <dgm:prSet presAssocID="{CEBA6B2A-B125-5544-8596-FAC5F6E4A94B}" presName="connTx" presStyleLbl="parChTrans1D4" presStyleIdx="0" presStyleCnt="3"/>
+      <dgm:spPr/>
+      <dgm:t>
+        <a:bodyPr/>
+        <a:lstStyle/>
+        <a:p>
+          <a:endParaRPr lang="zh-CN" altLang="en-US"/>
+        </a:p>
+      </dgm:t>
+    </dgm:pt>
+    <dgm:pt modelId="{1C270A1A-7A4A-E74F-996C-163DFC402E99}" type="pres">
+      <dgm:prSet presAssocID="{488D7A7A-AD6E-EA43-B237-CF8F3FC7E554}" presName="root2" presStyleCnt="0"/>
+      <dgm:spPr/>
+    </dgm:pt>
+    <dgm:pt modelId="{03DE0F1B-7208-6244-A1BB-293B383797A8}" type="pres">
+      <dgm:prSet presAssocID="{488D7A7A-AD6E-EA43-B237-CF8F3FC7E554}" presName="LevelTwoTextNode" presStyleLbl="node4" presStyleIdx="0" presStyleCnt="3">
+        <dgm:presLayoutVars>
+          <dgm:chPref val="3"/>
+        </dgm:presLayoutVars>
+      </dgm:prSet>
+      <dgm:spPr/>
+      <dgm:t>
+        <a:bodyPr/>
+        <a:lstStyle/>
+        <a:p>
+          <a:endParaRPr lang="zh-CN" altLang="en-US"/>
+        </a:p>
+      </dgm:t>
+    </dgm:pt>
+    <dgm:pt modelId="{C9F5FF86-0E4B-E345-BD73-6B237302FD74}" type="pres">
+      <dgm:prSet presAssocID="{488D7A7A-AD6E-EA43-B237-CF8F3FC7E554}" presName="level3hierChild" presStyleCnt="0"/>
+      <dgm:spPr/>
+    </dgm:pt>
+    <dgm:pt modelId="{C5DB0FC2-EC7A-5943-8AC4-3E4A0F685FB8}" type="pres">
+      <dgm:prSet presAssocID="{641D74A8-1E5A-A847-BE79-BB232C056B43}" presName="conn2-1" presStyleLbl="parChTrans1D4" presStyleIdx="1" presStyleCnt="3"/>
+      <dgm:spPr/>
+      <dgm:t>
+        <a:bodyPr/>
+        <a:lstStyle/>
+        <a:p>
+          <a:endParaRPr lang="zh-CN" altLang="en-US"/>
+        </a:p>
+      </dgm:t>
+    </dgm:pt>
+    <dgm:pt modelId="{6B3E5AF6-7561-284B-9AD2-485222746820}" type="pres">
+      <dgm:prSet presAssocID="{641D74A8-1E5A-A847-BE79-BB232C056B43}" presName="connTx" presStyleLbl="parChTrans1D4" presStyleIdx="1" presStyleCnt="3"/>
+      <dgm:spPr/>
+      <dgm:t>
+        <a:bodyPr/>
+        <a:lstStyle/>
+        <a:p>
+          <a:endParaRPr lang="zh-CN" altLang="en-US"/>
+        </a:p>
+      </dgm:t>
+    </dgm:pt>
+    <dgm:pt modelId="{EABB0823-F0AD-BE42-B073-45E5ED79FC24}" type="pres">
+      <dgm:prSet presAssocID="{06A1D4F8-ADCA-4147-9026-358412654B86}" presName="root2" presStyleCnt="0"/>
+      <dgm:spPr/>
+    </dgm:pt>
+    <dgm:pt modelId="{35A5F22A-8A90-0648-8998-9532535866A8}" type="pres">
+      <dgm:prSet presAssocID="{06A1D4F8-ADCA-4147-9026-358412654B86}" presName="LevelTwoTextNode" presStyleLbl="node4" presStyleIdx="1" presStyleCnt="3">
+        <dgm:presLayoutVars>
+          <dgm:chPref val="3"/>
+        </dgm:presLayoutVars>
+      </dgm:prSet>
+      <dgm:spPr/>
+      <dgm:t>
+        <a:bodyPr/>
+        <a:lstStyle/>
+        <a:p>
+          <a:endParaRPr lang="zh-CN" altLang="en-US"/>
+        </a:p>
+      </dgm:t>
+    </dgm:pt>
+    <dgm:pt modelId="{A2FA997C-70FB-2C46-8A0C-82E3D61EA600}" type="pres">
+      <dgm:prSet presAssocID="{06A1D4F8-ADCA-4147-9026-358412654B86}" presName="level3hierChild" presStyleCnt="0"/>
+      <dgm:spPr/>
+    </dgm:pt>
+    <dgm:pt modelId="{CAD09599-4394-EA47-91E0-9E3F0CBD38E7}" type="pres">
+      <dgm:prSet presAssocID="{1DF49C4A-895B-9440-B546-4DEB07A6CB98}" presName="conn2-1" presStyleLbl="parChTrans1D4" presStyleIdx="2" presStyleCnt="3"/>
+      <dgm:spPr/>
+      <dgm:t>
+        <a:bodyPr/>
+        <a:lstStyle/>
+        <a:p>
+          <a:endParaRPr lang="zh-CN" altLang="en-US"/>
+        </a:p>
+      </dgm:t>
+    </dgm:pt>
+    <dgm:pt modelId="{8EC2110B-CDB9-1D4C-B6F2-7F036C3499B7}" type="pres">
+      <dgm:prSet presAssocID="{1DF49C4A-895B-9440-B546-4DEB07A6CB98}" presName="connTx" presStyleLbl="parChTrans1D4" presStyleIdx="2" presStyleCnt="3"/>
+      <dgm:spPr/>
+      <dgm:t>
+        <a:bodyPr/>
+        <a:lstStyle/>
+        <a:p>
+          <a:endParaRPr lang="zh-CN" altLang="en-US"/>
+        </a:p>
+      </dgm:t>
+    </dgm:pt>
+    <dgm:pt modelId="{302FD59D-36CD-9A4B-B8B8-6A480A1DBD44}" type="pres">
+      <dgm:prSet presAssocID="{8E47DB61-F6AD-A146-8E59-1EC8663AEF2D}" presName="root2" presStyleCnt="0"/>
+      <dgm:spPr/>
+    </dgm:pt>
+    <dgm:pt modelId="{AF148FD6-3B15-4645-BD6D-D0AF2CC249D9}" type="pres">
+      <dgm:prSet presAssocID="{8E47DB61-F6AD-A146-8E59-1EC8663AEF2D}" presName="LevelTwoTextNode" presStyleLbl="node4" presStyleIdx="2" presStyleCnt="3">
+        <dgm:presLayoutVars>
+          <dgm:chPref val="3"/>
+        </dgm:presLayoutVars>
+      </dgm:prSet>
+      <dgm:spPr/>
+      <dgm:t>
+        <a:bodyPr/>
+        <a:lstStyle/>
+        <a:p>
+          <a:endParaRPr lang="zh-CN" altLang="en-US"/>
+        </a:p>
+      </dgm:t>
+    </dgm:pt>
+    <dgm:pt modelId="{D340BAF2-09B9-C34C-ACC6-766EA78E108B}" type="pres">
+      <dgm:prSet presAssocID="{8E47DB61-F6AD-A146-8E59-1EC8663AEF2D}" presName="level3hierChild" presStyleCnt="0"/>
+      <dgm:spPr/>
+    </dgm:pt>
+    <dgm:pt modelId="{C61318A7-26AE-D745-B05C-1CFE6BD609AF}" type="pres">
+      <dgm:prSet presAssocID="{5944D133-2D5F-0541-9A58-C763564E449E}" presName="conn2-1" presStyleLbl="parChTrans1D3" presStyleIdx="2" presStyleCnt="4"/>
+      <dgm:spPr/>
+      <dgm:t>
+        <a:bodyPr/>
+        <a:lstStyle/>
+        <a:p>
+          <a:endParaRPr lang="zh-CN" altLang="en-US"/>
+        </a:p>
+      </dgm:t>
+    </dgm:pt>
+    <dgm:pt modelId="{515B84FF-7B9B-3644-AB88-AA10C3A95D18}" type="pres">
+      <dgm:prSet presAssocID="{5944D133-2D5F-0541-9A58-C763564E449E}" presName="connTx" presStyleLbl="parChTrans1D3" presStyleIdx="2" presStyleCnt="4"/>
+      <dgm:spPr/>
+      <dgm:t>
+        <a:bodyPr/>
+        <a:lstStyle/>
+        <a:p>
+          <a:endParaRPr lang="zh-CN" altLang="en-US"/>
+        </a:p>
+      </dgm:t>
+    </dgm:pt>
+    <dgm:pt modelId="{D409523A-B60D-3E45-87C1-0F3AEE2BC8F0}" type="pres">
+      <dgm:prSet presAssocID="{60C2B48D-7B20-CE45-B4EE-D18E5D01624D}" presName="root2" presStyleCnt="0"/>
+      <dgm:spPr/>
+    </dgm:pt>
+    <dgm:pt modelId="{E5BB419C-F137-554B-BC55-6923233BF6E4}" type="pres">
+      <dgm:prSet presAssocID="{60C2B48D-7B20-CE45-B4EE-D18E5D01624D}" presName="LevelTwoTextNode" presStyleLbl="node3" presStyleIdx="2" presStyleCnt="4">
+        <dgm:presLayoutVars>
+          <dgm:chPref val="3"/>
+        </dgm:presLayoutVars>
+      </dgm:prSet>
+      <dgm:spPr/>
+      <dgm:t>
+        <a:bodyPr/>
+        <a:lstStyle/>
+        <a:p>
+          <a:endParaRPr lang="zh-CN" altLang="en-US"/>
+        </a:p>
+      </dgm:t>
+    </dgm:pt>
+    <dgm:pt modelId="{3F817595-AD80-4947-86AC-C46FE117F8D8}" type="pres">
+      <dgm:prSet presAssocID="{60C2B48D-7B20-CE45-B4EE-D18E5D01624D}" presName="level3hierChild" presStyleCnt="0"/>
+      <dgm:spPr/>
+    </dgm:pt>
+    <dgm:pt modelId="{2DBD4531-593D-D54F-962C-296B0F4F8BB8}" type="pres">
+      <dgm:prSet presAssocID="{826D4DB2-75B9-1046-9988-E7D2EE396017}" presName="conn2-1" presStyleLbl="parChTrans1D3" presStyleIdx="3" presStyleCnt="4"/>
+      <dgm:spPr/>
+      <dgm:t>
+        <a:bodyPr/>
+        <a:lstStyle/>
+        <a:p>
+          <a:endParaRPr lang="zh-CN" altLang="en-US"/>
+        </a:p>
+      </dgm:t>
+    </dgm:pt>
+    <dgm:pt modelId="{163771FC-6A8C-AE4F-A3A3-1D4AA59E6246}" type="pres">
+      <dgm:prSet presAssocID="{826D4DB2-75B9-1046-9988-E7D2EE396017}" presName="connTx" presStyleLbl="parChTrans1D3" presStyleIdx="3" presStyleCnt="4"/>
+      <dgm:spPr/>
+      <dgm:t>
+        <a:bodyPr/>
+        <a:lstStyle/>
+        <a:p>
+          <a:endParaRPr lang="zh-CN" altLang="en-US"/>
+        </a:p>
+      </dgm:t>
+    </dgm:pt>
+    <dgm:pt modelId="{A6BF4C42-5716-694D-8A0D-C29E75FA29C0}" type="pres">
+      <dgm:prSet presAssocID="{5DF8C541-2AFD-7445-811F-4ACE8B44C3F8}" presName="root2" presStyleCnt="0"/>
+      <dgm:spPr/>
+    </dgm:pt>
+    <dgm:pt modelId="{9F4A18E8-440A-B943-AC72-A116447E2246}" type="pres">
+      <dgm:prSet presAssocID="{5DF8C541-2AFD-7445-811F-4ACE8B44C3F8}" presName="LevelTwoTextNode" presStyleLbl="node3" presStyleIdx="3" presStyleCnt="4">
+        <dgm:presLayoutVars>
+          <dgm:chPref val="3"/>
+        </dgm:presLayoutVars>
+      </dgm:prSet>
+      <dgm:spPr/>
+      <dgm:t>
+        <a:bodyPr/>
+        <a:lstStyle/>
+        <a:p>
+          <a:endParaRPr lang="zh-CN" altLang="en-US"/>
+        </a:p>
+      </dgm:t>
+    </dgm:pt>
     <dgm:pt modelId="{73E2DC6E-0A3A-E846-A039-3D9EBEA62EEC}" type="pres">
       <dgm:prSet presAssocID="{5DF8C541-2AFD-7445-811F-4ACE8B44C3F8}" presName="level3hierChild" presStyleCnt="0"/>
       <dgm:spPr/>
     </dgm:pt>
   </dgm:ptLst>
   <dgm:cxnLst>
-    <dgm:cxn modelId="{F2EEBCAA-5640-F740-B487-A9A5B64D1F61}" type="presOf" srcId="{5DF8C541-2AFD-7445-811F-4ACE8B44C3F8}" destId="{9F4A18E8-440A-B943-AC72-A116447E2246}" srcOrd="0" destOrd="0" presId="urn:microsoft.com/office/officeart/2005/8/layout/hierarchy2"/>
-    <dgm:cxn modelId="{60DA534C-1DE1-D943-98A6-8FD39B7418F0}" srcId="{C4FACB6A-DD2F-2B42-9397-4DAEAC83E3D0}" destId="{5DF8C541-2AFD-7445-811F-4ACE8B44C3F8}" srcOrd="3" destOrd="0" parTransId="{826D4DB2-75B9-1046-9988-E7D2EE396017}" sibTransId="{7B7FBABE-AEA5-9B43-B2A8-11BB0019928E}"/>
+    <dgm:cxn modelId="{E0A0624D-A251-5C40-BB25-A1E60DBAB8AB}" type="presOf" srcId="{129A4872-49F9-3D45-B8DC-3A9485DE5F68}" destId="{1D556638-DF8A-8446-9A78-A9A5F9F41EB7}" srcOrd="0" destOrd="0" presId="urn:microsoft.com/office/officeart/2005/8/layout/hierarchy2"/>
+    <dgm:cxn modelId="{B40C4074-3CB0-F74F-BFE1-94527799A62B}" type="presOf" srcId="{F0EDC55B-8135-6E41-A0AF-866F4CDC7343}" destId="{EA7D64D3-CF64-DF44-ADE5-BB488B29C18F}" srcOrd="0" destOrd="0" presId="urn:microsoft.com/office/officeart/2005/8/layout/hierarchy2"/>
+    <dgm:cxn modelId="{1FBADEC0-D860-CC41-A9CD-0647D8B39D42}" srcId="{C906AAE0-B246-E44D-BCDC-D32FEC259052}" destId="{06A1D4F8-ADCA-4147-9026-358412654B86}" srcOrd="1" destOrd="0" parTransId="{641D74A8-1E5A-A847-BE79-BB232C056B43}" sibTransId="{90BDDD31-C442-974F-874F-0DC8E5C30727}"/>
+    <dgm:cxn modelId="{88509AC3-5B5F-5842-AA51-0ADDCADA915E}" srcId="{C4FACB6A-DD2F-2B42-9397-4DAEAC83E3D0}" destId="{60C2B48D-7B20-CE45-B4EE-D18E5D01624D}" srcOrd="2" destOrd="0" parTransId="{5944D133-2D5F-0541-9A58-C763564E449E}" sibTransId="{AE5C0147-2BC5-6948-B38D-7E49A72A03D6}"/>
     <dgm:cxn modelId="{ABB0B011-1676-7146-84B4-B25598446558}" type="presOf" srcId="{826D4DB2-75B9-1046-9988-E7D2EE396017}" destId="{2DBD4531-593D-D54F-962C-296B0F4F8BB8}" srcOrd="0" destOrd="0" presId="urn:microsoft.com/office/officeart/2005/8/layout/hierarchy2"/>
-    <dgm:cxn modelId="{1FBADEC0-D860-CC41-A9CD-0647D8B39D42}" srcId="{C906AAE0-B246-E44D-BCDC-D32FEC259052}" destId="{06A1D4F8-ADCA-4147-9026-358412654B86}" srcOrd="1" destOrd="0" parTransId="{641D74A8-1E5A-A847-BE79-BB232C056B43}" sibTransId="{90BDDD31-C442-974F-874F-0DC8E5C30727}"/>
-    <dgm:cxn modelId="{EB5604BF-78E0-3A4C-A6FC-4E71E260E461}" type="presOf" srcId="{5944D133-2D5F-0541-9A58-C763564E449E}" destId="{515B84FF-7B9B-3644-AB88-AA10C3A95D18}" srcOrd="1" destOrd="0" presId="urn:microsoft.com/office/officeart/2005/8/layout/hierarchy2"/>
-    <dgm:cxn modelId="{E0A0624D-A251-5C40-BB25-A1E60DBAB8AB}" type="presOf" srcId="{129A4872-49F9-3D45-B8DC-3A9485DE5F68}" destId="{1D556638-DF8A-8446-9A78-A9A5F9F41EB7}" srcOrd="0" destOrd="0" presId="urn:microsoft.com/office/officeart/2005/8/layout/hierarchy2"/>
-    <dgm:cxn modelId="{CF37A2DB-FDB1-1644-AA57-7E90315E9F6A}" srcId="{C906AAE0-B246-E44D-BCDC-D32FEC259052}" destId="{8E47DB61-F6AD-A146-8E59-1EC8663AEF2D}" srcOrd="2" destOrd="0" parTransId="{1DF49C4A-895B-9440-B546-4DEB07A6CB98}" sibTransId="{1217382C-447D-E442-AD0F-E090398BE4A5}"/>
-    <dgm:cxn modelId="{C44752EA-5219-6646-BDF1-CEE7A64A50E7}" srcId="{C906AAE0-B246-E44D-BCDC-D32FEC259052}" destId="{488D7A7A-AD6E-EA43-B237-CF8F3FC7E554}" srcOrd="0" destOrd="0" parTransId="{CEBA6B2A-B125-5544-8596-FAC5F6E4A94B}" sibTransId="{14626AB9-3CB2-A341-8EDB-4CB699BDC1D9}"/>
+    <dgm:cxn modelId="{F8BF99F3-A506-DD4E-9219-5BBBAE753CC6}" type="presOf" srcId="{5B8CCC55-4582-FA4E-B858-16CB397E8E07}" destId="{DB1123F5-0633-5341-8285-1DCA5C08A4C5}" srcOrd="0" destOrd="0" presId="urn:microsoft.com/office/officeart/2005/8/layout/hierarchy2"/>
+    <dgm:cxn modelId="{FADE1442-D56C-1E44-AA0C-D55259868AB2}" type="presOf" srcId="{CEBA6B2A-B125-5544-8596-FAC5F6E4A94B}" destId="{A1619664-98D2-0146-8964-FF1B6E70FC60}" srcOrd="0" destOrd="0" presId="urn:microsoft.com/office/officeart/2005/8/layout/hierarchy2"/>
+    <dgm:cxn modelId="{A8019223-2FC8-F149-9AAD-70C8B2675741}" srcId="{C4FACB6A-DD2F-2B42-9397-4DAEAC83E3D0}" destId="{F0EDC55B-8135-6E41-A0AF-866F4CDC7343}" srcOrd="0" destOrd="0" parTransId="{C99A4B5B-65AC-684C-9797-B2F6FABDFAA4}" sibTransId="{80267BC5-0F1D-A542-A16C-36C30D582C4B}"/>
+    <dgm:cxn modelId="{5C23FDE0-D4E3-AA41-A2B9-CFAFB59FB8C0}" type="presOf" srcId="{1DF49C4A-895B-9440-B546-4DEB07A6CB98}" destId="{8EC2110B-CDB9-1D4C-B6F2-7F036C3499B7}" srcOrd="1" destOrd="0" presId="urn:microsoft.com/office/officeart/2005/8/layout/hierarchy2"/>
+    <dgm:cxn modelId="{894C988F-119D-CC45-98C4-03A2C68390FF}" type="presOf" srcId="{641D74A8-1E5A-A847-BE79-BB232C056B43}" destId="{C5DB0FC2-EC7A-5943-8AC4-3E4A0F685FB8}" srcOrd="0" destOrd="0" presId="urn:microsoft.com/office/officeart/2005/8/layout/hierarchy2"/>
     <dgm:cxn modelId="{90CBED2B-CE33-5E4A-B10C-9303F5627662}" type="presOf" srcId="{826D4DB2-75B9-1046-9988-E7D2EE396017}" destId="{163771FC-6A8C-AE4F-A3A3-1D4AA59E6246}" srcOrd="1" destOrd="0" presId="urn:microsoft.com/office/officeart/2005/8/layout/hierarchy2"/>
-    <dgm:cxn modelId="{5C23FDE0-D4E3-AA41-A2B9-CFAFB59FB8C0}" type="presOf" srcId="{1DF49C4A-895B-9440-B546-4DEB07A6CB98}" destId="{8EC2110B-CDB9-1D4C-B6F2-7F036C3499B7}" srcOrd="1" destOrd="0" presId="urn:microsoft.com/office/officeart/2005/8/layout/hierarchy2"/>
-    <dgm:cxn modelId="{29BACC8A-5C71-6941-B43A-BD9BE79DE3F5}" srcId="{A2B19482-F0B5-6F4B-A349-23189F9A4A74}" destId="{71775075-7418-2E4A-944C-9563C9578B15}" srcOrd="0" destOrd="0" parTransId="{B0E55517-C9DB-2646-825E-5A9466E74816}" sibTransId="{A6FCC589-73CB-3E4E-80F1-604E300F92FC}"/>
-    <dgm:cxn modelId="{19989FE3-0F1F-D74E-A49D-26D07D5DADC1}" type="presOf" srcId="{C4FACB6A-DD2F-2B42-9397-4DAEAC83E3D0}" destId="{F2A7AD12-29FA-F848-B484-E1649BFF6A3B}" srcOrd="0" destOrd="0" presId="urn:microsoft.com/office/officeart/2005/8/layout/hierarchy2"/>
     <dgm:cxn modelId="{CF8601B6-F93C-8549-8588-F2C407D6816A}" type="presOf" srcId="{CEBA6B2A-B125-5544-8596-FAC5F6E4A94B}" destId="{21FA1E0B-C530-DE47-B318-AA01426BFAE1}" srcOrd="1" destOrd="0" presId="urn:microsoft.com/office/officeart/2005/8/layout/hierarchy2"/>
-    <dgm:cxn modelId="{85F0DD2D-ADAD-F749-90A8-67396CF04812}" type="presOf" srcId="{C906AAE0-B246-E44D-BCDC-D32FEC259052}" destId="{F3F3EFFE-C968-B34A-AA75-9E428D35E116}" srcOrd="0" destOrd="0" presId="urn:microsoft.com/office/officeart/2005/8/layout/hierarchy2"/>
-    <dgm:cxn modelId="{88509AC3-5B5F-5842-AA51-0ADDCADA915E}" srcId="{C4FACB6A-DD2F-2B42-9397-4DAEAC83E3D0}" destId="{60C2B48D-7B20-CE45-B4EE-D18E5D01624D}" srcOrd="2" destOrd="0" parTransId="{5944D133-2D5F-0541-9A58-C763564E449E}" sibTransId="{AE5C0147-2BC5-6948-B38D-7E49A72A03D6}"/>
-    <dgm:cxn modelId="{0C2767F4-ED29-524C-A74D-18413A4CDF07}" type="presOf" srcId="{A2B19482-F0B5-6F4B-A349-23189F9A4A74}" destId="{D26C4686-39D5-4D48-A1DA-37C5FDAC39B7}" srcOrd="0" destOrd="0" presId="urn:microsoft.com/office/officeart/2005/8/layout/hierarchy2"/>
-    <dgm:cxn modelId="{A79EFD15-2144-394D-95CC-7BB0CC7149FB}" type="presOf" srcId="{60C2B48D-7B20-CE45-B4EE-D18E5D01624D}" destId="{E5BB419C-F137-554B-BC55-6923233BF6E4}" srcOrd="0" destOrd="0" presId="urn:microsoft.com/office/officeart/2005/8/layout/hierarchy2"/>
-    <dgm:cxn modelId="{B40C4074-3CB0-F74F-BFE1-94527799A62B}" type="presOf" srcId="{F0EDC55B-8135-6E41-A0AF-866F4CDC7343}" destId="{EA7D64D3-CF64-DF44-ADE5-BB488B29C18F}" srcOrd="0" destOrd="0" presId="urn:microsoft.com/office/officeart/2005/8/layout/hierarchy2"/>
-    <dgm:cxn modelId="{894C988F-119D-CC45-98C4-03A2C68390FF}" type="presOf" srcId="{641D74A8-1E5A-A847-BE79-BB232C056B43}" destId="{C5DB0FC2-EC7A-5943-8AC4-3E4A0F685FB8}" srcOrd="0" destOrd="0" presId="urn:microsoft.com/office/officeart/2005/8/layout/hierarchy2"/>
-    <dgm:cxn modelId="{6B9DE805-939C-4F40-883F-32DD916B7264}" type="presOf" srcId="{71775075-7418-2E4A-944C-9563C9578B15}" destId="{51AC3011-EC30-CC4A-A487-C5612F186AED}" srcOrd="0" destOrd="0" presId="urn:microsoft.com/office/officeart/2005/8/layout/hierarchy2"/>
-    <dgm:cxn modelId="{FADE1442-D56C-1E44-AA0C-D55259868AB2}" type="presOf" srcId="{CEBA6B2A-B125-5544-8596-FAC5F6E4A94B}" destId="{A1619664-98D2-0146-8964-FF1B6E70FC60}" srcOrd="0" destOrd="0" presId="urn:microsoft.com/office/officeart/2005/8/layout/hierarchy2"/>
-    <dgm:cxn modelId="{02839B86-7D1F-8843-8568-F962D165EC20}" type="presOf" srcId="{06A1D4F8-ADCA-4147-9026-358412654B86}" destId="{35A5F22A-8A90-0648-8998-9532535866A8}" srcOrd="0" destOrd="0" presId="urn:microsoft.com/office/officeart/2005/8/layout/hierarchy2"/>
+    <dgm:cxn modelId="{A2226EDA-6E72-C945-A293-84402D29593C}" srcId="{71775075-7418-2E4A-944C-9563C9578B15}" destId="{C4FACB6A-DD2F-2B42-9397-4DAEAC83E3D0}" srcOrd="0" destOrd="0" parTransId="{5B8CCC55-4582-FA4E-B858-16CB397E8E07}" sibTransId="{7BAEE4D1-3541-9841-9B97-26F94FB98C47}"/>
     <dgm:cxn modelId="{20ACFB75-54D7-854E-B427-EDFEC0B9D242}" type="presOf" srcId="{8E47DB61-F6AD-A146-8E59-1EC8663AEF2D}" destId="{AF148FD6-3B15-4645-BD6D-D0AF2CC249D9}" srcOrd="0" destOrd="0" presId="urn:microsoft.com/office/officeart/2005/8/layout/hierarchy2"/>
     <dgm:cxn modelId="{FDF6E2E1-24DA-484A-B904-1F5B83E64787}" type="presOf" srcId="{C99A4B5B-65AC-684C-9797-B2F6FABDFAA4}" destId="{C2B0B986-D3F0-BB49-AAF8-66AD4B17C348}" srcOrd="1" destOrd="0" presId="urn:microsoft.com/office/officeart/2005/8/layout/hierarchy2"/>
-    <dgm:cxn modelId="{A8019223-2FC8-F149-9AAD-70C8B2675741}" srcId="{C4FACB6A-DD2F-2B42-9397-4DAEAC83E3D0}" destId="{F0EDC55B-8135-6E41-A0AF-866F4CDC7343}" srcOrd="0" destOrd="0" parTransId="{C99A4B5B-65AC-684C-9797-B2F6FABDFAA4}" sibTransId="{80267BC5-0F1D-A542-A16C-36C30D582C4B}"/>
-    <dgm:cxn modelId="{F8BF99F3-A506-DD4E-9219-5BBBAE753CC6}" type="presOf" srcId="{5B8CCC55-4582-FA4E-B858-16CB397E8E07}" destId="{DB1123F5-0633-5341-8285-1DCA5C08A4C5}" srcOrd="0" destOrd="0" presId="urn:microsoft.com/office/officeart/2005/8/layout/hierarchy2"/>
+    <dgm:cxn modelId="{3257E11B-290B-8541-B25A-9B0777CC5988}" type="presOf" srcId="{5944D133-2D5F-0541-9A58-C763564E449E}" destId="{C61318A7-26AE-D745-B05C-1CFE6BD609AF}" srcOrd="0" destOrd="0" presId="urn:microsoft.com/office/officeart/2005/8/layout/hierarchy2"/>
+    <dgm:cxn modelId="{6B9DE805-939C-4F40-883F-32DD916B7264}" type="presOf" srcId="{71775075-7418-2E4A-944C-9563C9578B15}" destId="{51AC3011-EC30-CC4A-A487-C5612F186AED}" srcOrd="0" destOrd="0" presId="urn:microsoft.com/office/officeart/2005/8/layout/hierarchy2"/>
+    <dgm:cxn modelId="{E1E32CF8-9287-1247-9020-625447226ADF}" type="presOf" srcId="{C99A4B5B-65AC-684C-9797-B2F6FABDFAA4}" destId="{A27AC082-2290-924F-8AD5-5560CB78C5CB}" srcOrd="0" destOrd="0" presId="urn:microsoft.com/office/officeart/2005/8/layout/hierarchy2"/>
+    <dgm:cxn modelId="{D4468BB3-4765-7A4D-B2AA-AAD0E05BE6A3}" type="presOf" srcId="{1DF49C4A-895B-9440-B546-4DEB07A6CB98}" destId="{CAD09599-4394-EA47-91E0-9E3F0CBD38E7}" srcOrd="0" destOrd="0" presId="urn:microsoft.com/office/officeart/2005/8/layout/hierarchy2"/>
+    <dgm:cxn modelId="{C44752EA-5219-6646-BDF1-CEE7A64A50E7}" srcId="{C906AAE0-B246-E44D-BCDC-D32FEC259052}" destId="{488D7A7A-AD6E-EA43-B237-CF8F3FC7E554}" srcOrd="0" destOrd="0" parTransId="{CEBA6B2A-B125-5544-8596-FAC5F6E4A94B}" sibTransId="{14626AB9-3CB2-A341-8EDB-4CB699BDC1D9}"/>
+    <dgm:cxn modelId="{CF37A2DB-FDB1-1644-AA57-7E90315E9F6A}" srcId="{C906AAE0-B246-E44D-BCDC-D32FEC259052}" destId="{8E47DB61-F6AD-A146-8E59-1EC8663AEF2D}" srcOrd="2" destOrd="0" parTransId="{1DF49C4A-895B-9440-B546-4DEB07A6CB98}" sibTransId="{1217382C-447D-E442-AD0F-E090398BE4A5}"/>
+    <dgm:cxn modelId="{85F0DD2D-ADAD-F749-90A8-67396CF04812}" type="presOf" srcId="{C906AAE0-B246-E44D-BCDC-D32FEC259052}" destId="{F3F3EFFE-C968-B34A-AA75-9E428D35E116}" srcOrd="0" destOrd="0" presId="urn:microsoft.com/office/officeart/2005/8/layout/hierarchy2"/>
+    <dgm:cxn modelId="{F2EEBCAA-5640-F740-B487-A9A5B64D1F61}" type="presOf" srcId="{5DF8C541-2AFD-7445-811F-4ACE8B44C3F8}" destId="{9F4A18E8-440A-B943-AC72-A116447E2246}" srcOrd="0" destOrd="0" presId="urn:microsoft.com/office/officeart/2005/8/layout/hierarchy2"/>
+    <dgm:cxn modelId="{02839B86-7D1F-8843-8568-F962D165EC20}" type="presOf" srcId="{06A1D4F8-ADCA-4147-9026-358412654B86}" destId="{35A5F22A-8A90-0648-8998-9532535866A8}" srcOrd="0" destOrd="0" presId="urn:microsoft.com/office/officeart/2005/8/layout/hierarchy2"/>
+    <dgm:cxn modelId="{E373D83C-5682-FC44-8144-4DCB97527E3D}" srcId="{C4FACB6A-DD2F-2B42-9397-4DAEAC83E3D0}" destId="{C906AAE0-B246-E44D-BCDC-D32FEC259052}" srcOrd="1" destOrd="0" parTransId="{129A4872-49F9-3D45-B8DC-3A9485DE5F68}" sibTransId="{F1D05862-84C3-F04D-B36D-4EA264C0B42B}"/>
+    <dgm:cxn modelId="{0C2767F4-ED29-524C-A74D-18413A4CDF07}" type="presOf" srcId="{A2B19482-F0B5-6F4B-A349-23189F9A4A74}" destId="{D26C4686-39D5-4D48-A1DA-37C5FDAC39B7}" srcOrd="0" destOrd="0" presId="urn:microsoft.com/office/officeart/2005/8/layout/hierarchy2"/>
+    <dgm:cxn modelId="{29BACC8A-5C71-6941-B43A-BD9BE79DE3F5}" srcId="{A2B19482-F0B5-6F4B-A349-23189F9A4A74}" destId="{71775075-7418-2E4A-944C-9563C9578B15}" srcOrd="0" destOrd="0" parTransId="{B0E55517-C9DB-2646-825E-5A9466E74816}" sibTransId="{A6FCC589-73CB-3E4E-80F1-604E300F92FC}"/>
+    <dgm:cxn modelId="{EB8E91DE-137A-9640-9B19-EBB4259A9718}" type="presOf" srcId="{488D7A7A-AD6E-EA43-B237-CF8F3FC7E554}" destId="{03DE0F1B-7208-6244-A1BB-293B383797A8}" srcOrd="0" destOrd="0" presId="urn:microsoft.com/office/officeart/2005/8/layout/hierarchy2"/>
+    <dgm:cxn modelId="{19989FE3-0F1F-D74E-A49D-26D07D5DADC1}" type="presOf" srcId="{C4FACB6A-DD2F-2B42-9397-4DAEAC83E3D0}" destId="{F2A7AD12-29FA-F848-B484-E1649BFF6A3B}" srcOrd="0" destOrd="0" presId="urn:microsoft.com/office/officeart/2005/8/layout/hierarchy2"/>
+    <dgm:cxn modelId="{73AC1C57-1F4E-DF41-8D55-441F3023E98A}" type="presOf" srcId="{5B8CCC55-4582-FA4E-B858-16CB397E8E07}" destId="{AB1AF23E-CC7A-3D44-A37A-CB3F22D4AB0D}" srcOrd="1" destOrd="0" presId="urn:microsoft.com/office/officeart/2005/8/layout/hierarchy2"/>
+    <dgm:cxn modelId="{60DA534C-1DE1-D943-98A6-8FD39B7418F0}" srcId="{C4FACB6A-DD2F-2B42-9397-4DAEAC83E3D0}" destId="{5DF8C541-2AFD-7445-811F-4ACE8B44C3F8}" srcOrd="3" destOrd="0" parTransId="{826D4DB2-75B9-1046-9988-E7D2EE396017}" sibTransId="{7B7FBABE-AEA5-9B43-B2A8-11BB0019928E}"/>
+    <dgm:cxn modelId="{EB5604BF-78E0-3A4C-A6FC-4E71E260E461}" type="presOf" srcId="{5944D133-2D5F-0541-9A58-C763564E449E}" destId="{515B84FF-7B9B-3644-AB88-AA10C3A95D18}" srcOrd="1" destOrd="0" presId="urn:microsoft.com/office/officeart/2005/8/layout/hierarchy2"/>
     <dgm:cxn modelId="{FF46C46E-955F-C449-9ACE-25104818D64F}" type="presOf" srcId="{641D74A8-1E5A-A847-BE79-BB232C056B43}" destId="{6B3E5AF6-7561-284B-9AD2-485222746820}" srcOrd="1" destOrd="0" presId="urn:microsoft.com/office/officeart/2005/8/layout/hierarchy2"/>
-    <dgm:cxn modelId="{E373D83C-5682-FC44-8144-4DCB97527E3D}" srcId="{C4FACB6A-DD2F-2B42-9397-4DAEAC83E3D0}" destId="{C906AAE0-B246-E44D-BCDC-D32FEC259052}" srcOrd="1" destOrd="0" parTransId="{129A4872-49F9-3D45-B8DC-3A9485DE5F68}" sibTransId="{F1D05862-84C3-F04D-B36D-4EA264C0B42B}"/>
     <dgm:cxn modelId="{CF7B8628-0A2F-CA41-9AC4-2E83CD3E2B6C}" type="presOf" srcId="{129A4872-49F9-3D45-B8DC-3A9485DE5F68}" destId="{9E613B85-72D7-764E-B520-077D4556C2DE}" srcOrd="1" destOrd="0" presId="urn:microsoft.com/office/officeart/2005/8/layout/hierarchy2"/>
-    <dgm:cxn modelId="{3257E11B-290B-8541-B25A-9B0777CC5988}" type="presOf" srcId="{5944D133-2D5F-0541-9A58-C763564E449E}" destId="{C61318A7-26AE-D745-B05C-1CFE6BD609AF}" srcOrd="0" destOrd="0" presId="urn:microsoft.com/office/officeart/2005/8/layout/hierarchy2"/>
-    <dgm:cxn modelId="{EB8E91DE-137A-9640-9B19-EBB4259A9718}" type="presOf" srcId="{488D7A7A-AD6E-EA43-B237-CF8F3FC7E554}" destId="{03DE0F1B-7208-6244-A1BB-293B383797A8}" srcOrd="0" destOrd="0" presId="urn:microsoft.com/office/officeart/2005/8/layout/hierarchy2"/>
-    <dgm:cxn modelId="{D4468BB3-4765-7A4D-B2AA-AAD0E05BE6A3}" type="presOf" srcId="{1DF49C4A-895B-9440-B546-4DEB07A6CB98}" destId="{CAD09599-4394-EA47-91E0-9E3F0CBD38E7}" srcOrd="0" destOrd="0" presId="urn:microsoft.com/office/officeart/2005/8/layout/hierarchy2"/>
-    <dgm:cxn modelId="{A2226EDA-6E72-C945-A293-84402D29593C}" srcId="{71775075-7418-2E4A-944C-9563C9578B15}" destId="{C4FACB6A-DD2F-2B42-9397-4DAEAC83E3D0}" srcOrd="0" destOrd="0" parTransId="{5B8CCC55-4582-FA4E-B858-16CB397E8E07}" sibTransId="{7BAEE4D1-3541-9841-9B97-26F94FB98C47}"/>
-    <dgm:cxn modelId="{E1E32CF8-9287-1247-9020-625447226ADF}" type="presOf" srcId="{C99A4B5B-65AC-684C-9797-B2F6FABDFAA4}" destId="{A27AC082-2290-924F-8AD5-5560CB78C5CB}" srcOrd="0" destOrd="0" presId="urn:microsoft.com/office/officeart/2005/8/layout/hierarchy2"/>
-    <dgm:cxn modelId="{73AC1C57-1F4E-DF41-8D55-441F3023E98A}" type="presOf" srcId="{5B8CCC55-4582-FA4E-B858-16CB397E8E07}" destId="{AB1AF23E-CC7A-3D44-A37A-CB3F22D4AB0D}" srcOrd="1" destOrd="0" presId="urn:microsoft.com/office/officeart/2005/8/layout/hierarchy2"/>
+    <dgm:cxn modelId="{A79EFD15-2144-394D-95CC-7BB0CC7149FB}" type="presOf" srcId="{60C2B48D-7B20-CE45-B4EE-D18E5D01624D}" destId="{E5BB419C-F137-554B-BC55-6923233BF6E4}" srcOrd="0" destOrd="0" presId="urn:microsoft.com/office/officeart/2005/8/layout/hierarchy2"/>
     <dgm:cxn modelId="{0B2B7ADA-5296-3944-97F1-6F17186714A8}" type="presParOf" srcId="{D26C4686-39D5-4D48-A1DA-37C5FDAC39B7}" destId="{61D01C7B-41B9-3E4B-BE52-7551DFC4A7D1}" srcOrd="0" destOrd="0" presId="urn:microsoft.com/office/officeart/2005/8/layout/hierarchy2"/>
     <dgm:cxn modelId="{CDFE6420-5282-F340-8251-26F36F1B6F08}" type="presParOf" srcId="{61D01C7B-41B9-3E4B-BE52-7551DFC4A7D1}" destId="{51AC3011-EC30-CC4A-A487-C5612F186AED}" srcOrd="0" destOrd="0" presId="urn:microsoft.com/office/officeart/2005/8/layout/hierarchy2"/>
     <dgm:cxn modelId="{E5C81B04-CC65-0B4E-9B8F-8EA5A773C99C}" type="presParOf" srcId="{61D01C7B-41B9-3E4B-BE52-7551DFC4A7D1}" destId="{3521BBEB-BF2E-FA40-84BF-800540394443}" srcOrd="1" destOrd="0" presId="urn:microsoft.com/office/officeart/2005/8/layout/hierarchy2"/>
@@ -12453,42 +13070,6 @@
         </dgm:presLayoutVars>
       </dgm:prSet>
       <dgm:spPr/>
-    </dgm:pt>
-    <dgm:pt modelId="{61D01C7B-41B9-3E4B-BE52-7551DFC4A7D1}" type="pres">
-      <dgm:prSet presAssocID="{71775075-7418-2E4A-944C-9563C9578B15}" presName="root1" presStyleCnt="0"/>
-      <dgm:spPr/>
-    </dgm:pt>
-    <dgm:pt modelId="{51AC3011-EC30-CC4A-A487-C5612F186AED}" type="pres">
-      <dgm:prSet presAssocID="{71775075-7418-2E4A-944C-9563C9578B15}" presName="LevelOneTextNode" presStyleLbl="node0" presStyleIdx="0" presStyleCnt="1">
-        <dgm:presLayoutVars>
-          <dgm:chPref val="3"/>
-        </dgm:presLayoutVars>
-      </dgm:prSet>
-      <dgm:spPr/>
-    </dgm:pt>
-    <dgm:pt modelId="{3521BBEB-BF2E-FA40-84BF-800540394443}" type="pres">
-      <dgm:prSet presAssocID="{71775075-7418-2E4A-944C-9563C9578B15}" presName="level2hierChild" presStyleCnt="0"/>
-      <dgm:spPr/>
-    </dgm:pt>
-    <dgm:pt modelId="{37B8E5F0-5E96-C547-88BA-A01171926770}" type="pres">
-      <dgm:prSet presAssocID="{46934164-B4DD-CB46-A898-EFB4EAC94E0E}" presName="conn2-1" presStyleLbl="parChTrans1D2" presStyleIdx="0" presStyleCnt="1"/>
-      <dgm:spPr/>
-    </dgm:pt>
-    <dgm:pt modelId="{18A44121-1A16-6D42-B33F-0445F6DE930E}" type="pres">
-      <dgm:prSet presAssocID="{46934164-B4DD-CB46-A898-EFB4EAC94E0E}" presName="connTx" presStyleLbl="parChTrans1D2" presStyleIdx="0" presStyleCnt="1"/>
-      <dgm:spPr/>
-    </dgm:pt>
-    <dgm:pt modelId="{3C7A5367-BEAA-2B45-BABB-E103E42A54C9}" type="pres">
-      <dgm:prSet presAssocID="{2D0DB0BF-5C85-5E43-B815-40AC67821A63}" presName="root2" presStyleCnt="0"/>
-      <dgm:spPr/>
-    </dgm:pt>
-    <dgm:pt modelId="{B51CBA03-ACC1-ED46-803B-5FA367A04CED}" type="pres">
-      <dgm:prSet presAssocID="{2D0DB0BF-5C85-5E43-B815-40AC67821A63}" presName="LevelTwoTextNode" presStyleLbl="node2" presStyleIdx="0" presStyleCnt="1">
-        <dgm:presLayoutVars>
-          <dgm:chPref val="3"/>
-        </dgm:presLayoutVars>
-      </dgm:prSet>
-      <dgm:spPr/>
       <dgm:t>
         <a:bodyPr/>
         <a:lstStyle/>
@@ -12497,24 +13078,12 @@
         </a:p>
       </dgm:t>
     </dgm:pt>
-    <dgm:pt modelId="{FDEC1025-4BEF-0240-9FD6-395C77F75FE7}" type="pres">
-      <dgm:prSet presAssocID="{2D0DB0BF-5C85-5E43-B815-40AC67821A63}" presName="level3hierChild" presStyleCnt="0"/>
-      <dgm:spPr/>
-    </dgm:pt>
-    <dgm:pt modelId="{A71B22FA-76C5-DA4E-85C1-619ECC3C2585}" type="pres">
-      <dgm:prSet presAssocID="{4B25EEF5-8086-2A41-B859-2E9692C266FB}" presName="conn2-1" presStyleLbl="parChTrans1D3" presStyleIdx="0" presStyleCnt="5"/>
-      <dgm:spPr/>
-    </dgm:pt>
-    <dgm:pt modelId="{F3381D8D-6FF0-5748-A355-FE8B8A28E419}" type="pres">
-      <dgm:prSet presAssocID="{4B25EEF5-8086-2A41-B859-2E9692C266FB}" presName="connTx" presStyleLbl="parChTrans1D3" presStyleIdx="0" presStyleCnt="5"/>
-      <dgm:spPr/>
-    </dgm:pt>
-    <dgm:pt modelId="{538B9F1E-3140-DC41-9518-1641FC551730}" type="pres">
-      <dgm:prSet presAssocID="{8D5B22D3-47E2-A644-907C-51C8935AAE0D}" presName="root2" presStyleCnt="0"/>
-      <dgm:spPr/>
-    </dgm:pt>
-    <dgm:pt modelId="{F896A39B-3AC4-8D49-841E-7BFD0B302D31}" type="pres">
-      <dgm:prSet presAssocID="{8D5B22D3-47E2-A644-907C-51C8935AAE0D}" presName="LevelTwoTextNode" presStyleLbl="node3" presStyleIdx="0" presStyleCnt="5">
+    <dgm:pt modelId="{61D01C7B-41B9-3E4B-BE52-7551DFC4A7D1}" type="pres">
+      <dgm:prSet presAssocID="{71775075-7418-2E4A-944C-9563C9578B15}" presName="root1" presStyleCnt="0"/>
+      <dgm:spPr/>
+    </dgm:pt>
+    <dgm:pt modelId="{51AC3011-EC30-CC4A-A487-C5612F186AED}" type="pres">
+      <dgm:prSet presAssocID="{71775075-7418-2E4A-944C-9563C9578B15}" presName="LevelOneTextNode" presStyleLbl="node0" presStyleIdx="0" presStyleCnt="1">
         <dgm:presLayoutVars>
           <dgm:chPref val="3"/>
         </dgm:presLayoutVars>
@@ -12528,28 +13097,12 @@
         </a:p>
       </dgm:t>
     </dgm:pt>
-    <dgm:pt modelId="{0DD87B95-881F-AF41-A8FD-136016898C8C}" type="pres">
-      <dgm:prSet presAssocID="{8D5B22D3-47E2-A644-907C-51C8935AAE0D}" presName="level3hierChild" presStyleCnt="0"/>
-      <dgm:spPr/>
-    </dgm:pt>
-    <dgm:pt modelId="{8B8BB625-6B8B-2649-B0B6-2E8BF3A74662}" type="pres">
-      <dgm:prSet presAssocID="{377C2846-802D-B74C-A46B-D37C45F48F42}" presName="conn2-1" presStyleLbl="parChTrans1D3" presStyleIdx="1" presStyleCnt="5"/>
-      <dgm:spPr/>
-    </dgm:pt>
-    <dgm:pt modelId="{B9D4F3CE-AC46-6246-86D0-3203090BCD46}" type="pres">
-      <dgm:prSet presAssocID="{377C2846-802D-B74C-A46B-D37C45F48F42}" presName="connTx" presStyleLbl="parChTrans1D3" presStyleIdx="1" presStyleCnt="5"/>
-      <dgm:spPr/>
-    </dgm:pt>
-    <dgm:pt modelId="{E0F8C08E-772A-AC41-B407-DCA5AA2DF7C0}" type="pres">
-      <dgm:prSet presAssocID="{6E35712A-4EEA-E441-B139-388924F18F15}" presName="root2" presStyleCnt="0"/>
-      <dgm:spPr/>
-    </dgm:pt>
-    <dgm:pt modelId="{0ED300D5-6E1F-B948-95A2-A350DE4B4ADF}" type="pres">
-      <dgm:prSet presAssocID="{6E35712A-4EEA-E441-B139-388924F18F15}" presName="LevelTwoTextNode" presStyleLbl="node3" presStyleIdx="1" presStyleCnt="5">
-        <dgm:presLayoutVars>
-          <dgm:chPref val="3"/>
-        </dgm:presLayoutVars>
-      </dgm:prSet>
+    <dgm:pt modelId="{3521BBEB-BF2E-FA40-84BF-800540394443}" type="pres">
+      <dgm:prSet presAssocID="{71775075-7418-2E4A-944C-9563C9578B15}" presName="level2hierChild" presStyleCnt="0"/>
+      <dgm:spPr/>
+    </dgm:pt>
+    <dgm:pt modelId="{37B8E5F0-5E96-C547-88BA-A01171926770}" type="pres">
+      <dgm:prSet presAssocID="{46934164-B4DD-CB46-A898-EFB4EAC94E0E}" presName="conn2-1" presStyleLbl="parChTrans1D2" presStyleIdx="0" presStyleCnt="1"/>
       <dgm:spPr/>
       <dgm:t>
         <a:bodyPr/>
@@ -12559,28 +13112,8 @@
         </a:p>
       </dgm:t>
     </dgm:pt>
-    <dgm:pt modelId="{26C00B49-4830-7B45-8393-BD7B249AFA90}" type="pres">
-      <dgm:prSet presAssocID="{6E35712A-4EEA-E441-B139-388924F18F15}" presName="level3hierChild" presStyleCnt="0"/>
-      <dgm:spPr/>
-    </dgm:pt>
-    <dgm:pt modelId="{FD118F2B-E51F-AD45-A57E-427CFE023A73}" type="pres">
-      <dgm:prSet presAssocID="{36CC3B86-7104-3846-8B63-BEDF48D87F4D}" presName="conn2-1" presStyleLbl="parChTrans1D4" presStyleIdx="0" presStyleCnt="5"/>
-      <dgm:spPr/>
-    </dgm:pt>
-    <dgm:pt modelId="{A5EE14CB-BF77-CF4F-96D8-F0B7581F8FF3}" type="pres">
-      <dgm:prSet presAssocID="{36CC3B86-7104-3846-8B63-BEDF48D87F4D}" presName="connTx" presStyleLbl="parChTrans1D4" presStyleIdx="0" presStyleCnt="5"/>
-      <dgm:spPr/>
-    </dgm:pt>
-    <dgm:pt modelId="{74AE06C0-999F-B940-930C-4F38FB2E0AF7}" type="pres">
-      <dgm:prSet presAssocID="{B3D47692-5E54-824D-94DF-7278A7F53791}" presName="root2" presStyleCnt="0"/>
-      <dgm:spPr/>
-    </dgm:pt>
-    <dgm:pt modelId="{B905B1AF-2327-F045-9E33-AEF213392EFE}" type="pres">
-      <dgm:prSet presAssocID="{B3D47692-5E54-824D-94DF-7278A7F53791}" presName="LevelTwoTextNode" presStyleLbl="node4" presStyleIdx="0" presStyleCnt="5">
-        <dgm:presLayoutVars>
-          <dgm:chPref val="3"/>
-        </dgm:presLayoutVars>
-      </dgm:prSet>
+    <dgm:pt modelId="{18A44121-1A16-6D42-B33F-0445F6DE930E}" type="pres">
+      <dgm:prSet presAssocID="{46934164-B4DD-CB46-A898-EFB4EAC94E0E}" presName="connTx" presStyleLbl="parChTrans1D2" presStyleIdx="0" presStyleCnt="1"/>
       <dgm:spPr/>
       <dgm:t>
         <a:bodyPr/>
@@ -12590,96 +13123,12 @@
         </a:p>
       </dgm:t>
     </dgm:pt>
-    <dgm:pt modelId="{13CF87CF-8696-FB4F-BDB7-033E8A61614A}" type="pres">
-      <dgm:prSet presAssocID="{B3D47692-5E54-824D-94DF-7278A7F53791}" presName="level3hierChild" presStyleCnt="0"/>
-      <dgm:spPr/>
-    </dgm:pt>
-    <dgm:pt modelId="{6BB288F4-4FEA-1C41-A251-1094E7006665}" type="pres">
-      <dgm:prSet presAssocID="{9DDDD042-F50A-D84B-922C-4F15D4FDDC4E}" presName="conn2-1" presStyleLbl="parChTrans1D4" presStyleIdx="1" presStyleCnt="5"/>
-      <dgm:spPr/>
-    </dgm:pt>
-    <dgm:pt modelId="{E5918816-8637-C042-A7D2-B6B5CCC89253}" type="pres">
-      <dgm:prSet presAssocID="{9DDDD042-F50A-D84B-922C-4F15D4FDDC4E}" presName="connTx" presStyleLbl="parChTrans1D4" presStyleIdx="1" presStyleCnt="5"/>
-      <dgm:spPr/>
-    </dgm:pt>
-    <dgm:pt modelId="{C416FABE-BD12-BC4F-8EF7-9C609EE0FA72}" type="pres">
-      <dgm:prSet presAssocID="{3FBF62BD-4B05-134C-8893-36B3F3A3EFA8}" presName="root2" presStyleCnt="0"/>
-      <dgm:spPr/>
-    </dgm:pt>
-    <dgm:pt modelId="{4C6FA70B-549A-0645-BBB5-73E76DA988D1}" type="pres">
-      <dgm:prSet presAssocID="{3FBF62BD-4B05-134C-8893-36B3F3A3EFA8}" presName="LevelTwoTextNode" presStyleLbl="node4" presStyleIdx="1" presStyleCnt="5">
-        <dgm:presLayoutVars>
-          <dgm:chPref val="3"/>
-        </dgm:presLayoutVars>
-      </dgm:prSet>
-      <dgm:spPr/>
-    </dgm:pt>
-    <dgm:pt modelId="{F3AF8985-EEED-0E4B-AA69-B713C077D6ED}" type="pres">
-      <dgm:prSet presAssocID="{3FBF62BD-4B05-134C-8893-36B3F3A3EFA8}" presName="level3hierChild" presStyleCnt="0"/>
-      <dgm:spPr/>
-    </dgm:pt>
-    <dgm:pt modelId="{A319BE0C-5E86-AF4C-8E5E-668BA6413358}" type="pres">
-      <dgm:prSet presAssocID="{5B2B87B9-8C52-304A-BBFC-5403A1A18AEC}" presName="conn2-1" presStyleLbl="parChTrans1D4" presStyleIdx="2" presStyleCnt="5"/>
-      <dgm:spPr/>
-    </dgm:pt>
-    <dgm:pt modelId="{C37D6DB9-7B84-2448-B9C1-438B374160B9}" type="pres">
-      <dgm:prSet presAssocID="{5B2B87B9-8C52-304A-BBFC-5403A1A18AEC}" presName="connTx" presStyleLbl="parChTrans1D4" presStyleIdx="2" presStyleCnt="5"/>
-      <dgm:spPr/>
-    </dgm:pt>
-    <dgm:pt modelId="{6B01701B-6DD4-354E-9C12-C3EB99EAE9E6}" type="pres">
-      <dgm:prSet presAssocID="{D205754B-4418-E64E-916B-321FEA8B6AAE}" presName="root2" presStyleCnt="0"/>
-      <dgm:spPr/>
-    </dgm:pt>
-    <dgm:pt modelId="{C7AD395A-F672-F64B-9DFB-E11876810924}" type="pres">
-      <dgm:prSet presAssocID="{D205754B-4418-E64E-916B-321FEA8B6AAE}" presName="LevelTwoTextNode" presStyleLbl="node4" presStyleIdx="2" presStyleCnt="5">
-        <dgm:presLayoutVars>
-          <dgm:chPref val="3"/>
-        </dgm:presLayoutVars>
-      </dgm:prSet>
-      <dgm:spPr/>
-    </dgm:pt>
-    <dgm:pt modelId="{2808E227-A092-3548-AEC3-52A1D621813C}" type="pres">
-      <dgm:prSet presAssocID="{D205754B-4418-E64E-916B-321FEA8B6AAE}" presName="level3hierChild" presStyleCnt="0"/>
-      <dgm:spPr/>
-    </dgm:pt>
-    <dgm:pt modelId="{26AFA27B-D43F-B240-A6FF-DD5E9EFEAF54}" type="pres">
-      <dgm:prSet presAssocID="{64F698F8-C49B-7241-A187-332A29EF0582}" presName="conn2-1" presStyleLbl="parChTrans1D3" presStyleIdx="2" presStyleCnt="5"/>
-      <dgm:spPr/>
-    </dgm:pt>
-    <dgm:pt modelId="{BE8A680C-F1F1-DC48-9D2B-C7C5B26C3031}" type="pres">
-      <dgm:prSet presAssocID="{64F698F8-C49B-7241-A187-332A29EF0582}" presName="connTx" presStyleLbl="parChTrans1D3" presStyleIdx="2" presStyleCnt="5"/>
-      <dgm:spPr/>
-    </dgm:pt>
-    <dgm:pt modelId="{58DC045F-0CDC-0A41-B177-7836DC65F802}" type="pres">
-      <dgm:prSet presAssocID="{393C5542-BBDA-C747-BD5D-921B5D37A8F2}" presName="root2" presStyleCnt="0"/>
-      <dgm:spPr/>
-    </dgm:pt>
-    <dgm:pt modelId="{3A834992-1DD8-F84B-84BB-8933D72BE894}" type="pres">
-      <dgm:prSet presAssocID="{393C5542-BBDA-C747-BD5D-921B5D37A8F2}" presName="LevelTwoTextNode" presStyleLbl="node3" presStyleIdx="2" presStyleCnt="5">
-        <dgm:presLayoutVars>
-          <dgm:chPref val="3"/>
-        </dgm:presLayoutVars>
-      </dgm:prSet>
-      <dgm:spPr/>
-    </dgm:pt>
-    <dgm:pt modelId="{5F5CBFA6-DFD4-474B-A81A-2A6A4536B8FB}" type="pres">
-      <dgm:prSet presAssocID="{393C5542-BBDA-C747-BD5D-921B5D37A8F2}" presName="level3hierChild" presStyleCnt="0"/>
-      <dgm:spPr/>
-    </dgm:pt>
-    <dgm:pt modelId="{F3F07851-FADC-5D43-9EA4-492966A730DE}" type="pres">
-      <dgm:prSet presAssocID="{1D4D1DFD-61D1-5240-B578-18C23BBE744F}" presName="conn2-1" presStyleLbl="parChTrans1D4" presStyleIdx="3" presStyleCnt="5"/>
-      <dgm:spPr/>
-    </dgm:pt>
-    <dgm:pt modelId="{003A588E-CAFE-1B48-9709-DEA3D7FBA4D6}" type="pres">
-      <dgm:prSet presAssocID="{1D4D1DFD-61D1-5240-B578-18C23BBE744F}" presName="connTx" presStyleLbl="parChTrans1D4" presStyleIdx="3" presStyleCnt="5"/>
-      <dgm:spPr/>
-    </dgm:pt>
-    <dgm:pt modelId="{41D04DAD-D9FE-354A-9B3E-29C9A5F498CF}" type="pres">
-      <dgm:prSet presAssocID="{AF538BFB-4EB6-C746-AA20-79F3D1BD6A33}" presName="root2" presStyleCnt="0"/>
-      <dgm:spPr/>
-    </dgm:pt>
-    <dgm:pt modelId="{002CCF9C-E85D-AB40-962F-532F21128732}" type="pres">
-      <dgm:prSet presAssocID="{AF538BFB-4EB6-C746-AA20-79F3D1BD6A33}" presName="LevelTwoTextNode" presStyleLbl="node4" presStyleIdx="3" presStyleCnt="5">
+    <dgm:pt modelId="{3C7A5367-BEAA-2B45-BABB-E103E42A54C9}" type="pres">
+      <dgm:prSet presAssocID="{2D0DB0BF-5C85-5E43-B815-40AC67821A63}" presName="root2" presStyleCnt="0"/>
+      <dgm:spPr/>
+    </dgm:pt>
+    <dgm:pt modelId="{B51CBA03-ACC1-ED46-803B-5FA367A04CED}" type="pres">
+      <dgm:prSet presAssocID="{2D0DB0BF-5C85-5E43-B815-40AC67821A63}" presName="LevelTwoTextNode" presStyleLbl="node2" presStyleIdx="0" presStyleCnt="1">
         <dgm:presLayoutVars>
           <dgm:chPref val="3"/>
         </dgm:presLayoutVars>
@@ -12693,52 +13142,12 @@
         </a:p>
       </dgm:t>
     </dgm:pt>
-    <dgm:pt modelId="{6A565D9E-1357-0440-A863-B5BCE9142B51}" type="pres">
-      <dgm:prSet presAssocID="{AF538BFB-4EB6-C746-AA20-79F3D1BD6A33}" presName="level3hierChild" presStyleCnt="0"/>
-      <dgm:spPr/>
-    </dgm:pt>
-    <dgm:pt modelId="{8C634D8A-4948-6F4C-B998-027EB6C0160F}" type="pres">
-      <dgm:prSet presAssocID="{8887365A-A346-694F-843C-202251749E70}" presName="conn2-1" presStyleLbl="parChTrans1D4" presStyleIdx="4" presStyleCnt="5"/>
-      <dgm:spPr/>
-    </dgm:pt>
-    <dgm:pt modelId="{5FC5CC31-7127-4044-83C3-295C775E82D2}" type="pres">
-      <dgm:prSet presAssocID="{8887365A-A346-694F-843C-202251749E70}" presName="connTx" presStyleLbl="parChTrans1D4" presStyleIdx="4" presStyleCnt="5"/>
-      <dgm:spPr/>
-    </dgm:pt>
-    <dgm:pt modelId="{AE78680E-A3BD-334A-9489-82F4091E6DFD}" type="pres">
-      <dgm:prSet presAssocID="{99B3B24B-098E-BE41-9AC4-B0F5E148EAD0}" presName="root2" presStyleCnt="0"/>
-      <dgm:spPr/>
-    </dgm:pt>
-    <dgm:pt modelId="{2FBF243B-D1C9-0249-BA14-0C800E1282F5}" type="pres">
-      <dgm:prSet presAssocID="{99B3B24B-098E-BE41-9AC4-B0F5E148EAD0}" presName="LevelTwoTextNode" presStyleLbl="node4" presStyleIdx="4" presStyleCnt="5">
-        <dgm:presLayoutVars>
-          <dgm:chPref val="3"/>
-        </dgm:presLayoutVars>
-      </dgm:prSet>
-      <dgm:spPr/>
-    </dgm:pt>
-    <dgm:pt modelId="{BCD423AF-7651-C148-83A2-19845BDF8A4B}" type="pres">
-      <dgm:prSet presAssocID="{99B3B24B-098E-BE41-9AC4-B0F5E148EAD0}" presName="level3hierChild" presStyleCnt="0"/>
-      <dgm:spPr/>
-    </dgm:pt>
-    <dgm:pt modelId="{6EAA8F16-89EB-AA44-84DA-D9E4F2F8B24B}" type="pres">
-      <dgm:prSet presAssocID="{5576BCD4-68E0-FD45-B351-6BC5C8863A06}" presName="conn2-1" presStyleLbl="parChTrans1D3" presStyleIdx="3" presStyleCnt="5"/>
-      <dgm:spPr/>
-    </dgm:pt>
-    <dgm:pt modelId="{2E2DD329-9916-8943-AC00-84345FE50D94}" type="pres">
-      <dgm:prSet presAssocID="{5576BCD4-68E0-FD45-B351-6BC5C8863A06}" presName="connTx" presStyleLbl="parChTrans1D3" presStyleIdx="3" presStyleCnt="5"/>
-      <dgm:spPr/>
-    </dgm:pt>
-    <dgm:pt modelId="{9A3F8374-6A2B-044C-9122-EE4361FEA054}" type="pres">
-      <dgm:prSet presAssocID="{5ABC3FBD-9DFC-0B46-8BBE-9D9067980233}" presName="root2" presStyleCnt="0"/>
-      <dgm:spPr/>
-    </dgm:pt>
-    <dgm:pt modelId="{105237B9-0A83-2840-9CB0-8ED7560A36ED}" type="pres">
-      <dgm:prSet presAssocID="{5ABC3FBD-9DFC-0B46-8BBE-9D9067980233}" presName="LevelTwoTextNode" presStyleLbl="node3" presStyleIdx="3" presStyleCnt="5">
-        <dgm:presLayoutVars>
-          <dgm:chPref val="3"/>
-        </dgm:presLayoutVars>
-      </dgm:prSet>
+    <dgm:pt modelId="{FDEC1025-4BEF-0240-9FD6-395C77F75FE7}" type="pres">
+      <dgm:prSet presAssocID="{2D0DB0BF-5C85-5E43-B815-40AC67821A63}" presName="level3hierChild" presStyleCnt="0"/>
+      <dgm:spPr/>
+    </dgm:pt>
+    <dgm:pt modelId="{A71B22FA-76C5-DA4E-85C1-619ECC3C2585}" type="pres">
+      <dgm:prSet presAssocID="{4B25EEF5-8086-2A41-B859-2E9692C266FB}" presName="conn2-1" presStyleLbl="parChTrans1D3" presStyleIdx="0" presStyleCnt="5"/>
       <dgm:spPr/>
       <dgm:t>
         <a:bodyPr/>
@@ -12748,28 +13157,8 @@
         </a:p>
       </dgm:t>
     </dgm:pt>
-    <dgm:pt modelId="{5D96BFFF-D7A1-0A4E-9FB5-50999AB65FF7}" type="pres">
-      <dgm:prSet presAssocID="{5ABC3FBD-9DFC-0B46-8BBE-9D9067980233}" presName="level3hierChild" presStyleCnt="0"/>
-      <dgm:spPr/>
-    </dgm:pt>
-    <dgm:pt modelId="{55597423-E8F1-C946-AC1F-0D61F5EFCC1E}" type="pres">
-      <dgm:prSet presAssocID="{3216A9B3-3C39-C74F-9B31-6CE62F41E760}" presName="conn2-1" presStyleLbl="parChTrans1D3" presStyleIdx="4" presStyleCnt="5"/>
-      <dgm:spPr/>
-    </dgm:pt>
-    <dgm:pt modelId="{8473A3A6-7250-4845-B8AA-C1B6670E9CD7}" type="pres">
-      <dgm:prSet presAssocID="{3216A9B3-3C39-C74F-9B31-6CE62F41E760}" presName="connTx" presStyleLbl="parChTrans1D3" presStyleIdx="4" presStyleCnt="5"/>
-      <dgm:spPr/>
-    </dgm:pt>
-    <dgm:pt modelId="{4BF29CA2-50B1-7D45-8FBF-6B8D27D1960A}" type="pres">
-      <dgm:prSet presAssocID="{D47384E8-279C-264C-A744-0B3DE7E29B2E}" presName="root2" presStyleCnt="0"/>
-      <dgm:spPr/>
-    </dgm:pt>
-    <dgm:pt modelId="{97ABD13A-FB71-1745-BDBA-DA3F66344AC8}" type="pres">
-      <dgm:prSet presAssocID="{D47384E8-279C-264C-A744-0B3DE7E29B2E}" presName="LevelTwoTextNode" presStyleLbl="node3" presStyleIdx="4" presStyleCnt="5">
-        <dgm:presLayoutVars>
-          <dgm:chPref val="3"/>
-        </dgm:presLayoutVars>
-      </dgm:prSet>
+    <dgm:pt modelId="{F3381D8D-6FF0-5748-A355-FE8B8A28E419}" type="pres">
+      <dgm:prSet presAssocID="{4B25EEF5-8086-2A41-B859-2E9692C266FB}" presName="connTx" presStyleLbl="parChTrans1D3" presStyleIdx="0" presStyleCnt="5"/>
       <dgm:spPr/>
       <dgm:t>
         <a:bodyPr/>
@@ -12779,59 +13168,483 @@
         </a:p>
       </dgm:t>
     </dgm:pt>
+    <dgm:pt modelId="{538B9F1E-3140-DC41-9518-1641FC551730}" type="pres">
+      <dgm:prSet presAssocID="{8D5B22D3-47E2-A644-907C-51C8935AAE0D}" presName="root2" presStyleCnt="0"/>
+      <dgm:spPr/>
+    </dgm:pt>
+    <dgm:pt modelId="{F896A39B-3AC4-8D49-841E-7BFD0B302D31}" type="pres">
+      <dgm:prSet presAssocID="{8D5B22D3-47E2-A644-907C-51C8935AAE0D}" presName="LevelTwoTextNode" presStyleLbl="node3" presStyleIdx="0" presStyleCnt="5">
+        <dgm:presLayoutVars>
+          <dgm:chPref val="3"/>
+        </dgm:presLayoutVars>
+      </dgm:prSet>
+      <dgm:spPr/>
+      <dgm:t>
+        <a:bodyPr/>
+        <a:lstStyle/>
+        <a:p>
+          <a:endParaRPr lang="zh-CN" altLang="en-US"/>
+        </a:p>
+      </dgm:t>
+    </dgm:pt>
+    <dgm:pt modelId="{0DD87B95-881F-AF41-A8FD-136016898C8C}" type="pres">
+      <dgm:prSet presAssocID="{8D5B22D3-47E2-A644-907C-51C8935AAE0D}" presName="level3hierChild" presStyleCnt="0"/>
+      <dgm:spPr/>
+    </dgm:pt>
+    <dgm:pt modelId="{8B8BB625-6B8B-2649-B0B6-2E8BF3A74662}" type="pres">
+      <dgm:prSet presAssocID="{377C2846-802D-B74C-A46B-D37C45F48F42}" presName="conn2-1" presStyleLbl="parChTrans1D3" presStyleIdx="1" presStyleCnt="5"/>
+      <dgm:spPr/>
+      <dgm:t>
+        <a:bodyPr/>
+        <a:lstStyle/>
+        <a:p>
+          <a:endParaRPr lang="zh-CN" altLang="en-US"/>
+        </a:p>
+      </dgm:t>
+    </dgm:pt>
+    <dgm:pt modelId="{B9D4F3CE-AC46-6246-86D0-3203090BCD46}" type="pres">
+      <dgm:prSet presAssocID="{377C2846-802D-B74C-A46B-D37C45F48F42}" presName="connTx" presStyleLbl="parChTrans1D3" presStyleIdx="1" presStyleCnt="5"/>
+      <dgm:spPr/>
+      <dgm:t>
+        <a:bodyPr/>
+        <a:lstStyle/>
+        <a:p>
+          <a:endParaRPr lang="zh-CN" altLang="en-US"/>
+        </a:p>
+      </dgm:t>
+    </dgm:pt>
+    <dgm:pt modelId="{E0F8C08E-772A-AC41-B407-DCA5AA2DF7C0}" type="pres">
+      <dgm:prSet presAssocID="{6E35712A-4EEA-E441-B139-388924F18F15}" presName="root2" presStyleCnt="0"/>
+      <dgm:spPr/>
+    </dgm:pt>
+    <dgm:pt modelId="{0ED300D5-6E1F-B948-95A2-A350DE4B4ADF}" type="pres">
+      <dgm:prSet presAssocID="{6E35712A-4EEA-E441-B139-388924F18F15}" presName="LevelTwoTextNode" presStyleLbl="node3" presStyleIdx="1" presStyleCnt="5">
+        <dgm:presLayoutVars>
+          <dgm:chPref val="3"/>
+        </dgm:presLayoutVars>
+      </dgm:prSet>
+      <dgm:spPr/>
+      <dgm:t>
+        <a:bodyPr/>
+        <a:lstStyle/>
+        <a:p>
+          <a:endParaRPr lang="zh-CN" altLang="en-US"/>
+        </a:p>
+      </dgm:t>
+    </dgm:pt>
+    <dgm:pt modelId="{26C00B49-4830-7B45-8393-BD7B249AFA90}" type="pres">
+      <dgm:prSet presAssocID="{6E35712A-4EEA-E441-B139-388924F18F15}" presName="level3hierChild" presStyleCnt="0"/>
+      <dgm:spPr/>
+    </dgm:pt>
+    <dgm:pt modelId="{FD118F2B-E51F-AD45-A57E-427CFE023A73}" type="pres">
+      <dgm:prSet presAssocID="{36CC3B86-7104-3846-8B63-BEDF48D87F4D}" presName="conn2-1" presStyleLbl="parChTrans1D4" presStyleIdx="0" presStyleCnt="5"/>
+      <dgm:spPr/>
+      <dgm:t>
+        <a:bodyPr/>
+        <a:lstStyle/>
+        <a:p>
+          <a:endParaRPr lang="zh-CN" altLang="en-US"/>
+        </a:p>
+      </dgm:t>
+    </dgm:pt>
+    <dgm:pt modelId="{A5EE14CB-BF77-CF4F-96D8-F0B7581F8FF3}" type="pres">
+      <dgm:prSet presAssocID="{36CC3B86-7104-3846-8B63-BEDF48D87F4D}" presName="connTx" presStyleLbl="parChTrans1D4" presStyleIdx="0" presStyleCnt="5"/>
+      <dgm:spPr/>
+      <dgm:t>
+        <a:bodyPr/>
+        <a:lstStyle/>
+        <a:p>
+          <a:endParaRPr lang="zh-CN" altLang="en-US"/>
+        </a:p>
+      </dgm:t>
+    </dgm:pt>
+    <dgm:pt modelId="{74AE06C0-999F-B940-930C-4F38FB2E0AF7}" type="pres">
+      <dgm:prSet presAssocID="{B3D47692-5E54-824D-94DF-7278A7F53791}" presName="root2" presStyleCnt="0"/>
+      <dgm:spPr/>
+    </dgm:pt>
+    <dgm:pt modelId="{B905B1AF-2327-F045-9E33-AEF213392EFE}" type="pres">
+      <dgm:prSet presAssocID="{B3D47692-5E54-824D-94DF-7278A7F53791}" presName="LevelTwoTextNode" presStyleLbl="node4" presStyleIdx="0" presStyleCnt="5">
+        <dgm:presLayoutVars>
+          <dgm:chPref val="3"/>
+        </dgm:presLayoutVars>
+      </dgm:prSet>
+      <dgm:spPr/>
+      <dgm:t>
+        <a:bodyPr/>
+        <a:lstStyle/>
+        <a:p>
+          <a:endParaRPr lang="zh-CN" altLang="en-US"/>
+        </a:p>
+      </dgm:t>
+    </dgm:pt>
+    <dgm:pt modelId="{13CF87CF-8696-FB4F-BDB7-033E8A61614A}" type="pres">
+      <dgm:prSet presAssocID="{B3D47692-5E54-824D-94DF-7278A7F53791}" presName="level3hierChild" presStyleCnt="0"/>
+      <dgm:spPr/>
+    </dgm:pt>
+    <dgm:pt modelId="{6BB288F4-4FEA-1C41-A251-1094E7006665}" type="pres">
+      <dgm:prSet presAssocID="{9DDDD042-F50A-D84B-922C-4F15D4FDDC4E}" presName="conn2-1" presStyleLbl="parChTrans1D4" presStyleIdx="1" presStyleCnt="5"/>
+      <dgm:spPr/>
+      <dgm:t>
+        <a:bodyPr/>
+        <a:lstStyle/>
+        <a:p>
+          <a:endParaRPr lang="zh-CN" altLang="en-US"/>
+        </a:p>
+      </dgm:t>
+    </dgm:pt>
+    <dgm:pt modelId="{E5918816-8637-C042-A7D2-B6B5CCC89253}" type="pres">
+      <dgm:prSet presAssocID="{9DDDD042-F50A-D84B-922C-4F15D4FDDC4E}" presName="connTx" presStyleLbl="parChTrans1D4" presStyleIdx="1" presStyleCnt="5"/>
+      <dgm:spPr/>
+      <dgm:t>
+        <a:bodyPr/>
+        <a:lstStyle/>
+        <a:p>
+          <a:endParaRPr lang="zh-CN" altLang="en-US"/>
+        </a:p>
+      </dgm:t>
+    </dgm:pt>
+    <dgm:pt modelId="{C416FABE-BD12-BC4F-8EF7-9C609EE0FA72}" type="pres">
+      <dgm:prSet presAssocID="{3FBF62BD-4B05-134C-8893-36B3F3A3EFA8}" presName="root2" presStyleCnt="0"/>
+      <dgm:spPr/>
+    </dgm:pt>
+    <dgm:pt modelId="{4C6FA70B-549A-0645-BBB5-73E76DA988D1}" type="pres">
+      <dgm:prSet presAssocID="{3FBF62BD-4B05-134C-8893-36B3F3A3EFA8}" presName="LevelTwoTextNode" presStyleLbl="node4" presStyleIdx="1" presStyleCnt="5">
+        <dgm:presLayoutVars>
+          <dgm:chPref val="3"/>
+        </dgm:presLayoutVars>
+      </dgm:prSet>
+      <dgm:spPr/>
+      <dgm:t>
+        <a:bodyPr/>
+        <a:lstStyle/>
+        <a:p>
+          <a:endParaRPr lang="zh-CN" altLang="en-US"/>
+        </a:p>
+      </dgm:t>
+    </dgm:pt>
+    <dgm:pt modelId="{F3AF8985-EEED-0E4B-AA69-B713C077D6ED}" type="pres">
+      <dgm:prSet presAssocID="{3FBF62BD-4B05-134C-8893-36B3F3A3EFA8}" presName="level3hierChild" presStyleCnt="0"/>
+      <dgm:spPr/>
+    </dgm:pt>
+    <dgm:pt modelId="{A319BE0C-5E86-AF4C-8E5E-668BA6413358}" type="pres">
+      <dgm:prSet presAssocID="{5B2B87B9-8C52-304A-BBFC-5403A1A18AEC}" presName="conn2-1" presStyleLbl="parChTrans1D4" presStyleIdx="2" presStyleCnt="5"/>
+      <dgm:spPr/>
+      <dgm:t>
+        <a:bodyPr/>
+        <a:lstStyle/>
+        <a:p>
+          <a:endParaRPr lang="zh-CN" altLang="en-US"/>
+        </a:p>
+      </dgm:t>
+    </dgm:pt>
+    <dgm:pt modelId="{C37D6DB9-7B84-2448-B9C1-438B374160B9}" type="pres">
+      <dgm:prSet presAssocID="{5B2B87B9-8C52-304A-BBFC-5403A1A18AEC}" presName="connTx" presStyleLbl="parChTrans1D4" presStyleIdx="2" presStyleCnt="5"/>
+      <dgm:spPr/>
+      <dgm:t>
+        <a:bodyPr/>
+        <a:lstStyle/>
+        <a:p>
+          <a:endParaRPr lang="zh-CN" altLang="en-US"/>
+        </a:p>
+      </dgm:t>
+    </dgm:pt>
+    <dgm:pt modelId="{6B01701B-6DD4-354E-9C12-C3EB99EAE9E6}" type="pres">
+      <dgm:prSet presAssocID="{D205754B-4418-E64E-916B-321FEA8B6AAE}" presName="root2" presStyleCnt="0"/>
+      <dgm:spPr/>
+    </dgm:pt>
+    <dgm:pt modelId="{C7AD395A-F672-F64B-9DFB-E11876810924}" type="pres">
+      <dgm:prSet presAssocID="{D205754B-4418-E64E-916B-321FEA8B6AAE}" presName="LevelTwoTextNode" presStyleLbl="node4" presStyleIdx="2" presStyleCnt="5">
+        <dgm:presLayoutVars>
+          <dgm:chPref val="3"/>
+        </dgm:presLayoutVars>
+      </dgm:prSet>
+      <dgm:spPr/>
+      <dgm:t>
+        <a:bodyPr/>
+        <a:lstStyle/>
+        <a:p>
+          <a:endParaRPr lang="zh-CN" altLang="en-US"/>
+        </a:p>
+      </dgm:t>
+    </dgm:pt>
+    <dgm:pt modelId="{2808E227-A092-3548-AEC3-52A1D621813C}" type="pres">
+      <dgm:prSet presAssocID="{D205754B-4418-E64E-916B-321FEA8B6AAE}" presName="level3hierChild" presStyleCnt="0"/>
+      <dgm:spPr/>
+    </dgm:pt>
+    <dgm:pt modelId="{26AFA27B-D43F-B240-A6FF-DD5E9EFEAF54}" type="pres">
+      <dgm:prSet presAssocID="{64F698F8-C49B-7241-A187-332A29EF0582}" presName="conn2-1" presStyleLbl="parChTrans1D3" presStyleIdx="2" presStyleCnt="5"/>
+      <dgm:spPr/>
+      <dgm:t>
+        <a:bodyPr/>
+        <a:lstStyle/>
+        <a:p>
+          <a:endParaRPr lang="zh-CN" altLang="en-US"/>
+        </a:p>
+      </dgm:t>
+    </dgm:pt>
+    <dgm:pt modelId="{BE8A680C-F1F1-DC48-9D2B-C7C5B26C3031}" type="pres">
+      <dgm:prSet presAssocID="{64F698F8-C49B-7241-A187-332A29EF0582}" presName="connTx" presStyleLbl="parChTrans1D3" presStyleIdx="2" presStyleCnt="5"/>
+      <dgm:spPr/>
+      <dgm:t>
+        <a:bodyPr/>
+        <a:lstStyle/>
+        <a:p>
+          <a:endParaRPr lang="zh-CN" altLang="en-US"/>
+        </a:p>
+      </dgm:t>
+    </dgm:pt>
+    <dgm:pt modelId="{58DC045F-0CDC-0A41-B177-7836DC65F802}" type="pres">
+      <dgm:prSet presAssocID="{393C5542-BBDA-C747-BD5D-921B5D37A8F2}" presName="root2" presStyleCnt="0"/>
+      <dgm:spPr/>
+    </dgm:pt>
+    <dgm:pt modelId="{3A834992-1DD8-F84B-84BB-8933D72BE894}" type="pres">
+      <dgm:prSet presAssocID="{393C5542-BBDA-C747-BD5D-921B5D37A8F2}" presName="LevelTwoTextNode" presStyleLbl="node3" presStyleIdx="2" presStyleCnt="5">
+        <dgm:presLayoutVars>
+          <dgm:chPref val="3"/>
+        </dgm:presLayoutVars>
+      </dgm:prSet>
+      <dgm:spPr/>
+      <dgm:t>
+        <a:bodyPr/>
+        <a:lstStyle/>
+        <a:p>
+          <a:endParaRPr lang="zh-CN" altLang="en-US"/>
+        </a:p>
+      </dgm:t>
+    </dgm:pt>
+    <dgm:pt modelId="{5F5CBFA6-DFD4-474B-A81A-2A6A4536B8FB}" type="pres">
+      <dgm:prSet presAssocID="{393C5542-BBDA-C747-BD5D-921B5D37A8F2}" presName="level3hierChild" presStyleCnt="0"/>
+      <dgm:spPr/>
+    </dgm:pt>
+    <dgm:pt modelId="{F3F07851-FADC-5D43-9EA4-492966A730DE}" type="pres">
+      <dgm:prSet presAssocID="{1D4D1DFD-61D1-5240-B578-18C23BBE744F}" presName="conn2-1" presStyleLbl="parChTrans1D4" presStyleIdx="3" presStyleCnt="5"/>
+      <dgm:spPr/>
+      <dgm:t>
+        <a:bodyPr/>
+        <a:lstStyle/>
+        <a:p>
+          <a:endParaRPr lang="zh-CN" altLang="en-US"/>
+        </a:p>
+      </dgm:t>
+    </dgm:pt>
+    <dgm:pt modelId="{003A588E-CAFE-1B48-9709-DEA3D7FBA4D6}" type="pres">
+      <dgm:prSet presAssocID="{1D4D1DFD-61D1-5240-B578-18C23BBE744F}" presName="connTx" presStyleLbl="parChTrans1D4" presStyleIdx="3" presStyleCnt="5"/>
+      <dgm:spPr/>
+      <dgm:t>
+        <a:bodyPr/>
+        <a:lstStyle/>
+        <a:p>
+          <a:endParaRPr lang="zh-CN" altLang="en-US"/>
+        </a:p>
+      </dgm:t>
+    </dgm:pt>
+    <dgm:pt modelId="{41D04DAD-D9FE-354A-9B3E-29C9A5F498CF}" type="pres">
+      <dgm:prSet presAssocID="{AF538BFB-4EB6-C746-AA20-79F3D1BD6A33}" presName="root2" presStyleCnt="0"/>
+      <dgm:spPr/>
+    </dgm:pt>
+    <dgm:pt modelId="{002CCF9C-E85D-AB40-962F-532F21128732}" type="pres">
+      <dgm:prSet presAssocID="{AF538BFB-4EB6-C746-AA20-79F3D1BD6A33}" presName="LevelTwoTextNode" presStyleLbl="node4" presStyleIdx="3" presStyleCnt="5">
+        <dgm:presLayoutVars>
+          <dgm:chPref val="3"/>
+        </dgm:presLayoutVars>
+      </dgm:prSet>
+      <dgm:spPr/>
+      <dgm:t>
+        <a:bodyPr/>
+        <a:lstStyle/>
+        <a:p>
+          <a:endParaRPr lang="zh-CN" altLang="en-US"/>
+        </a:p>
+      </dgm:t>
+    </dgm:pt>
+    <dgm:pt modelId="{6A565D9E-1357-0440-A863-B5BCE9142B51}" type="pres">
+      <dgm:prSet presAssocID="{AF538BFB-4EB6-C746-AA20-79F3D1BD6A33}" presName="level3hierChild" presStyleCnt="0"/>
+      <dgm:spPr/>
+    </dgm:pt>
+    <dgm:pt modelId="{8C634D8A-4948-6F4C-B998-027EB6C0160F}" type="pres">
+      <dgm:prSet presAssocID="{8887365A-A346-694F-843C-202251749E70}" presName="conn2-1" presStyleLbl="parChTrans1D4" presStyleIdx="4" presStyleCnt="5"/>
+      <dgm:spPr/>
+      <dgm:t>
+        <a:bodyPr/>
+        <a:lstStyle/>
+        <a:p>
+          <a:endParaRPr lang="zh-CN" altLang="en-US"/>
+        </a:p>
+      </dgm:t>
+    </dgm:pt>
+    <dgm:pt modelId="{5FC5CC31-7127-4044-83C3-295C775E82D2}" type="pres">
+      <dgm:prSet presAssocID="{8887365A-A346-694F-843C-202251749E70}" presName="connTx" presStyleLbl="parChTrans1D4" presStyleIdx="4" presStyleCnt="5"/>
+      <dgm:spPr/>
+      <dgm:t>
+        <a:bodyPr/>
+        <a:lstStyle/>
+        <a:p>
+          <a:endParaRPr lang="zh-CN" altLang="en-US"/>
+        </a:p>
+      </dgm:t>
+    </dgm:pt>
+    <dgm:pt modelId="{AE78680E-A3BD-334A-9489-82F4091E6DFD}" type="pres">
+      <dgm:prSet presAssocID="{99B3B24B-098E-BE41-9AC4-B0F5E148EAD0}" presName="root2" presStyleCnt="0"/>
+      <dgm:spPr/>
+    </dgm:pt>
+    <dgm:pt modelId="{2FBF243B-D1C9-0249-BA14-0C800E1282F5}" type="pres">
+      <dgm:prSet presAssocID="{99B3B24B-098E-BE41-9AC4-B0F5E148EAD0}" presName="LevelTwoTextNode" presStyleLbl="node4" presStyleIdx="4" presStyleCnt="5">
+        <dgm:presLayoutVars>
+          <dgm:chPref val="3"/>
+        </dgm:presLayoutVars>
+      </dgm:prSet>
+      <dgm:spPr/>
+      <dgm:t>
+        <a:bodyPr/>
+        <a:lstStyle/>
+        <a:p>
+          <a:endParaRPr lang="zh-CN" altLang="en-US"/>
+        </a:p>
+      </dgm:t>
+    </dgm:pt>
+    <dgm:pt modelId="{BCD423AF-7651-C148-83A2-19845BDF8A4B}" type="pres">
+      <dgm:prSet presAssocID="{99B3B24B-098E-BE41-9AC4-B0F5E148EAD0}" presName="level3hierChild" presStyleCnt="0"/>
+      <dgm:spPr/>
+    </dgm:pt>
+    <dgm:pt modelId="{6EAA8F16-89EB-AA44-84DA-D9E4F2F8B24B}" type="pres">
+      <dgm:prSet presAssocID="{5576BCD4-68E0-FD45-B351-6BC5C8863A06}" presName="conn2-1" presStyleLbl="parChTrans1D3" presStyleIdx="3" presStyleCnt="5"/>
+      <dgm:spPr/>
+      <dgm:t>
+        <a:bodyPr/>
+        <a:lstStyle/>
+        <a:p>
+          <a:endParaRPr lang="zh-CN" altLang="en-US"/>
+        </a:p>
+      </dgm:t>
+    </dgm:pt>
+    <dgm:pt modelId="{2E2DD329-9916-8943-AC00-84345FE50D94}" type="pres">
+      <dgm:prSet presAssocID="{5576BCD4-68E0-FD45-B351-6BC5C8863A06}" presName="connTx" presStyleLbl="parChTrans1D3" presStyleIdx="3" presStyleCnt="5"/>
+      <dgm:spPr/>
+      <dgm:t>
+        <a:bodyPr/>
+        <a:lstStyle/>
+        <a:p>
+          <a:endParaRPr lang="zh-CN" altLang="en-US"/>
+        </a:p>
+      </dgm:t>
+    </dgm:pt>
+    <dgm:pt modelId="{9A3F8374-6A2B-044C-9122-EE4361FEA054}" type="pres">
+      <dgm:prSet presAssocID="{5ABC3FBD-9DFC-0B46-8BBE-9D9067980233}" presName="root2" presStyleCnt="0"/>
+      <dgm:spPr/>
+    </dgm:pt>
+    <dgm:pt modelId="{105237B9-0A83-2840-9CB0-8ED7560A36ED}" type="pres">
+      <dgm:prSet presAssocID="{5ABC3FBD-9DFC-0B46-8BBE-9D9067980233}" presName="LevelTwoTextNode" presStyleLbl="node3" presStyleIdx="3" presStyleCnt="5">
+        <dgm:presLayoutVars>
+          <dgm:chPref val="3"/>
+        </dgm:presLayoutVars>
+      </dgm:prSet>
+      <dgm:spPr/>
+      <dgm:t>
+        <a:bodyPr/>
+        <a:lstStyle/>
+        <a:p>
+          <a:endParaRPr lang="zh-CN" altLang="en-US"/>
+        </a:p>
+      </dgm:t>
+    </dgm:pt>
+    <dgm:pt modelId="{5D96BFFF-D7A1-0A4E-9FB5-50999AB65FF7}" type="pres">
+      <dgm:prSet presAssocID="{5ABC3FBD-9DFC-0B46-8BBE-9D9067980233}" presName="level3hierChild" presStyleCnt="0"/>
+      <dgm:spPr/>
+    </dgm:pt>
+    <dgm:pt modelId="{55597423-E8F1-C946-AC1F-0D61F5EFCC1E}" type="pres">
+      <dgm:prSet presAssocID="{3216A9B3-3C39-C74F-9B31-6CE62F41E760}" presName="conn2-1" presStyleLbl="parChTrans1D3" presStyleIdx="4" presStyleCnt="5"/>
+      <dgm:spPr/>
+      <dgm:t>
+        <a:bodyPr/>
+        <a:lstStyle/>
+        <a:p>
+          <a:endParaRPr lang="zh-CN" altLang="en-US"/>
+        </a:p>
+      </dgm:t>
+    </dgm:pt>
+    <dgm:pt modelId="{8473A3A6-7250-4845-B8AA-C1B6670E9CD7}" type="pres">
+      <dgm:prSet presAssocID="{3216A9B3-3C39-C74F-9B31-6CE62F41E760}" presName="connTx" presStyleLbl="parChTrans1D3" presStyleIdx="4" presStyleCnt="5"/>
+      <dgm:spPr/>
+      <dgm:t>
+        <a:bodyPr/>
+        <a:lstStyle/>
+        <a:p>
+          <a:endParaRPr lang="zh-CN" altLang="en-US"/>
+        </a:p>
+      </dgm:t>
+    </dgm:pt>
+    <dgm:pt modelId="{4BF29CA2-50B1-7D45-8FBF-6B8D27D1960A}" type="pres">
+      <dgm:prSet presAssocID="{D47384E8-279C-264C-A744-0B3DE7E29B2E}" presName="root2" presStyleCnt="0"/>
+      <dgm:spPr/>
+    </dgm:pt>
+    <dgm:pt modelId="{97ABD13A-FB71-1745-BDBA-DA3F66344AC8}" type="pres">
+      <dgm:prSet presAssocID="{D47384E8-279C-264C-A744-0B3DE7E29B2E}" presName="LevelTwoTextNode" presStyleLbl="node3" presStyleIdx="4" presStyleCnt="5">
+        <dgm:presLayoutVars>
+          <dgm:chPref val="3"/>
+        </dgm:presLayoutVars>
+      </dgm:prSet>
+      <dgm:spPr/>
+      <dgm:t>
+        <a:bodyPr/>
+        <a:lstStyle/>
+        <a:p>
+          <a:endParaRPr lang="zh-CN" altLang="en-US"/>
+        </a:p>
+      </dgm:t>
+    </dgm:pt>
     <dgm:pt modelId="{30A7A4D0-5E7B-F94E-9F80-C197A5A37461}" type="pres">
       <dgm:prSet presAssocID="{D47384E8-279C-264C-A744-0B3DE7E29B2E}" presName="level3hierChild" presStyleCnt="0"/>
       <dgm:spPr/>
     </dgm:pt>
   </dgm:ptLst>
   <dgm:cxnLst>
+    <dgm:cxn modelId="{42E7D506-CF87-2844-9324-1956B595F119}" type="presOf" srcId="{5576BCD4-68E0-FD45-B351-6BC5C8863A06}" destId="{2E2DD329-9916-8943-AC00-84345FE50D94}" srcOrd="1" destOrd="0" presId="urn:microsoft.com/office/officeart/2005/8/layout/hierarchy2"/>
+    <dgm:cxn modelId="{65507D55-6737-354D-AD96-1D943E2C1819}" type="presOf" srcId="{AF538BFB-4EB6-C746-AA20-79F3D1BD6A33}" destId="{002CCF9C-E85D-AB40-962F-532F21128732}" srcOrd="0" destOrd="0" presId="urn:microsoft.com/office/officeart/2005/8/layout/hierarchy2"/>
+    <dgm:cxn modelId="{FFB929D7-9FC8-4748-8F07-94DE877D6407}" type="presOf" srcId="{8D5B22D3-47E2-A644-907C-51C8935AAE0D}" destId="{F896A39B-3AC4-8D49-841E-7BFD0B302D31}" srcOrd="0" destOrd="0" presId="urn:microsoft.com/office/officeart/2005/8/layout/hierarchy2"/>
+    <dgm:cxn modelId="{84D36C57-02BB-254E-B1C1-07D66165A33B}" type="presOf" srcId="{64F698F8-C49B-7241-A187-332A29EF0582}" destId="{BE8A680C-F1F1-DC48-9D2B-C7C5B26C3031}" srcOrd="1" destOrd="0" presId="urn:microsoft.com/office/officeart/2005/8/layout/hierarchy2"/>
+    <dgm:cxn modelId="{888BFA2A-6249-0D4A-80EA-22619740996C}" type="presOf" srcId="{6E35712A-4EEA-E441-B139-388924F18F15}" destId="{0ED300D5-6E1F-B948-95A2-A350DE4B4ADF}" srcOrd="0" destOrd="0" presId="urn:microsoft.com/office/officeart/2005/8/layout/hierarchy2"/>
+    <dgm:cxn modelId="{32A017DC-3326-3443-A003-0D7A6317540F}" srcId="{2D0DB0BF-5C85-5E43-B815-40AC67821A63}" destId="{5ABC3FBD-9DFC-0B46-8BBE-9D9067980233}" srcOrd="3" destOrd="0" parTransId="{5576BCD4-68E0-FD45-B351-6BC5C8863A06}" sibTransId="{017BA930-3216-1044-9DCA-78FE6E076A77}"/>
+    <dgm:cxn modelId="{2CC8AAA0-EBB8-6240-A891-03B7B741183B}" type="presOf" srcId="{D47384E8-279C-264C-A744-0B3DE7E29B2E}" destId="{97ABD13A-FB71-1745-BDBA-DA3F66344AC8}" srcOrd="0" destOrd="0" presId="urn:microsoft.com/office/officeart/2005/8/layout/hierarchy2"/>
+    <dgm:cxn modelId="{D5BA2739-9BAE-A24B-9AAE-A009FEBE22C0}" type="presOf" srcId="{71775075-7418-2E4A-944C-9563C9578B15}" destId="{51AC3011-EC30-CC4A-A487-C5612F186AED}" srcOrd="0" destOrd="0" presId="urn:microsoft.com/office/officeart/2005/8/layout/hierarchy2"/>
+    <dgm:cxn modelId="{88F83AD9-0BF7-A14E-990B-B7928A2537FE}" type="presOf" srcId="{B3D47692-5E54-824D-94DF-7278A7F53791}" destId="{B905B1AF-2327-F045-9E33-AEF213392EFE}" srcOrd="0" destOrd="0" presId="urn:microsoft.com/office/officeart/2005/8/layout/hierarchy2"/>
+    <dgm:cxn modelId="{F48D0A9D-7588-E346-A7F3-543847C0B82A}" type="presOf" srcId="{99B3B24B-098E-BE41-9AC4-B0F5E148EAD0}" destId="{2FBF243B-D1C9-0249-BA14-0C800E1282F5}" srcOrd="0" destOrd="0" presId="urn:microsoft.com/office/officeart/2005/8/layout/hierarchy2"/>
+    <dgm:cxn modelId="{FC47A897-072C-E941-9470-78C16EC657EF}" type="presOf" srcId="{1D4D1DFD-61D1-5240-B578-18C23BBE744F}" destId="{F3F07851-FADC-5D43-9EA4-492966A730DE}" srcOrd="0" destOrd="0" presId="urn:microsoft.com/office/officeart/2005/8/layout/hierarchy2"/>
+    <dgm:cxn modelId="{9B3C9234-9AAA-B040-8CBD-A8B5A8337E58}" type="presOf" srcId="{5ABC3FBD-9DFC-0B46-8BBE-9D9067980233}" destId="{105237B9-0A83-2840-9CB0-8ED7560A36ED}" srcOrd="0" destOrd="0" presId="urn:microsoft.com/office/officeart/2005/8/layout/hierarchy2"/>
+    <dgm:cxn modelId="{56146C28-F802-2341-886E-C19B4FAFB172}" type="presOf" srcId="{5B2B87B9-8C52-304A-BBFC-5403A1A18AEC}" destId="{C37D6DB9-7B84-2448-B9C1-438B374160B9}" srcOrd="1" destOrd="0" presId="urn:microsoft.com/office/officeart/2005/8/layout/hierarchy2"/>
+    <dgm:cxn modelId="{29BACC8A-5C71-6941-B43A-BD9BE79DE3F5}" srcId="{A2B19482-F0B5-6F4B-A349-23189F9A4A74}" destId="{71775075-7418-2E4A-944C-9563C9578B15}" srcOrd="0" destOrd="0" parTransId="{B0E55517-C9DB-2646-825E-5A9466E74816}" sibTransId="{A6FCC589-73CB-3E4E-80F1-604E300F92FC}"/>
+    <dgm:cxn modelId="{42973852-932E-3F48-A65C-5F0B2C76C1E3}" type="presOf" srcId="{377C2846-802D-B74C-A46B-D37C45F48F42}" destId="{8B8BB625-6B8B-2649-B0B6-2E8BF3A74662}" srcOrd="0" destOrd="0" presId="urn:microsoft.com/office/officeart/2005/8/layout/hierarchy2"/>
+    <dgm:cxn modelId="{C5E7C362-7948-9E4B-A268-951F824D50A4}" srcId="{6E35712A-4EEA-E441-B139-388924F18F15}" destId="{D205754B-4418-E64E-916B-321FEA8B6AAE}" srcOrd="2" destOrd="0" parTransId="{5B2B87B9-8C52-304A-BBFC-5403A1A18AEC}" sibTransId="{3AF1BA8E-85BA-C342-8858-1E1AE77E74CA}"/>
+    <dgm:cxn modelId="{C802925A-33A9-7641-AF6D-91AADE3C0261}" type="presOf" srcId="{8887365A-A346-694F-843C-202251749E70}" destId="{5FC5CC31-7127-4044-83C3-295C775E82D2}" srcOrd="1" destOrd="0" presId="urn:microsoft.com/office/officeart/2005/8/layout/hierarchy2"/>
+    <dgm:cxn modelId="{229B041B-3CC9-2847-810E-2D71FA85723E}" type="presOf" srcId="{8887365A-A346-694F-843C-202251749E70}" destId="{8C634D8A-4948-6F4C-B998-027EB6C0160F}" srcOrd="0" destOrd="0" presId="urn:microsoft.com/office/officeart/2005/8/layout/hierarchy2"/>
+    <dgm:cxn modelId="{DFB527FA-0A8D-3E43-A64B-CD945CFDCD5C}" type="presOf" srcId="{9DDDD042-F50A-D84B-922C-4F15D4FDDC4E}" destId="{6BB288F4-4FEA-1C41-A251-1094E7006665}" srcOrd="0" destOrd="0" presId="urn:microsoft.com/office/officeart/2005/8/layout/hierarchy2"/>
+    <dgm:cxn modelId="{CA228E1C-9D1F-B54F-B67A-BC6474F2A1BC}" type="presOf" srcId="{393C5542-BBDA-C747-BD5D-921B5D37A8F2}" destId="{3A834992-1DD8-F84B-84BB-8933D72BE894}" srcOrd="0" destOrd="0" presId="urn:microsoft.com/office/officeart/2005/8/layout/hierarchy2"/>
+    <dgm:cxn modelId="{C4AE2F71-DA8C-C04D-8506-CD6D4824395B}" srcId="{2D0DB0BF-5C85-5E43-B815-40AC67821A63}" destId="{D47384E8-279C-264C-A744-0B3DE7E29B2E}" srcOrd="4" destOrd="0" parTransId="{3216A9B3-3C39-C74F-9B31-6CE62F41E760}" sibTransId="{5F52A041-14FE-1E42-9F71-707DED51DDCC}"/>
+    <dgm:cxn modelId="{329C2599-CA2C-BF47-AC6D-12EA11864576}" srcId="{6E35712A-4EEA-E441-B139-388924F18F15}" destId="{B3D47692-5E54-824D-94DF-7278A7F53791}" srcOrd="0" destOrd="0" parTransId="{36CC3B86-7104-3846-8B63-BEDF48D87F4D}" sibTransId="{0D4545AD-CCF8-2D43-A6CF-A6F8976515BA}"/>
+    <dgm:cxn modelId="{BEC8891E-4938-0841-8CF8-03EABEA38C15}" type="presOf" srcId="{9DDDD042-F50A-D84B-922C-4F15D4FDDC4E}" destId="{E5918816-8637-C042-A7D2-B6B5CCC89253}" srcOrd="1" destOrd="0" presId="urn:microsoft.com/office/officeart/2005/8/layout/hierarchy2"/>
+    <dgm:cxn modelId="{7234211D-15E4-3B44-BBCC-99790CA676F1}" srcId="{2D0DB0BF-5C85-5E43-B815-40AC67821A63}" destId="{6E35712A-4EEA-E441-B139-388924F18F15}" srcOrd="1" destOrd="0" parTransId="{377C2846-802D-B74C-A46B-D37C45F48F42}" sibTransId="{26FA85C1-9E32-4847-ADDD-64672BD2180C}"/>
+    <dgm:cxn modelId="{64521018-8CA0-C644-A74D-9587E9D68FD4}" type="presOf" srcId="{A2B19482-F0B5-6F4B-A349-23189F9A4A74}" destId="{D26C4686-39D5-4D48-A1DA-37C5FDAC39B7}" srcOrd="0" destOrd="0" presId="urn:microsoft.com/office/officeart/2005/8/layout/hierarchy2"/>
+    <dgm:cxn modelId="{64C7B035-60C4-9542-805E-BB93B2429705}" srcId="{2D0DB0BF-5C85-5E43-B815-40AC67821A63}" destId="{8D5B22D3-47E2-A644-907C-51C8935AAE0D}" srcOrd="0" destOrd="0" parTransId="{4B25EEF5-8086-2A41-B859-2E9692C266FB}" sibTransId="{A27B63D2-EA91-254F-9E4D-1E99891C3B75}"/>
+    <dgm:cxn modelId="{A54B4E7B-6E03-B94F-A834-9C9BF6F13439}" type="presOf" srcId="{36CC3B86-7104-3846-8B63-BEDF48D87F4D}" destId="{A5EE14CB-BF77-CF4F-96D8-F0B7581F8FF3}" srcOrd="1" destOrd="0" presId="urn:microsoft.com/office/officeart/2005/8/layout/hierarchy2"/>
+    <dgm:cxn modelId="{F05AA6A9-1FD8-4A44-BE93-AAA5C238A706}" type="presOf" srcId="{3FBF62BD-4B05-134C-8893-36B3F3A3EFA8}" destId="{4C6FA70B-549A-0645-BBB5-73E76DA988D1}" srcOrd="0" destOrd="0" presId="urn:microsoft.com/office/officeart/2005/8/layout/hierarchy2"/>
+    <dgm:cxn modelId="{80BBB227-1EA6-594B-A5FD-8606BEEF795A}" type="presOf" srcId="{36CC3B86-7104-3846-8B63-BEDF48D87F4D}" destId="{FD118F2B-E51F-AD45-A57E-427CFE023A73}" srcOrd="0" destOrd="0" presId="urn:microsoft.com/office/officeart/2005/8/layout/hierarchy2"/>
+    <dgm:cxn modelId="{343B8332-BE8A-8E45-8F26-19F24A00F5BA}" type="presOf" srcId="{4B25EEF5-8086-2A41-B859-2E9692C266FB}" destId="{F3381D8D-6FF0-5748-A355-FE8B8A28E419}" srcOrd="1" destOrd="0" presId="urn:microsoft.com/office/officeart/2005/8/layout/hierarchy2"/>
+    <dgm:cxn modelId="{F7CA7FA6-8C49-C740-8EC9-6DA31D464641}" type="presOf" srcId="{D205754B-4418-E64E-916B-321FEA8B6AAE}" destId="{C7AD395A-F672-F64B-9DFB-E11876810924}" srcOrd="0" destOrd="0" presId="urn:microsoft.com/office/officeart/2005/8/layout/hierarchy2"/>
+    <dgm:cxn modelId="{B60891EB-D281-FD44-B7DB-7E075F14F18E}" type="presOf" srcId="{46934164-B4DD-CB46-A898-EFB4EAC94E0E}" destId="{37B8E5F0-5E96-C547-88BA-A01171926770}" srcOrd="0" destOrd="0" presId="urn:microsoft.com/office/officeart/2005/8/layout/hierarchy2"/>
+    <dgm:cxn modelId="{E5AF9811-AF7A-1543-9AF1-CAB75E9C592A}" type="presOf" srcId="{3216A9B3-3C39-C74F-9B31-6CE62F41E760}" destId="{8473A3A6-7250-4845-B8AA-C1B6670E9CD7}" srcOrd="1" destOrd="0" presId="urn:microsoft.com/office/officeart/2005/8/layout/hierarchy2"/>
+    <dgm:cxn modelId="{138ABFF1-B863-C845-B97E-1581F94816DA}" type="presOf" srcId="{377C2846-802D-B74C-A46B-D37C45F48F42}" destId="{B9D4F3CE-AC46-6246-86D0-3203090BCD46}" srcOrd="1" destOrd="0" presId="urn:microsoft.com/office/officeart/2005/8/layout/hierarchy2"/>
+    <dgm:cxn modelId="{274569E3-ACD8-3547-858A-4FC0326F460C}" type="presOf" srcId="{64F698F8-C49B-7241-A187-332A29EF0582}" destId="{26AFA27B-D43F-B240-A6FF-DD5E9EFEAF54}" srcOrd="0" destOrd="0" presId="urn:microsoft.com/office/officeart/2005/8/layout/hierarchy2"/>
+    <dgm:cxn modelId="{9A144E9A-1ABC-E342-AC94-BE957E57EFFF}" type="presOf" srcId="{46934164-B4DD-CB46-A898-EFB4EAC94E0E}" destId="{18A44121-1A16-6D42-B33F-0445F6DE930E}" srcOrd="1" destOrd="0" presId="urn:microsoft.com/office/officeart/2005/8/layout/hierarchy2"/>
+    <dgm:cxn modelId="{C1C6AEFD-58DF-9948-BBA8-3A8839DD268B}" type="presOf" srcId="{4B25EEF5-8086-2A41-B859-2E9692C266FB}" destId="{A71B22FA-76C5-DA4E-85C1-619ECC3C2585}" srcOrd="0" destOrd="0" presId="urn:microsoft.com/office/officeart/2005/8/layout/hierarchy2"/>
+    <dgm:cxn modelId="{CFD78BCE-B895-944A-9A32-6BF88E4DE2D4}" srcId="{393C5542-BBDA-C747-BD5D-921B5D37A8F2}" destId="{AF538BFB-4EB6-C746-AA20-79F3D1BD6A33}" srcOrd="0" destOrd="0" parTransId="{1D4D1DFD-61D1-5240-B578-18C23BBE744F}" sibTransId="{3CC23572-9C7E-C04C-A946-F0C94AFBAB96}"/>
+    <dgm:cxn modelId="{28D8F911-597F-CD4C-8204-A1CC27F4403F}" srcId="{6E35712A-4EEA-E441-B139-388924F18F15}" destId="{3FBF62BD-4B05-134C-8893-36B3F3A3EFA8}" srcOrd="1" destOrd="0" parTransId="{9DDDD042-F50A-D84B-922C-4F15D4FDDC4E}" sibTransId="{B50D86E4-5ACC-4043-8946-531981F22BD9}"/>
+    <dgm:cxn modelId="{85C1395D-F1EC-9449-A9A6-F2E666D1AB32}" srcId="{71775075-7418-2E4A-944C-9563C9578B15}" destId="{2D0DB0BF-5C85-5E43-B815-40AC67821A63}" srcOrd="0" destOrd="0" parTransId="{46934164-B4DD-CB46-A898-EFB4EAC94E0E}" sibTransId="{C359FAD4-0803-C14B-9CDB-5FDC0E0438D4}"/>
+    <dgm:cxn modelId="{031C5CC7-ECD4-C14A-8A0A-529A6A830AD7}" type="presOf" srcId="{3216A9B3-3C39-C74F-9B31-6CE62F41E760}" destId="{55597423-E8F1-C946-AC1F-0D61F5EFCC1E}" srcOrd="0" destOrd="0" presId="urn:microsoft.com/office/officeart/2005/8/layout/hierarchy2"/>
     <dgm:cxn modelId="{2D03FF8D-0B09-3949-B4F1-A73E5951A9E5}" srcId="{393C5542-BBDA-C747-BD5D-921B5D37A8F2}" destId="{99B3B24B-098E-BE41-9AC4-B0F5E148EAD0}" srcOrd="1" destOrd="0" parTransId="{8887365A-A346-694F-843C-202251749E70}" sibTransId="{FD5DEEBC-D024-F545-9B87-EAF79867A790}"/>
-    <dgm:cxn modelId="{BEC8891E-4938-0841-8CF8-03EABEA38C15}" type="presOf" srcId="{9DDDD042-F50A-D84B-922C-4F15D4FDDC4E}" destId="{E5918816-8637-C042-A7D2-B6B5CCC89253}" srcOrd="1" destOrd="0" presId="urn:microsoft.com/office/officeart/2005/8/layout/hierarchy2"/>
-    <dgm:cxn modelId="{88F83AD9-0BF7-A14E-990B-B7928A2537FE}" type="presOf" srcId="{B3D47692-5E54-824D-94DF-7278A7F53791}" destId="{B905B1AF-2327-F045-9E33-AEF213392EFE}" srcOrd="0" destOrd="0" presId="urn:microsoft.com/office/officeart/2005/8/layout/hierarchy2"/>
-    <dgm:cxn modelId="{64521018-8CA0-C644-A74D-9587E9D68FD4}" type="presOf" srcId="{A2B19482-F0B5-6F4B-A349-23189F9A4A74}" destId="{D26C4686-39D5-4D48-A1DA-37C5FDAC39B7}" srcOrd="0" destOrd="0" presId="urn:microsoft.com/office/officeart/2005/8/layout/hierarchy2"/>
-    <dgm:cxn modelId="{A54B4E7B-6E03-B94F-A834-9C9BF6F13439}" type="presOf" srcId="{36CC3B86-7104-3846-8B63-BEDF48D87F4D}" destId="{A5EE14CB-BF77-CF4F-96D8-F0B7581F8FF3}" srcOrd="1" destOrd="0" presId="urn:microsoft.com/office/officeart/2005/8/layout/hierarchy2"/>
-    <dgm:cxn modelId="{343B8332-BE8A-8E45-8F26-19F24A00F5BA}" type="presOf" srcId="{4B25EEF5-8086-2A41-B859-2E9692C266FB}" destId="{F3381D8D-6FF0-5748-A355-FE8B8A28E419}" srcOrd="1" destOrd="0" presId="urn:microsoft.com/office/officeart/2005/8/layout/hierarchy2"/>
-    <dgm:cxn modelId="{138ABFF1-B863-C845-B97E-1581F94816DA}" type="presOf" srcId="{377C2846-802D-B74C-A46B-D37C45F48F42}" destId="{B9D4F3CE-AC46-6246-86D0-3203090BCD46}" srcOrd="1" destOrd="0" presId="urn:microsoft.com/office/officeart/2005/8/layout/hierarchy2"/>
-    <dgm:cxn modelId="{C5E7C362-7948-9E4B-A268-951F824D50A4}" srcId="{6E35712A-4EEA-E441-B139-388924F18F15}" destId="{D205754B-4418-E64E-916B-321FEA8B6AAE}" srcOrd="2" destOrd="0" parTransId="{5B2B87B9-8C52-304A-BBFC-5403A1A18AEC}" sibTransId="{3AF1BA8E-85BA-C342-8858-1E1AE77E74CA}"/>
-    <dgm:cxn modelId="{80BBB227-1EA6-594B-A5FD-8606BEEF795A}" type="presOf" srcId="{36CC3B86-7104-3846-8B63-BEDF48D87F4D}" destId="{FD118F2B-E51F-AD45-A57E-427CFE023A73}" srcOrd="0" destOrd="0" presId="urn:microsoft.com/office/officeart/2005/8/layout/hierarchy2"/>
-    <dgm:cxn modelId="{84D36C57-02BB-254E-B1C1-07D66165A33B}" type="presOf" srcId="{64F698F8-C49B-7241-A187-332A29EF0582}" destId="{BE8A680C-F1F1-DC48-9D2B-C7C5B26C3031}" srcOrd="1" destOrd="0" presId="urn:microsoft.com/office/officeart/2005/8/layout/hierarchy2"/>
-    <dgm:cxn modelId="{C802925A-33A9-7641-AF6D-91AADE3C0261}" type="presOf" srcId="{8887365A-A346-694F-843C-202251749E70}" destId="{5FC5CC31-7127-4044-83C3-295C775E82D2}" srcOrd="1" destOrd="0" presId="urn:microsoft.com/office/officeart/2005/8/layout/hierarchy2"/>
-    <dgm:cxn modelId="{C1C6AEFD-58DF-9948-BBA8-3A8839DD268B}" type="presOf" srcId="{4B25EEF5-8086-2A41-B859-2E9692C266FB}" destId="{A71B22FA-76C5-DA4E-85C1-619ECC3C2585}" srcOrd="0" destOrd="0" presId="urn:microsoft.com/office/officeart/2005/8/layout/hierarchy2"/>
-    <dgm:cxn modelId="{F48D0A9D-7588-E346-A7F3-543847C0B82A}" type="presOf" srcId="{99B3B24B-098E-BE41-9AC4-B0F5E148EAD0}" destId="{2FBF243B-D1C9-0249-BA14-0C800E1282F5}" srcOrd="0" destOrd="0" presId="urn:microsoft.com/office/officeart/2005/8/layout/hierarchy2"/>
-    <dgm:cxn modelId="{56146C28-F802-2341-886E-C19B4FAFB172}" type="presOf" srcId="{5B2B87B9-8C52-304A-BBFC-5403A1A18AEC}" destId="{C37D6DB9-7B84-2448-B9C1-438B374160B9}" srcOrd="1" destOrd="0" presId="urn:microsoft.com/office/officeart/2005/8/layout/hierarchy2"/>
-    <dgm:cxn modelId="{FC47A897-072C-E941-9470-78C16EC657EF}" type="presOf" srcId="{1D4D1DFD-61D1-5240-B578-18C23BBE744F}" destId="{F3F07851-FADC-5D43-9EA4-492966A730DE}" srcOrd="0" destOrd="0" presId="urn:microsoft.com/office/officeart/2005/8/layout/hierarchy2"/>
-    <dgm:cxn modelId="{28D8F911-597F-CD4C-8204-A1CC27F4403F}" srcId="{6E35712A-4EEA-E441-B139-388924F18F15}" destId="{3FBF62BD-4B05-134C-8893-36B3F3A3EFA8}" srcOrd="1" destOrd="0" parTransId="{9DDDD042-F50A-D84B-922C-4F15D4FDDC4E}" sibTransId="{B50D86E4-5ACC-4043-8946-531981F22BD9}"/>
     <dgm:cxn modelId="{87F95A28-4DD5-8849-B80D-8D6BECC39122}" type="presOf" srcId="{1D4D1DFD-61D1-5240-B578-18C23BBE744F}" destId="{003A588E-CAFE-1B48-9709-DEA3D7FBA4D6}" srcOrd="1" destOrd="0" presId="urn:microsoft.com/office/officeart/2005/8/layout/hierarchy2"/>
-    <dgm:cxn modelId="{9A144E9A-1ABC-E342-AC94-BE957E57EFFF}" type="presOf" srcId="{46934164-B4DD-CB46-A898-EFB4EAC94E0E}" destId="{18A44121-1A16-6D42-B33F-0445F6DE930E}" srcOrd="1" destOrd="0" presId="urn:microsoft.com/office/officeart/2005/8/layout/hierarchy2"/>
-    <dgm:cxn modelId="{32A017DC-3326-3443-A003-0D7A6317540F}" srcId="{2D0DB0BF-5C85-5E43-B815-40AC67821A63}" destId="{5ABC3FBD-9DFC-0B46-8BBE-9D9067980233}" srcOrd="3" destOrd="0" parTransId="{5576BCD4-68E0-FD45-B351-6BC5C8863A06}" sibTransId="{017BA930-3216-1044-9DCA-78FE6E076A77}"/>
-    <dgm:cxn modelId="{FFB929D7-9FC8-4748-8F07-94DE877D6407}" type="presOf" srcId="{8D5B22D3-47E2-A644-907C-51C8935AAE0D}" destId="{F896A39B-3AC4-8D49-841E-7BFD0B302D31}" srcOrd="0" destOrd="0" presId="urn:microsoft.com/office/officeart/2005/8/layout/hierarchy2"/>
-    <dgm:cxn modelId="{C4AE2F71-DA8C-C04D-8506-CD6D4824395B}" srcId="{2D0DB0BF-5C85-5E43-B815-40AC67821A63}" destId="{D47384E8-279C-264C-A744-0B3DE7E29B2E}" srcOrd="4" destOrd="0" parTransId="{3216A9B3-3C39-C74F-9B31-6CE62F41E760}" sibTransId="{5F52A041-14FE-1E42-9F71-707DED51DDCC}"/>
+    <dgm:cxn modelId="{07BE0AFF-3DBC-F748-BC81-CBF52A15325B}" type="presOf" srcId="{5B2B87B9-8C52-304A-BBFC-5403A1A18AEC}" destId="{A319BE0C-5E86-AF4C-8E5E-668BA6413358}" srcOrd="0" destOrd="0" presId="urn:microsoft.com/office/officeart/2005/8/layout/hierarchy2"/>
     <dgm:cxn modelId="{3CA93EAA-CBAC-7B4A-B735-F24A129F8092}" type="presOf" srcId="{2D0DB0BF-5C85-5E43-B815-40AC67821A63}" destId="{B51CBA03-ACC1-ED46-803B-5FA367A04CED}" srcOrd="0" destOrd="0" presId="urn:microsoft.com/office/officeart/2005/8/layout/hierarchy2"/>
-    <dgm:cxn modelId="{F7CA7FA6-8C49-C740-8EC9-6DA31D464641}" type="presOf" srcId="{D205754B-4418-E64E-916B-321FEA8B6AAE}" destId="{C7AD395A-F672-F64B-9DFB-E11876810924}" srcOrd="0" destOrd="0" presId="urn:microsoft.com/office/officeart/2005/8/layout/hierarchy2"/>
-    <dgm:cxn modelId="{F05AA6A9-1FD8-4A44-BE93-AAA5C238A706}" type="presOf" srcId="{3FBF62BD-4B05-134C-8893-36B3F3A3EFA8}" destId="{4C6FA70B-549A-0645-BBB5-73E76DA988D1}" srcOrd="0" destOrd="0" presId="urn:microsoft.com/office/officeart/2005/8/layout/hierarchy2"/>
-    <dgm:cxn modelId="{E5AF9811-AF7A-1543-9AF1-CAB75E9C592A}" type="presOf" srcId="{3216A9B3-3C39-C74F-9B31-6CE62F41E760}" destId="{8473A3A6-7250-4845-B8AA-C1B6670E9CD7}" srcOrd="1" destOrd="0" presId="urn:microsoft.com/office/officeart/2005/8/layout/hierarchy2"/>
     <dgm:cxn modelId="{44910596-B435-4346-833B-0AA66F7D2E29}" srcId="{2D0DB0BF-5C85-5E43-B815-40AC67821A63}" destId="{393C5542-BBDA-C747-BD5D-921B5D37A8F2}" srcOrd="2" destOrd="0" parTransId="{64F698F8-C49B-7241-A187-332A29EF0582}" sibTransId="{51E1616D-9DF0-2C46-9E8B-9ABB32393231}"/>
-    <dgm:cxn modelId="{329C2599-CA2C-BF47-AC6D-12EA11864576}" srcId="{6E35712A-4EEA-E441-B139-388924F18F15}" destId="{B3D47692-5E54-824D-94DF-7278A7F53791}" srcOrd="0" destOrd="0" parTransId="{36CC3B86-7104-3846-8B63-BEDF48D87F4D}" sibTransId="{0D4545AD-CCF8-2D43-A6CF-A6F8976515BA}"/>
-    <dgm:cxn modelId="{29BACC8A-5C71-6941-B43A-BD9BE79DE3F5}" srcId="{A2B19482-F0B5-6F4B-A349-23189F9A4A74}" destId="{71775075-7418-2E4A-944C-9563C9578B15}" srcOrd="0" destOrd="0" parTransId="{B0E55517-C9DB-2646-825E-5A9466E74816}" sibTransId="{A6FCC589-73CB-3E4E-80F1-604E300F92FC}"/>
-    <dgm:cxn modelId="{888BFA2A-6249-0D4A-80EA-22619740996C}" type="presOf" srcId="{6E35712A-4EEA-E441-B139-388924F18F15}" destId="{0ED300D5-6E1F-B948-95A2-A350DE4B4ADF}" srcOrd="0" destOrd="0" presId="urn:microsoft.com/office/officeart/2005/8/layout/hierarchy2"/>
-    <dgm:cxn modelId="{2CC8AAA0-EBB8-6240-A891-03B7B741183B}" type="presOf" srcId="{D47384E8-279C-264C-A744-0B3DE7E29B2E}" destId="{97ABD13A-FB71-1745-BDBA-DA3F66344AC8}" srcOrd="0" destOrd="0" presId="urn:microsoft.com/office/officeart/2005/8/layout/hierarchy2"/>
-    <dgm:cxn modelId="{42973852-932E-3F48-A65C-5F0B2C76C1E3}" type="presOf" srcId="{377C2846-802D-B74C-A46B-D37C45F48F42}" destId="{8B8BB625-6B8B-2649-B0B6-2E8BF3A74662}" srcOrd="0" destOrd="0" presId="urn:microsoft.com/office/officeart/2005/8/layout/hierarchy2"/>
-    <dgm:cxn modelId="{42E7D506-CF87-2844-9324-1956B595F119}" type="presOf" srcId="{5576BCD4-68E0-FD45-B351-6BC5C8863A06}" destId="{2E2DD329-9916-8943-AC00-84345FE50D94}" srcOrd="1" destOrd="0" presId="urn:microsoft.com/office/officeart/2005/8/layout/hierarchy2"/>
-    <dgm:cxn modelId="{DFB527FA-0A8D-3E43-A64B-CD945CFDCD5C}" type="presOf" srcId="{9DDDD042-F50A-D84B-922C-4F15D4FDDC4E}" destId="{6BB288F4-4FEA-1C41-A251-1094E7006665}" srcOrd="0" destOrd="0" presId="urn:microsoft.com/office/officeart/2005/8/layout/hierarchy2"/>
-    <dgm:cxn modelId="{274569E3-ACD8-3547-858A-4FC0326F460C}" type="presOf" srcId="{64F698F8-C49B-7241-A187-332A29EF0582}" destId="{26AFA27B-D43F-B240-A6FF-DD5E9EFEAF54}" srcOrd="0" destOrd="0" presId="urn:microsoft.com/office/officeart/2005/8/layout/hierarchy2"/>
-    <dgm:cxn modelId="{9B3C9234-9AAA-B040-8CBD-A8B5A8337E58}" type="presOf" srcId="{5ABC3FBD-9DFC-0B46-8BBE-9D9067980233}" destId="{105237B9-0A83-2840-9CB0-8ED7560A36ED}" srcOrd="0" destOrd="0" presId="urn:microsoft.com/office/officeart/2005/8/layout/hierarchy2"/>
-    <dgm:cxn modelId="{CFD78BCE-B895-944A-9A32-6BF88E4DE2D4}" srcId="{393C5542-BBDA-C747-BD5D-921B5D37A8F2}" destId="{AF538BFB-4EB6-C746-AA20-79F3D1BD6A33}" srcOrd="0" destOrd="0" parTransId="{1D4D1DFD-61D1-5240-B578-18C23BBE744F}" sibTransId="{3CC23572-9C7E-C04C-A946-F0C94AFBAB96}"/>
-    <dgm:cxn modelId="{031C5CC7-ECD4-C14A-8A0A-529A6A830AD7}" type="presOf" srcId="{3216A9B3-3C39-C74F-9B31-6CE62F41E760}" destId="{55597423-E8F1-C946-AC1F-0D61F5EFCC1E}" srcOrd="0" destOrd="0" presId="urn:microsoft.com/office/officeart/2005/8/layout/hierarchy2"/>
-    <dgm:cxn modelId="{229B041B-3CC9-2847-810E-2D71FA85723E}" type="presOf" srcId="{8887365A-A346-694F-843C-202251749E70}" destId="{8C634D8A-4948-6F4C-B998-027EB6C0160F}" srcOrd="0" destOrd="0" presId="urn:microsoft.com/office/officeart/2005/8/layout/hierarchy2"/>
-    <dgm:cxn modelId="{65507D55-6737-354D-AD96-1D943E2C1819}" type="presOf" srcId="{AF538BFB-4EB6-C746-AA20-79F3D1BD6A33}" destId="{002CCF9C-E85D-AB40-962F-532F21128732}" srcOrd="0" destOrd="0" presId="urn:microsoft.com/office/officeart/2005/8/layout/hierarchy2"/>
-    <dgm:cxn modelId="{D5BA2739-9BAE-A24B-9AAE-A009FEBE22C0}" type="presOf" srcId="{71775075-7418-2E4A-944C-9563C9578B15}" destId="{51AC3011-EC30-CC4A-A487-C5612F186AED}" srcOrd="0" destOrd="0" presId="urn:microsoft.com/office/officeart/2005/8/layout/hierarchy2"/>
     <dgm:cxn modelId="{9B8872CD-5E39-C04D-A2AE-D32C76A177FB}" type="presOf" srcId="{5576BCD4-68E0-FD45-B351-6BC5C8863A06}" destId="{6EAA8F16-89EB-AA44-84DA-D9E4F2F8B24B}" srcOrd="0" destOrd="0" presId="urn:microsoft.com/office/officeart/2005/8/layout/hierarchy2"/>
-    <dgm:cxn modelId="{07BE0AFF-3DBC-F748-BC81-CBF52A15325B}" type="presOf" srcId="{5B2B87B9-8C52-304A-BBFC-5403A1A18AEC}" destId="{A319BE0C-5E86-AF4C-8E5E-668BA6413358}" srcOrd="0" destOrd="0" presId="urn:microsoft.com/office/officeart/2005/8/layout/hierarchy2"/>
-    <dgm:cxn modelId="{85C1395D-F1EC-9449-A9A6-F2E666D1AB32}" srcId="{71775075-7418-2E4A-944C-9563C9578B15}" destId="{2D0DB0BF-5C85-5E43-B815-40AC67821A63}" srcOrd="0" destOrd="0" parTransId="{46934164-B4DD-CB46-A898-EFB4EAC94E0E}" sibTransId="{C359FAD4-0803-C14B-9CDB-5FDC0E0438D4}"/>
-    <dgm:cxn modelId="{CA228E1C-9D1F-B54F-B67A-BC6474F2A1BC}" type="presOf" srcId="{393C5542-BBDA-C747-BD5D-921B5D37A8F2}" destId="{3A834992-1DD8-F84B-84BB-8933D72BE894}" srcOrd="0" destOrd="0" presId="urn:microsoft.com/office/officeart/2005/8/layout/hierarchy2"/>
-    <dgm:cxn modelId="{7234211D-15E4-3B44-BBCC-99790CA676F1}" srcId="{2D0DB0BF-5C85-5E43-B815-40AC67821A63}" destId="{6E35712A-4EEA-E441-B139-388924F18F15}" srcOrd="1" destOrd="0" parTransId="{377C2846-802D-B74C-A46B-D37C45F48F42}" sibTransId="{26FA85C1-9E32-4847-ADDD-64672BD2180C}"/>
-    <dgm:cxn modelId="{64C7B035-60C4-9542-805E-BB93B2429705}" srcId="{2D0DB0BF-5C85-5E43-B815-40AC67821A63}" destId="{8D5B22D3-47E2-A644-907C-51C8935AAE0D}" srcOrd="0" destOrd="0" parTransId="{4B25EEF5-8086-2A41-B859-2E9692C266FB}" sibTransId="{A27B63D2-EA91-254F-9E4D-1E99891C3B75}"/>
-    <dgm:cxn modelId="{B60891EB-D281-FD44-B7DB-7E075F14F18E}" type="presOf" srcId="{46934164-B4DD-CB46-A898-EFB4EAC94E0E}" destId="{37B8E5F0-5E96-C547-88BA-A01171926770}" srcOrd="0" destOrd="0" presId="urn:microsoft.com/office/officeart/2005/8/layout/hierarchy2"/>
     <dgm:cxn modelId="{D465A987-EC28-9F4A-A595-BCBC1E350022}" type="presParOf" srcId="{D26C4686-39D5-4D48-A1DA-37C5FDAC39B7}" destId="{61D01C7B-41B9-3E4B-BE52-7551DFC4A7D1}" srcOrd="0" destOrd="0" presId="urn:microsoft.com/office/officeart/2005/8/layout/hierarchy2"/>
     <dgm:cxn modelId="{085B8DAB-BE59-6B42-A99C-B4A9FCA045BE}" type="presParOf" srcId="{61D01C7B-41B9-3E4B-BE52-7551DFC4A7D1}" destId="{51AC3011-EC30-CC4A-A487-C5612F186AED}" srcOrd="0" destOrd="0" presId="urn:microsoft.com/office/officeart/2005/8/layout/hierarchy2"/>
     <dgm:cxn modelId="{EBE298C0-AAFB-D046-A80E-AA4DA2EEC865}" type="presParOf" srcId="{61D01C7B-41B9-3E4B-BE52-7551DFC4A7D1}" destId="{3521BBEB-BF2E-FA40-84BF-800540394443}" srcOrd="1" destOrd="0" presId="urn:microsoft.com/office/officeart/2005/8/layout/hierarchy2"/>
@@ -13184,6 +13997,13 @@
         </dgm:presLayoutVars>
       </dgm:prSet>
       <dgm:spPr/>
+      <dgm:t>
+        <a:bodyPr/>
+        <a:lstStyle/>
+        <a:p>
+          <a:endParaRPr lang="zh-CN" altLang="en-US"/>
+        </a:p>
+      </dgm:t>
     </dgm:pt>
     <dgm:pt modelId="{535A662C-86C7-B948-91CC-FE87A843FEC9}" type="pres">
       <dgm:prSet presAssocID="{6800A699-DCE1-3B44-874F-C17DF6848369}" presName="hierFlow" presStyleCnt="0"/>
@@ -13210,6 +14030,13 @@
         </dgm:presLayoutVars>
       </dgm:prSet>
       <dgm:spPr/>
+      <dgm:t>
+        <a:bodyPr/>
+        <a:lstStyle/>
+        <a:p>
+          <a:endParaRPr lang="zh-CN" altLang="en-US"/>
+        </a:p>
+      </dgm:t>
     </dgm:pt>
     <dgm:pt modelId="{64CE8254-1F9A-7248-9BE4-60816166BEED}" type="pres">
       <dgm:prSet presAssocID="{DCCD8CD8-3DF9-C642-A6ED-B70A1E74EBDC}" presName="hierChild2" presStyleCnt="0"/>
@@ -13218,10 +14045,24 @@
     <dgm:pt modelId="{40F02C71-7B61-8F4F-9BBB-E00915FD6E0B}" type="pres">
       <dgm:prSet presAssocID="{7BDE26C6-5F98-B443-A453-2E768F1C8D42}" presName="Name25" presStyleLbl="parChTrans1D2" presStyleIdx="0" presStyleCnt="2"/>
       <dgm:spPr/>
+      <dgm:t>
+        <a:bodyPr/>
+        <a:lstStyle/>
+        <a:p>
+          <a:endParaRPr lang="zh-CN" altLang="en-US"/>
+        </a:p>
+      </dgm:t>
     </dgm:pt>
     <dgm:pt modelId="{3E36D84A-2637-4343-BF67-3EBDD039A54E}" type="pres">
       <dgm:prSet presAssocID="{7BDE26C6-5F98-B443-A453-2E768F1C8D42}" presName="connTx" presStyleLbl="parChTrans1D2" presStyleIdx="0" presStyleCnt="2"/>
       <dgm:spPr/>
+      <dgm:t>
+        <a:bodyPr/>
+        <a:lstStyle/>
+        <a:p>
+          <a:endParaRPr lang="zh-CN" altLang="en-US"/>
+        </a:p>
+      </dgm:t>
     </dgm:pt>
     <dgm:pt modelId="{F3C1AFA7-C7B1-D04D-A9F8-B530C85E05AD}" type="pres">
       <dgm:prSet presAssocID="{C520B502-CB52-F640-A3FD-59F5F0CA8EDF}" presName="Name30" presStyleCnt="0"/>
@@ -13230,6 +14071,13 @@
     <dgm:pt modelId="{24C263FC-23CD-C242-B4EB-69F3BB3C17EE}" type="pres">
       <dgm:prSet presAssocID="{C520B502-CB52-F640-A3FD-59F5F0CA8EDF}" presName="level2Shape" presStyleLbl="node2" presStyleIdx="0" presStyleCnt="2"/>
       <dgm:spPr/>
+      <dgm:t>
+        <a:bodyPr/>
+        <a:lstStyle/>
+        <a:p>
+          <a:endParaRPr lang="zh-CN" altLang="en-US"/>
+        </a:p>
+      </dgm:t>
     </dgm:pt>
     <dgm:pt modelId="{23836D12-5DAC-4345-92F1-4C7E9DCCF904}" type="pres">
       <dgm:prSet presAssocID="{C520B502-CB52-F640-A3FD-59F5F0CA8EDF}" presName="hierChild3" presStyleCnt="0"/>
@@ -13238,10 +14086,24 @@
     <dgm:pt modelId="{5DADBD4A-DD3B-6542-832F-9D302F581FD7}" type="pres">
       <dgm:prSet presAssocID="{3893C82C-B177-E944-AFD9-698ADE4389CF}" presName="Name25" presStyleLbl="parChTrans1D3" presStyleIdx="0" presStyleCnt="4"/>
       <dgm:spPr/>
+      <dgm:t>
+        <a:bodyPr/>
+        <a:lstStyle/>
+        <a:p>
+          <a:endParaRPr lang="zh-CN" altLang="en-US"/>
+        </a:p>
+      </dgm:t>
     </dgm:pt>
     <dgm:pt modelId="{42E8169B-6D34-5D47-BECA-69142AD00376}" type="pres">
       <dgm:prSet presAssocID="{3893C82C-B177-E944-AFD9-698ADE4389CF}" presName="connTx" presStyleLbl="parChTrans1D3" presStyleIdx="0" presStyleCnt="4"/>
       <dgm:spPr/>
+      <dgm:t>
+        <a:bodyPr/>
+        <a:lstStyle/>
+        <a:p>
+          <a:endParaRPr lang="zh-CN" altLang="en-US"/>
+        </a:p>
+      </dgm:t>
     </dgm:pt>
     <dgm:pt modelId="{4B59A4D9-C269-5D49-AB4A-4138A86123C7}" type="pres">
       <dgm:prSet presAssocID="{AA9B1289-7148-CB4C-BB5A-5D4A53B8B4FA}" presName="Name30" presStyleCnt="0"/>
@@ -13250,6 +14112,13 @@
     <dgm:pt modelId="{68A98931-F96B-2747-A15B-26774AD8BB05}" type="pres">
       <dgm:prSet presAssocID="{AA9B1289-7148-CB4C-BB5A-5D4A53B8B4FA}" presName="level2Shape" presStyleLbl="node3" presStyleIdx="0" presStyleCnt="4"/>
       <dgm:spPr/>
+      <dgm:t>
+        <a:bodyPr/>
+        <a:lstStyle/>
+        <a:p>
+          <a:endParaRPr lang="zh-CN" altLang="en-US"/>
+        </a:p>
+      </dgm:t>
     </dgm:pt>
     <dgm:pt modelId="{BBA82968-5C85-9142-AA44-40F7E7E0D8D0}" type="pres">
       <dgm:prSet presAssocID="{AA9B1289-7148-CB4C-BB5A-5D4A53B8B4FA}" presName="hierChild3" presStyleCnt="0"/>
@@ -13258,10 +14127,24 @@
     <dgm:pt modelId="{BEEC3E44-F2F9-8E48-92B5-4CC80DFCB5D2}" type="pres">
       <dgm:prSet presAssocID="{037093A0-D906-4E4E-87CA-B2A699DAEE96}" presName="Name25" presStyleLbl="parChTrans1D3" presStyleIdx="1" presStyleCnt="4"/>
       <dgm:spPr/>
+      <dgm:t>
+        <a:bodyPr/>
+        <a:lstStyle/>
+        <a:p>
+          <a:endParaRPr lang="zh-CN" altLang="en-US"/>
+        </a:p>
+      </dgm:t>
     </dgm:pt>
     <dgm:pt modelId="{AA108C37-06C8-7F4D-BD99-C1C5108D95C8}" type="pres">
       <dgm:prSet presAssocID="{037093A0-D906-4E4E-87CA-B2A699DAEE96}" presName="connTx" presStyleLbl="parChTrans1D3" presStyleIdx="1" presStyleCnt="4"/>
       <dgm:spPr/>
+      <dgm:t>
+        <a:bodyPr/>
+        <a:lstStyle/>
+        <a:p>
+          <a:endParaRPr lang="zh-CN" altLang="en-US"/>
+        </a:p>
+      </dgm:t>
     </dgm:pt>
     <dgm:pt modelId="{ECB0980D-DA79-ED45-B528-7E01B2AA351F}" type="pres">
       <dgm:prSet presAssocID="{36B9B34B-89BA-C24B-A4AC-17B9F6438FC4}" presName="Name30" presStyleCnt="0"/>
@@ -13270,6 +14153,13 @@
     <dgm:pt modelId="{7D26A7D6-3D8B-1843-9037-F8467D3BF730}" type="pres">
       <dgm:prSet presAssocID="{36B9B34B-89BA-C24B-A4AC-17B9F6438FC4}" presName="level2Shape" presStyleLbl="node3" presStyleIdx="1" presStyleCnt="4"/>
       <dgm:spPr/>
+      <dgm:t>
+        <a:bodyPr/>
+        <a:lstStyle/>
+        <a:p>
+          <a:endParaRPr lang="zh-CN" altLang="en-US"/>
+        </a:p>
+      </dgm:t>
     </dgm:pt>
     <dgm:pt modelId="{65B67E19-6719-9548-A4B4-3CAB49DB2162}" type="pres">
       <dgm:prSet presAssocID="{36B9B34B-89BA-C24B-A4AC-17B9F6438FC4}" presName="hierChild3" presStyleCnt="0"/>
@@ -13278,10 +14168,24 @@
     <dgm:pt modelId="{14CB21FA-A1BF-5F45-B9CE-725ED0EFE8A4}" type="pres">
       <dgm:prSet presAssocID="{3F3E2838-25DC-5A4F-8771-D28CBFB1E5E1}" presName="Name25" presStyleLbl="parChTrans1D3" presStyleIdx="2" presStyleCnt="4"/>
       <dgm:spPr/>
+      <dgm:t>
+        <a:bodyPr/>
+        <a:lstStyle/>
+        <a:p>
+          <a:endParaRPr lang="zh-CN" altLang="en-US"/>
+        </a:p>
+      </dgm:t>
     </dgm:pt>
     <dgm:pt modelId="{92801501-7C3B-014D-BBA0-C253BC7894F9}" type="pres">
       <dgm:prSet presAssocID="{3F3E2838-25DC-5A4F-8771-D28CBFB1E5E1}" presName="connTx" presStyleLbl="parChTrans1D3" presStyleIdx="2" presStyleCnt="4"/>
       <dgm:spPr/>
+      <dgm:t>
+        <a:bodyPr/>
+        <a:lstStyle/>
+        <a:p>
+          <a:endParaRPr lang="zh-CN" altLang="en-US"/>
+        </a:p>
+      </dgm:t>
     </dgm:pt>
     <dgm:pt modelId="{7F906CBF-4DC2-8D46-8917-8F0E3D54BFFE}" type="pres">
       <dgm:prSet presAssocID="{77D76BD8-A425-DD44-B524-2FC1FB880472}" presName="Name30" presStyleCnt="0"/>
@@ -13290,6 +14194,13 @@
     <dgm:pt modelId="{12C24F99-BD8D-0744-A94C-B73C10147F56}" type="pres">
       <dgm:prSet presAssocID="{77D76BD8-A425-DD44-B524-2FC1FB880472}" presName="level2Shape" presStyleLbl="node3" presStyleIdx="2" presStyleCnt="4"/>
       <dgm:spPr/>
+      <dgm:t>
+        <a:bodyPr/>
+        <a:lstStyle/>
+        <a:p>
+          <a:endParaRPr lang="zh-CN" altLang="en-US"/>
+        </a:p>
+      </dgm:t>
     </dgm:pt>
     <dgm:pt modelId="{23D2BBAC-F597-C54B-89BE-F6AFA0091BF5}" type="pres">
       <dgm:prSet presAssocID="{77D76BD8-A425-DD44-B524-2FC1FB880472}" presName="hierChild3" presStyleCnt="0"/>
@@ -13298,10 +14209,24 @@
     <dgm:pt modelId="{725F189A-BF36-A744-B044-14AB69504102}" type="pres">
       <dgm:prSet presAssocID="{AC092DBD-40CA-5742-B128-5DA0B18402BF}" presName="Name25" presStyleLbl="parChTrans1D2" presStyleIdx="1" presStyleCnt="2"/>
       <dgm:spPr/>
+      <dgm:t>
+        <a:bodyPr/>
+        <a:lstStyle/>
+        <a:p>
+          <a:endParaRPr lang="zh-CN" altLang="en-US"/>
+        </a:p>
+      </dgm:t>
     </dgm:pt>
     <dgm:pt modelId="{0EB00E1B-0156-B245-A3B6-454D2FE85965}" type="pres">
       <dgm:prSet presAssocID="{AC092DBD-40CA-5742-B128-5DA0B18402BF}" presName="connTx" presStyleLbl="parChTrans1D2" presStyleIdx="1" presStyleCnt="2"/>
       <dgm:spPr/>
+      <dgm:t>
+        <a:bodyPr/>
+        <a:lstStyle/>
+        <a:p>
+          <a:endParaRPr lang="zh-CN" altLang="en-US"/>
+        </a:p>
+      </dgm:t>
     </dgm:pt>
     <dgm:pt modelId="{A46138A3-0847-F648-9048-2210C49E85A6}" type="pres">
       <dgm:prSet presAssocID="{B227EC1E-DDDB-1A4E-89D9-FE1A7E386202}" presName="Name30" presStyleCnt="0"/>
@@ -13310,6 +14235,13 @@
     <dgm:pt modelId="{7D385236-82A9-0F4F-A93C-790825654655}" type="pres">
       <dgm:prSet presAssocID="{B227EC1E-DDDB-1A4E-89D9-FE1A7E386202}" presName="level2Shape" presStyleLbl="node2" presStyleIdx="1" presStyleCnt="2"/>
       <dgm:spPr/>
+      <dgm:t>
+        <a:bodyPr/>
+        <a:lstStyle/>
+        <a:p>
+          <a:endParaRPr lang="zh-CN" altLang="en-US"/>
+        </a:p>
+      </dgm:t>
     </dgm:pt>
     <dgm:pt modelId="{3DF0C138-EBE0-E446-AAEB-C0B2A88080AD}" type="pres">
       <dgm:prSet presAssocID="{B227EC1E-DDDB-1A4E-89D9-FE1A7E386202}" presName="hierChild3" presStyleCnt="0"/>
@@ -13318,10 +14250,24 @@
     <dgm:pt modelId="{6621DD07-9FC4-7C45-840E-B4505276A5D9}" type="pres">
       <dgm:prSet presAssocID="{1BBEC57A-C98B-F047-9A46-252F6225C361}" presName="Name25" presStyleLbl="parChTrans1D3" presStyleIdx="3" presStyleCnt="4"/>
       <dgm:spPr/>
+      <dgm:t>
+        <a:bodyPr/>
+        <a:lstStyle/>
+        <a:p>
+          <a:endParaRPr lang="zh-CN" altLang="en-US"/>
+        </a:p>
+      </dgm:t>
     </dgm:pt>
     <dgm:pt modelId="{76765B40-E81D-5C42-83C7-F2FF71AE21D4}" type="pres">
       <dgm:prSet presAssocID="{1BBEC57A-C98B-F047-9A46-252F6225C361}" presName="connTx" presStyleLbl="parChTrans1D3" presStyleIdx="3" presStyleCnt="4"/>
       <dgm:spPr/>
+      <dgm:t>
+        <a:bodyPr/>
+        <a:lstStyle/>
+        <a:p>
+          <a:endParaRPr lang="zh-CN" altLang="en-US"/>
+        </a:p>
+      </dgm:t>
     </dgm:pt>
     <dgm:pt modelId="{63A9B36D-1A63-034F-A820-CE2B9E02FBC4}" type="pres">
       <dgm:prSet presAssocID="{63A687AD-1D03-CF45-A584-1B1838AE87B4}" presName="Name30" presStyleCnt="0"/>
@@ -13330,6 +14276,13 @@
     <dgm:pt modelId="{E6EA4642-1C8A-7E4A-B140-F69B47B63283}" type="pres">
       <dgm:prSet presAssocID="{63A687AD-1D03-CF45-A584-1B1838AE87B4}" presName="level2Shape" presStyleLbl="node3" presStyleIdx="3" presStyleCnt="4"/>
       <dgm:spPr/>
+      <dgm:t>
+        <a:bodyPr/>
+        <a:lstStyle/>
+        <a:p>
+          <a:endParaRPr lang="zh-CN" altLang="en-US"/>
+        </a:p>
+      </dgm:t>
     </dgm:pt>
     <dgm:pt modelId="{63AD540C-D406-3142-9BD5-E8EEE3940DD5}" type="pres">
       <dgm:prSet presAssocID="{63A687AD-1D03-CF45-A584-1B1838AE87B4}" presName="hierChild3" presStyleCnt="0"/>
@@ -13342,32 +14295,32 @@
   </dgm:ptLst>
   <dgm:cxnLst>
     <dgm:cxn modelId="{EB979ED2-ED74-2846-960F-1D30E0D57A66}" type="presOf" srcId="{DCCD8CD8-3DF9-C642-A6ED-B70A1E74EBDC}" destId="{2729A8C7-4CF4-EA4B-9D8B-00348FEF8818}" srcOrd="0" destOrd="0" presId="urn:microsoft.com/office/officeart/2005/8/layout/hierarchy5"/>
+    <dgm:cxn modelId="{6ACA610A-6DAB-224F-9728-B2D45FB0C021}" type="presOf" srcId="{AA9B1289-7148-CB4C-BB5A-5D4A53B8B4FA}" destId="{68A98931-F96B-2747-A15B-26774AD8BB05}" srcOrd="0" destOrd="0" presId="urn:microsoft.com/office/officeart/2005/8/layout/hierarchy5"/>
+    <dgm:cxn modelId="{FBCC72AB-F414-584A-8F0B-1C379774D983}" type="presOf" srcId="{77D76BD8-A425-DD44-B524-2FC1FB880472}" destId="{12C24F99-BD8D-0744-A94C-B73C10147F56}" srcOrd="0" destOrd="0" presId="urn:microsoft.com/office/officeart/2005/8/layout/hierarchy5"/>
+    <dgm:cxn modelId="{79F92AEC-F501-8245-9E1C-C7E8E00586B7}" srcId="{DCCD8CD8-3DF9-C642-A6ED-B70A1E74EBDC}" destId="{B227EC1E-DDDB-1A4E-89D9-FE1A7E386202}" srcOrd="1" destOrd="0" parTransId="{AC092DBD-40CA-5742-B128-5DA0B18402BF}" sibTransId="{B6ADF4EA-7FB3-DE43-9340-085C141B3207}"/>
+    <dgm:cxn modelId="{428FDE36-CAC2-BA49-974D-E0CD9C5EBEC9}" type="presOf" srcId="{36B9B34B-89BA-C24B-A4AC-17B9F6438FC4}" destId="{7D26A7D6-3D8B-1843-9037-F8467D3BF730}" srcOrd="0" destOrd="0" presId="urn:microsoft.com/office/officeart/2005/8/layout/hierarchy5"/>
+    <dgm:cxn modelId="{54E2A432-A9F8-7447-8485-E893B0F7A151}" type="presOf" srcId="{63A687AD-1D03-CF45-A584-1B1838AE87B4}" destId="{E6EA4642-1C8A-7E4A-B140-F69B47B63283}" srcOrd="0" destOrd="0" presId="urn:microsoft.com/office/officeart/2005/8/layout/hierarchy5"/>
+    <dgm:cxn modelId="{DD4F7407-C8D8-6149-BBB1-41D4AF85064F}" type="presOf" srcId="{3893C82C-B177-E944-AFD9-698ADE4389CF}" destId="{42E8169B-6D34-5D47-BECA-69142AD00376}" srcOrd="1" destOrd="0" presId="urn:microsoft.com/office/officeart/2005/8/layout/hierarchy5"/>
+    <dgm:cxn modelId="{6401561D-3597-2D48-8137-9149E18CC156}" srcId="{B227EC1E-DDDB-1A4E-89D9-FE1A7E386202}" destId="{63A687AD-1D03-CF45-A584-1B1838AE87B4}" srcOrd="0" destOrd="0" parTransId="{1BBEC57A-C98B-F047-9A46-252F6225C361}" sibTransId="{1BA7F6B6-F20D-DB4A-8B49-B9EF38A45867}"/>
+    <dgm:cxn modelId="{88A7D742-B360-D84A-B0A4-143662C6C295}" srcId="{6800A699-DCE1-3B44-874F-C17DF6848369}" destId="{DCCD8CD8-3DF9-C642-A6ED-B70A1E74EBDC}" srcOrd="0" destOrd="0" parTransId="{89B52898-DDEE-5441-A5E7-F7E5D9EF3BA4}" sibTransId="{A63B5266-9559-BC43-BF22-BB342514CCF8}"/>
+    <dgm:cxn modelId="{6D044A5D-AA07-7644-A538-07187FD460B3}" type="presOf" srcId="{037093A0-D906-4E4E-87CA-B2A699DAEE96}" destId="{AA108C37-06C8-7F4D-BD99-C1C5108D95C8}" srcOrd="1" destOrd="0" presId="urn:microsoft.com/office/officeart/2005/8/layout/hierarchy5"/>
+    <dgm:cxn modelId="{7AB5CD87-C0F0-E041-BFEB-B0D699BFEEE0}" type="presOf" srcId="{AC092DBD-40CA-5742-B128-5DA0B18402BF}" destId="{0EB00E1B-0156-B245-A3B6-454D2FE85965}" srcOrd="1" destOrd="0" presId="urn:microsoft.com/office/officeart/2005/8/layout/hierarchy5"/>
+    <dgm:cxn modelId="{D8089DB2-9F27-CA47-8F6B-36C51E246D8F}" type="presOf" srcId="{1BBEC57A-C98B-F047-9A46-252F6225C361}" destId="{6621DD07-9FC4-7C45-840E-B4505276A5D9}" srcOrd="0" destOrd="0" presId="urn:microsoft.com/office/officeart/2005/8/layout/hierarchy5"/>
+    <dgm:cxn modelId="{2FA762B7-29F8-EE4D-89FC-9D3FC5504DA8}" type="presOf" srcId="{AC092DBD-40CA-5742-B128-5DA0B18402BF}" destId="{725F189A-BF36-A744-B044-14AB69504102}" srcOrd="0" destOrd="0" presId="urn:microsoft.com/office/officeart/2005/8/layout/hierarchy5"/>
+    <dgm:cxn modelId="{A51549B4-D81F-944A-B1BB-29D4731FBEA6}" type="presOf" srcId="{3F3E2838-25DC-5A4F-8771-D28CBFB1E5E1}" destId="{14CB21FA-A1BF-5F45-B9CE-725ED0EFE8A4}" srcOrd="0" destOrd="0" presId="urn:microsoft.com/office/officeart/2005/8/layout/hierarchy5"/>
     <dgm:cxn modelId="{B7520A1D-CDDF-8943-80C9-E8CDBB500BC0}" type="presOf" srcId="{C520B502-CB52-F640-A3FD-59F5F0CA8EDF}" destId="{24C263FC-23CD-C242-B4EB-69F3BB3C17EE}" srcOrd="0" destOrd="0" presId="urn:microsoft.com/office/officeart/2005/8/layout/hierarchy5"/>
+    <dgm:cxn modelId="{6581A0BA-FECA-094E-97CD-5B3C35AD22D1}" type="presOf" srcId="{3893C82C-B177-E944-AFD9-698ADE4389CF}" destId="{5DADBD4A-DD3B-6542-832F-9D302F581FD7}" srcOrd="0" destOrd="0" presId="urn:microsoft.com/office/officeart/2005/8/layout/hierarchy5"/>
+    <dgm:cxn modelId="{F6A82094-0161-AA43-A4EE-6DF7BA605B48}" type="presOf" srcId="{B227EC1E-DDDB-1A4E-89D9-FE1A7E386202}" destId="{7D385236-82A9-0F4F-A93C-790825654655}" srcOrd="0" destOrd="0" presId="urn:microsoft.com/office/officeart/2005/8/layout/hierarchy5"/>
+    <dgm:cxn modelId="{C2E54195-C292-0F42-BFE7-CFA9E92790BE}" srcId="{C520B502-CB52-F640-A3FD-59F5F0CA8EDF}" destId="{AA9B1289-7148-CB4C-BB5A-5D4A53B8B4FA}" srcOrd="0" destOrd="0" parTransId="{3893C82C-B177-E944-AFD9-698ADE4389CF}" sibTransId="{D6B5E115-A228-D840-9685-928ABECC3FD6}"/>
+    <dgm:cxn modelId="{31209783-565B-E14B-9B26-A912A1693717}" type="presOf" srcId="{6800A699-DCE1-3B44-874F-C17DF6848369}" destId="{2A3225D2-BC7A-0549-A4FD-1D75CD63F562}" srcOrd="0" destOrd="0" presId="urn:microsoft.com/office/officeart/2005/8/layout/hierarchy5"/>
+    <dgm:cxn modelId="{D366431F-7993-D54C-8A16-4291F4084E9F}" srcId="{C520B502-CB52-F640-A3FD-59F5F0CA8EDF}" destId="{77D76BD8-A425-DD44-B524-2FC1FB880472}" srcOrd="2" destOrd="0" parTransId="{3F3E2838-25DC-5A4F-8771-D28CBFB1E5E1}" sibTransId="{CC59B743-9F6D-AF43-B84E-345EB2EFA412}"/>
+    <dgm:cxn modelId="{9C4A4FA4-6D7A-174F-8370-B6723A7AE539}" type="presOf" srcId="{7BDE26C6-5F98-B443-A453-2E768F1C8D42}" destId="{3E36D84A-2637-4343-BF67-3EBDD039A54E}" srcOrd="1" destOrd="0" presId="urn:microsoft.com/office/officeart/2005/8/layout/hierarchy5"/>
+    <dgm:cxn modelId="{9B4ADB18-0E7B-4147-A036-1006B8783F09}" type="presOf" srcId="{7BDE26C6-5F98-B443-A453-2E768F1C8D42}" destId="{40F02C71-7B61-8F4F-9BBB-E00915FD6E0B}" srcOrd="0" destOrd="0" presId="urn:microsoft.com/office/officeart/2005/8/layout/hierarchy5"/>
+    <dgm:cxn modelId="{FF1267EE-0D09-6643-8B44-C1C3D15F5815}" type="presOf" srcId="{037093A0-D906-4E4E-87CA-B2A699DAEE96}" destId="{BEEC3E44-F2F9-8E48-92B5-4CC80DFCB5D2}" srcOrd="0" destOrd="0" presId="urn:microsoft.com/office/officeart/2005/8/layout/hierarchy5"/>
+    <dgm:cxn modelId="{6F4B50B4-361B-9441-A857-D22B307456BC}" type="presOf" srcId="{3F3E2838-25DC-5A4F-8771-D28CBFB1E5E1}" destId="{92801501-7C3B-014D-BBA0-C253BC7894F9}" srcOrd="1" destOrd="0" presId="urn:microsoft.com/office/officeart/2005/8/layout/hierarchy5"/>
     <dgm:cxn modelId="{1995EC9B-4B5D-2E47-94A8-01B56A350108}" srcId="{DCCD8CD8-3DF9-C642-A6ED-B70A1E74EBDC}" destId="{C520B502-CB52-F640-A3FD-59F5F0CA8EDF}" srcOrd="0" destOrd="0" parTransId="{7BDE26C6-5F98-B443-A453-2E768F1C8D42}" sibTransId="{EFAC490C-E3A5-D248-B71B-6C0D2540029D}"/>
-    <dgm:cxn modelId="{D366431F-7993-D54C-8A16-4291F4084E9F}" srcId="{C520B502-CB52-F640-A3FD-59F5F0CA8EDF}" destId="{77D76BD8-A425-DD44-B524-2FC1FB880472}" srcOrd="2" destOrd="0" parTransId="{3F3E2838-25DC-5A4F-8771-D28CBFB1E5E1}" sibTransId="{CC59B743-9F6D-AF43-B84E-345EB2EFA412}"/>
-    <dgm:cxn modelId="{D8089DB2-9F27-CA47-8F6B-36C51E246D8F}" type="presOf" srcId="{1BBEC57A-C98B-F047-9A46-252F6225C361}" destId="{6621DD07-9FC4-7C45-840E-B4505276A5D9}" srcOrd="0" destOrd="0" presId="urn:microsoft.com/office/officeart/2005/8/layout/hierarchy5"/>
-    <dgm:cxn modelId="{FBCC72AB-F414-584A-8F0B-1C379774D983}" type="presOf" srcId="{77D76BD8-A425-DD44-B524-2FC1FB880472}" destId="{12C24F99-BD8D-0744-A94C-B73C10147F56}" srcOrd="0" destOrd="0" presId="urn:microsoft.com/office/officeart/2005/8/layout/hierarchy5"/>
+    <dgm:cxn modelId="{766E945C-7ECC-4840-AA4A-ECE96A64B5CF}" srcId="{C520B502-CB52-F640-A3FD-59F5F0CA8EDF}" destId="{36B9B34B-89BA-C24B-A4AC-17B9F6438FC4}" srcOrd="1" destOrd="0" parTransId="{037093A0-D906-4E4E-87CA-B2A699DAEE96}" sibTransId="{F49944C2-AFD1-2648-BE48-A03897BD600F}"/>
     <dgm:cxn modelId="{D452E90F-62B4-6C47-951B-667D52F1A8CC}" type="presOf" srcId="{1BBEC57A-C98B-F047-9A46-252F6225C361}" destId="{76765B40-E81D-5C42-83C7-F2FF71AE21D4}" srcOrd="1" destOrd="0" presId="urn:microsoft.com/office/officeart/2005/8/layout/hierarchy5"/>
-    <dgm:cxn modelId="{6581A0BA-FECA-094E-97CD-5B3C35AD22D1}" type="presOf" srcId="{3893C82C-B177-E944-AFD9-698ADE4389CF}" destId="{5DADBD4A-DD3B-6542-832F-9D302F581FD7}" srcOrd="0" destOrd="0" presId="urn:microsoft.com/office/officeart/2005/8/layout/hierarchy5"/>
-    <dgm:cxn modelId="{79F92AEC-F501-8245-9E1C-C7E8E00586B7}" srcId="{DCCD8CD8-3DF9-C642-A6ED-B70A1E74EBDC}" destId="{B227EC1E-DDDB-1A4E-89D9-FE1A7E386202}" srcOrd="1" destOrd="0" parTransId="{AC092DBD-40CA-5742-B128-5DA0B18402BF}" sibTransId="{B6ADF4EA-7FB3-DE43-9340-085C141B3207}"/>
-    <dgm:cxn modelId="{7AB5CD87-C0F0-E041-BFEB-B0D699BFEEE0}" type="presOf" srcId="{AC092DBD-40CA-5742-B128-5DA0B18402BF}" destId="{0EB00E1B-0156-B245-A3B6-454D2FE85965}" srcOrd="1" destOrd="0" presId="urn:microsoft.com/office/officeart/2005/8/layout/hierarchy5"/>
-    <dgm:cxn modelId="{766E945C-7ECC-4840-AA4A-ECE96A64B5CF}" srcId="{C520B502-CB52-F640-A3FD-59F5F0CA8EDF}" destId="{36B9B34B-89BA-C24B-A4AC-17B9F6438FC4}" srcOrd="1" destOrd="0" parTransId="{037093A0-D906-4E4E-87CA-B2A699DAEE96}" sibTransId="{F49944C2-AFD1-2648-BE48-A03897BD600F}"/>
-    <dgm:cxn modelId="{31209783-565B-E14B-9B26-A912A1693717}" type="presOf" srcId="{6800A699-DCE1-3B44-874F-C17DF6848369}" destId="{2A3225D2-BC7A-0549-A4FD-1D75CD63F562}" srcOrd="0" destOrd="0" presId="urn:microsoft.com/office/officeart/2005/8/layout/hierarchy5"/>
-    <dgm:cxn modelId="{A51549B4-D81F-944A-B1BB-29D4731FBEA6}" type="presOf" srcId="{3F3E2838-25DC-5A4F-8771-D28CBFB1E5E1}" destId="{14CB21FA-A1BF-5F45-B9CE-725ED0EFE8A4}" srcOrd="0" destOrd="0" presId="urn:microsoft.com/office/officeart/2005/8/layout/hierarchy5"/>
-    <dgm:cxn modelId="{88A7D742-B360-D84A-B0A4-143662C6C295}" srcId="{6800A699-DCE1-3B44-874F-C17DF6848369}" destId="{DCCD8CD8-3DF9-C642-A6ED-B70A1E74EBDC}" srcOrd="0" destOrd="0" parTransId="{89B52898-DDEE-5441-A5E7-F7E5D9EF3BA4}" sibTransId="{A63B5266-9559-BC43-BF22-BB342514CCF8}"/>
-    <dgm:cxn modelId="{6F4B50B4-361B-9441-A857-D22B307456BC}" type="presOf" srcId="{3F3E2838-25DC-5A4F-8771-D28CBFB1E5E1}" destId="{92801501-7C3B-014D-BBA0-C253BC7894F9}" srcOrd="1" destOrd="0" presId="urn:microsoft.com/office/officeart/2005/8/layout/hierarchy5"/>
-    <dgm:cxn modelId="{9C4A4FA4-6D7A-174F-8370-B6723A7AE539}" type="presOf" srcId="{7BDE26C6-5F98-B443-A453-2E768F1C8D42}" destId="{3E36D84A-2637-4343-BF67-3EBDD039A54E}" srcOrd="1" destOrd="0" presId="urn:microsoft.com/office/officeart/2005/8/layout/hierarchy5"/>
-    <dgm:cxn modelId="{C2E54195-C292-0F42-BFE7-CFA9E92790BE}" srcId="{C520B502-CB52-F640-A3FD-59F5F0CA8EDF}" destId="{AA9B1289-7148-CB4C-BB5A-5D4A53B8B4FA}" srcOrd="0" destOrd="0" parTransId="{3893C82C-B177-E944-AFD9-698ADE4389CF}" sibTransId="{D6B5E115-A228-D840-9685-928ABECC3FD6}"/>
-    <dgm:cxn modelId="{9B4ADB18-0E7B-4147-A036-1006B8783F09}" type="presOf" srcId="{7BDE26C6-5F98-B443-A453-2E768F1C8D42}" destId="{40F02C71-7B61-8F4F-9BBB-E00915FD6E0B}" srcOrd="0" destOrd="0" presId="urn:microsoft.com/office/officeart/2005/8/layout/hierarchy5"/>
-    <dgm:cxn modelId="{F6A82094-0161-AA43-A4EE-6DF7BA605B48}" type="presOf" srcId="{B227EC1E-DDDB-1A4E-89D9-FE1A7E386202}" destId="{7D385236-82A9-0F4F-A93C-790825654655}" srcOrd="0" destOrd="0" presId="urn:microsoft.com/office/officeart/2005/8/layout/hierarchy5"/>
-    <dgm:cxn modelId="{2FA762B7-29F8-EE4D-89FC-9D3FC5504DA8}" type="presOf" srcId="{AC092DBD-40CA-5742-B128-5DA0B18402BF}" destId="{725F189A-BF36-A744-B044-14AB69504102}" srcOrd="0" destOrd="0" presId="urn:microsoft.com/office/officeart/2005/8/layout/hierarchy5"/>
-    <dgm:cxn modelId="{6ACA610A-6DAB-224F-9728-B2D45FB0C021}" type="presOf" srcId="{AA9B1289-7148-CB4C-BB5A-5D4A53B8B4FA}" destId="{68A98931-F96B-2747-A15B-26774AD8BB05}" srcOrd="0" destOrd="0" presId="urn:microsoft.com/office/officeart/2005/8/layout/hierarchy5"/>
-    <dgm:cxn modelId="{DD4F7407-C8D8-6149-BBB1-41D4AF85064F}" type="presOf" srcId="{3893C82C-B177-E944-AFD9-698ADE4389CF}" destId="{42E8169B-6D34-5D47-BECA-69142AD00376}" srcOrd="1" destOrd="0" presId="urn:microsoft.com/office/officeart/2005/8/layout/hierarchy5"/>
-    <dgm:cxn modelId="{428FDE36-CAC2-BA49-974D-E0CD9C5EBEC9}" type="presOf" srcId="{36B9B34B-89BA-C24B-A4AC-17B9F6438FC4}" destId="{7D26A7D6-3D8B-1843-9037-F8467D3BF730}" srcOrd="0" destOrd="0" presId="urn:microsoft.com/office/officeart/2005/8/layout/hierarchy5"/>
-    <dgm:cxn modelId="{FF1267EE-0D09-6643-8B44-C1C3D15F5815}" type="presOf" srcId="{037093A0-D906-4E4E-87CA-B2A699DAEE96}" destId="{BEEC3E44-F2F9-8E48-92B5-4CC80DFCB5D2}" srcOrd="0" destOrd="0" presId="urn:microsoft.com/office/officeart/2005/8/layout/hierarchy5"/>
-    <dgm:cxn modelId="{6401561D-3597-2D48-8137-9149E18CC156}" srcId="{B227EC1E-DDDB-1A4E-89D9-FE1A7E386202}" destId="{63A687AD-1D03-CF45-A584-1B1838AE87B4}" srcOrd="0" destOrd="0" parTransId="{1BBEC57A-C98B-F047-9A46-252F6225C361}" sibTransId="{1BA7F6B6-F20D-DB4A-8B49-B9EF38A45867}"/>
-    <dgm:cxn modelId="{54E2A432-A9F8-7447-8485-E893B0F7A151}" type="presOf" srcId="{63A687AD-1D03-CF45-A584-1B1838AE87B4}" destId="{E6EA4642-1C8A-7E4A-B140-F69B47B63283}" srcOrd="0" destOrd="0" presId="urn:microsoft.com/office/officeart/2005/8/layout/hierarchy5"/>
-    <dgm:cxn modelId="{6D044A5D-AA07-7644-A538-07187FD460B3}" type="presOf" srcId="{037093A0-D906-4E4E-87CA-B2A699DAEE96}" destId="{AA108C37-06C8-7F4D-BD99-C1C5108D95C8}" srcOrd="1" destOrd="0" presId="urn:microsoft.com/office/officeart/2005/8/layout/hierarchy5"/>
     <dgm:cxn modelId="{AC5605A1-08AB-174A-B519-82B491F8CD25}" type="presParOf" srcId="{2A3225D2-BC7A-0549-A4FD-1D75CD63F562}" destId="{535A662C-86C7-B948-91CC-FE87A843FEC9}" srcOrd="0" destOrd="0" presId="urn:microsoft.com/office/officeart/2005/8/layout/hierarchy5"/>
     <dgm:cxn modelId="{BDF790FC-F254-1841-8E19-C28B6F2FB06C}" type="presParOf" srcId="{535A662C-86C7-B948-91CC-FE87A843FEC9}" destId="{1E89395C-15B6-F141-9BC5-72A1C0724425}" srcOrd="0" destOrd="0" presId="urn:microsoft.com/office/officeart/2005/8/layout/hierarchy5"/>
     <dgm:cxn modelId="{0D3DB674-FC9A-1446-97A9-EB16FEA9CFA0}" type="presParOf" srcId="{1E89395C-15B6-F141-9BC5-72A1C0724425}" destId="{50D64DEF-B2D3-BB4D-AC43-7483C35D06FD}" srcOrd="0" destOrd="0" presId="urn:microsoft.com/office/officeart/2005/8/layout/hierarchy5"/>
@@ -13668,6 +14621,13 @@
         </dgm:presLayoutVars>
       </dgm:prSet>
       <dgm:spPr/>
+      <dgm:t>
+        <a:bodyPr/>
+        <a:lstStyle/>
+        <a:p>
+          <a:endParaRPr lang="zh-CN" altLang="en-US"/>
+        </a:p>
+      </dgm:t>
     </dgm:pt>
     <dgm:pt modelId="{9B22D4E5-D17A-A443-A920-E8B3F80BEB29}" type="pres">
       <dgm:prSet presAssocID="{F899A038-786A-784D-9A8C-B47762961A91}" presName="root1" presStyleCnt="0"/>
@@ -13680,6 +14640,13 @@
         </dgm:presLayoutVars>
       </dgm:prSet>
       <dgm:spPr/>
+      <dgm:t>
+        <a:bodyPr/>
+        <a:lstStyle/>
+        <a:p>
+          <a:endParaRPr lang="zh-CN" altLang="en-US"/>
+        </a:p>
+      </dgm:t>
     </dgm:pt>
     <dgm:pt modelId="{5490504E-0696-B04E-9CA9-28F9B80F5FD0}" type="pres">
       <dgm:prSet presAssocID="{F899A038-786A-784D-9A8C-B47762961A91}" presName="level2hierChild" presStyleCnt="0"/>
@@ -13696,6 +14663,13 @@
         </dgm:presLayoutVars>
       </dgm:prSet>
       <dgm:spPr/>
+      <dgm:t>
+        <a:bodyPr/>
+        <a:lstStyle/>
+        <a:p>
+          <a:endParaRPr lang="zh-CN" altLang="en-US"/>
+        </a:p>
+      </dgm:t>
     </dgm:pt>
     <dgm:pt modelId="{6125A18E-A0A1-7244-897F-C160DD05E73D}" type="pres">
       <dgm:prSet presAssocID="{D6A1508E-52FA-A84E-A916-36C7B4ABAB5A}" presName="level2hierChild" presStyleCnt="0"/>
@@ -13704,10 +14678,24 @@
     <dgm:pt modelId="{61E907D5-8433-C747-976B-069DC4B05C94}" type="pres">
       <dgm:prSet presAssocID="{078DF73A-6E91-184E-9A3B-FE14E4A96140}" presName="conn2-1" presStyleLbl="parChTrans1D2" presStyleIdx="0" presStyleCnt="3"/>
       <dgm:spPr/>
+      <dgm:t>
+        <a:bodyPr/>
+        <a:lstStyle/>
+        <a:p>
+          <a:endParaRPr lang="zh-CN" altLang="en-US"/>
+        </a:p>
+      </dgm:t>
     </dgm:pt>
     <dgm:pt modelId="{1A285AF5-0D64-FB4D-9777-7197D3E3D9FA}" type="pres">
       <dgm:prSet presAssocID="{078DF73A-6E91-184E-9A3B-FE14E4A96140}" presName="connTx" presStyleLbl="parChTrans1D2" presStyleIdx="0" presStyleCnt="3"/>
       <dgm:spPr/>
+      <dgm:t>
+        <a:bodyPr/>
+        <a:lstStyle/>
+        <a:p>
+          <a:endParaRPr lang="zh-CN" altLang="en-US"/>
+        </a:p>
+      </dgm:t>
     </dgm:pt>
     <dgm:pt modelId="{CF38D559-EB24-9642-8206-C0D93786E71B}" type="pres">
       <dgm:prSet presAssocID="{5ABDD403-161B-8640-B1CF-6605A3006C5D}" presName="root2" presStyleCnt="0"/>
@@ -13720,6 +14708,13 @@
         </dgm:presLayoutVars>
       </dgm:prSet>
       <dgm:spPr/>
+      <dgm:t>
+        <a:bodyPr/>
+        <a:lstStyle/>
+        <a:p>
+          <a:endParaRPr lang="zh-CN" altLang="en-US"/>
+        </a:p>
+      </dgm:t>
     </dgm:pt>
     <dgm:pt modelId="{5D0F293E-8AA4-EF4C-98D8-B538F6F32D23}" type="pres">
       <dgm:prSet presAssocID="{5ABDD403-161B-8640-B1CF-6605A3006C5D}" presName="level3hierChild" presStyleCnt="0"/>
@@ -13728,10 +14723,24 @@
     <dgm:pt modelId="{4884089E-7BBD-F14E-9C12-BFC9A3509AB2}" type="pres">
       <dgm:prSet presAssocID="{740AFF0B-EC80-CC40-B941-A6CC6B13EE95}" presName="conn2-1" presStyleLbl="parChTrans1D2" presStyleIdx="1" presStyleCnt="3"/>
       <dgm:spPr/>
+      <dgm:t>
+        <a:bodyPr/>
+        <a:lstStyle/>
+        <a:p>
+          <a:endParaRPr lang="zh-CN" altLang="en-US"/>
+        </a:p>
+      </dgm:t>
     </dgm:pt>
     <dgm:pt modelId="{23BDE8D7-EE65-874A-9F0D-58FB08825523}" type="pres">
       <dgm:prSet presAssocID="{740AFF0B-EC80-CC40-B941-A6CC6B13EE95}" presName="connTx" presStyleLbl="parChTrans1D2" presStyleIdx="1" presStyleCnt="3"/>
       <dgm:spPr/>
+      <dgm:t>
+        <a:bodyPr/>
+        <a:lstStyle/>
+        <a:p>
+          <a:endParaRPr lang="zh-CN" altLang="en-US"/>
+        </a:p>
+      </dgm:t>
     </dgm:pt>
     <dgm:pt modelId="{DDADDDE0-1978-8B4F-A193-5A1DD3B6E9BA}" type="pres">
       <dgm:prSet presAssocID="{E495F1EB-C305-5645-B0F2-C9916CC757F8}" presName="root2" presStyleCnt="0"/>
@@ -13744,6 +14753,13 @@
         </dgm:presLayoutVars>
       </dgm:prSet>
       <dgm:spPr/>
+      <dgm:t>
+        <a:bodyPr/>
+        <a:lstStyle/>
+        <a:p>
+          <a:endParaRPr lang="zh-CN" altLang="en-US"/>
+        </a:p>
+      </dgm:t>
     </dgm:pt>
     <dgm:pt modelId="{E85DE0C4-F67E-6C43-9C11-C26B87C0F358}" type="pres">
       <dgm:prSet presAssocID="{E495F1EB-C305-5645-B0F2-C9916CC757F8}" presName="level3hierChild" presStyleCnt="0"/>
@@ -13752,10 +14768,24 @@
     <dgm:pt modelId="{73CB9601-7286-304F-80DF-C32285B49C3C}" type="pres">
       <dgm:prSet presAssocID="{16B6C04A-91AD-E44B-BF78-5749F9CDFF90}" presName="conn2-1" presStyleLbl="parChTrans1D2" presStyleIdx="2" presStyleCnt="3"/>
       <dgm:spPr/>
+      <dgm:t>
+        <a:bodyPr/>
+        <a:lstStyle/>
+        <a:p>
+          <a:endParaRPr lang="zh-CN" altLang="en-US"/>
+        </a:p>
+      </dgm:t>
     </dgm:pt>
     <dgm:pt modelId="{E1D27F69-9EE3-7243-B285-7475FFED6CB1}" type="pres">
       <dgm:prSet presAssocID="{16B6C04A-91AD-E44B-BF78-5749F9CDFF90}" presName="connTx" presStyleLbl="parChTrans1D2" presStyleIdx="2" presStyleCnt="3"/>
       <dgm:spPr/>
+      <dgm:t>
+        <a:bodyPr/>
+        <a:lstStyle/>
+        <a:p>
+          <a:endParaRPr lang="zh-CN" altLang="en-US"/>
+        </a:p>
+      </dgm:t>
     </dgm:pt>
     <dgm:pt modelId="{AD2AB2D2-A59B-204E-957D-08EA6D2F1BE3}" type="pres">
       <dgm:prSet presAssocID="{97CFABC9-3DEE-2B45-87A4-AA2688D254C9}" presName="root2" presStyleCnt="0"/>
@@ -13768,6 +14798,13 @@
         </dgm:presLayoutVars>
       </dgm:prSet>
       <dgm:spPr/>
+      <dgm:t>
+        <a:bodyPr/>
+        <a:lstStyle/>
+        <a:p>
+          <a:endParaRPr lang="zh-CN" altLang="en-US"/>
+        </a:p>
+      </dgm:t>
     </dgm:pt>
     <dgm:pt modelId="{5B362613-5688-2C40-8CB5-61590E219574}" type="pres">
       <dgm:prSet presAssocID="{97CFABC9-3DEE-2B45-87A4-AA2688D254C9}" presName="level3hierChild" presStyleCnt="0"/>
@@ -13784,6 +14821,13 @@
         </dgm:presLayoutVars>
       </dgm:prSet>
       <dgm:spPr/>
+      <dgm:t>
+        <a:bodyPr/>
+        <a:lstStyle/>
+        <a:p>
+          <a:endParaRPr lang="zh-CN" altLang="en-US"/>
+        </a:p>
+      </dgm:t>
     </dgm:pt>
     <dgm:pt modelId="{04E235CC-3718-1D41-BFFB-B5FDF3C78260}" type="pres">
       <dgm:prSet presAssocID="{153343C3-DFBE-B541-896C-FA581620A6FE}" presName="level2hierChild" presStyleCnt="0"/>
@@ -13791,25 +14835,25 @@
     </dgm:pt>
   </dgm:ptLst>
   <dgm:cxnLst>
+    <dgm:cxn modelId="{0D0384AA-8C8B-7E45-90B7-EC72CE1CB05F}" type="presOf" srcId="{F899A038-786A-784D-9A8C-B47762961A91}" destId="{906046FA-3FE7-9F40-8473-B5EFA12CD731}" srcOrd="0" destOrd="0" presId="urn:microsoft.com/office/officeart/2005/8/layout/hierarchy2"/>
+    <dgm:cxn modelId="{700D39FE-FBE4-4445-8FB2-577B2FD2B156}" srcId="{D6A1508E-52FA-A84E-A916-36C7B4ABAB5A}" destId="{97CFABC9-3DEE-2B45-87A4-AA2688D254C9}" srcOrd="2" destOrd="0" parTransId="{16B6C04A-91AD-E44B-BF78-5749F9CDFF90}" sibTransId="{70EE7427-04C7-F34F-8676-9DFBAD02B047}"/>
+    <dgm:cxn modelId="{7821BDE9-9C89-1940-AAE5-535E59A3F205}" type="presOf" srcId="{078DF73A-6E91-184E-9A3B-FE14E4A96140}" destId="{61E907D5-8433-C747-976B-069DC4B05C94}" srcOrd="0" destOrd="0" presId="urn:microsoft.com/office/officeart/2005/8/layout/hierarchy2"/>
+    <dgm:cxn modelId="{BE91294A-B5BD-0A45-B14E-D2B915051EAC}" type="presOf" srcId="{740AFF0B-EC80-CC40-B941-A6CC6B13EE95}" destId="{4884089E-7BBD-F14E-9C12-BFC9A3509AB2}" srcOrd="0" destOrd="0" presId="urn:microsoft.com/office/officeart/2005/8/layout/hierarchy2"/>
+    <dgm:cxn modelId="{597421C0-E793-8549-AA05-6BC42F54B1BB}" type="presOf" srcId="{D6A1508E-52FA-A84E-A916-36C7B4ABAB5A}" destId="{25171AA9-2D8B-954B-B3E0-CF47A9915795}" srcOrd="0" destOrd="0" presId="urn:microsoft.com/office/officeart/2005/8/layout/hierarchy2"/>
+    <dgm:cxn modelId="{653A6200-60D2-D84B-B918-1FD8CD99B551}" srcId="{E2DC3092-C700-EF47-AD26-A101D38AAF19}" destId="{D6A1508E-52FA-A84E-A916-36C7B4ABAB5A}" srcOrd="1" destOrd="0" parTransId="{7D32317F-CBD4-494E-83D3-ECC252474CFC}" sibTransId="{F789145C-A02D-D444-9CEB-938DAB543CCD}"/>
+    <dgm:cxn modelId="{0F0E7A73-3946-D448-BE49-9CEAE225C3E6}" type="presOf" srcId="{16B6C04A-91AD-E44B-BF78-5749F9CDFF90}" destId="{73CB9601-7286-304F-80DF-C32285B49C3C}" srcOrd="0" destOrd="0" presId="urn:microsoft.com/office/officeart/2005/8/layout/hierarchy2"/>
+    <dgm:cxn modelId="{9B6C43B9-2D08-4C45-B168-E3CAEBDF0EA3}" srcId="{D6A1508E-52FA-A84E-A916-36C7B4ABAB5A}" destId="{E495F1EB-C305-5645-B0F2-C9916CC757F8}" srcOrd="1" destOrd="0" parTransId="{740AFF0B-EC80-CC40-B941-A6CC6B13EE95}" sibTransId="{C2EE31E0-582E-1F4F-9CDC-92EB589A12F4}"/>
+    <dgm:cxn modelId="{FAA9E1C6-3B6B-9647-B7DA-F29E345DBC64}" type="presOf" srcId="{E2DC3092-C700-EF47-AD26-A101D38AAF19}" destId="{3C95B2C2-12D4-2C40-94DC-432EF193847E}" srcOrd="0" destOrd="0" presId="urn:microsoft.com/office/officeart/2005/8/layout/hierarchy2"/>
+    <dgm:cxn modelId="{B28C7FA0-B021-9A43-AC04-41012DBA2681}" type="presOf" srcId="{16B6C04A-91AD-E44B-BF78-5749F9CDFF90}" destId="{E1D27F69-9EE3-7243-B285-7475FFED6CB1}" srcOrd="1" destOrd="0" presId="urn:microsoft.com/office/officeart/2005/8/layout/hierarchy2"/>
+    <dgm:cxn modelId="{6C2F9006-491E-3542-9208-F3EEE81B639C}" type="presOf" srcId="{740AFF0B-EC80-CC40-B941-A6CC6B13EE95}" destId="{23BDE8D7-EE65-874A-9F0D-58FB08825523}" srcOrd="1" destOrd="0" presId="urn:microsoft.com/office/officeart/2005/8/layout/hierarchy2"/>
     <dgm:cxn modelId="{FB981903-EC33-7541-A8FB-C3EB3568FD04}" srcId="{D6A1508E-52FA-A84E-A916-36C7B4ABAB5A}" destId="{5ABDD403-161B-8640-B1CF-6605A3006C5D}" srcOrd="0" destOrd="0" parTransId="{078DF73A-6E91-184E-9A3B-FE14E4A96140}" sibTransId="{9E688524-D46F-E341-A6E7-4B10C5A1C056}"/>
-    <dgm:cxn modelId="{0D0384AA-8C8B-7E45-90B7-EC72CE1CB05F}" type="presOf" srcId="{F899A038-786A-784D-9A8C-B47762961A91}" destId="{906046FA-3FE7-9F40-8473-B5EFA12CD731}" srcOrd="0" destOrd="0" presId="urn:microsoft.com/office/officeart/2005/8/layout/hierarchy2"/>
+    <dgm:cxn modelId="{9AA77662-59E9-2F4F-AEB2-73307F9F0C3B}" type="presOf" srcId="{078DF73A-6E91-184E-9A3B-FE14E4A96140}" destId="{1A285AF5-0D64-FB4D-9777-7197D3E3D9FA}" srcOrd="1" destOrd="0" presId="urn:microsoft.com/office/officeart/2005/8/layout/hierarchy2"/>
+    <dgm:cxn modelId="{148C386D-B72E-E14D-9734-EF91DFF95784}" type="presOf" srcId="{153343C3-DFBE-B541-896C-FA581620A6FE}" destId="{DFE7F3F3-BBC3-F045-9E98-8D8B2D3CF0B0}" srcOrd="0" destOrd="0" presId="urn:microsoft.com/office/officeart/2005/8/layout/hierarchy2"/>
+    <dgm:cxn modelId="{8C18B8CE-B598-9245-9F17-CD684E6665EE}" type="presOf" srcId="{5ABDD403-161B-8640-B1CF-6605A3006C5D}" destId="{F1E3C0FE-152A-604E-B42E-2F9A62FCF88F}" srcOrd="0" destOrd="0" presId="urn:microsoft.com/office/officeart/2005/8/layout/hierarchy2"/>
     <dgm:cxn modelId="{586747FD-E158-5646-95A9-48156ECD7431}" type="presOf" srcId="{E495F1EB-C305-5645-B0F2-C9916CC757F8}" destId="{94741144-B7C6-0A4E-A7AC-12F81B38E505}" srcOrd="0" destOrd="0" presId="urn:microsoft.com/office/officeart/2005/8/layout/hierarchy2"/>
-    <dgm:cxn modelId="{8C18B8CE-B598-9245-9F17-CD684E6665EE}" type="presOf" srcId="{5ABDD403-161B-8640-B1CF-6605A3006C5D}" destId="{F1E3C0FE-152A-604E-B42E-2F9A62FCF88F}" srcOrd="0" destOrd="0" presId="urn:microsoft.com/office/officeart/2005/8/layout/hierarchy2"/>
     <dgm:cxn modelId="{A645CD99-B03F-0143-92A4-74C2BCD1EB79}" srcId="{E2DC3092-C700-EF47-AD26-A101D38AAF19}" destId="{F899A038-786A-784D-9A8C-B47762961A91}" srcOrd="0" destOrd="0" parTransId="{711BC174-0096-EE4F-9B23-B24CE696764D}" sibTransId="{E3A6DF54-CFED-DB45-8FA2-A3FB5EA7C4EB}"/>
     <dgm:cxn modelId="{845E401A-6803-2248-B536-22A98F12ADF3}" type="presOf" srcId="{97CFABC9-3DEE-2B45-87A4-AA2688D254C9}" destId="{4C8D73C1-D520-1648-A84C-A5A671A6A402}" srcOrd="0" destOrd="0" presId="urn:microsoft.com/office/officeart/2005/8/layout/hierarchy2"/>
-    <dgm:cxn modelId="{7821BDE9-9C89-1940-AAE5-535E59A3F205}" type="presOf" srcId="{078DF73A-6E91-184E-9A3B-FE14E4A96140}" destId="{61E907D5-8433-C747-976B-069DC4B05C94}" srcOrd="0" destOrd="0" presId="urn:microsoft.com/office/officeart/2005/8/layout/hierarchy2"/>
-    <dgm:cxn modelId="{653A6200-60D2-D84B-B918-1FD8CD99B551}" srcId="{E2DC3092-C700-EF47-AD26-A101D38AAF19}" destId="{D6A1508E-52FA-A84E-A916-36C7B4ABAB5A}" srcOrd="1" destOrd="0" parTransId="{7D32317F-CBD4-494E-83D3-ECC252474CFC}" sibTransId="{F789145C-A02D-D444-9CEB-938DAB543CCD}"/>
-    <dgm:cxn modelId="{FAA9E1C6-3B6B-9647-B7DA-F29E345DBC64}" type="presOf" srcId="{E2DC3092-C700-EF47-AD26-A101D38AAF19}" destId="{3C95B2C2-12D4-2C40-94DC-432EF193847E}" srcOrd="0" destOrd="0" presId="urn:microsoft.com/office/officeart/2005/8/layout/hierarchy2"/>
-    <dgm:cxn modelId="{B28C7FA0-B021-9A43-AC04-41012DBA2681}" type="presOf" srcId="{16B6C04A-91AD-E44B-BF78-5749F9CDFF90}" destId="{E1D27F69-9EE3-7243-B285-7475FFED6CB1}" srcOrd="1" destOrd="0" presId="urn:microsoft.com/office/officeart/2005/8/layout/hierarchy2"/>
     <dgm:cxn modelId="{CF4BA07F-25A6-684F-984C-E314A837378B}" srcId="{E2DC3092-C700-EF47-AD26-A101D38AAF19}" destId="{153343C3-DFBE-B541-896C-FA581620A6FE}" srcOrd="2" destOrd="0" parTransId="{E75B8F3C-6AE9-8E47-98F4-987DFA70CA31}" sibTransId="{729F5367-C20E-DB47-AFD6-60AAA2DE4EA7}"/>
-    <dgm:cxn modelId="{9AA77662-59E9-2F4F-AEB2-73307F9F0C3B}" type="presOf" srcId="{078DF73A-6E91-184E-9A3B-FE14E4A96140}" destId="{1A285AF5-0D64-FB4D-9777-7197D3E3D9FA}" srcOrd="1" destOrd="0" presId="urn:microsoft.com/office/officeart/2005/8/layout/hierarchy2"/>
-    <dgm:cxn modelId="{597421C0-E793-8549-AA05-6BC42F54B1BB}" type="presOf" srcId="{D6A1508E-52FA-A84E-A916-36C7B4ABAB5A}" destId="{25171AA9-2D8B-954B-B3E0-CF47A9915795}" srcOrd="0" destOrd="0" presId="urn:microsoft.com/office/officeart/2005/8/layout/hierarchy2"/>
-    <dgm:cxn modelId="{6C2F9006-491E-3542-9208-F3EEE81B639C}" type="presOf" srcId="{740AFF0B-EC80-CC40-B941-A6CC6B13EE95}" destId="{23BDE8D7-EE65-874A-9F0D-58FB08825523}" srcOrd="1" destOrd="0" presId="urn:microsoft.com/office/officeart/2005/8/layout/hierarchy2"/>
-    <dgm:cxn modelId="{700D39FE-FBE4-4445-8FB2-577B2FD2B156}" srcId="{D6A1508E-52FA-A84E-A916-36C7B4ABAB5A}" destId="{97CFABC9-3DEE-2B45-87A4-AA2688D254C9}" srcOrd="2" destOrd="0" parTransId="{16B6C04A-91AD-E44B-BF78-5749F9CDFF90}" sibTransId="{70EE7427-04C7-F34F-8676-9DFBAD02B047}"/>
-    <dgm:cxn modelId="{0F0E7A73-3946-D448-BE49-9CEAE225C3E6}" type="presOf" srcId="{16B6C04A-91AD-E44B-BF78-5749F9CDFF90}" destId="{73CB9601-7286-304F-80DF-C32285B49C3C}" srcOrd="0" destOrd="0" presId="urn:microsoft.com/office/officeart/2005/8/layout/hierarchy2"/>
-    <dgm:cxn modelId="{148C386D-B72E-E14D-9734-EF91DFF95784}" type="presOf" srcId="{153343C3-DFBE-B541-896C-FA581620A6FE}" destId="{DFE7F3F3-BBC3-F045-9E98-8D8B2D3CF0B0}" srcOrd="0" destOrd="0" presId="urn:microsoft.com/office/officeart/2005/8/layout/hierarchy2"/>
-    <dgm:cxn modelId="{BE91294A-B5BD-0A45-B14E-D2B915051EAC}" type="presOf" srcId="{740AFF0B-EC80-CC40-B941-A6CC6B13EE95}" destId="{4884089E-7BBD-F14E-9C12-BFC9A3509AB2}" srcOrd="0" destOrd="0" presId="urn:microsoft.com/office/officeart/2005/8/layout/hierarchy2"/>
-    <dgm:cxn modelId="{9B6C43B9-2D08-4C45-B168-E3CAEBDF0EA3}" srcId="{D6A1508E-52FA-A84E-A916-36C7B4ABAB5A}" destId="{E495F1EB-C305-5645-B0F2-C9916CC757F8}" srcOrd="1" destOrd="0" parTransId="{740AFF0B-EC80-CC40-B941-A6CC6B13EE95}" sibTransId="{C2EE31E0-582E-1F4F-9CDC-92EB589A12F4}"/>
     <dgm:cxn modelId="{16CC12B1-DE81-4247-9EAB-EFFDDEA81FAD}" type="presParOf" srcId="{3C95B2C2-12D4-2C40-94DC-432EF193847E}" destId="{9B22D4E5-D17A-A443-A920-E8B3F80BEB29}" srcOrd="0" destOrd="0" presId="urn:microsoft.com/office/officeart/2005/8/layout/hierarchy2"/>
     <dgm:cxn modelId="{562B78D9-E524-B14C-A5F2-1712EB00BC73}" type="presParOf" srcId="{9B22D4E5-D17A-A443-A920-E8B3F80BEB29}" destId="{906046FA-3FE7-9F40-8473-B5EFA12CD731}" srcOrd="0" destOrd="0" presId="urn:microsoft.com/office/officeart/2005/8/layout/hierarchy2"/>
     <dgm:cxn modelId="{B8774E9B-B57F-8E46-AF5B-E2A89615E24B}" type="presParOf" srcId="{9B22D4E5-D17A-A443-A920-E8B3F80BEB29}" destId="{5490504E-0696-B04E-9CA9-28F9B80F5FD0}" srcOrd="1" destOrd="0" presId="urn:microsoft.com/office/officeart/2005/8/layout/hierarchy2"/>
@@ -41872,7 +42916,7 @@
           <a:p>
             <a:fld id="{3DB8EECE-FF4B-0A44-8E99-A9FF1E455A8A}" type="datetimeFigureOut">
               <a:rPr kumimoji="1" lang="zh-CN" altLang="en-US" smtClean="0"/>
-              <a:t>16/5/8</a:t>
+              <a:t>16/5/10</a:t>
             </a:fld>
             <a:endParaRPr kumimoji="1" lang="zh-CN" altLang="en-US"/>
           </a:p>
@@ -42458,7 +43502,7 @@
             <a:fld id="{5586B75A-687E-405C-8A0B-8D00578BA2C3}" type="datetimeFigureOut">
               <a:rPr lang="en-US" smtClean="0"/>
               <a:pPr/>
-              <a:t>5/8/16</a:t>
+              <a:t>5/10/16</a:t>
             </a:fld>
             <a:endParaRPr lang="en-US" dirty="0"/>
           </a:p>
@@ -42768,7 +43812,7 @@
             <a:fld id="{5586B75A-687E-405C-8A0B-8D00578BA2C3}" type="datetimeFigureOut">
               <a:rPr lang="en-US" smtClean="0"/>
               <a:pPr/>
-              <a:t>5/8/16</a:t>
+              <a:t>5/10/16</a:t>
             </a:fld>
             <a:endParaRPr lang="en-US" dirty="0"/>
           </a:p>
@@ -43019,7 +44063,7 @@
             <a:fld id="{5586B75A-687E-405C-8A0B-8D00578BA2C3}" type="datetimeFigureOut">
               <a:rPr lang="en-US" smtClean="0"/>
               <a:pPr/>
-              <a:t>5/8/16</a:t>
+              <a:t>5/10/16</a:t>
             </a:fld>
             <a:endParaRPr lang="en-US" dirty="0"/>
           </a:p>
@@ -43562,7 +44606,7 @@
             <a:fld id="{5586B75A-687E-405C-8A0B-8D00578BA2C3}" type="datetimeFigureOut">
               <a:rPr lang="en-US" smtClean="0"/>
               <a:pPr/>
-              <a:t>5/8/16</a:t>
+              <a:t>5/10/16</a:t>
             </a:fld>
             <a:endParaRPr lang="en-US" dirty="0"/>
           </a:p>
@@ -43813,7 +44857,7 @@
             <a:fld id="{5586B75A-687E-405C-8A0B-8D00578BA2C3}" type="datetimeFigureOut">
               <a:rPr lang="en-US" smtClean="0"/>
               <a:pPr/>
-              <a:t>5/8/16</a:t>
+              <a:t>5/10/16</a:t>
             </a:fld>
             <a:endParaRPr lang="en-US" dirty="0"/>
           </a:p>
@@ -44348,7 +45392,7 @@
             <a:fld id="{5586B75A-687E-405C-8A0B-8D00578BA2C3}" type="datetimeFigureOut">
               <a:rPr lang="en-US" smtClean="0"/>
               <a:pPr/>
-              <a:t>5/8/16</a:t>
+              <a:t>5/10/16</a:t>
             </a:fld>
             <a:endParaRPr lang="en-US" dirty="0"/>
           </a:p>
@@ -44648,7 +45692,7 @@
             <a:fld id="{5586B75A-687E-405C-8A0B-8D00578BA2C3}" type="datetimeFigureOut">
               <a:rPr lang="en-US" smtClean="0"/>
               <a:pPr/>
-              <a:t>5/8/16</a:t>
+              <a:t>5/10/16</a:t>
             </a:fld>
             <a:endParaRPr lang="en-US" dirty="0"/>
           </a:p>
@@ -44825,7 +45869,7 @@
             <a:fld id="{5586B75A-687E-405C-8A0B-8D00578BA2C3}" type="datetimeFigureOut">
               <a:rPr lang="en-US" smtClean="0"/>
               <a:pPr/>
-              <a:t>5/8/16</a:t>
+              <a:t>5/10/16</a:t>
             </a:fld>
             <a:endParaRPr lang="en-US" dirty="0"/>
           </a:p>
@@ -45007,7 +46051,7 @@
             <a:fld id="{5586B75A-687E-405C-8A0B-8D00578BA2C3}" type="datetimeFigureOut">
               <a:rPr lang="en-US" smtClean="0"/>
               <a:pPr/>
-              <a:t>5/8/16</a:t>
+              <a:t>5/10/16</a:t>
             </a:fld>
             <a:endParaRPr lang="en-US" dirty="0"/>
           </a:p>
@@ -45184,7 +46228,7 @@
             <a:fld id="{5586B75A-687E-405C-8A0B-8D00578BA2C3}" type="datetimeFigureOut">
               <a:rPr lang="en-US" smtClean="0"/>
               <a:pPr/>
-              <a:t>5/8/16</a:t>
+              <a:t>5/10/16</a:t>
             </a:fld>
             <a:endParaRPr lang="en-US" dirty="0"/>
           </a:p>
@@ -45437,7 +46481,7 @@
             <a:fld id="{5586B75A-687E-405C-8A0B-8D00578BA2C3}" type="datetimeFigureOut">
               <a:rPr lang="en-US" smtClean="0"/>
               <a:pPr/>
-              <a:t>5/8/16</a:t>
+              <a:t>5/10/16</a:t>
             </a:fld>
             <a:endParaRPr lang="en-US" dirty="0"/>
           </a:p>
@@ -45741,7 +46785,7 @@
             <a:fld id="{5586B75A-687E-405C-8A0B-8D00578BA2C3}" type="datetimeFigureOut">
               <a:rPr lang="en-US" smtClean="0"/>
               <a:pPr/>
-              <a:t>5/8/16</a:t>
+              <a:t>5/10/16</a:t>
             </a:fld>
             <a:endParaRPr lang="en-US" dirty="0"/>
           </a:p>
@@ -46185,7 +47229,7 @@
             <a:fld id="{5586B75A-687E-405C-8A0B-8D00578BA2C3}" type="datetimeFigureOut">
               <a:rPr lang="en-US" smtClean="0"/>
               <a:pPr/>
-              <a:t>5/8/16</a:t>
+              <a:t>5/10/16</a:t>
             </a:fld>
             <a:endParaRPr lang="en-US" dirty="0"/>
           </a:p>
@@ -46305,7 +47349,7 @@
             <a:fld id="{5586B75A-687E-405C-8A0B-8D00578BA2C3}" type="datetimeFigureOut">
               <a:rPr lang="en-US" smtClean="0"/>
               <a:pPr/>
-              <a:t>5/8/16</a:t>
+              <a:t>5/10/16</a:t>
             </a:fld>
             <a:endParaRPr lang="en-US" dirty="0"/>
           </a:p>
@@ -46402,7 +47446,7 @@
             <a:fld id="{5586B75A-687E-405C-8A0B-8D00578BA2C3}" type="datetimeFigureOut">
               <a:rPr lang="en-US" smtClean="0"/>
               <a:pPr/>
-              <a:t>5/8/16</a:t>
+              <a:t>5/10/16</a:t>
             </a:fld>
             <a:endParaRPr lang="en-US" dirty="0"/>
           </a:p>
@@ -46687,7 +47731,7 @@
             <a:fld id="{5586B75A-687E-405C-8A0B-8D00578BA2C3}" type="datetimeFigureOut">
               <a:rPr lang="en-US" smtClean="0"/>
               <a:pPr/>
-              <a:t>5/8/16</a:t>
+              <a:t>5/10/16</a:t>
             </a:fld>
             <a:endParaRPr lang="en-US" dirty="0"/>
           </a:p>
@@ -46980,7 +48024,7 @@
             <a:fld id="{5586B75A-687E-405C-8A0B-8D00578BA2C3}" type="datetimeFigureOut">
               <a:rPr lang="en-US" smtClean="0"/>
               <a:pPr/>
-              <a:t>5/8/16</a:t>
+              <a:t>5/10/16</a:t>
             </a:fld>
             <a:endParaRPr lang="en-US" dirty="0"/>
           </a:p>
@@ -47512,7 +48556,7 @@
             <a:fld id="{5586B75A-687E-405C-8A0B-8D00578BA2C3}" type="datetimeFigureOut">
               <a:rPr lang="en-US" smtClean="0"/>
               <a:pPr/>
-              <a:t>5/8/16</a:t>
+              <a:t>5/10/16</a:t>
             </a:fld>
             <a:endParaRPr lang="en-US" dirty="0"/>
           </a:p>
@@ -50381,6 +51425,176 @@
       </p:grpSpPr>
       <p:sp>
         <p:nvSpPr>
+          <p:cNvPr id="2" name="标题 1"/>
+          <p:cNvSpPr>
+            <a:spLocks noGrp="1"/>
+          </p:cNvSpPr>
+          <p:nvPr>
+            <p:ph type="title"/>
+          </p:nvPr>
+        </p:nvSpPr>
+        <p:spPr/>
+        <p:txBody>
+          <a:bodyPr/>
+          <a:lstStyle/>
+          <a:p>
+            <a:r>
+              <a:rPr kumimoji="1" lang="zh-CN" altLang="en-US" dirty="0" smtClean="0"/>
+              <a:t>版本 </a:t>
+            </a:r>
+            <a:r>
+              <a:rPr kumimoji="1" lang="en-US" altLang="zh-CN" dirty="0" smtClean="0"/>
+              <a:t>5</a:t>
+            </a:r>
+            <a:endParaRPr kumimoji="1" lang="zh-CN" altLang="en-US" dirty="0"/>
+          </a:p>
+        </p:txBody>
+      </p:sp>
+      <p:sp>
+        <p:nvSpPr>
+          <p:cNvPr id="3" name="内容占位符 2"/>
+          <p:cNvSpPr>
+            <a:spLocks noGrp="1"/>
+          </p:cNvSpPr>
+          <p:nvPr>
+            <p:ph idx="1"/>
+          </p:nvPr>
+        </p:nvSpPr>
+        <p:spPr/>
+        <p:txBody>
+          <a:bodyPr/>
+          <a:lstStyle/>
+          <a:p>
+            <a:r>
+              <a:rPr kumimoji="1" lang="zh-CN" altLang="en-US" dirty="0" smtClean="0"/>
+              <a:t>用</a:t>
+            </a:r>
+            <a:r>
+              <a:rPr kumimoji="1" lang="en-US" altLang="zh-CN" dirty="0" err="1" smtClean="0"/>
+              <a:t>ConstZero</a:t>
+            </a:r>
+            <a:r>
+              <a:rPr kumimoji="1" lang="zh-CN" altLang="en-US" dirty="0" smtClean="0"/>
+              <a:t>来替代代码中出现的常量</a:t>
+            </a:r>
+            <a:r>
+              <a:rPr kumimoji="1" lang="en-US" altLang="zh-CN" dirty="0" smtClean="0"/>
+              <a:t>0</a:t>
+            </a:r>
+            <a:r>
+              <a:rPr kumimoji="1" lang="zh-CN" altLang="en-US" dirty="0" smtClean="0"/>
+              <a:t>，</a:t>
+            </a:r>
+            <a:r>
+              <a:rPr kumimoji="1" lang="en-US" altLang="zh-CN" dirty="0" smtClean="0"/>
+              <a:t>null</a:t>
+            </a:r>
+            <a:r>
+              <a:rPr kumimoji="1" lang="zh-CN" altLang="en-US" dirty="0" smtClean="0"/>
+              <a:t>，</a:t>
+            </a:r>
+            <a:r>
+              <a:rPr kumimoji="1" lang="en-US" altLang="zh-CN" dirty="0" smtClean="0"/>
+              <a:t>false</a:t>
+            </a:r>
+          </a:p>
+          <a:p>
+            <a:r>
+              <a:rPr kumimoji="1" lang="zh-CN" altLang="en-US" dirty="0" smtClean="0"/>
+              <a:t>如果</a:t>
+            </a:r>
+            <a:r>
+              <a:rPr kumimoji="1" lang="en-US" altLang="zh-CN" dirty="0" smtClean="0"/>
+              <a:t>Move</a:t>
+            </a:r>
+            <a:r>
+              <a:rPr kumimoji="1" lang="zh-CN" altLang="en-US" dirty="0" smtClean="0"/>
+              <a:t>指令的</a:t>
+            </a:r>
+            <a:r>
+              <a:rPr kumimoji="1" lang="en-US" altLang="zh-CN" dirty="0" err="1" smtClean="0"/>
+              <a:t>dest</a:t>
+            </a:r>
+            <a:r>
+              <a:rPr kumimoji="1" lang="zh-CN" altLang="en-US" dirty="0" smtClean="0"/>
+              <a:t>不是变量且</a:t>
+            </a:r>
+            <a:r>
+              <a:rPr kumimoji="1" lang="en-US" altLang="zh-CN" dirty="0" err="1" smtClean="0"/>
+              <a:t>refCount</a:t>
+            </a:r>
+            <a:r>
+              <a:rPr kumimoji="1" lang="en-US" altLang="zh-CN" dirty="0" smtClean="0"/>
+              <a:t>==0</a:t>
+            </a:r>
+            <a:r>
+              <a:rPr kumimoji="1" lang="zh-CN" altLang="en-US" dirty="0" smtClean="0"/>
+              <a:t>那么这个</a:t>
+            </a:r>
+            <a:r>
+              <a:rPr kumimoji="1" lang="en-US" altLang="zh-CN" dirty="0" smtClean="0"/>
+              <a:t>Move</a:t>
+            </a:r>
+            <a:r>
+              <a:rPr kumimoji="1" lang="zh-CN" altLang="en-US" dirty="0" smtClean="0"/>
+              <a:t>指令不会被翻译，（比如</a:t>
+            </a:r>
+            <a:r>
+              <a:rPr kumimoji="1" lang="en-US" altLang="zh-CN" dirty="0" err="1" smtClean="0"/>
+              <a:t>i</a:t>
+            </a:r>
+            <a:r>
+              <a:rPr kumimoji="1" lang="en-US" altLang="zh-CN" dirty="0" smtClean="0"/>
+              <a:t>++</a:t>
+            </a:r>
+            <a:r>
+              <a:rPr kumimoji="1" lang="zh-CN" altLang="en-US" dirty="0" smtClean="0"/>
+              <a:t>中会可能会出现一个无用的</a:t>
+            </a:r>
+            <a:r>
+              <a:rPr kumimoji="1" lang="en-US" altLang="zh-CN" dirty="0" smtClean="0"/>
+              <a:t>move</a:t>
+            </a:r>
+            <a:r>
+              <a:rPr kumimoji="1" lang="zh-CN" altLang="en-US" dirty="0" smtClean="0"/>
+              <a:t>语句，因为这个表达式的结果可能不会被用到）</a:t>
+            </a:r>
+            <a:endParaRPr kumimoji="1" lang="zh-CN" altLang="en-US" dirty="0"/>
+          </a:p>
+        </p:txBody>
+      </p:sp>
+    </p:spTree>
+    <p:extLst>
+      <p:ext uri="{BB962C8B-B14F-4D97-AF65-F5344CB8AC3E}">
+        <p14:creationId xmlns:p14="http://schemas.microsoft.com/office/powerpoint/2010/main" val="1479980803"/>
+      </p:ext>
+    </p:extLst>
+  </p:cSld>
+  <p:clrMapOvr>
+    <a:masterClrMapping/>
+  </p:clrMapOvr>
+</p:sld>
+</file>
+
+<file path=ppt/slides/slide28.xml><?xml version="1.0" encoding="utf-8"?>
+<p:sld xmlns:a="http://schemas.openxmlformats.org/drawingml/2006/main" xmlns:r="http://schemas.openxmlformats.org/officeDocument/2006/relationships" xmlns:p="http://schemas.openxmlformats.org/presentationml/2006/main">
+  <p:cSld>
+    <p:spTree>
+      <p:nvGrpSpPr>
+        <p:cNvPr id="1" name=""/>
+        <p:cNvGrpSpPr/>
+        <p:nvPr/>
+      </p:nvGrpSpPr>
+      <p:grpSpPr>
+        <a:xfrm>
+          <a:off x="0" y="0"/>
+          <a:ext cx="0" cy="0"/>
+          <a:chOff x="0" y="0"/>
+          <a:chExt cx="0" cy="0"/>
+        </a:xfrm>
+      </p:grpSpPr>
+      <p:sp>
+        <p:nvSpPr>
           <p:cNvPr id="4" name="标题 3"/>
           <p:cNvSpPr>
             <a:spLocks noGrp="1"/>

</xml_diff>